<commit_message>
Savepoint; declassed nearly everything in favor of react style modules; functioning fractal entrypointgit add * Blofin candle api is 99.5% - strange intermittent behavior where candles are left open; overall, not a show shopper but should be looked into; next step: complete fractal integration now in progress;
</commit_message>
<xml_diff>
--- a/~Documents/AppArchitecture.pptx
+++ b/~Documents/AppArchitecture.pptx
@@ -8,11 +8,12 @@
     <p:notesMasterId r:id="rId5"/>
   </p:notesMasterIdLst>
   <p:handoutMasterIdLst>
-    <p:handoutMasterId r:id="rId6"/>
+    <p:handoutMasterId r:id="rId7"/>
   </p:handoutMasterIdLst>
   <p:sldIdLst>
     <p:sldId id="256" r:id="rId3"/>
     <p:sldId id="257" r:id="rId4"/>
+    <p:sldId id="258" r:id="rId6"/>
   </p:sldIdLst>
   <p:sldSz cx="12192000" cy="6858000"/>
   <p:notesSz cx="7103745" cy="10234295"/>
@@ -620,6 +621,50 @@
 </file>
 
 <file path=ppt/notesSlides/notesSlide1.xml><?xml version="1.0" encoding="utf-8"?>
+<p:notes xmlns:a="http://schemas.openxmlformats.org/drawingml/2006/main" xmlns:r="http://schemas.openxmlformats.org/officeDocument/2006/relationships" xmlns:p="http://schemas.openxmlformats.org/presentationml/2006/main">
+  <p:cSld>
+    <p:spTree>
+      <p:nvGrpSpPr>
+        <p:cNvPr id="1" name=""/>
+        <p:cNvGrpSpPr/>
+        <p:nvPr/>
+      </p:nvGrpSpPr>
+      <p:grpSpPr/>
+      <p:sp>
+        <p:nvSpPr>
+          <p:cNvPr id="2" name="Slide Image Placeholder 1"/>
+          <p:cNvSpPr/>
+          <p:nvPr>
+            <p:ph type="sldImg" idx="2"/>
+          </p:nvPr>
+        </p:nvSpPr>
+        <p:spPr/>
+      </p:sp>
+      <p:sp>
+        <p:nvSpPr>
+          <p:cNvPr id="3" name="Text Placeholder 2"/>
+          <p:cNvSpPr/>
+          <p:nvPr>
+            <p:ph type="body" idx="3"/>
+          </p:nvPr>
+        </p:nvSpPr>
+        <p:spPr/>
+        <p:txBody>
+          <a:bodyPr/>
+          <a:p>
+            <a:endParaRPr lang="en-US"/>
+          </a:p>
+        </p:txBody>
+      </p:sp>
+    </p:spTree>
+  </p:cSld>
+  <p:clrMapOvr>
+    <a:masterClrMapping/>
+  </p:clrMapOvr>
+</p:notes>
+</file>
+
+<file path=ppt/notesSlides/notesSlide2.xml><?xml version="1.0" encoding="utf-8"?>
 <p:notes xmlns:a="http://schemas.openxmlformats.org/drawingml/2006/main" xmlns:r="http://schemas.openxmlformats.org/officeDocument/2006/relationships" xmlns:p="http://schemas.openxmlformats.org/presentationml/2006/main">
   <p:cSld>
     <p:spTree>
@@ -6639,6 +6684,1597 @@
             <a:solidFill>
               <a:srgbClr val="FF8D41"/>
             </a:solidFill>
+            <a:tailEnd type="triangle"/>
+          </a:ln>
+        </p:spPr>
+        <p:style>
+          <a:lnRef idx="1">
+            <a:schemeClr val="accent1"/>
+          </a:lnRef>
+          <a:fillRef idx="0">
+            <a:schemeClr val="accent1"/>
+          </a:fillRef>
+          <a:effectRef idx="0">
+            <a:schemeClr val="accent1"/>
+          </a:effectRef>
+          <a:fontRef idx="minor">
+            <a:schemeClr val="tx1"/>
+          </a:fontRef>
+        </p:style>
+      </p:cxnSp>
+    </p:spTree>
+  </p:cSld>
+  <p:clrMapOvr>
+    <a:masterClrMapping/>
+  </p:clrMapOvr>
+</p:sld>
+</file>
+
+<file path=ppt/slides/slide3.xml><?xml version="1.0" encoding="utf-8"?>
+<p:sld xmlns:a="http://schemas.openxmlformats.org/drawingml/2006/main" xmlns:r="http://schemas.openxmlformats.org/officeDocument/2006/relationships" xmlns:p="http://schemas.openxmlformats.org/presentationml/2006/main">
+  <p:cSld>
+    <p:spTree>
+      <p:nvGrpSpPr>
+        <p:cNvPr id="1" name=""/>
+        <p:cNvGrpSpPr/>
+        <p:nvPr/>
+      </p:nvGrpSpPr>
+      <p:grpSpPr>
+        <a:xfrm>
+          <a:off x="0" y="0"/>
+          <a:ext cx="0" cy="0"/>
+          <a:chOff x="0" y="0"/>
+          <a:chExt cx="0" cy="0"/>
+        </a:xfrm>
+      </p:grpSpPr>
+      <p:sp>
+        <p:nvSpPr>
+          <p:cNvPr id="80" name="Rectangles 79"/>
+          <p:cNvSpPr/>
+          <p:nvPr/>
+        </p:nvSpPr>
+        <p:spPr>
+          <a:xfrm>
+            <a:off x="5431790" y="1871345"/>
+            <a:ext cx="1555750" cy="2658110"/>
+          </a:xfrm>
+          <a:prstGeom prst="rect">
+            <a:avLst/>
+          </a:prstGeom>
+          <a:pattFill prst="wdUpDiag">
+            <a:fgClr>
+              <a:schemeClr val="accent2">
+                <a:lumMod val="40000"/>
+                <a:lumOff val="60000"/>
+              </a:schemeClr>
+            </a:fgClr>
+            <a:bgClr>
+              <a:schemeClr val="bg1"/>
+            </a:bgClr>
+          </a:pattFill>
+          <a:ln>
+            <a:solidFill>
+              <a:srgbClr val="FF8D41"/>
+            </a:solidFill>
+          </a:ln>
+        </p:spPr>
+        <p:style>
+          <a:lnRef idx="2">
+            <a:schemeClr val="accent1">
+              <a:shade val="50000"/>
+            </a:schemeClr>
+          </a:lnRef>
+          <a:fillRef idx="1">
+            <a:schemeClr val="accent1"/>
+          </a:fillRef>
+          <a:effectRef idx="0">
+            <a:schemeClr val="accent1"/>
+          </a:effectRef>
+          <a:fontRef idx="minor">
+            <a:schemeClr val="lt1"/>
+          </a:fontRef>
+        </p:style>
+        <p:txBody>
+          <a:bodyPr rtlCol="0" anchor="ctr"/>
+          <a:p>
+            <a:pPr algn="ctr"/>
+            <a:endParaRPr lang="en-US"/>
+          </a:p>
+        </p:txBody>
+      </p:sp>
+      <p:sp>
+        <p:nvSpPr>
+          <p:cNvPr id="3" name="Rectangles 2"/>
+          <p:cNvSpPr/>
+          <p:nvPr/>
+        </p:nvSpPr>
+        <p:spPr>
+          <a:xfrm>
+            <a:off x="1554798" y="2714625"/>
+            <a:ext cx="1318895" cy="831850"/>
+          </a:xfrm>
+          <a:prstGeom prst="rect">
+            <a:avLst/>
+          </a:prstGeom>
+        </p:spPr>
+        <p:style>
+          <a:lnRef idx="1">
+            <a:schemeClr val="accent4"/>
+          </a:lnRef>
+          <a:fillRef idx="2">
+            <a:schemeClr val="accent4"/>
+          </a:fillRef>
+          <a:effectRef idx="1">
+            <a:schemeClr val="accent4"/>
+          </a:effectRef>
+          <a:fontRef idx="minor">
+            <a:schemeClr val="dk1"/>
+          </a:fontRef>
+        </p:style>
+        <p:txBody>
+          <a:bodyPr rtlCol="0" anchor="ctr"/>
+          <a:p>
+            <a:pPr algn="ctr"/>
+            <a:r>
+              <a:rPr lang="en-US"/>
+              <a:t>Main</a:t>
+            </a:r>
+            <a:endParaRPr lang="en-US"/>
+          </a:p>
+        </p:txBody>
+      </p:sp>
+      <p:pic>
+        <p:nvPicPr>
+          <p:cNvPr id="5" name="Picture 4"/>
+          <p:cNvPicPr>
+            <a:picLocks noChangeAspect="1"/>
+          </p:cNvPicPr>
+          <p:nvPr/>
+        </p:nvPicPr>
+        <p:blipFill>
+          <a:blip r:embed="rId1"/>
+          <a:stretch>
+            <a:fillRect/>
+          </a:stretch>
+        </p:blipFill>
+        <p:spPr>
+          <a:xfrm>
+            <a:off x="7837488" y="100965"/>
+            <a:ext cx="1161415" cy="631190"/>
+          </a:xfrm>
+          <a:prstGeom prst="rect">
+            <a:avLst/>
+          </a:prstGeom>
+        </p:spPr>
+      </p:pic>
+      <p:pic>
+        <p:nvPicPr>
+          <p:cNvPr id="14" name="Picture 13"/>
+          <p:cNvPicPr>
+            <a:picLocks noChangeAspect="1"/>
+          </p:cNvPicPr>
+          <p:nvPr/>
+        </p:nvPicPr>
+        <p:blipFill>
+          <a:blip r:embed="rId2">
+            <a:clrChange>
+              <a:clrFrom>
+                <a:srgbClr val="FFFFFF">
+                  <a:alpha val="100000"/>
+                </a:srgbClr>
+              </a:clrFrom>
+              <a:clrTo>
+                <a:srgbClr val="FFFFFF">
+                  <a:alpha val="100000"/>
+                  <a:alpha val="0"/>
+                </a:srgbClr>
+              </a:clrTo>
+            </a:clrChange>
+          </a:blip>
+          <a:stretch>
+            <a:fillRect/>
+          </a:stretch>
+        </p:blipFill>
+        <p:spPr>
+          <a:xfrm>
+            <a:off x="7982268" y="2297430"/>
+            <a:ext cx="874395" cy="998855"/>
+          </a:xfrm>
+          <a:prstGeom prst="rect">
+            <a:avLst/>
+          </a:prstGeom>
+        </p:spPr>
+      </p:pic>
+      <p:sp>
+        <p:nvSpPr>
+          <p:cNvPr id="59" name="Rectangles 58"/>
+          <p:cNvSpPr/>
+          <p:nvPr/>
+        </p:nvSpPr>
+        <p:spPr>
+          <a:xfrm>
+            <a:off x="5552440" y="3344545"/>
+            <a:ext cx="1318895" cy="348615"/>
+          </a:xfrm>
+          <a:prstGeom prst="rect">
+            <a:avLst/>
+          </a:prstGeom>
+          <a:ln w="22225"/>
+        </p:spPr>
+        <p:style>
+          <a:lnRef idx="1">
+            <a:schemeClr val="accent4"/>
+          </a:lnRef>
+          <a:fillRef idx="2">
+            <a:schemeClr val="accent4"/>
+          </a:fillRef>
+          <a:effectRef idx="1">
+            <a:schemeClr val="accent4"/>
+          </a:effectRef>
+          <a:fontRef idx="minor">
+            <a:schemeClr val="dk1"/>
+          </a:fontRef>
+        </p:style>
+        <p:txBody>
+          <a:bodyPr rtlCol="0" anchor="ctr"/>
+          <a:p>
+            <a:pPr algn="ctr"/>
+            <a:r>
+              <a:rPr lang="en-US" sz="1400">
+                <a:sym typeface="+mn-ea"/>
+              </a:rPr>
+              <a:t>CProcess</a:t>
+            </a:r>
+            <a:endParaRPr lang="en-US" sz="1400"/>
+          </a:p>
+        </p:txBody>
+      </p:sp>
+      <p:sp>
+        <p:nvSpPr>
+          <p:cNvPr id="60" name="Rectangles 59"/>
+          <p:cNvSpPr/>
+          <p:nvPr/>
+        </p:nvSpPr>
+        <p:spPr>
+          <a:xfrm>
+            <a:off x="5552440" y="2667635"/>
+            <a:ext cx="1318895" cy="348615"/>
+          </a:xfrm>
+          <a:prstGeom prst="rect">
+            <a:avLst/>
+          </a:prstGeom>
+          <a:ln w="22225"/>
+        </p:spPr>
+        <p:style>
+          <a:lnRef idx="1">
+            <a:schemeClr val="accent4"/>
+          </a:lnRef>
+          <a:fillRef idx="2">
+            <a:schemeClr val="accent4"/>
+          </a:fillRef>
+          <a:effectRef idx="1">
+            <a:schemeClr val="accent4"/>
+          </a:effectRef>
+          <a:fontRef idx="minor">
+            <a:schemeClr val="dk1"/>
+          </a:fontRef>
+        </p:style>
+        <p:txBody>
+          <a:bodyPr rtlCol="0" anchor="ctr"/>
+          <a:p>
+            <a:pPr algn="ctr"/>
+            <a:r>
+              <a:rPr lang="en-US" sz="1400">
+                <a:sym typeface="+mn-ea"/>
+              </a:rPr>
+              <a:t>CProcess</a:t>
+            </a:r>
+            <a:endParaRPr lang="en-US" sz="1400"/>
+          </a:p>
+        </p:txBody>
+      </p:sp>
+      <p:sp>
+        <p:nvSpPr>
+          <p:cNvPr id="61" name="Rectangles 60"/>
+          <p:cNvSpPr/>
+          <p:nvPr/>
+        </p:nvSpPr>
+        <p:spPr>
+          <a:xfrm>
+            <a:off x="5552440" y="1990725"/>
+            <a:ext cx="1318895" cy="348615"/>
+          </a:xfrm>
+          <a:prstGeom prst="rect">
+            <a:avLst/>
+          </a:prstGeom>
+          <a:ln w="22225"/>
+        </p:spPr>
+        <p:style>
+          <a:lnRef idx="1">
+            <a:schemeClr val="accent4"/>
+          </a:lnRef>
+          <a:fillRef idx="2">
+            <a:schemeClr val="accent4"/>
+          </a:fillRef>
+          <a:effectRef idx="1">
+            <a:schemeClr val="accent4"/>
+          </a:effectRef>
+          <a:fontRef idx="minor">
+            <a:schemeClr val="dk1"/>
+          </a:fontRef>
+        </p:style>
+        <p:txBody>
+          <a:bodyPr rtlCol="0" anchor="ctr"/>
+          <a:p>
+            <a:pPr algn="ctr"/>
+            <a:r>
+              <a:rPr lang="en-US" sz="1400"/>
+              <a:t>CProcess</a:t>
+            </a:r>
+            <a:endParaRPr lang="en-US" sz="1400"/>
+          </a:p>
+        </p:txBody>
+      </p:sp>
+      <p:sp>
+        <p:nvSpPr>
+          <p:cNvPr id="62" name="Rectangles 61"/>
+          <p:cNvSpPr/>
+          <p:nvPr/>
+        </p:nvSpPr>
+        <p:spPr>
+          <a:xfrm>
+            <a:off x="5552440" y="4021455"/>
+            <a:ext cx="1318895" cy="348615"/>
+          </a:xfrm>
+          <a:prstGeom prst="rect">
+            <a:avLst/>
+          </a:prstGeom>
+          <a:ln w="22225"/>
+        </p:spPr>
+        <p:style>
+          <a:lnRef idx="1">
+            <a:schemeClr val="accent4"/>
+          </a:lnRef>
+          <a:fillRef idx="2">
+            <a:schemeClr val="accent4"/>
+          </a:fillRef>
+          <a:effectRef idx="1">
+            <a:schemeClr val="accent4"/>
+          </a:effectRef>
+          <a:fontRef idx="minor">
+            <a:schemeClr val="dk1"/>
+          </a:fontRef>
+        </p:style>
+        <p:txBody>
+          <a:bodyPr rtlCol="0" anchor="ctr"/>
+          <a:p>
+            <a:pPr algn="ctr"/>
+            <a:r>
+              <a:rPr lang="en-US" sz="1400">
+                <a:sym typeface="+mn-ea"/>
+              </a:rPr>
+              <a:t>CProcess</a:t>
+            </a:r>
+            <a:endParaRPr lang="en-US" sz="1400"/>
+          </a:p>
+        </p:txBody>
+      </p:sp>
+      <p:cxnSp>
+        <p:nvCxnSpPr>
+          <p:cNvPr id="63" name="Straight Connector 62"/>
+          <p:cNvCxnSpPr>
+            <a:stCxn id="9" idx="1"/>
+            <a:endCxn id="61" idx="1"/>
+          </p:cNvCxnSpPr>
+          <p:nvPr/>
+        </p:nvCxnSpPr>
+        <p:spPr>
+          <a:xfrm flipV="1">
+            <a:off x="3308350" y="2165350"/>
+            <a:ext cx="2244090" cy="965200"/>
+          </a:xfrm>
+          <a:prstGeom prst="line">
+            <a:avLst/>
+          </a:prstGeom>
+          <a:ln>
+            <a:solidFill>
+              <a:srgbClr val="FF8D41"/>
+            </a:solidFill>
+            <a:tailEnd type="triangle"/>
+          </a:ln>
+        </p:spPr>
+        <p:style>
+          <a:lnRef idx="1">
+            <a:schemeClr val="accent1"/>
+          </a:lnRef>
+          <a:fillRef idx="0">
+            <a:schemeClr val="accent1"/>
+          </a:fillRef>
+          <a:effectRef idx="0">
+            <a:schemeClr val="accent1"/>
+          </a:effectRef>
+          <a:fontRef idx="minor">
+            <a:schemeClr val="tx1"/>
+          </a:fontRef>
+        </p:style>
+      </p:cxnSp>
+      <p:cxnSp>
+        <p:nvCxnSpPr>
+          <p:cNvPr id="64" name="Straight Connector 63"/>
+          <p:cNvCxnSpPr>
+            <a:stCxn id="9" idx="1"/>
+            <a:endCxn id="60" idx="1"/>
+          </p:cNvCxnSpPr>
+          <p:nvPr/>
+        </p:nvCxnSpPr>
+        <p:spPr>
+          <a:xfrm flipV="1">
+            <a:off x="3308350" y="2842260"/>
+            <a:ext cx="2244090" cy="288290"/>
+          </a:xfrm>
+          <a:prstGeom prst="line">
+            <a:avLst/>
+          </a:prstGeom>
+          <a:ln>
+            <a:solidFill>
+              <a:srgbClr val="FF8D41"/>
+            </a:solidFill>
+            <a:tailEnd type="triangle"/>
+          </a:ln>
+        </p:spPr>
+        <p:style>
+          <a:lnRef idx="1">
+            <a:schemeClr val="accent1"/>
+          </a:lnRef>
+          <a:fillRef idx="0">
+            <a:schemeClr val="accent1"/>
+          </a:fillRef>
+          <a:effectRef idx="0">
+            <a:schemeClr val="accent1"/>
+          </a:effectRef>
+          <a:fontRef idx="minor">
+            <a:schemeClr val="tx1"/>
+          </a:fontRef>
+        </p:style>
+      </p:cxnSp>
+      <p:cxnSp>
+        <p:nvCxnSpPr>
+          <p:cNvPr id="65" name="Straight Connector 64"/>
+          <p:cNvCxnSpPr>
+            <a:stCxn id="9" idx="1"/>
+            <a:endCxn id="59" idx="1"/>
+          </p:cNvCxnSpPr>
+          <p:nvPr/>
+        </p:nvCxnSpPr>
+        <p:spPr>
+          <a:xfrm>
+            <a:off x="3308350" y="3130550"/>
+            <a:ext cx="2244090" cy="388620"/>
+          </a:xfrm>
+          <a:prstGeom prst="line">
+            <a:avLst/>
+          </a:prstGeom>
+          <a:ln>
+            <a:solidFill>
+              <a:srgbClr val="FF8D41"/>
+            </a:solidFill>
+            <a:tailEnd type="triangle"/>
+          </a:ln>
+        </p:spPr>
+        <p:style>
+          <a:lnRef idx="1">
+            <a:schemeClr val="accent1"/>
+          </a:lnRef>
+          <a:fillRef idx="0">
+            <a:schemeClr val="accent1"/>
+          </a:fillRef>
+          <a:effectRef idx="0">
+            <a:schemeClr val="accent1"/>
+          </a:effectRef>
+          <a:fontRef idx="minor">
+            <a:schemeClr val="tx1"/>
+          </a:fontRef>
+        </p:style>
+      </p:cxnSp>
+      <p:cxnSp>
+        <p:nvCxnSpPr>
+          <p:cNvPr id="66" name="Straight Connector 65"/>
+          <p:cNvCxnSpPr>
+            <a:stCxn id="9" idx="1"/>
+            <a:endCxn id="62" idx="1"/>
+          </p:cNvCxnSpPr>
+          <p:nvPr/>
+        </p:nvCxnSpPr>
+        <p:spPr>
+          <a:xfrm>
+            <a:off x="3308350" y="3130550"/>
+            <a:ext cx="2244090" cy="1065530"/>
+          </a:xfrm>
+          <a:prstGeom prst="line">
+            <a:avLst/>
+          </a:prstGeom>
+          <a:ln>
+            <a:solidFill>
+              <a:srgbClr val="FF8D41"/>
+            </a:solidFill>
+            <a:tailEnd type="triangle"/>
+          </a:ln>
+        </p:spPr>
+        <p:style>
+          <a:lnRef idx="1">
+            <a:schemeClr val="accent1"/>
+          </a:lnRef>
+          <a:fillRef idx="0">
+            <a:schemeClr val="accent1"/>
+          </a:fillRef>
+          <a:effectRef idx="0">
+            <a:schemeClr val="accent1"/>
+          </a:effectRef>
+          <a:fontRef idx="minor">
+            <a:schemeClr val="tx1"/>
+          </a:fontRef>
+        </p:style>
+      </p:cxnSp>
+      <p:cxnSp>
+        <p:nvCxnSpPr>
+          <p:cNvPr id="67" name="Straight Connector 66"/>
+          <p:cNvCxnSpPr>
+            <a:stCxn id="6" idx="0"/>
+            <a:endCxn id="5" idx="2"/>
+          </p:cNvCxnSpPr>
+          <p:nvPr/>
+        </p:nvCxnSpPr>
+        <p:spPr>
+          <a:xfrm flipH="1" flipV="1">
+            <a:off x="8418830" y="732155"/>
+            <a:ext cx="1270" cy="363855"/>
+          </a:xfrm>
+          <a:prstGeom prst="line">
+            <a:avLst/>
+          </a:prstGeom>
+          <a:ln>
+            <a:solidFill>
+              <a:srgbClr val="00B0F0"/>
+            </a:solidFill>
+            <a:headEnd type="none"/>
+            <a:tailEnd type="triangle"/>
+          </a:ln>
+        </p:spPr>
+        <p:style>
+          <a:lnRef idx="1">
+            <a:schemeClr val="accent1"/>
+          </a:lnRef>
+          <a:fillRef idx="0">
+            <a:schemeClr val="accent1"/>
+          </a:fillRef>
+          <a:effectRef idx="0">
+            <a:schemeClr val="accent1"/>
+          </a:effectRef>
+          <a:fontRef idx="minor">
+            <a:schemeClr val="tx1"/>
+          </a:fontRef>
+        </p:style>
+      </p:cxnSp>
+      <p:sp>
+        <p:nvSpPr>
+          <p:cNvPr id="9" name="Rectangles 8"/>
+          <p:cNvSpPr/>
+          <p:nvPr/>
+        </p:nvSpPr>
+        <p:spPr>
+          <a:xfrm>
+            <a:off x="3308350" y="2714625"/>
+            <a:ext cx="1318895" cy="831850"/>
+          </a:xfrm>
+          <a:prstGeom prst="rect">
+            <a:avLst/>
+          </a:prstGeom>
+        </p:spPr>
+        <p:style>
+          <a:lnRef idx="1">
+            <a:schemeClr val="accent4"/>
+          </a:lnRef>
+          <a:fillRef idx="2">
+            <a:schemeClr val="accent4"/>
+          </a:fillRef>
+          <a:effectRef idx="1">
+            <a:schemeClr val="accent4"/>
+          </a:effectRef>
+          <a:fontRef idx="minor">
+            <a:schemeClr val="dk1"/>
+          </a:fontRef>
+        </p:style>
+        <p:txBody>
+          <a:bodyPr rtlCol="0" anchor="ctr"/>
+          <a:p>
+            <a:pPr algn="ctr"/>
+            <a:r>
+              <a:rPr lang="en-US"/>
+              <a:t>CMain</a:t>
+            </a:r>
+            <a:endParaRPr lang="en-US"/>
+          </a:p>
+        </p:txBody>
+      </p:sp>
+      <p:sp>
+        <p:nvSpPr>
+          <p:cNvPr id="23" name="Down Arrow 22"/>
+          <p:cNvSpPr/>
+          <p:nvPr/>
+        </p:nvSpPr>
+        <p:spPr>
+          <a:xfrm rot="16200000">
+            <a:off x="3079750" y="2993390"/>
+            <a:ext cx="91440" cy="365760"/>
+          </a:xfrm>
+          <a:prstGeom prst="downArrow">
+            <a:avLst>
+              <a:gd name="adj1" fmla="val 50000"/>
+              <a:gd name="adj2" fmla="val 85781"/>
+            </a:avLst>
+          </a:prstGeom>
+        </p:spPr>
+        <p:style>
+          <a:lnRef idx="2">
+            <a:schemeClr val="accent2">
+              <a:shade val="50000"/>
+            </a:schemeClr>
+          </a:lnRef>
+          <a:fillRef idx="1">
+            <a:schemeClr val="accent2"/>
+          </a:fillRef>
+          <a:effectRef idx="0">
+            <a:schemeClr val="accent2"/>
+          </a:effectRef>
+          <a:fontRef idx="minor">
+            <a:schemeClr val="lt1"/>
+          </a:fontRef>
+        </p:style>
+        <p:txBody>
+          <a:bodyPr rtlCol="0" anchor="ctr"/>
+          <a:p>
+            <a:pPr algn="ctr"/>
+            <a:endParaRPr lang="en-US" b="1"/>
+          </a:p>
+        </p:txBody>
+      </p:sp>
+      <p:cxnSp>
+        <p:nvCxnSpPr>
+          <p:cNvPr id="7" name="Straight Connector 6"/>
+          <p:cNvCxnSpPr>
+            <a:endCxn id="6" idx="0"/>
+          </p:cNvCxnSpPr>
+          <p:nvPr/>
+        </p:nvCxnSpPr>
+        <p:spPr>
+          <a:xfrm flipV="1">
+            <a:off x="6846570" y="1096010"/>
+            <a:ext cx="1573530" cy="1274445"/>
+          </a:xfrm>
+          <a:prstGeom prst="line">
+            <a:avLst/>
+          </a:prstGeom>
+          <a:ln>
+            <a:solidFill>
+              <a:srgbClr val="FF8D41"/>
+            </a:solidFill>
+            <a:tailEnd type="triangle"/>
+          </a:ln>
+        </p:spPr>
+        <p:style>
+          <a:lnRef idx="1">
+            <a:schemeClr val="accent1"/>
+          </a:lnRef>
+          <a:fillRef idx="0">
+            <a:schemeClr val="accent1"/>
+          </a:fillRef>
+          <a:effectRef idx="0">
+            <a:schemeClr val="accent1"/>
+          </a:effectRef>
+          <a:fontRef idx="minor">
+            <a:schemeClr val="tx1"/>
+          </a:fontRef>
+        </p:style>
+      </p:cxnSp>
+      <p:cxnSp>
+        <p:nvCxnSpPr>
+          <p:cNvPr id="10" name="Straight Connector 9"/>
+          <p:cNvCxnSpPr>
+            <a:endCxn id="6" idx="0"/>
+          </p:cNvCxnSpPr>
+          <p:nvPr/>
+        </p:nvCxnSpPr>
+        <p:spPr>
+          <a:xfrm flipV="1">
+            <a:off x="6840220" y="1096010"/>
+            <a:ext cx="1579880" cy="1943100"/>
+          </a:xfrm>
+          <a:prstGeom prst="line">
+            <a:avLst/>
+          </a:prstGeom>
+          <a:ln>
+            <a:solidFill>
+              <a:srgbClr val="FF8D41"/>
+            </a:solidFill>
+            <a:tailEnd type="triangle"/>
+          </a:ln>
+        </p:spPr>
+        <p:style>
+          <a:lnRef idx="1">
+            <a:schemeClr val="accent1"/>
+          </a:lnRef>
+          <a:fillRef idx="0">
+            <a:schemeClr val="accent1"/>
+          </a:fillRef>
+          <a:effectRef idx="0">
+            <a:schemeClr val="accent1"/>
+          </a:effectRef>
+          <a:fontRef idx="minor">
+            <a:schemeClr val="tx1"/>
+          </a:fontRef>
+        </p:style>
+      </p:cxnSp>
+      <p:cxnSp>
+        <p:nvCxnSpPr>
+          <p:cNvPr id="11" name="Straight Connector 10"/>
+          <p:cNvCxnSpPr>
+            <a:endCxn id="6" idx="0"/>
+          </p:cNvCxnSpPr>
+          <p:nvPr/>
+        </p:nvCxnSpPr>
+        <p:spPr>
+          <a:xfrm flipV="1">
+            <a:off x="6840220" y="1096010"/>
+            <a:ext cx="1579880" cy="2648585"/>
+          </a:xfrm>
+          <a:prstGeom prst="line">
+            <a:avLst/>
+          </a:prstGeom>
+          <a:ln>
+            <a:solidFill>
+              <a:srgbClr val="FF8D41"/>
+            </a:solidFill>
+            <a:tailEnd type="triangle"/>
+          </a:ln>
+        </p:spPr>
+        <p:style>
+          <a:lnRef idx="1">
+            <a:schemeClr val="accent1"/>
+          </a:lnRef>
+          <a:fillRef idx="0">
+            <a:schemeClr val="accent1"/>
+          </a:fillRef>
+          <a:effectRef idx="0">
+            <a:schemeClr val="accent1"/>
+          </a:effectRef>
+          <a:fontRef idx="minor">
+            <a:schemeClr val="tx1"/>
+          </a:fontRef>
+        </p:style>
+      </p:cxnSp>
+      <p:cxnSp>
+        <p:nvCxnSpPr>
+          <p:cNvPr id="12" name="Straight Connector 11"/>
+          <p:cNvCxnSpPr>
+            <a:endCxn id="6" idx="0"/>
+          </p:cNvCxnSpPr>
+          <p:nvPr/>
+        </p:nvCxnSpPr>
+        <p:spPr>
+          <a:xfrm flipV="1">
+            <a:off x="6858635" y="1096010"/>
+            <a:ext cx="1561465" cy="3286125"/>
+          </a:xfrm>
+          <a:prstGeom prst="line">
+            <a:avLst/>
+          </a:prstGeom>
+          <a:ln>
+            <a:solidFill>
+              <a:srgbClr val="FF8D41"/>
+            </a:solidFill>
+            <a:tailEnd type="triangle"/>
+          </a:ln>
+        </p:spPr>
+        <p:style>
+          <a:lnRef idx="1">
+            <a:schemeClr val="accent1"/>
+          </a:lnRef>
+          <a:fillRef idx="0">
+            <a:schemeClr val="accent1"/>
+          </a:fillRef>
+          <a:effectRef idx="0">
+            <a:schemeClr val="accent1"/>
+          </a:effectRef>
+          <a:fontRef idx="minor">
+            <a:schemeClr val="tx1"/>
+          </a:fontRef>
+        </p:style>
+      </p:cxnSp>
+      <p:sp>
+        <p:nvSpPr>
+          <p:cNvPr id="6" name="Rectangles 5"/>
+          <p:cNvSpPr/>
+          <p:nvPr/>
+        </p:nvSpPr>
+        <p:spPr>
+          <a:xfrm>
+            <a:off x="7760335" y="1096010"/>
+            <a:ext cx="1318895" cy="765810"/>
+          </a:xfrm>
+          <a:prstGeom prst="rect">
+            <a:avLst/>
+          </a:prstGeom>
+          <a:ln w="22225"/>
+        </p:spPr>
+        <p:style>
+          <a:lnRef idx="1">
+            <a:schemeClr val="accent4"/>
+          </a:lnRef>
+          <a:fillRef idx="2">
+            <a:schemeClr val="accent4"/>
+          </a:fillRef>
+          <a:effectRef idx="1">
+            <a:schemeClr val="accent4"/>
+          </a:effectRef>
+          <a:fontRef idx="minor">
+            <a:schemeClr val="dk1"/>
+          </a:fontRef>
+        </p:style>
+        <p:txBody>
+          <a:bodyPr rtlCol="0" anchor="ctr"/>
+          <a:p>
+            <a:pPr algn="ctr"/>
+            <a:r>
+              <a:rPr lang="en-US" sz="1400"/>
+              <a:t>API</a:t>
+            </a:r>
+            <a:endParaRPr lang="en-US" sz="1400"/>
+          </a:p>
+        </p:txBody>
+      </p:sp>
+      <p:cxnSp>
+        <p:nvCxnSpPr>
+          <p:cNvPr id="15" name="Elbow Connector 14"/>
+          <p:cNvCxnSpPr>
+            <a:stCxn id="6" idx="1"/>
+            <a:endCxn id="9" idx="0"/>
+          </p:cNvCxnSpPr>
+          <p:nvPr/>
+        </p:nvCxnSpPr>
+        <p:spPr>
+          <a:xfrm rot="10800000" flipV="1">
+            <a:off x="3968115" y="1478915"/>
+            <a:ext cx="3792220" cy="1235710"/>
+          </a:xfrm>
+          <a:prstGeom prst="bentConnector2">
+            <a:avLst/>
+          </a:prstGeom>
+          <a:ln>
+            <a:tailEnd type="triangle"/>
+          </a:ln>
+        </p:spPr>
+        <p:style>
+          <a:lnRef idx="1">
+            <a:schemeClr val="accent1"/>
+          </a:lnRef>
+          <a:fillRef idx="0">
+            <a:schemeClr val="accent1"/>
+          </a:fillRef>
+          <a:effectRef idx="0">
+            <a:schemeClr val="accent1"/>
+          </a:effectRef>
+          <a:fontRef idx="minor">
+            <a:schemeClr val="tx1"/>
+          </a:fontRef>
+        </p:style>
+      </p:cxnSp>
+      <p:cxnSp>
+        <p:nvCxnSpPr>
+          <p:cNvPr id="84" name="Straight Connector 83"/>
+          <p:cNvCxnSpPr>
+            <a:stCxn id="6" idx="2"/>
+            <a:endCxn id="14" idx="0"/>
+          </p:cNvCxnSpPr>
+          <p:nvPr/>
+        </p:nvCxnSpPr>
+        <p:spPr>
+          <a:xfrm flipH="1">
+            <a:off x="8419465" y="1861820"/>
+            <a:ext cx="635" cy="435610"/>
+          </a:xfrm>
+          <a:prstGeom prst="line">
+            <a:avLst/>
+          </a:prstGeom>
+          <a:ln>
+            <a:solidFill>
+              <a:srgbClr val="00B0F0"/>
+            </a:solidFill>
+            <a:headEnd type="none"/>
+            <a:tailEnd type="triangle"/>
+          </a:ln>
+        </p:spPr>
+        <p:style>
+          <a:lnRef idx="1">
+            <a:schemeClr val="accent1"/>
+          </a:lnRef>
+          <a:fillRef idx="0">
+            <a:schemeClr val="accent1"/>
+          </a:fillRef>
+          <a:effectRef idx="0">
+            <a:schemeClr val="accent1"/>
+          </a:effectRef>
+          <a:fontRef idx="minor">
+            <a:schemeClr val="tx1"/>
+          </a:fontRef>
+        </p:style>
+      </p:cxnSp>
+      <p:cxnSp>
+        <p:nvCxnSpPr>
+          <p:cNvPr id="89" name="Straight Connector 88"/>
+          <p:cNvCxnSpPr>
+            <a:endCxn id="88" idx="1"/>
+          </p:cNvCxnSpPr>
+          <p:nvPr/>
+        </p:nvCxnSpPr>
+        <p:spPr>
+          <a:xfrm>
+            <a:off x="6846570" y="2431415"/>
+            <a:ext cx="1221740" cy="1494155"/>
+          </a:xfrm>
+          <a:prstGeom prst="line">
+            <a:avLst/>
+          </a:prstGeom>
+          <a:ln>
+            <a:solidFill>
+              <a:srgbClr val="00B050"/>
+            </a:solidFill>
+            <a:tailEnd type="oval"/>
+          </a:ln>
+        </p:spPr>
+        <p:style>
+          <a:lnRef idx="1">
+            <a:schemeClr val="accent1"/>
+          </a:lnRef>
+          <a:fillRef idx="0">
+            <a:schemeClr val="accent1"/>
+          </a:fillRef>
+          <a:effectRef idx="0">
+            <a:schemeClr val="accent1"/>
+          </a:effectRef>
+          <a:fontRef idx="minor">
+            <a:schemeClr val="tx1"/>
+          </a:fontRef>
+        </p:style>
+      </p:cxnSp>
+      <p:cxnSp>
+        <p:nvCxnSpPr>
+          <p:cNvPr id="90" name="Straight Connector 89"/>
+          <p:cNvCxnSpPr>
+            <a:endCxn id="88" idx="1"/>
+          </p:cNvCxnSpPr>
+          <p:nvPr/>
+        </p:nvCxnSpPr>
+        <p:spPr>
+          <a:xfrm>
+            <a:off x="6858635" y="3081655"/>
+            <a:ext cx="1209675" cy="843915"/>
+          </a:xfrm>
+          <a:prstGeom prst="line">
+            <a:avLst/>
+          </a:prstGeom>
+          <a:ln>
+            <a:solidFill>
+              <a:srgbClr val="00B050"/>
+            </a:solidFill>
+            <a:tailEnd type="oval"/>
+          </a:ln>
+        </p:spPr>
+        <p:style>
+          <a:lnRef idx="1">
+            <a:schemeClr val="accent1"/>
+          </a:lnRef>
+          <a:fillRef idx="0">
+            <a:schemeClr val="accent1"/>
+          </a:fillRef>
+          <a:effectRef idx="0">
+            <a:schemeClr val="accent1"/>
+          </a:effectRef>
+          <a:fontRef idx="minor">
+            <a:schemeClr val="tx1"/>
+          </a:fontRef>
+        </p:style>
+      </p:cxnSp>
+      <p:cxnSp>
+        <p:nvCxnSpPr>
+          <p:cNvPr id="91" name="Straight Connector 90"/>
+          <p:cNvCxnSpPr>
+            <a:endCxn id="88" idx="1"/>
+          </p:cNvCxnSpPr>
+          <p:nvPr/>
+        </p:nvCxnSpPr>
+        <p:spPr>
+          <a:xfrm>
+            <a:off x="6846570" y="3683000"/>
+            <a:ext cx="1221740" cy="242570"/>
+          </a:xfrm>
+          <a:prstGeom prst="line">
+            <a:avLst/>
+          </a:prstGeom>
+          <a:ln>
+            <a:solidFill>
+              <a:srgbClr val="00B050"/>
+            </a:solidFill>
+            <a:tailEnd type="oval"/>
+          </a:ln>
+        </p:spPr>
+        <p:style>
+          <a:lnRef idx="1">
+            <a:schemeClr val="accent1"/>
+          </a:lnRef>
+          <a:fillRef idx="0">
+            <a:schemeClr val="accent1"/>
+          </a:fillRef>
+          <a:effectRef idx="0">
+            <a:schemeClr val="accent1"/>
+          </a:effectRef>
+          <a:fontRef idx="minor">
+            <a:schemeClr val="tx1"/>
+          </a:fontRef>
+        </p:style>
+      </p:cxnSp>
+      <p:cxnSp>
+        <p:nvCxnSpPr>
+          <p:cNvPr id="92" name="Straight Connector 91"/>
+          <p:cNvCxnSpPr>
+            <a:endCxn id="88" idx="1"/>
+          </p:cNvCxnSpPr>
+          <p:nvPr/>
+        </p:nvCxnSpPr>
+        <p:spPr>
+          <a:xfrm flipV="1">
+            <a:off x="6846570" y="3925570"/>
+            <a:ext cx="1221740" cy="469265"/>
+          </a:xfrm>
+          <a:prstGeom prst="line">
+            <a:avLst/>
+          </a:prstGeom>
+          <a:ln>
+            <a:solidFill>
+              <a:srgbClr val="00B050"/>
+            </a:solidFill>
+            <a:tailEnd type="oval"/>
+          </a:ln>
+        </p:spPr>
+        <p:style>
+          <a:lnRef idx="1">
+            <a:schemeClr val="accent1"/>
+          </a:lnRef>
+          <a:fillRef idx="0">
+            <a:schemeClr val="accent1"/>
+          </a:fillRef>
+          <a:effectRef idx="0">
+            <a:schemeClr val="accent1"/>
+          </a:effectRef>
+          <a:fontRef idx="minor">
+            <a:schemeClr val="tx1"/>
+          </a:fontRef>
+        </p:style>
+      </p:cxnSp>
+      <p:sp>
+        <p:nvSpPr>
+          <p:cNvPr id="93" name="Rectangles 92"/>
+          <p:cNvSpPr/>
+          <p:nvPr/>
+        </p:nvSpPr>
+        <p:spPr>
+          <a:xfrm>
+            <a:off x="7759065" y="4667885"/>
+            <a:ext cx="1318895" cy="765810"/>
+          </a:xfrm>
+          <a:prstGeom prst="rect">
+            <a:avLst/>
+          </a:prstGeom>
+          <a:ln w="22225"/>
+        </p:spPr>
+        <p:style>
+          <a:lnRef idx="1">
+            <a:schemeClr val="accent4"/>
+          </a:lnRef>
+          <a:fillRef idx="2">
+            <a:schemeClr val="accent4"/>
+          </a:fillRef>
+          <a:effectRef idx="1">
+            <a:schemeClr val="accent4"/>
+          </a:effectRef>
+          <a:fontRef idx="minor">
+            <a:schemeClr val="dk1"/>
+          </a:fontRef>
+        </p:style>
+        <p:txBody>
+          <a:bodyPr rtlCol="0" anchor="ctr"/>
+          <a:p>
+            <a:pPr algn="ctr"/>
+            <a:r>
+              <a:rPr lang="en-US" sz="1400"/>
+              <a:t>Update</a:t>
+            </a:r>
+            <a:endParaRPr lang="en-US" sz="1400"/>
+          </a:p>
+        </p:txBody>
+      </p:sp>
+      <p:sp>
+        <p:nvSpPr>
+          <p:cNvPr id="88" name="Diamond 87"/>
+          <p:cNvSpPr/>
+          <p:nvPr/>
+        </p:nvSpPr>
+        <p:spPr>
+          <a:xfrm>
+            <a:off x="8068310" y="3606165"/>
+            <a:ext cx="708660" cy="638175"/>
+          </a:xfrm>
+          <a:prstGeom prst="diamond">
+            <a:avLst/>
+          </a:prstGeom>
+        </p:spPr>
+        <p:style>
+          <a:lnRef idx="2">
+            <a:schemeClr val="accent2">
+              <a:shade val="50000"/>
+            </a:schemeClr>
+          </a:lnRef>
+          <a:fillRef idx="1">
+            <a:schemeClr val="accent2"/>
+          </a:fillRef>
+          <a:effectRef idx="0">
+            <a:schemeClr val="accent2"/>
+          </a:effectRef>
+          <a:fontRef idx="minor">
+            <a:schemeClr val="lt1"/>
+          </a:fontRef>
+        </p:style>
+        <p:txBody>
+          <a:bodyPr rtlCol="0" anchor="ctr"/>
+          <a:p>
+            <a:pPr algn="ctr"/>
+            <a:r>
+              <a:rPr lang="en-US" b="1"/>
+              <a:t>?</a:t>
+            </a:r>
+            <a:endParaRPr lang="en-US" b="1"/>
+          </a:p>
+        </p:txBody>
+      </p:sp>
+      <p:cxnSp>
+        <p:nvCxnSpPr>
+          <p:cNvPr id="98" name="Straight Connector 97"/>
+          <p:cNvCxnSpPr>
+            <a:stCxn id="14" idx="2"/>
+            <a:endCxn id="88" idx="0"/>
+          </p:cNvCxnSpPr>
+          <p:nvPr/>
+        </p:nvCxnSpPr>
+        <p:spPr>
+          <a:xfrm>
+            <a:off x="8420100" y="3296285"/>
+            <a:ext cx="2540" cy="309880"/>
+          </a:xfrm>
+          <a:prstGeom prst="line">
+            <a:avLst/>
+          </a:prstGeom>
+          <a:ln>
+            <a:solidFill>
+              <a:srgbClr val="00B0F0"/>
+            </a:solidFill>
+            <a:headEnd type="none"/>
+            <a:tailEnd type="triangle"/>
+          </a:ln>
+        </p:spPr>
+        <p:style>
+          <a:lnRef idx="1">
+            <a:schemeClr val="accent1"/>
+          </a:lnRef>
+          <a:fillRef idx="0">
+            <a:schemeClr val="accent1"/>
+          </a:fillRef>
+          <a:effectRef idx="0">
+            <a:schemeClr val="accent1"/>
+          </a:effectRef>
+          <a:fontRef idx="minor">
+            <a:schemeClr val="tx1"/>
+          </a:fontRef>
+        </p:style>
+      </p:cxnSp>
+      <p:cxnSp>
+        <p:nvCxnSpPr>
+          <p:cNvPr id="99" name="Straight Connector 98"/>
+          <p:cNvCxnSpPr/>
+          <p:nvPr/>
+        </p:nvCxnSpPr>
+        <p:spPr>
+          <a:xfrm>
+            <a:off x="8587105" y="695960"/>
+            <a:ext cx="0" cy="435610"/>
+          </a:xfrm>
+          <a:prstGeom prst="line">
+            <a:avLst/>
+          </a:prstGeom>
+          <a:ln>
+            <a:solidFill>
+              <a:srgbClr val="00B0F0"/>
+            </a:solidFill>
+            <a:headEnd type="none"/>
+            <a:tailEnd type="triangle"/>
+          </a:ln>
+        </p:spPr>
+        <p:style>
+          <a:lnRef idx="1">
+            <a:schemeClr val="accent1"/>
+          </a:lnRef>
+          <a:fillRef idx="0">
+            <a:schemeClr val="accent1"/>
+          </a:fillRef>
+          <a:effectRef idx="0">
+            <a:schemeClr val="accent1"/>
+          </a:effectRef>
+          <a:fontRef idx="minor">
+            <a:schemeClr val="tx1"/>
+          </a:fontRef>
+        </p:style>
+      </p:cxnSp>
+      <p:cxnSp>
+        <p:nvCxnSpPr>
+          <p:cNvPr id="101" name="Straight Connector 100"/>
+          <p:cNvCxnSpPr>
+            <a:stCxn id="88" idx="2"/>
+            <a:endCxn id="93" idx="0"/>
+          </p:cNvCxnSpPr>
+          <p:nvPr/>
+        </p:nvCxnSpPr>
+        <p:spPr>
+          <a:xfrm flipH="1">
+            <a:off x="8418830" y="4244340"/>
+            <a:ext cx="3810" cy="423545"/>
+          </a:xfrm>
+          <a:prstGeom prst="line">
+            <a:avLst/>
+          </a:prstGeom>
+          <a:ln>
+            <a:solidFill>
+              <a:srgbClr val="00B050"/>
+            </a:solidFill>
+            <a:headEnd type="none"/>
+            <a:tailEnd type="triangle"/>
+          </a:ln>
+        </p:spPr>
+        <p:style>
+          <a:lnRef idx="1">
+            <a:schemeClr val="accent1"/>
+          </a:lnRef>
+          <a:fillRef idx="0">
+            <a:schemeClr val="accent1"/>
+          </a:fillRef>
+          <a:effectRef idx="0">
+            <a:schemeClr val="accent1"/>
+          </a:effectRef>
+          <a:fontRef idx="minor">
+            <a:schemeClr val="tx1"/>
+          </a:fontRef>
+        </p:style>
+      </p:cxnSp>
+      <p:cxnSp>
+        <p:nvCxnSpPr>
+          <p:cNvPr id="102" name="Elbow Connector 101"/>
+          <p:cNvCxnSpPr>
+            <a:stCxn id="93" idx="1"/>
+            <a:endCxn id="9" idx="2"/>
+          </p:cNvCxnSpPr>
+          <p:nvPr/>
+        </p:nvCxnSpPr>
+        <p:spPr>
+          <a:xfrm rot="10800000">
+            <a:off x="3968115" y="3546475"/>
+            <a:ext cx="3790950" cy="1504315"/>
+          </a:xfrm>
+          <a:prstGeom prst="bentConnector2">
+            <a:avLst/>
+          </a:prstGeom>
+          <a:ln>
+            <a:solidFill>
+              <a:srgbClr val="00B050"/>
+            </a:solidFill>
+            <a:tailEnd type="triangle"/>
+          </a:ln>
+        </p:spPr>
+        <p:style>
+          <a:lnRef idx="1">
+            <a:schemeClr val="accent1"/>
+          </a:lnRef>
+          <a:fillRef idx="0">
+            <a:schemeClr val="accent1"/>
+          </a:fillRef>
+          <a:effectRef idx="0">
+            <a:schemeClr val="accent1"/>
+          </a:effectRef>
+          <a:fontRef idx="minor">
+            <a:schemeClr val="tx1"/>
+          </a:fontRef>
+        </p:style>
+      </p:cxnSp>
+      <p:pic>
+        <p:nvPicPr>
+          <p:cNvPr id="24" name="Picture 23"/>
+          <p:cNvPicPr>
+            <a:picLocks noChangeAspect="1"/>
+          </p:cNvPicPr>
+          <p:nvPr/>
+        </p:nvPicPr>
+        <p:blipFill>
+          <a:blip r:embed="rId3">
+            <a:clrChange>
+              <a:clrFrom>
+                <a:srgbClr val="FFFFFF">
+                  <a:alpha val="100000"/>
+                </a:srgbClr>
+              </a:clrFrom>
+              <a:clrTo>
+                <a:srgbClr val="FFFFFF">
+                  <a:alpha val="100000"/>
+                  <a:alpha val="0"/>
+                </a:srgbClr>
+              </a:clrTo>
+            </a:clrChange>
+          </a:blip>
+          <a:stretch>
+            <a:fillRect/>
+          </a:stretch>
+        </p:blipFill>
+        <p:spPr>
+          <a:xfrm>
+            <a:off x="6586855" y="2195830"/>
+            <a:ext cx="376555" cy="344805"/>
+          </a:xfrm>
+          <a:prstGeom prst="rect">
+            <a:avLst/>
+          </a:prstGeom>
+        </p:spPr>
+      </p:pic>
+      <p:pic>
+        <p:nvPicPr>
+          <p:cNvPr id="81" name="Picture 80"/>
+          <p:cNvPicPr>
+            <a:picLocks noChangeAspect="1"/>
+          </p:cNvPicPr>
+          <p:nvPr/>
+        </p:nvPicPr>
+        <p:blipFill>
+          <a:blip r:embed="rId3">
+            <a:clrChange>
+              <a:clrFrom>
+                <a:srgbClr val="FFFFFF">
+                  <a:alpha val="100000"/>
+                </a:srgbClr>
+              </a:clrFrom>
+              <a:clrTo>
+                <a:srgbClr val="FFFFFF">
+                  <a:alpha val="100000"/>
+                  <a:alpha val="0"/>
+                </a:srgbClr>
+              </a:clrTo>
+            </a:clrChange>
+          </a:blip>
+          <a:stretch>
+            <a:fillRect/>
+          </a:stretch>
+        </p:blipFill>
+        <p:spPr>
+          <a:xfrm>
+            <a:off x="6586855" y="2853690"/>
+            <a:ext cx="376555" cy="344805"/>
+          </a:xfrm>
+          <a:prstGeom prst="rect">
+            <a:avLst/>
+          </a:prstGeom>
+        </p:spPr>
+      </p:pic>
+      <p:pic>
+        <p:nvPicPr>
+          <p:cNvPr id="82" name="Picture 81"/>
+          <p:cNvPicPr>
+            <a:picLocks noChangeAspect="1"/>
+          </p:cNvPicPr>
+          <p:nvPr/>
+        </p:nvPicPr>
+        <p:blipFill>
+          <a:blip r:embed="rId3">
+            <a:clrChange>
+              <a:clrFrom>
+                <a:srgbClr val="FFFFFF">
+                  <a:alpha val="100000"/>
+                </a:srgbClr>
+              </a:clrFrom>
+              <a:clrTo>
+                <a:srgbClr val="FFFFFF">
+                  <a:alpha val="100000"/>
+                  <a:alpha val="0"/>
+                </a:srgbClr>
+              </a:clrTo>
+            </a:clrChange>
+          </a:blip>
+          <a:stretch>
+            <a:fillRect/>
+          </a:stretch>
+        </p:blipFill>
+        <p:spPr>
+          <a:xfrm>
+            <a:off x="6586855" y="3519170"/>
+            <a:ext cx="376555" cy="344805"/>
+          </a:xfrm>
+          <a:prstGeom prst="rect">
+            <a:avLst/>
+          </a:prstGeom>
+        </p:spPr>
+      </p:pic>
+      <p:pic>
+        <p:nvPicPr>
+          <p:cNvPr id="83" name="Picture 82"/>
+          <p:cNvPicPr>
+            <a:picLocks noChangeAspect="1"/>
+          </p:cNvPicPr>
+          <p:nvPr/>
+        </p:nvPicPr>
+        <p:blipFill>
+          <a:blip r:embed="rId3">
+            <a:clrChange>
+              <a:clrFrom>
+                <a:srgbClr val="FFFFFF">
+                  <a:alpha val="100000"/>
+                </a:srgbClr>
+              </a:clrFrom>
+              <a:clrTo>
+                <a:srgbClr val="FFFFFF">
+                  <a:alpha val="100000"/>
+                  <a:alpha val="0"/>
+                </a:srgbClr>
+              </a:clrTo>
+            </a:clrChange>
+          </a:blip>
+          <a:stretch>
+            <a:fillRect/>
+          </a:stretch>
+        </p:blipFill>
+        <p:spPr>
+          <a:xfrm>
+            <a:off x="6586855" y="4204335"/>
+            <a:ext cx="376555" cy="344805"/>
+          </a:xfrm>
+          <a:prstGeom prst="rect">
+            <a:avLst/>
+          </a:prstGeom>
+        </p:spPr>
+      </p:pic>
+      <p:sp>
+        <p:nvSpPr>
+          <p:cNvPr id="103" name="Rectangles 102"/>
+          <p:cNvSpPr/>
+          <p:nvPr/>
+        </p:nvSpPr>
+        <p:spPr>
+          <a:xfrm>
+            <a:off x="3389630" y="4667885"/>
+            <a:ext cx="1318895" cy="765810"/>
+          </a:xfrm>
+          <a:prstGeom prst="rect">
+            <a:avLst/>
+          </a:prstGeom>
+          <a:ln w="22225"/>
+        </p:spPr>
+        <p:style>
+          <a:lnRef idx="1">
+            <a:schemeClr val="accent4"/>
+          </a:lnRef>
+          <a:fillRef idx="2">
+            <a:schemeClr val="accent4"/>
+          </a:fillRef>
+          <a:effectRef idx="1">
+            <a:schemeClr val="accent4"/>
+          </a:effectRef>
+          <a:fontRef idx="minor">
+            <a:schemeClr val="dk1"/>
+          </a:fontRef>
+        </p:style>
+        <p:txBody>
+          <a:bodyPr rtlCol="0" anchor="ctr"/>
+          <a:p>
+            <a:pPr algn="ctr"/>
+            <a:r>
+              <a:rPr lang="en-US" sz="1400"/>
+              <a:t>Orders</a:t>
+            </a:r>
+            <a:endParaRPr lang="en-US" sz="1400"/>
+          </a:p>
+        </p:txBody>
+      </p:sp>
+      <p:cxnSp>
+        <p:nvCxnSpPr>
+          <p:cNvPr id="106" name="Straight Connector 105"/>
+          <p:cNvCxnSpPr/>
+          <p:nvPr/>
+        </p:nvCxnSpPr>
+        <p:spPr>
+          <a:xfrm>
+            <a:off x="4087495" y="5443855"/>
+            <a:ext cx="0" cy="435610"/>
+          </a:xfrm>
+          <a:prstGeom prst="line">
+            <a:avLst/>
+          </a:prstGeom>
+          <a:ln>
+            <a:solidFill>
+              <a:srgbClr val="00B0F0"/>
+            </a:solidFill>
+            <a:headEnd type="none"/>
+            <a:tailEnd type="triangle"/>
+          </a:ln>
+        </p:spPr>
+        <p:style>
+          <a:lnRef idx="1">
+            <a:schemeClr val="accent1"/>
+          </a:lnRef>
+          <a:fillRef idx="0">
+            <a:schemeClr val="accent1"/>
+          </a:fillRef>
+          <a:effectRef idx="0">
+            <a:schemeClr val="accent1"/>
+          </a:effectRef>
+          <a:fontRef idx="minor">
+            <a:schemeClr val="tx1"/>
+          </a:fontRef>
+        </p:style>
+      </p:cxnSp>
+      <p:pic>
+        <p:nvPicPr>
+          <p:cNvPr id="104" name="Picture 103"/>
+          <p:cNvPicPr>
+            <a:picLocks noChangeAspect="1"/>
+          </p:cNvPicPr>
+          <p:nvPr/>
+        </p:nvPicPr>
+        <p:blipFill>
+          <a:blip r:embed="rId1"/>
+          <a:stretch>
+            <a:fillRect/>
+          </a:stretch>
+        </p:blipFill>
+        <p:spPr>
+          <a:xfrm>
+            <a:off x="3386773" y="5882640"/>
+            <a:ext cx="1161415" cy="631190"/>
+          </a:xfrm>
+          <a:prstGeom prst="rect">
+            <a:avLst/>
+          </a:prstGeom>
+        </p:spPr>
+      </p:pic>
+      <p:cxnSp>
+        <p:nvCxnSpPr>
+          <p:cNvPr id="105" name="Straight Connector 104"/>
+          <p:cNvCxnSpPr/>
+          <p:nvPr/>
+        </p:nvCxnSpPr>
+        <p:spPr>
+          <a:xfrm flipV="1">
+            <a:off x="3846830" y="5394325"/>
+            <a:ext cx="4445" cy="608965"/>
+          </a:xfrm>
+          <a:prstGeom prst="line">
+            <a:avLst/>
+          </a:prstGeom>
+          <a:ln>
+            <a:solidFill>
+              <a:srgbClr val="00B0F0"/>
+            </a:solidFill>
+            <a:headEnd type="none"/>
             <a:tailEnd type="triangle"/>
           </a:ln>
         </p:spPr>

</xml_diff>

<commit_message>
Savepoint; in preparation for a full-cycle regression test;
</commit_message>
<xml_diff>
--- a/~Documents/AppArchitecture.pptx
+++ b/~Documents/AppArchitecture.pptx
@@ -8,7 +8,7 @@
     <p:notesMasterId r:id="rId4"/>
   </p:notesMasterIdLst>
   <p:handoutMasterIdLst>
-    <p:handoutMasterId r:id="rId13"/>
+    <p:handoutMasterId r:id="rId14"/>
   </p:handoutMasterIdLst>
   <p:sldIdLst>
     <p:sldId id="257" r:id="rId3"/>
@@ -20,6 +20,7 @@
     <p:sldId id="272" r:id="rId10"/>
     <p:sldId id="274" r:id="rId11"/>
     <p:sldId id="261" r:id="rId12"/>
+    <p:sldId id="275" r:id="rId13"/>
   </p:sldIdLst>
   <p:sldSz cx="14630400" cy="10972800"/>
   <p:notesSz cx="10234295" cy="7103745"/>
@@ -4065,6 +4066,245 @@
           <a:chExt cx="0" cy="0"/>
         </a:xfrm>
       </p:grpSpPr>
+    </p:spTree>
+  </p:cSld>
+  <p:clrMapOvr>
+    <a:masterClrMapping/>
+  </p:clrMapOvr>
+</p:sld>
+</file>
+
+<file path=ppt/slides/slide10.xml><?xml version="1.0" encoding="utf-8"?>
+<p:sld xmlns:a="http://schemas.openxmlformats.org/drawingml/2006/main" xmlns:r="http://schemas.openxmlformats.org/officeDocument/2006/relationships" xmlns:p="http://schemas.openxmlformats.org/presentationml/2006/main">
+  <p:cSld>
+    <p:spTree>
+      <p:nvGrpSpPr>
+        <p:cNvPr id="1" name=""/>
+        <p:cNvGrpSpPr/>
+        <p:nvPr/>
+      </p:nvGrpSpPr>
+      <p:grpSpPr/>
+      <p:pic>
+        <p:nvPicPr>
+          <p:cNvPr id="9" name="Picture 8"/>
+          <p:cNvPicPr>
+            <a:picLocks noChangeAspect="1"/>
+          </p:cNvPicPr>
+          <p:nvPr/>
+        </p:nvPicPr>
+        <p:blipFill>
+          <a:blip r:embed="rId1"/>
+          <a:stretch>
+            <a:fillRect/>
+          </a:stretch>
+        </p:blipFill>
+        <p:spPr>
+          <a:xfrm>
+            <a:off x="1802765" y="3310890"/>
+            <a:ext cx="10203815" cy="5273040"/>
+          </a:xfrm>
+          <a:prstGeom prst="rect">
+            <a:avLst/>
+          </a:prstGeom>
+        </p:spPr>
+      </p:pic>
+      <p:sp>
+        <p:nvSpPr>
+          <p:cNvPr id="10" name="Rectangles 9"/>
+          <p:cNvSpPr/>
+          <p:nvPr/>
+        </p:nvSpPr>
+        <p:spPr>
+          <a:xfrm>
+            <a:off x="7685405" y="7718425"/>
+            <a:ext cx="692150" cy="290830"/>
+          </a:xfrm>
+          <a:prstGeom prst="rect">
+            <a:avLst/>
+          </a:prstGeom>
+          <a:noFill/>
+          <a:ln w="28575">
+            <a:solidFill>
+              <a:srgbClr val="FF0000"/>
+            </a:solidFill>
+            <a:headEnd type="none" w="med" len="med"/>
+            <a:tailEnd type="none" w="med" len="med"/>
+          </a:ln>
+          <a:extLst>
+            <a:ext uri="{909E8E84-426E-40DD-AFC4-6F175D3DCCD1}">
+              <a14:hiddenFill xmlns:a14="http://schemas.microsoft.com/office/drawing/2010/main">
+                <a:solidFill>
+                  <a:schemeClr val="lt1"/>
+                </a:solidFill>
+              </a14:hiddenFill>
+            </a:ext>
+          </a:extLst>
+        </p:spPr>
+        <p:style>
+          <a:lnRef idx="2">
+            <a:schemeClr val="accent6"/>
+          </a:lnRef>
+          <a:fillRef idx="1">
+            <a:schemeClr val="lt1"/>
+          </a:fillRef>
+          <a:effectRef idx="0">
+            <a:schemeClr val="accent6"/>
+          </a:effectRef>
+          <a:fontRef idx="minor">
+            <a:schemeClr val="dk1"/>
+          </a:fontRef>
+        </p:style>
+        <p:txBody>
+          <a:bodyPr vert="horz" wrap="none" lIns="91440" tIns="45720" rIns="91440" bIns="45720" numCol="1" anchor="ctr" anchorCtr="0" compatLnSpc="1"/>
+          <a:p>
+            <a:pPr marL="0" marR="0" indent="0" algn="l" defTabSz="914400" rtl="0" eaLnBrk="1" fontAlgn="base" latinLnBrk="0" hangingPunct="1">
+              <a:lnSpc>
+                <a:spcPct val="100000"/>
+              </a:lnSpc>
+              <a:spcBef>
+                <a:spcPct val="0"/>
+              </a:spcBef>
+              <a:spcAft>
+                <a:spcPct val="0"/>
+              </a:spcAft>
+              <a:buClrTx/>
+              <a:buSzTx/>
+              <a:buFontTx/>
+              <a:buNone/>
+            </a:pPr>
+            <a:endParaRPr kumimoji="0" lang="zh-CN" altLang="en-US" sz="1800" b="0" i="0" u="none" strike="noStrike" cap="none" normalizeH="0" baseline="0" smtClean="0">
+              <a:ln>
+                <a:noFill/>
+              </a:ln>
+              <a:solidFill>
+                <a:schemeClr val="tx1"/>
+              </a:solidFill>
+              <a:effectLst/>
+              <a:latin typeface="Arial" panose="02080604020202020204" pitchFamily="34" charset="0"/>
+              <a:ea typeface="SimSun" pitchFamily="2" charset="-122"/>
+            </a:endParaRPr>
+          </a:p>
+        </p:txBody>
+      </p:sp>
+      <p:sp>
+        <p:nvSpPr>
+          <p:cNvPr id="11" name="Rectangles 10"/>
+          <p:cNvSpPr/>
+          <p:nvPr/>
+        </p:nvSpPr>
+        <p:spPr>
+          <a:xfrm>
+            <a:off x="8552180" y="7766050"/>
+            <a:ext cx="486410" cy="242570"/>
+          </a:xfrm>
+          <a:prstGeom prst="rect">
+            <a:avLst/>
+          </a:prstGeom>
+          <a:noFill/>
+          <a:ln w="28575">
+            <a:solidFill>
+              <a:srgbClr val="FF0000"/>
+            </a:solidFill>
+            <a:headEnd type="none" w="med" len="med"/>
+            <a:tailEnd type="none" w="med" len="med"/>
+          </a:ln>
+          <a:extLst>
+            <a:ext uri="{909E8E84-426E-40DD-AFC4-6F175D3DCCD1}">
+              <a14:hiddenFill xmlns:a14="http://schemas.microsoft.com/office/drawing/2010/main">
+                <a:solidFill>
+                  <a:schemeClr val="lt1"/>
+                </a:solidFill>
+              </a14:hiddenFill>
+            </a:ext>
+          </a:extLst>
+        </p:spPr>
+        <p:style>
+          <a:lnRef idx="2">
+            <a:schemeClr val="accent6"/>
+          </a:lnRef>
+          <a:fillRef idx="1">
+            <a:schemeClr val="lt1"/>
+          </a:fillRef>
+          <a:effectRef idx="0">
+            <a:schemeClr val="accent6"/>
+          </a:effectRef>
+          <a:fontRef idx="minor">
+            <a:schemeClr val="dk1"/>
+          </a:fontRef>
+        </p:style>
+        <p:txBody>
+          <a:bodyPr vert="horz" wrap="none" lIns="91440" tIns="45720" rIns="91440" bIns="45720" numCol="1" anchor="ctr" anchorCtr="0" compatLnSpc="1"/>
+          <a:p>
+            <a:pPr marL="0" marR="0" indent="0" algn="l" defTabSz="914400" rtl="0" eaLnBrk="1" fontAlgn="base" latinLnBrk="0" hangingPunct="1">
+              <a:lnSpc>
+                <a:spcPct val="100000"/>
+              </a:lnSpc>
+              <a:spcBef>
+                <a:spcPct val="0"/>
+              </a:spcBef>
+              <a:spcAft>
+                <a:spcPct val="0"/>
+              </a:spcAft>
+              <a:buClrTx/>
+              <a:buSzTx/>
+              <a:buFontTx/>
+              <a:buNone/>
+            </a:pPr>
+            <a:endParaRPr kumimoji="0" lang="zh-CN" altLang="en-US" sz="1800" b="0" i="0" u="none" strike="noStrike" cap="none" normalizeH="0" baseline="0" smtClean="0">
+              <a:ln>
+                <a:noFill/>
+              </a:ln>
+              <a:solidFill>
+                <a:schemeClr val="tx1"/>
+              </a:solidFill>
+              <a:effectLst/>
+              <a:latin typeface="Arial" panose="02080604020202020204" pitchFamily="34" charset="0"/>
+              <a:ea typeface="SimSun" pitchFamily="2" charset="-122"/>
+            </a:endParaRPr>
+          </a:p>
+        </p:txBody>
+      </p:sp>
+      <p:cxnSp>
+        <p:nvCxnSpPr>
+          <p:cNvPr id="12" name="Elbow Connector 11"/>
+          <p:cNvCxnSpPr>
+            <a:stCxn id="10" idx="2"/>
+            <a:endCxn id="11" idx="2"/>
+          </p:cNvCxnSpPr>
+          <p:nvPr/>
+        </p:nvCxnSpPr>
+        <p:spPr>
+          <a:xfrm rot="5400000" flipH="1" flipV="1">
+            <a:off x="8413115" y="7626985"/>
+            <a:ext cx="635" cy="763905"/>
+          </a:xfrm>
+          <a:prstGeom prst="bentConnector3">
+            <a:avLst>
+              <a:gd name="adj1" fmla="val -37500000"/>
+            </a:avLst>
+          </a:prstGeom>
+          <a:gradFill rotWithShape="0">
+            <a:gsLst>
+              <a:gs pos="0">
+                <a:schemeClr val="accent1"/>
+              </a:gs>
+              <a:gs pos="100000">
+                <a:schemeClr val="accent2"/>
+              </a:gs>
+            </a:gsLst>
+            <a:lin ang="5400000" scaled="1"/>
+          </a:gradFill>
+          <a:ln w="28575" cap="flat" cmpd="sng" algn="ctr">
+            <a:solidFill>
+              <a:srgbClr val="FF0000"/>
+            </a:solidFill>
+            <a:prstDash val="solid"/>
+            <a:round/>
+            <a:headEnd type="none" w="med" len="med"/>
+            <a:tailEnd type="arrow" w="med" len="med"/>
+          </a:ln>
+        </p:spPr>
+      </p:cxnSp>
     </p:spTree>
   </p:cSld>
   <p:clrMapOvr>

</xml_diff>

<commit_message>
Interim Checkpoint; pulling diffs on order imports;
</commit_message>
<xml_diff>
--- a/~Documents/AppArchitecture.pptx
+++ b/~Documents/AppArchitecture.pptx
@@ -9098,10 +9098,10 @@
         </p:nvGrpSpPr>
         <p:grpSpPr>
           <a:xfrm>
-            <a:off x="4374515" y="8395970"/>
-            <a:ext cx="1097280" cy="1013460"/>
+            <a:off x="4374515" y="8258810"/>
+            <a:ext cx="1097280" cy="1023366"/>
             <a:chOff x="6889" y="13222"/>
-            <a:chExt cx="1728" cy="1596"/>
+            <a:chExt cx="1728" cy="1612"/>
           </a:xfrm>
           <a:effectLst>
             <a:outerShdw blurRad="50800" dist="38100" dir="8100000" algn="tr" rotWithShape="0">
@@ -9162,7 +9162,7 @@
           </p:nvSpPr>
           <p:spPr>
             <a:xfrm>
-              <a:off x="6889" y="14616"/>
+              <a:off x="6889" y="14632"/>
               <a:ext cx="1728" cy="202"/>
             </a:xfrm>
             <a:prstGeom prst="rect">
@@ -9291,7 +9291,7 @@
           </p:nvSpPr>
           <p:spPr>
             <a:xfrm>
-              <a:off x="6889" y="14383"/>
+              <a:off x="6889" y="14399"/>
               <a:ext cx="1728" cy="202"/>
             </a:xfrm>
             <a:prstGeom prst="rect">
@@ -9421,7 +9421,7 @@
         </p:nvGrpSpPr>
         <p:grpSpPr>
           <a:xfrm>
-            <a:off x="7752715" y="5764530"/>
+            <a:off x="7752715" y="5627370"/>
             <a:ext cx="1100455" cy="569341"/>
             <a:chOff x="12209" y="9078"/>
             <a:chExt cx="1733" cy="897"/>
@@ -9653,7 +9653,7 @@
         </p:nvSpPr>
         <p:spPr>
           <a:xfrm rot="10800000">
-            <a:off x="1191895" y="3303270"/>
+            <a:off x="1191895" y="3166110"/>
             <a:ext cx="4137660" cy="2861310"/>
           </a:xfrm>
           <a:prstGeom prst="triangle">
@@ -9729,7 +9729,7 @@
         </p:nvCxnSpPr>
         <p:spPr>
           <a:xfrm flipV="1">
-            <a:off x="5305886" y="4053937"/>
+            <a:off x="5305886" y="3916777"/>
             <a:ext cx="631522" cy="4572"/>
           </a:xfrm>
           <a:prstGeom prst="straightConnector1">
@@ -9764,14 +9764,12 @@
       <p:cxnSp>
         <p:nvCxnSpPr>
           <p:cNvPr id="11" name="Straight Arrow Connector 10"/>
-          <p:cNvCxnSpPr>
-            <a:endCxn id="19" idx="3"/>
-          </p:cNvCxnSpPr>
+          <p:cNvCxnSpPr/>
           <p:nvPr/>
         </p:nvCxnSpPr>
         <p:spPr>
           <a:xfrm flipH="1" flipV="1">
-            <a:off x="5507990" y="4188460"/>
+            <a:off x="5507990" y="4051300"/>
             <a:ext cx="605155" cy="3175"/>
           </a:xfrm>
           <a:prstGeom prst="straightConnector1">
@@ -9814,7 +9812,7 @@
         </p:nvCxnSpPr>
         <p:spPr>
           <a:xfrm rot="10800000" flipV="1">
-            <a:off x="5667375" y="5411470"/>
+            <a:off x="5667375" y="5274310"/>
             <a:ext cx="588645" cy="3140075"/>
           </a:xfrm>
           <a:prstGeom prst="bentConnector2">
@@ -9850,14 +9848,15 @@
         <p:nvCxnSpPr>
           <p:cNvPr id="311" name="Elbow Connector 310"/>
           <p:cNvCxnSpPr>
+            <a:stCxn id="296" idx="6"/>
             <a:endCxn id="312" idx="0"/>
           </p:cNvCxnSpPr>
           <p:nvPr/>
         </p:nvCxnSpPr>
         <p:spPr>
           <a:xfrm>
-            <a:off x="6407150" y="5414010"/>
-            <a:ext cx="1159510" cy="638810"/>
+            <a:off x="6323965" y="5274310"/>
+            <a:ext cx="1242695" cy="641350"/>
           </a:xfrm>
           <a:prstGeom prst="bentConnector2">
             <a:avLst/>
@@ -9890,59 +9889,13 @@
       </p:cxnSp>
       <p:sp>
         <p:nvSpPr>
-          <p:cNvPr id="317" name="Oval 316"/>
-          <p:cNvSpPr/>
-          <p:nvPr/>
-        </p:nvSpPr>
-        <p:spPr>
-          <a:xfrm>
-            <a:off x="6076315" y="4307205"/>
-            <a:ext cx="67945" cy="67945"/>
-          </a:xfrm>
-          <a:prstGeom prst="ellipse">
-            <a:avLst/>
-          </a:prstGeom>
-          <a:effectLst>
-            <a:outerShdw blurRad="50800" dist="38100" dir="8100000" algn="tr" rotWithShape="0">
-              <a:prstClr val="black">
-                <a:alpha val="40000"/>
-              </a:prstClr>
-            </a:outerShdw>
-          </a:effectLst>
-        </p:spPr>
-        <p:style>
-          <a:lnRef idx="2">
-            <a:schemeClr val="accent1">
-              <a:shade val="50000"/>
-            </a:schemeClr>
-          </a:lnRef>
-          <a:fillRef idx="1">
-            <a:schemeClr val="accent1"/>
-          </a:fillRef>
-          <a:effectRef idx="0">
-            <a:schemeClr val="accent1"/>
-          </a:effectRef>
-          <a:fontRef idx="minor">
-            <a:schemeClr val="lt1"/>
-          </a:fontRef>
-        </p:style>
-        <p:txBody>
-          <a:bodyPr rtlCol="0" anchor="ctr"/>
-          <a:p>
-            <a:pPr algn="ctr"/>
-            <a:endParaRPr lang="en-US" sz="1620"/>
-          </a:p>
-        </p:txBody>
-      </p:sp>
-      <p:sp>
-        <p:nvSpPr>
           <p:cNvPr id="318" name="Oval 317"/>
           <p:cNvSpPr/>
           <p:nvPr/>
         </p:nvSpPr>
         <p:spPr>
           <a:xfrm>
-            <a:off x="5937250" y="4159885"/>
+            <a:off x="5937250" y="4022725"/>
             <a:ext cx="67945" cy="67945"/>
           </a:xfrm>
           <a:prstGeom prst="ellipse">
@@ -9988,7 +9941,7 @@
         </p:nvSpPr>
         <p:spPr>
           <a:xfrm>
-            <a:off x="6256020" y="5377180"/>
+            <a:off x="6256020" y="5240020"/>
             <a:ext cx="67945" cy="67945"/>
           </a:xfrm>
           <a:prstGeom prst="ellipse">
@@ -10034,7 +9987,7 @@
         </p:nvGrpSpPr>
         <p:grpSpPr>
           <a:xfrm rot="0">
-            <a:off x="5844540" y="3274060"/>
+            <a:off x="5844540" y="3136900"/>
             <a:ext cx="427355" cy="334010"/>
             <a:chOff x="16290" y="4518"/>
             <a:chExt cx="748" cy="584"/>
@@ -10136,37 +10089,6 @@
           </p:spPr>
         </p:pic>
       </p:grpSp>
-      <p:pic>
-        <p:nvPicPr>
-          <p:cNvPr id="5" name="Picture 4"/>
-          <p:cNvPicPr>
-            <a:picLocks noChangeAspect="1"/>
-          </p:cNvPicPr>
-          <p:nvPr/>
-        </p:nvPicPr>
-        <p:blipFill>
-          <a:blip r:embed="rId3"/>
-          <a:stretch>
-            <a:fillRect/>
-          </a:stretch>
-        </p:blipFill>
-        <p:spPr>
-          <a:xfrm>
-            <a:off x="5932805" y="3545840"/>
-            <a:ext cx="753110" cy="1991360"/>
-          </a:xfrm>
-          <a:prstGeom prst="rect">
-            <a:avLst/>
-          </a:prstGeom>
-          <a:effectLst>
-            <a:outerShdw blurRad="50800" dist="38100" dir="8100000" algn="tr" rotWithShape="0">
-              <a:prstClr val="black">
-                <a:alpha val="40000"/>
-              </a:prstClr>
-            </a:outerShdw>
-          </a:effectLst>
-        </p:spPr>
-      </p:pic>
       <p:sp>
         <p:nvSpPr>
           <p:cNvPr id="22" name="Flowchart: Decision 21"/>
@@ -10175,7 +10097,7 @@
         </p:nvSpPr>
         <p:spPr>
           <a:xfrm>
-            <a:off x="7965506" y="6520964"/>
+            <a:off x="7965506" y="6383804"/>
             <a:ext cx="664670" cy="488644"/>
           </a:xfrm>
           <a:prstGeom prst="flowChartDecision">
@@ -10287,7 +10209,7 @@
         </p:nvCxnSpPr>
         <p:spPr>
           <a:xfrm flipH="1">
-            <a:off x="8298180" y="6334125"/>
+            <a:off x="8298180" y="6196965"/>
             <a:ext cx="3810" cy="186690"/>
           </a:xfrm>
           <a:prstGeom prst="straightConnector1">
@@ -10327,7 +10249,7 @@
         </p:nvSpPr>
         <p:spPr>
           <a:xfrm>
-            <a:off x="3907347" y="2544335"/>
+            <a:off x="3907347" y="2407175"/>
             <a:ext cx="270897" cy="260610"/>
           </a:xfrm>
           <a:prstGeom prst="ellipse">
@@ -10416,7 +10338,7 @@
         </p:nvCxnSpPr>
         <p:spPr>
           <a:xfrm flipH="1">
-            <a:off x="5885180" y="8769350"/>
+            <a:off x="5885180" y="8632190"/>
             <a:ext cx="558800" cy="3810"/>
           </a:xfrm>
           <a:prstGeom prst="straightConnector1">
@@ -10456,10 +10378,10 @@
         </p:nvGrpSpPr>
         <p:grpSpPr>
           <a:xfrm>
-            <a:off x="10086975" y="6380480"/>
-            <a:ext cx="1097915" cy="421005"/>
+            <a:off x="10086975" y="6243320"/>
+            <a:ext cx="1097915" cy="430911"/>
             <a:chOff x="15885" y="10048"/>
-            <a:chExt cx="1729" cy="663"/>
+            <a:chExt cx="1729" cy="679"/>
           </a:xfrm>
           <a:effectLst>
             <a:outerShdw blurRad="50800" dist="38100" dir="8100000" algn="tr" rotWithShape="0">
@@ -10565,7 +10487,7 @@
           </p:nvSpPr>
           <p:spPr>
             <a:xfrm>
-              <a:off x="15886" y="10509"/>
+              <a:off x="15886" y="10525"/>
               <a:ext cx="1728" cy="202"/>
             </a:xfrm>
             <a:prstGeom prst="rect">
@@ -10611,7 +10533,7 @@
         </p:nvGrpSpPr>
         <p:grpSpPr>
           <a:xfrm rot="0">
-            <a:off x="9937115" y="6179185"/>
+            <a:off x="9937115" y="6042025"/>
             <a:ext cx="363855" cy="287020"/>
             <a:chOff x="10155" y="414"/>
             <a:chExt cx="1146" cy="883"/>
@@ -10640,7 +10562,7 @@
               <p:nvPr/>
             </p:nvPicPr>
             <p:blipFill>
-              <a:blip r:embed="rId4"/>
+              <a:blip r:embed="rId3"/>
               <a:stretch>
                 <a:fillRect/>
               </a:stretch>
@@ -10689,7 +10611,7 @@
             <p:nvPr/>
           </p:nvPicPr>
           <p:blipFill>
-            <a:blip r:embed="rId5"/>
+            <a:blip r:embed="rId4"/>
             <a:stretch>
               <a:fillRect/>
             </a:stretch>
@@ -10716,7 +10638,7 @@
         </p:nvCxnSpPr>
         <p:spPr>
           <a:xfrm>
-            <a:off x="4043045" y="2804795"/>
+            <a:off x="4043045" y="2667635"/>
             <a:ext cx="2540" cy="202565"/>
           </a:xfrm>
           <a:prstGeom prst="straightConnector1">
@@ -10744,16 +10666,13 @@
       <p:cxnSp>
         <p:nvCxnSpPr>
           <p:cNvPr id="37" name="Straight Arrow Connector 36"/>
-          <p:cNvCxnSpPr>
-            <a:stCxn id="148" idx="2"/>
-            <a:endCxn id="112" idx="0"/>
-          </p:cNvCxnSpPr>
+          <p:cNvCxnSpPr/>
           <p:nvPr/>
         </p:nvCxnSpPr>
         <p:spPr>
           <a:xfrm flipH="1">
-            <a:off x="10635615" y="5563235"/>
-            <a:ext cx="1270" cy="817245"/>
+            <a:off x="10635615" y="5431155"/>
+            <a:ext cx="1270" cy="812165"/>
           </a:xfrm>
           <a:prstGeom prst="straightConnector1">
             <a:avLst/>
@@ -10792,7 +10711,7 @@
         </p:nvCxnSpPr>
         <p:spPr>
           <a:xfrm>
-            <a:off x="11064875" y="6609080"/>
+            <a:off x="11064875" y="6471920"/>
             <a:ext cx="529590" cy="6350"/>
           </a:xfrm>
           <a:prstGeom prst="straightConnector1">
@@ -10835,8 +10754,8 @@
         </p:nvCxnSpPr>
         <p:spPr>
           <a:xfrm rot="10800000">
-            <a:off x="9448800" y="5824855"/>
-            <a:ext cx="638810" cy="912495"/>
+            <a:off x="9448800" y="5687695"/>
+            <a:ext cx="638810" cy="922655"/>
           </a:xfrm>
           <a:prstGeom prst="bentConnector3">
             <a:avLst>
@@ -10872,14 +10791,12 @@
       <p:cxnSp>
         <p:nvCxnSpPr>
           <p:cNvPr id="64" name="Straight Arrow Connector 63"/>
-          <p:cNvCxnSpPr>
-            <a:endCxn id="8" idx="3"/>
-          </p:cNvCxnSpPr>
+          <p:cNvCxnSpPr/>
           <p:nvPr/>
         </p:nvCxnSpPr>
         <p:spPr>
           <a:xfrm flipH="1" flipV="1">
-            <a:off x="11185525" y="5202555"/>
+            <a:off x="11185525" y="5065395"/>
             <a:ext cx="588010" cy="6350"/>
           </a:xfrm>
           <a:prstGeom prst="straightConnector1">
@@ -10914,14 +10831,12 @@
       <p:cxnSp>
         <p:nvCxnSpPr>
           <p:cNvPr id="66" name="Straight Arrow Connector 65"/>
-          <p:cNvCxnSpPr>
-            <a:endCxn id="34" idx="3"/>
-          </p:cNvCxnSpPr>
+          <p:cNvCxnSpPr/>
           <p:nvPr/>
         </p:nvCxnSpPr>
         <p:spPr>
           <a:xfrm flipH="1">
-            <a:off x="11184890" y="6733540"/>
+            <a:off x="11184890" y="6606540"/>
             <a:ext cx="656590" cy="3810"/>
           </a:xfrm>
           <a:prstGeom prst="straightConnector1">
@@ -10961,10 +10876,10 @@
         </p:nvGrpSpPr>
         <p:grpSpPr>
           <a:xfrm>
-            <a:off x="10088245" y="5138420"/>
-            <a:ext cx="1097280" cy="424815"/>
+            <a:off x="10088245" y="5001260"/>
+            <a:ext cx="1097280" cy="429641"/>
             <a:chOff x="15887" y="8092"/>
-            <a:chExt cx="1728" cy="669"/>
+            <a:chExt cx="1728" cy="677"/>
           </a:xfrm>
           <a:effectLst>
             <a:outerShdw blurRad="50800" dist="38100" dir="8100000" algn="tr" rotWithShape="0">
@@ -10982,7 +10897,7 @@
           </p:nvSpPr>
           <p:spPr>
             <a:xfrm>
-              <a:off x="15887" y="8559"/>
+              <a:off x="15887" y="8567"/>
               <a:ext cx="1728" cy="202"/>
             </a:xfrm>
             <a:prstGeom prst="rect">
@@ -11112,7 +11027,7 @@
         </p:nvGrpSpPr>
         <p:grpSpPr>
           <a:xfrm>
-            <a:off x="9944287" y="4940541"/>
+            <a:off x="9944287" y="4803381"/>
             <a:ext cx="363482" cy="286900"/>
             <a:chOff x="12459" y="1283"/>
             <a:chExt cx="636" cy="502"/>
@@ -11127,7 +11042,7 @@
             <p:nvPr/>
           </p:nvPicPr>
           <p:blipFill>
-            <a:blip r:embed="rId4"/>
+            <a:blip r:embed="rId3"/>
             <a:stretch>
               <a:fillRect/>
             </a:stretch>
@@ -11175,7 +11090,7 @@
             <p:nvPr/>
           </p:nvPicPr>
           <p:blipFill>
-            <a:blip r:embed="rId5"/>
+            <a:blip r:embed="rId4"/>
             <a:stretch>
               <a:fillRect/>
             </a:stretch>
@@ -11199,7 +11114,7 @@
         </p:nvGrpSpPr>
         <p:grpSpPr>
           <a:xfrm>
-            <a:off x="11018731" y="5451540"/>
+            <a:off x="11018731" y="5314380"/>
             <a:ext cx="203459" cy="216032"/>
             <a:chOff x="8092" y="1237"/>
             <a:chExt cx="482" cy="524"/>
@@ -11269,7 +11184,7 @@
             <p:nvPr/>
           </p:nvPicPr>
           <p:blipFill>
-            <a:blip r:embed="rId6">
+            <a:blip r:embed="rId5">
               <a:clrChange>
                 <a:clrFrom>
                   <a:srgbClr val="FFFFFF">
@@ -11310,7 +11225,7 @@
         </p:nvCxnSpPr>
         <p:spPr>
           <a:xfrm rot="10800000" flipV="1">
-            <a:off x="9448800" y="5351780"/>
+            <a:off x="9448800" y="5214620"/>
             <a:ext cx="639445" cy="473075"/>
           </a:xfrm>
           <a:prstGeom prst="bentConnector3">
@@ -11352,7 +11267,7 @@
         </p:nvSpPr>
         <p:spPr>
           <a:xfrm>
-            <a:off x="7965506" y="8321084"/>
+            <a:off x="7965506" y="8183924"/>
             <a:ext cx="664670" cy="488644"/>
           </a:xfrm>
           <a:prstGeom prst="flowChartDecision">
@@ -11432,7 +11347,7 @@
         </p:nvCxnSpPr>
         <p:spPr>
           <a:xfrm>
-            <a:off x="7021195" y="8162925"/>
+            <a:off x="7021195" y="8025765"/>
             <a:ext cx="3810" cy="1204595"/>
           </a:xfrm>
           <a:prstGeom prst="straightConnector1">
@@ -11475,8 +11390,8 @@
         </p:nvCxnSpPr>
         <p:spPr>
           <a:xfrm rot="10800000">
-            <a:off x="2499360" y="5852795"/>
-            <a:ext cx="1875155" cy="3492500"/>
+            <a:off x="2499360" y="5715635"/>
+            <a:ext cx="1875155" cy="3502660"/>
           </a:xfrm>
           <a:prstGeom prst="bentConnector2">
             <a:avLst/>
@@ -11515,7 +11430,7 @@
         </p:nvSpPr>
         <p:spPr>
           <a:xfrm>
-            <a:off x="2171071" y="7138438"/>
+            <a:off x="2171071" y="7001278"/>
             <a:ext cx="664670" cy="488644"/>
           </a:xfrm>
           <a:prstGeom prst="flowChartDecision">
@@ -11592,7 +11507,7 @@
         </p:nvSpPr>
         <p:spPr>
           <a:xfrm>
-            <a:off x="2171071" y="6224722"/>
+            <a:off x="2171071" y="6087562"/>
             <a:ext cx="664670" cy="488644"/>
           </a:xfrm>
           <a:prstGeom prst="flowChartDecision">
@@ -11699,10 +11614,10 @@
         </p:nvGrpSpPr>
         <p:grpSpPr>
           <a:xfrm>
-            <a:off x="4410075" y="3978910"/>
-            <a:ext cx="1097915" cy="1010285"/>
+            <a:off x="4410075" y="3841750"/>
+            <a:ext cx="1097915" cy="1015111"/>
             <a:chOff x="6945" y="6266"/>
-            <a:chExt cx="1729" cy="1591"/>
+            <a:chExt cx="1729" cy="1599"/>
           </a:xfrm>
           <a:effectLst>
             <a:outerShdw blurRad="50800" dist="38100" dir="8100000" algn="tr" rotWithShape="0">
@@ -11977,7 +11892,7 @@
           </p:nvSpPr>
           <p:spPr>
             <a:xfrm>
-              <a:off x="6946" y="7655"/>
+              <a:off x="6946" y="7663"/>
               <a:ext cx="1728" cy="202"/>
             </a:xfrm>
             <a:prstGeom prst="rect">
@@ -12067,8 +11982,8 @@
         </p:nvCxnSpPr>
         <p:spPr>
           <a:xfrm rot="10800000">
-            <a:off x="3069590" y="5243195"/>
-            <a:ext cx="1304925" cy="3954145"/>
+            <a:off x="3069590" y="5106035"/>
+            <a:ext cx="1304925" cy="3964305"/>
           </a:xfrm>
           <a:prstGeom prst="bentConnector2">
             <a:avLst/>
@@ -12107,7 +12022,7 @@
         </p:nvSpPr>
         <p:spPr>
           <a:xfrm>
-            <a:off x="2736869" y="6704604"/>
+            <a:off x="2736869" y="6567444"/>
             <a:ext cx="664670" cy="488644"/>
           </a:xfrm>
           <a:prstGeom prst="flowChartDecision">
@@ -12184,7 +12099,7 @@
         </p:nvSpPr>
         <p:spPr>
           <a:xfrm>
-            <a:off x="2736869" y="5768910"/>
+            <a:off x="2736869" y="5631750"/>
             <a:ext cx="664670" cy="488644"/>
           </a:xfrm>
           <a:prstGeom prst="flowChartDecision">
@@ -12294,7 +12209,7 @@
         </p:nvCxnSpPr>
         <p:spPr>
           <a:xfrm rot="10800000">
-            <a:off x="3634740" y="6713855"/>
+            <a:off x="3634740" y="6576695"/>
             <a:ext cx="739775" cy="2343785"/>
           </a:xfrm>
           <a:prstGeom prst="bentConnector2">
@@ -12334,7 +12249,7 @@
         </p:nvSpPr>
         <p:spPr>
           <a:xfrm>
-            <a:off x="3302667" y="7154948"/>
+            <a:off x="3302667" y="7017788"/>
             <a:ext cx="664670" cy="488644"/>
           </a:xfrm>
           <a:prstGeom prst="flowChartDecision">
@@ -12413,7 +12328,7 @@
         </p:nvSpPr>
         <p:spPr>
           <a:xfrm>
-            <a:off x="3302095" y="6224722"/>
+            <a:off x="3302095" y="6087562"/>
             <a:ext cx="664670" cy="488644"/>
           </a:xfrm>
           <a:prstGeom prst="flowChartDecision">
@@ -12489,8 +12404,8 @@
         </p:nvCxnSpPr>
         <p:spPr>
           <a:xfrm flipV="1">
-            <a:off x="3966845" y="4925060"/>
-            <a:ext cx="443865" cy="1544320"/>
+            <a:off x="3966845" y="4792980"/>
+            <a:ext cx="443865" cy="1539240"/>
           </a:xfrm>
           <a:prstGeom prst="bentConnector3">
             <a:avLst>
@@ -12534,7 +12449,7 @@
         </p:nvCxnSpPr>
         <p:spPr>
           <a:xfrm flipH="1" flipV="1">
-            <a:off x="1820545" y="8250555"/>
+            <a:off x="1820545" y="8113395"/>
             <a:ext cx="350520" cy="6985"/>
           </a:xfrm>
           <a:prstGeom prst="straightConnector1">
@@ -12574,7 +12489,7 @@
         </p:nvSpPr>
         <p:spPr>
           <a:xfrm>
-            <a:off x="2171186" y="8012833"/>
+            <a:off x="2171186" y="7875673"/>
             <a:ext cx="664670" cy="488644"/>
           </a:xfrm>
           <a:prstGeom prst="flowChartDecision">
@@ -12653,7 +12568,7 @@
         </p:nvSpPr>
         <p:spPr>
           <a:xfrm>
-            <a:off x="2995129" y="5440288"/>
+            <a:off x="2995129" y="5303128"/>
             <a:ext cx="148022" cy="159452"/>
           </a:xfrm>
           <a:prstGeom prst="ellipse">
@@ -12701,7 +12616,7 @@
         </p:nvSpPr>
         <p:spPr>
           <a:xfrm>
-            <a:off x="1972310" y="8171828"/>
+            <a:off x="1972310" y="8034668"/>
             <a:ext cx="148022" cy="159452"/>
           </a:xfrm>
           <a:prstGeom prst="ellipse">
@@ -12749,7 +12664,7 @@
         </p:nvSpPr>
         <p:spPr>
           <a:xfrm>
-            <a:off x="4114977" y="6005326"/>
+            <a:off x="4114977" y="5868166"/>
             <a:ext cx="148022" cy="159452"/>
           </a:xfrm>
           <a:prstGeom prst="ellipse">
@@ -12797,7 +12712,7 @@
         </p:nvSpPr>
         <p:spPr>
           <a:xfrm>
-            <a:off x="8920960" y="4062824"/>
+            <a:off x="8920960" y="3925664"/>
             <a:ext cx="270897" cy="263468"/>
           </a:xfrm>
           <a:prstGeom prst="ellipse">
@@ -12887,7 +12802,7 @@
         </p:nvCxnSpPr>
         <p:spPr>
           <a:xfrm>
-            <a:off x="9057044" y="4326291"/>
+            <a:off x="9057044" y="4189131"/>
             <a:ext cx="6350" cy="198120"/>
           </a:xfrm>
           <a:prstGeom prst="straightConnector1">
@@ -12927,7 +12842,7 @@
         </p:nvSpPr>
         <p:spPr>
           <a:xfrm>
-            <a:off x="7557648" y="4638338"/>
+            <a:off x="7557648" y="4501178"/>
             <a:ext cx="664670" cy="488644"/>
           </a:xfrm>
           <a:prstGeom prst="flowChartDecision">
@@ -13009,7 +12924,7 @@
         </p:nvCxnSpPr>
         <p:spPr>
           <a:xfrm flipH="1" flipV="1">
-            <a:off x="8222833" y="4882374"/>
+            <a:off x="8222833" y="4745214"/>
             <a:ext cx="292100" cy="4445"/>
           </a:xfrm>
           <a:prstGeom prst="straightConnector1">
@@ -13052,7 +12967,7 @@
         </p:nvCxnSpPr>
         <p:spPr>
           <a:xfrm flipH="1">
-            <a:off x="7158160" y="4882945"/>
+            <a:off x="7158160" y="4745785"/>
             <a:ext cx="399488" cy="6858"/>
           </a:xfrm>
           <a:prstGeom prst="straightConnector1">
@@ -13095,7 +13010,7 @@
         </p:nvCxnSpPr>
         <p:spPr>
           <a:xfrm rot="5400000">
-            <a:off x="7481065" y="4810935"/>
+            <a:off x="7481065" y="4673775"/>
             <a:ext cx="93157" cy="725250"/>
           </a:xfrm>
           <a:prstGeom prst="bentConnector2">
@@ -13135,7 +13050,7 @@
         </p:nvSpPr>
         <p:spPr>
           <a:xfrm>
-            <a:off x="7281035" y="4802933"/>
+            <a:off x="7281035" y="4665773"/>
             <a:ext cx="148022" cy="159452"/>
           </a:xfrm>
           <a:prstGeom prst="ellipse">
@@ -13177,86 +13092,13 @@
       </p:sp>
       <p:sp>
         <p:nvSpPr>
-          <p:cNvPr id="241" name="Flowchart: Terminator 240"/>
-          <p:cNvSpPr/>
-          <p:nvPr/>
-        </p:nvSpPr>
-        <p:spPr>
-          <a:xfrm>
-            <a:off x="6639226" y="4825222"/>
-            <a:ext cx="518934" cy="128590"/>
-          </a:xfrm>
-          <a:prstGeom prst="flowChartTerminator">
-            <a:avLst/>
-          </a:prstGeom>
-          <a:solidFill>
-            <a:schemeClr val="accent6">
-              <a:lumMod val="40000"/>
-              <a:lumOff val="60000"/>
-            </a:schemeClr>
-          </a:solidFill>
-          <a:ln>
-            <a:solidFill>
-              <a:schemeClr val="accent6"/>
-            </a:solidFill>
-          </a:ln>
-          <a:effectLst>
-            <a:outerShdw blurRad="50800" dist="38100" dir="8100000" algn="tr" rotWithShape="0">
-              <a:prstClr val="black">
-                <a:alpha val="40000"/>
-              </a:prstClr>
-            </a:outerShdw>
-          </a:effectLst>
-        </p:spPr>
-        <p:style>
-          <a:lnRef idx="3">
-            <a:schemeClr val="lt1"/>
-          </a:lnRef>
-          <a:fillRef idx="1">
-            <a:schemeClr val="accent6"/>
-          </a:fillRef>
-          <a:effectRef idx="1">
-            <a:schemeClr val="accent6"/>
-          </a:effectRef>
-          <a:fontRef idx="minor">
-            <a:schemeClr val="lt1"/>
-          </a:fontRef>
-        </p:style>
-        <p:txBody>
-          <a:bodyPr rtlCol="0" anchor="ctr"/>
-          <a:p>
-            <a:pPr algn="ctr"/>
-            <a:r>
-              <a:rPr lang="en-US" sz="450" b="1">
-                <a:solidFill>
-                  <a:schemeClr val="tx1">
-                    <a:lumMod val="75000"/>
-                    <a:lumOff val="25000"/>
-                  </a:schemeClr>
-                </a:solidFill>
-              </a:rPr>
-              <a:t>closed</a:t>
-            </a:r>
-            <a:endParaRPr lang="en-US" sz="450" b="1">
-              <a:solidFill>
-                <a:schemeClr val="tx1">
-                  <a:lumMod val="75000"/>
-                  <a:lumOff val="25000"/>
-                </a:schemeClr>
-              </a:solidFill>
-            </a:endParaRPr>
-          </a:p>
-        </p:txBody>
-      </p:sp>
-      <p:sp>
-        <p:nvSpPr>
           <p:cNvPr id="242" name="Oval 241"/>
           <p:cNvSpPr/>
           <p:nvPr/>
         </p:nvSpPr>
         <p:spPr>
           <a:xfrm>
-            <a:off x="7281035" y="5133839"/>
+            <a:off x="7281035" y="4996679"/>
             <a:ext cx="148022" cy="159452"/>
           </a:xfrm>
           <a:prstGeom prst="ellipse">
@@ -13296,98 +13138,22 @@
           </a:p>
         </p:txBody>
       </p:sp>
-      <p:sp>
-        <p:nvSpPr>
-          <p:cNvPr id="243" name="Flowchart: Terminator 242"/>
-          <p:cNvSpPr/>
-          <p:nvPr/>
-        </p:nvSpPr>
-        <p:spPr>
-          <a:xfrm>
-            <a:off x="6646084" y="5155557"/>
-            <a:ext cx="518934" cy="128590"/>
-          </a:xfrm>
-          <a:prstGeom prst="flowChartTerminator">
-            <a:avLst/>
-          </a:prstGeom>
-          <a:solidFill>
-            <a:schemeClr val="accent6">
-              <a:lumMod val="40000"/>
-              <a:lumOff val="60000"/>
-            </a:schemeClr>
-          </a:solidFill>
-          <a:ln>
-            <a:solidFill>
-              <a:schemeClr val="accent6"/>
-            </a:solidFill>
-          </a:ln>
-          <a:effectLst>
-            <a:outerShdw blurRad="50800" dist="38100" dir="8100000" algn="tr" rotWithShape="0">
-              <a:prstClr val="black">
-                <a:alpha val="40000"/>
-              </a:prstClr>
-            </a:outerShdw>
-          </a:effectLst>
-        </p:spPr>
-        <p:style>
-          <a:lnRef idx="3">
-            <a:schemeClr val="lt1"/>
-          </a:lnRef>
-          <a:fillRef idx="1">
-            <a:schemeClr val="accent6"/>
-          </a:fillRef>
-          <a:effectRef idx="1">
-            <a:schemeClr val="accent6"/>
-          </a:effectRef>
-          <a:fontRef idx="minor">
-            <a:schemeClr val="lt1"/>
-          </a:fontRef>
-        </p:style>
-        <p:txBody>
-          <a:bodyPr rtlCol="0" anchor="ctr"/>
-          <a:p>
-            <a:pPr algn="ctr"/>
-            <a:r>
-              <a:rPr lang="en-US" sz="450" b="1">
-                <a:solidFill>
-                  <a:schemeClr val="tx1">
-                    <a:lumMod val="75000"/>
-                    <a:lumOff val="25000"/>
-                  </a:schemeClr>
-                </a:solidFill>
-                <a:sym typeface="+mn-ea"/>
-              </a:rPr>
-              <a:t>canceled</a:t>
-            </a:r>
-            <a:endParaRPr lang="en-US" sz="450" b="1">
-              <a:solidFill>
-                <a:schemeClr val="tx1">
-                  <a:lumMod val="75000"/>
-                  <a:lumOff val="25000"/>
-                </a:schemeClr>
-              </a:solidFill>
-            </a:endParaRPr>
-          </a:p>
-        </p:txBody>
-      </p:sp>
       <p:cxnSp>
         <p:nvCxnSpPr>
           <p:cNvPr id="244" name="Elbow Connector 243"/>
           <p:cNvCxnSpPr>
             <a:stCxn id="61" idx="1"/>
-            <a:endCxn id="314" idx="6"/>
+            <a:endCxn id="215" idx="2"/>
           </p:cNvCxnSpPr>
           <p:nvPr/>
         </p:nvCxnSpPr>
         <p:spPr>
           <a:xfrm rot="10800000">
-            <a:off x="3706495" y="6950075"/>
-            <a:ext cx="667385" cy="1958975"/>
-          </a:xfrm>
-          <a:prstGeom prst="bentConnector3">
-            <a:avLst>
-              <a:gd name="adj1" fmla="val 21788"/>
-            </a:avLst>
+            <a:off x="4241165" y="7055485"/>
+            <a:ext cx="132715" cy="1716405"/>
+          </a:xfrm>
+          <a:prstGeom prst="bentConnector2">
+            <a:avLst/>
           </a:prstGeom>
           <a:ln>
             <a:tailEnd type="triangle"/>
@@ -13423,7 +13189,7 @@
         </p:nvSpPr>
         <p:spPr>
           <a:xfrm>
-            <a:off x="8926358" y="2982664"/>
+            <a:off x="8926358" y="2845504"/>
             <a:ext cx="270897" cy="266897"/>
           </a:xfrm>
           <a:prstGeom prst="ellipse">
@@ -13512,7 +13278,7 @@
         </p:nvCxnSpPr>
         <p:spPr>
           <a:xfrm>
-            <a:off x="9061806" y="3249561"/>
+            <a:off x="9061806" y="3112401"/>
             <a:ext cx="1270" cy="201930"/>
           </a:xfrm>
           <a:prstGeom prst="straightConnector1">
@@ -13552,7 +13318,7 @@
         </p:nvSpPr>
         <p:spPr>
           <a:xfrm>
-            <a:off x="7557648" y="3570751"/>
+            <a:off x="7557648" y="3433591"/>
             <a:ext cx="664670" cy="488644"/>
           </a:xfrm>
           <a:prstGeom prst="flowChartDecision">
@@ -13634,7 +13400,7 @@
         </p:nvCxnSpPr>
         <p:spPr>
           <a:xfrm flipH="1">
-            <a:off x="8222833" y="3810088"/>
+            <a:off x="8222833" y="3672928"/>
             <a:ext cx="292100" cy="5080"/>
           </a:xfrm>
           <a:prstGeom prst="straightConnector1">
@@ -13677,7 +13443,7 @@
         </p:nvCxnSpPr>
         <p:spPr>
           <a:xfrm flipH="1">
-            <a:off x="7118154" y="3815359"/>
+            <a:off x="7118154" y="3678199"/>
             <a:ext cx="439494" cy="1715"/>
           </a:xfrm>
           <a:prstGeom prst="straightConnector1">
@@ -13720,7 +13486,7 @@
         </p:nvCxnSpPr>
         <p:spPr>
           <a:xfrm rot="5400000">
-            <a:off x="7456805" y="3727450"/>
+            <a:off x="7456805" y="3590290"/>
             <a:ext cx="101600" cy="765810"/>
           </a:xfrm>
           <a:prstGeom prst="bentConnector2">
@@ -13760,7 +13526,7 @@
         </p:nvSpPr>
         <p:spPr>
           <a:xfrm>
-            <a:off x="7281035" y="3744491"/>
+            <a:off x="7281035" y="3607331"/>
             <a:ext cx="148022" cy="159452"/>
           </a:xfrm>
           <a:prstGeom prst="ellipse">
@@ -13802,86 +13568,13 @@
       </p:sp>
       <p:sp>
         <p:nvSpPr>
-          <p:cNvPr id="264" name="Flowchart: Terminator 263"/>
-          <p:cNvSpPr/>
-          <p:nvPr/>
-        </p:nvSpPr>
-        <p:spPr>
-          <a:xfrm>
-            <a:off x="6599220" y="3752492"/>
-            <a:ext cx="518934" cy="128590"/>
-          </a:xfrm>
-          <a:prstGeom prst="flowChartTerminator">
-            <a:avLst/>
-          </a:prstGeom>
-          <a:solidFill>
-            <a:schemeClr val="accent6">
-              <a:lumMod val="40000"/>
-              <a:lumOff val="60000"/>
-            </a:schemeClr>
-          </a:solidFill>
-          <a:ln>
-            <a:solidFill>
-              <a:schemeClr val="accent6"/>
-            </a:solidFill>
-          </a:ln>
-          <a:effectLst>
-            <a:outerShdw blurRad="50800" dist="38100" dir="8100000" algn="tr" rotWithShape="0">
-              <a:prstClr val="black">
-                <a:alpha val="40000"/>
-              </a:prstClr>
-            </a:outerShdw>
-          </a:effectLst>
-        </p:spPr>
-        <p:style>
-          <a:lnRef idx="3">
-            <a:schemeClr val="lt1"/>
-          </a:lnRef>
-          <a:fillRef idx="1">
-            <a:schemeClr val="accent6"/>
-          </a:fillRef>
-          <a:effectRef idx="1">
-            <a:schemeClr val="accent6"/>
-          </a:effectRef>
-          <a:fontRef idx="minor">
-            <a:schemeClr val="lt1"/>
-          </a:fontRef>
-        </p:style>
-        <p:txBody>
-          <a:bodyPr rtlCol="0" anchor="ctr"/>
-          <a:p>
-            <a:pPr algn="ctr"/>
-            <a:r>
-              <a:rPr lang="en-US" sz="450" b="1">
-                <a:solidFill>
-                  <a:schemeClr val="tx1">
-                    <a:lumMod val="75000"/>
-                    <a:lumOff val="25000"/>
-                  </a:schemeClr>
-                </a:solidFill>
-              </a:rPr>
-              <a:t>pending</a:t>
-            </a:r>
-            <a:endParaRPr lang="en-US" sz="450" b="1">
-              <a:solidFill>
-                <a:schemeClr val="tx1">
-                  <a:lumMod val="75000"/>
-                  <a:lumOff val="25000"/>
-                </a:schemeClr>
-              </a:solidFill>
-            </a:endParaRPr>
-          </a:p>
-        </p:txBody>
-      </p:sp>
-      <p:sp>
-        <p:nvSpPr>
           <p:cNvPr id="265" name="Oval 264"/>
           <p:cNvSpPr/>
           <p:nvPr/>
         </p:nvSpPr>
         <p:spPr>
           <a:xfrm>
-            <a:off x="7281035" y="4081810"/>
+            <a:off x="7281035" y="3944650"/>
             <a:ext cx="148022" cy="159452"/>
           </a:xfrm>
           <a:prstGeom prst="ellipse">
@@ -13921,79 +13614,6 @@
           </a:p>
         </p:txBody>
       </p:sp>
-      <p:sp>
-        <p:nvSpPr>
-          <p:cNvPr id="266" name="Flowchart: Terminator 265"/>
-          <p:cNvSpPr/>
-          <p:nvPr/>
-        </p:nvSpPr>
-        <p:spPr>
-          <a:xfrm>
-            <a:off x="6606078" y="4096098"/>
-            <a:ext cx="518934" cy="128590"/>
-          </a:xfrm>
-          <a:prstGeom prst="flowChartTerminator">
-            <a:avLst/>
-          </a:prstGeom>
-          <a:solidFill>
-            <a:schemeClr val="accent6">
-              <a:lumMod val="40000"/>
-              <a:lumOff val="60000"/>
-            </a:schemeClr>
-          </a:solidFill>
-          <a:ln>
-            <a:solidFill>
-              <a:schemeClr val="accent6"/>
-            </a:solidFill>
-          </a:ln>
-          <a:effectLst>
-            <a:outerShdw blurRad="50800" dist="38100" dir="8100000" algn="tr" rotWithShape="0">
-              <a:prstClr val="black">
-                <a:alpha val="40000"/>
-              </a:prstClr>
-            </a:outerShdw>
-          </a:effectLst>
-        </p:spPr>
-        <p:style>
-          <a:lnRef idx="3">
-            <a:schemeClr val="lt1"/>
-          </a:lnRef>
-          <a:fillRef idx="1">
-            <a:schemeClr val="accent6"/>
-          </a:fillRef>
-          <a:effectRef idx="1">
-            <a:schemeClr val="accent6"/>
-          </a:effectRef>
-          <a:fontRef idx="minor">
-            <a:schemeClr val="lt1"/>
-          </a:fontRef>
-        </p:style>
-        <p:txBody>
-          <a:bodyPr rtlCol="0" anchor="ctr"/>
-          <a:p>
-            <a:pPr algn="ctr"/>
-            <a:r>
-              <a:rPr lang="en-US" sz="450" b="1">
-                <a:solidFill>
-                  <a:schemeClr val="tx1">
-                    <a:lumMod val="75000"/>
-                    <a:lumOff val="25000"/>
-                  </a:schemeClr>
-                </a:solidFill>
-              </a:rPr>
-              <a:t>rejected</a:t>
-            </a:r>
-            <a:endParaRPr lang="en-US" sz="450" b="1">
-              <a:solidFill>
-                <a:schemeClr val="tx1">
-                  <a:lumMod val="75000"/>
-                  <a:lumOff val="25000"/>
-                </a:schemeClr>
-              </a:solidFill>
-            </a:endParaRPr>
-          </a:p>
-        </p:txBody>
-      </p:sp>
       <p:grpSp>
         <p:nvGrpSpPr>
           <p:cNvPr id="116" name="Group 115"/>
@@ -14002,7 +13622,7 @@
         </p:nvGrpSpPr>
         <p:grpSpPr>
           <a:xfrm>
-            <a:off x="8514715" y="3451225"/>
+            <a:off x="8514715" y="3314065"/>
             <a:ext cx="1100455" cy="422656"/>
             <a:chOff x="13409" y="5435"/>
             <a:chExt cx="1733" cy="666"/>
@@ -14191,7 +13811,7 @@
         </p:nvGrpSpPr>
         <p:grpSpPr>
           <a:xfrm>
-            <a:off x="8514715" y="4524375"/>
+            <a:off x="8514715" y="4387215"/>
             <a:ext cx="1100455" cy="426466"/>
             <a:chOff x="13409" y="7125"/>
             <a:chExt cx="1733" cy="672"/>
@@ -14380,7 +14000,7 @@
         </p:nvSpPr>
         <p:spPr>
           <a:xfrm>
-            <a:off x="3909168" y="6704604"/>
+            <a:off x="3909168" y="6567444"/>
             <a:ext cx="664670" cy="488644"/>
           </a:xfrm>
           <a:prstGeom prst="flowChartDecision">
@@ -14453,7 +14073,7 @@
         </p:nvSpPr>
         <p:spPr>
           <a:xfrm>
-            <a:off x="3559416" y="6870713"/>
+            <a:off x="3559416" y="6733553"/>
             <a:ext cx="148022" cy="159452"/>
           </a:xfrm>
           <a:prstGeom prst="ellipse">
@@ -14504,7 +14124,7 @@
         </p:nvCxnSpPr>
         <p:spPr>
           <a:xfrm>
-            <a:off x="4045585" y="3364865"/>
+            <a:off x="4045585" y="3227705"/>
             <a:ext cx="4445" cy="615315"/>
           </a:xfrm>
           <a:prstGeom prst="straightConnector1">
@@ -14550,7 +14170,7 @@
         </p:nvGrpSpPr>
         <p:grpSpPr>
           <a:xfrm>
-            <a:off x="3517900" y="3458845"/>
+            <a:off x="3517900" y="3321685"/>
             <a:ext cx="1099185" cy="276860"/>
             <a:chOff x="5540" y="5447"/>
             <a:chExt cx="1731" cy="436"/>
@@ -14700,7 +14320,7 @@
         </p:nvSpPr>
         <p:spPr>
           <a:xfrm>
-            <a:off x="3626271" y="3980272"/>
+            <a:off x="3626271" y="3843112"/>
             <a:ext cx="846411" cy="128590"/>
           </a:xfrm>
           <a:prstGeom prst="flowChartTerminator">
@@ -14768,14 +14388,12 @@
       <p:cxnSp>
         <p:nvCxnSpPr>
           <p:cNvPr id="336" name="Straight Arrow Connector 335"/>
-          <p:cNvCxnSpPr>
-            <a:endCxn id="332" idx="1"/>
-          </p:cNvCxnSpPr>
+          <p:cNvCxnSpPr/>
           <p:nvPr/>
         </p:nvCxnSpPr>
         <p:spPr>
           <a:xfrm>
-            <a:off x="2968625" y="3519170"/>
+            <a:off x="2968625" y="3382010"/>
             <a:ext cx="549275" cy="3810"/>
           </a:xfrm>
           <a:prstGeom prst="straightConnector1">
@@ -14821,7 +14439,7 @@
         </p:nvSpPr>
         <p:spPr>
           <a:xfrm>
-            <a:off x="11332210" y="2891790"/>
+            <a:off x="11150600" y="2743835"/>
             <a:ext cx="1543050" cy="368300"/>
           </a:xfrm>
           <a:prstGeom prst="rect">
@@ -14871,14 +14489,14 @@
           <p:nvPr/>
         </p:nvPicPr>
         <p:blipFill>
-          <a:blip r:embed="rId7"/>
+          <a:blip r:embed="rId6"/>
           <a:stretch>
             <a:fillRect/>
           </a:stretch>
         </p:blipFill>
         <p:spPr>
           <a:xfrm>
-            <a:off x="11585225" y="3644477"/>
+            <a:off x="11585225" y="3507317"/>
             <a:ext cx="1108735" cy="1859704"/>
           </a:xfrm>
           <a:prstGeom prst="rect">
@@ -14902,14 +14520,14 @@
           <p:nvPr/>
         </p:nvPicPr>
         <p:blipFill>
-          <a:blip r:embed="rId8"/>
+          <a:blip r:embed="rId7"/>
           <a:stretch>
             <a:fillRect/>
           </a:stretch>
         </p:blipFill>
         <p:spPr>
           <a:xfrm>
-            <a:off x="11570937" y="5630740"/>
+            <a:off x="11570937" y="5493580"/>
             <a:ext cx="1122452" cy="1916855"/>
           </a:xfrm>
           <a:prstGeom prst="rect">
@@ -14932,7 +14550,7 @@
         </p:nvSpPr>
         <p:spPr>
           <a:xfrm>
-            <a:off x="2933503" y="4996423"/>
+            <a:off x="2933503" y="4859263"/>
             <a:ext cx="270897" cy="246894"/>
           </a:xfrm>
           <a:prstGeom prst="ellipse">
@@ -15019,7 +14637,7 @@
         </p:nvSpPr>
         <p:spPr>
           <a:xfrm>
-            <a:off x="3499013" y="5330259"/>
+            <a:off x="3499013" y="5193099"/>
             <a:ext cx="270897" cy="266897"/>
           </a:xfrm>
           <a:prstGeom prst="ellipse">
@@ -15101,14 +14719,12 @@
       <p:cxnSp>
         <p:nvCxnSpPr>
           <p:cNvPr id="40" name="Straight Arrow Connector 39"/>
-          <p:cNvCxnSpPr>
-            <a:endCxn id="26" idx="3"/>
-          </p:cNvCxnSpPr>
+          <p:cNvCxnSpPr/>
           <p:nvPr/>
         </p:nvCxnSpPr>
         <p:spPr>
           <a:xfrm flipH="1" flipV="1">
-            <a:off x="11189970" y="7903845"/>
+            <a:off x="11189970" y="7766685"/>
             <a:ext cx="370205" cy="6985"/>
           </a:xfrm>
           <a:prstGeom prst="straightConnector1">
@@ -15151,7 +14767,7 @@
         </p:nvCxnSpPr>
         <p:spPr>
           <a:xfrm flipV="1">
-            <a:off x="3634740" y="5596890"/>
+            <a:off x="3634740" y="5459730"/>
             <a:ext cx="0" cy="628015"/>
           </a:xfrm>
           <a:prstGeom prst="straightConnector1">
@@ -15191,7 +14807,7 @@
         </p:nvSpPr>
         <p:spPr>
           <a:xfrm>
-            <a:off x="3558832" y="5795134"/>
+            <a:off x="3558832" y="5657974"/>
             <a:ext cx="148022" cy="159452"/>
           </a:xfrm>
           <a:prstGeom prst="ellipse">
@@ -15239,7 +14855,7 @@
         </p:nvSpPr>
         <p:spPr>
           <a:xfrm>
-            <a:off x="2166715" y="5363662"/>
+            <a:off x="2166715" y="5226502"/>
             <a:ext cx="664670" cy="488644"/>
           </a:xfrm>
           <a:prstGeom prst="flowChartDecision">
@@ -15312,7 +14928,7 @@
         </p:nvSpPr>
         <p:spPr>
           <a:xfrm>
-            <a:off x="2367718" y="4685908"/>
+            <a:off x="2367718" y="4548748"/>
             <a:ext cx="270897" cy="246894"/>
           </a:xfrm>
           <a:prstGeom prst="ellipse">
@@ -15402,7 +15018,7 @@
         </p:nvCxnSpPr>
         <p:spPr>
           <a:xfrm flipV="1">
-            <a:off x="2499360" y="4932680"/>
+            <a:off x="2499360" y="4795520"/>
             <a:ext cx="4445" cy="431165"/>
           </a:xfrm>
           <a:prstGeom prst="straightConnector1">
@@ -15442,7 +15058,7 @@
         </p:nvSpPr>
         <p:spPr>
           <a:xfrm>
-            <a:off x="2424823" y="5087347"/>
+            <a:off x="2424823" y="4950187"/>
             <a:ext cx="148022" cy="159452"/>
           </a:xfrm>
           <a:prstGeom prst="ellipse">
@@ -15490,7 +15106,7 @@
         </p:nvSpPr>
         <p:spPr>
           <a:xfrm>
-            <a:off x="3275330" y="7969250"/>
+            <a:off x="3275330" y="7832090"/>
             <a:ext cx="706120" cy="499110"/>
           </a:xfrm>
           <a:prstGeom prst="flowChartDecision">
@@ -15563,7 +15179,7 @@
         </p:nvSpPr>
         <p:spPr>
           <a:xfrm>
-            <a:off x="1549592" y="8120270"/>
+            <a:off x="1549592" y="7983110"/>
             <a:ext cx="270897" cy="260610"/>
           </a:xfrm>
           <a:prstGeom prst="ellipse">
@@ -15653,7 +15269,7 @@
         </p:nvCxnSpPr>
         <p:spPr>
           <a:xfrm>
-            <a:off x="4170045" y="4782820"/>
+            <a:off x="4170045" y="4645660"/>
             <a:ext cx="240030" cy="1270"/>
           </a:xfrm>
           <a:prstGeom prst="straightConnector1">
@@ -15699,7 +15315,7 @@
         </p:nvSpPr>
         <p:spPr>
           <a:xfrm>
-            <a:off x="3899092" y="4652535"/>
+            <a:off x="3899092" y="4515375"/>
             <a:ext cx="270897" cy="260610"/>
           </a:xfrm>
           <a:prstGeom prst="ellipse">
@@ -15786,7 +15402,7 @@
         </p:nvSpPr>
         <p:spPr>
           <a:xfrm>
-            <a:off x="2425065" y="7713993"/>
+            <a:off x="2425065" y="7576833"/>
             <a:ext cx="148022" cy="159452"/>
           </a:xfrm>
           <a:prstGeom prst="ellipse">
@@ -15834,7 +15450,7 @@
         </p:nvSpPr>
         <p:spPr>
           <a:xfrm>
-            <a:off x="5313045" y="8245475"/>
+            <a:off x="5313045" y="8108315"/>
             <a:ext cx="203200" cy="215900"/>
           </a:xfrm>
           <a:prstGeom prst="ellipse">
@@ -15883,7 +15499,7 @@
           <p:nvPr/>
         </p:nvPicPr>
         <p:blipFill>
-          <a:blip r:embed="rId6">
+          <a:blip r:embed="rId5">
             <a:clrChange>
               <a:clrFrom>
                 <a:srgbClr val="FFFFFF">
@@ -15904,7 +15520,7 @@
         </p:blipFill>
         <p:spPr>
           <a:xfrm>
-            <a:off x="5329555" y="8284210"/>
+            <a:off x="5329555" y="8147050"/>
             <a:ext cx="193675" cy="173990"/>
           </a:xfrm>
           <a:prstGeom prst="rect">
@@ -15920,7 +15536,7 @@
         </p:nvSpPr>
         <p:spPr>
           <a:xfrm>
-            <a:off x="5436235" y="8708390"/>
+            <a:off x="5436235" y="8571230"/>
             <a:ext cx="448945" cy="128905"/>
           </a:xfrm>
           <a:prstGeom prst="flowChartTerminator">
@@ -15993,7 +15609,7 @@
         </p:nvSpPr>
         <p:spPr>
           <a:xfrm>
-            <a:off x="5400675" y="8551545"/>
+            <a:off x="5400675" y="8414385"/>
             <a:ext cx="532765" cy="128905"/>
           </a:xfrm>
           <a:prstGeom prst="flowChartTerminator">
@@ -16066,7 +15682,7 @@
         </p:nvSpPr>
         <p:spPr>
           <a:xfrm>
-            <a:off x="2145665" y="8736330"/>
+            <a:off x="2145665" y="8599170"/>
             <a:ext cx="706120" cy="499110"/>
           </a:xfrm>
           <a:prstGeom prst="flowChartDecision">
@@ -16139,10 +15755,10 @@
         </p:nvGrpSpPr>
         <p:grpSpPr>
           <a:xfrm>
-            <a:off x="10092690" y="7693025"/>
-            <a:ext cx="1097280" cy="421640"/>
+            <a:off x="10092690" y="7555865"/>
+            <a:ext cx="1097280" cy="426466"/>
             <a:chOff x="15894" y="12115"/>
-            <a:chExt cx="1728" cy="664"/>
+            <a:chExt cx="1728" cy="672"/>
           </a:xfrm>
           <a:effectLst>
             <a:outerShdw blurRad="50800" dist="38100" dir="8100000" algn="tr" rotWithShape="0">
@@ -16246,7 +15862,7 @@
           </p:nvSpPr>
           <p:spPr>
             <a:xfrm>
-              <a:off x="15894" y="12577"/>
+              <a:off x="15894" y="12585"/>
               <a:ext cx="1728" cy="202"/>
             </a:xfrm>
             <a:prstGeom prst="rect">
@@ -16290,7 +15906,7 @@
         </p:nvSpPr>
         <p:spPr>
           <a:xfrm>
-            <a:off x="2716530" y="7578725"/>
+            <a:off x="2716530" y="7441565"/>
             <a:ext cx="706120" cy="499110"/>
           </a:xfrm>
           <a:prstGeom prst="flowChartDecision">
@@ -16363,7 +15979,7 @@
         </p:nvSpPr>
         <p:spPr>
           <a:xfrm>
-            <a:off x="6885299" y="7921405"/>
+            <a:off x="6885299" y="7784245"/>
             <a:ext cx="270897" cy="241179"/>
           </a:xfrm>
           <a:prstGeom prst="ellipse">
@@ -16450,7 +16066,7 @@
         </p:nvSpPr>
         <p:spPr>
           <a:xfrm>
-            <a:off x="8768080" y="5760085"/>
+            <a:off x="8768080" y="5622925"/>
             <a:ext cx="680720" cy="128905"/>
           </a:xfrm>
           <a:prstGeom prst="flowChartTerminator">
@@ -16523,7 +16139,7 @@
         </p:nvSpPr>
         <p:spPr>
           <a:xfrm>
-            <a:off x="7289800" y="6052820"/>
+            <a:off x="7289800" y="5915660"/>
             <a:ext cx="553720" cy="128905"/>
           </a:xfrm>
           <a:prstGeom prst="flowChartTerminator">
@@ -16596,7 +16212,7 @@
         </p:nvSpPr>
         <p:spPr>
           <a:xfrm>
-            <a:off x="10415270" y="4638040"/>
+            <a:off x="10415270" y="4500880"/>
             <a:ext cx="438912" cy="219456"/>
           </a:xfrm>
           <a:prstGeom prst="flowChartOffpageConnector">
@@ -16710,7 +16326,7 @@
         </p:nvCxnSpPr>
         <p:spPr>
           <a:xfrm>
-            <a:off x="10634980" y="4857750"/>
+            <a:off x="10634980" y="4720590"/>
             <a:ext cx="1905" cy="280670"/>
           </a:xfrm>
           <a:prstGeom prst="straightConnector1">
@@ -16750,7 +16366,7 @@
         </p:nvSpPr>
         <p:spPr>
           <a:xfrm>
-            <a:off x="1289050" y="3443605"/>
+            <a:off x="1289050" y="3306445"/>
             <a:ext cx="438912" cy="219456"/>
           </a:xfrm>
           <a:prstGeom prst="flowChartOffpageConnector">
@@ -16852,7 +16468,7 @@
         </p:nvCxnSpPr>
         <p:spPr>
           <a:xfrm flipV="1">
-            <a:off x="1727835" y="3552190"/>
+            <a:off x="1727835" y="3415030"/>
             <a:ext cx="367030" cy="1270"/>
           </a:xfrm>
           <a:prstGeom prst="straightConnector1">
@@ -16898,7 +16514,7 @@
         </p:nvSpPr>
         <p:spPr>
           <a:xfrm>
-            <a:off x="3746500" y="3007360"/>
+            <a:off x="3746500" y="2870200"/>
             <a:ext cx="597535" cy="357505"/>
           </a:xfrm>
           <a:prstGeom prst="flowChartOffpageConnector">
@@ -17010,14 +16626,14 @@
           <p:nvPr/>
         </p:nvPicPr>
         <p:blipFill>
-          <a:blip r:embed="rId9"/>
+          <a:blip r:embed="rId8"/>
           <a:stretch>
             <a:fillRect/>
           </a:stretch>
         </p:blipFill>
         <p:spPr>
           <a:xfrm>
-            <a:off x="2080260" y="2804795"/>
+            <a:off x="2080260" y="2667635"/>
             <a:ext cx="1123950" cy="1619250"/>
           </a:xfrm>
           <a:prstGeom prst="rect">
@@ -17040,7 +16656,7 @@
         </p:nvSpPr>
         <p:spPr>
           <a:xfrm>
-            <a:off x="7968046" y="7432719"/>
+            <a:off x="7968046" y="7295559"/>
             <a:ext cx="664670" cy="488644"/>
           </a:xfrm>
           <a:prstGeom prst="flowChartDecision">
@@ -17149,7 +16765,7 @@
         </p:nvGrpSpPr>
         <p:grpSpPr>
           <a:xfrm rot="0">
-            <a:off x="6000750" y="7247255"/>
+            <a:off x="6000750" y="7110095"/>
             <a:ext cx="427355" cy="334010"/>
             <a:chOff x="16290" y="4518"/>
             <a:chExt cx="748" cy="584"/>
@@ -17251,110 +16867,6 @@
           </p:spPr>
         </p:pic>
       </p:grpSp>
-      <p:pic>
-        <p:nvPicPr>
-          <p:cNvPr id="6" name="Picture 5"/>
-          <p:cNvPicPr>
-            <a:picLocks noChangeAspect="1"/>
-          </p:cNvPicPr>
-          <p:nvPr/>
-        </p:nvPicPr>
-        <p:blipFill>
-          <a:blip r:embed="rId10"/>
-          <a:stretch>
-            <a:fillRect/>
-          </a:stretch>
-        </p:blipFill>
-        <p:spPr>
-          <a:xfrm>
-            <a:off x="6109970" y="7508240"/>
-            <a:ext cx="728980" cy="2167255"/>
-          </a:xfrm>
-          <a:prstGeom prst="rect">
-            <a:avLst/>
-          </a:prstGeom>
-          <a:effectLst>
-            <a:outerShdw blurRad="50800" dist="38100" dir="8100000" algn="tr" rotWithShape="0">
-              <a:prstClr val="black">
-                <a:alpha val="40000"/>
-              </a:prstClr>
-            </a:outerShdw>
-          </a:effectLst>
-        </p:spPr>
-      </p:pic>
-      <p:sp>
-        <p:nvSpPr>
-          <p:cNvPr id="285" name="Flowchart: Terminator 284"/>
-          <p:cNvSpPr/>
-          <p:nvPr/>
-        </p:nvSpPr>
-        <p:spPr>
-          <a:xfrm>
-            <a:off x="6800136" y="9367822"/>
-            <a:ext cx="449209" cy="128590"/>
-          </a:xfrm>
-          <a:prstGeom prst="flowChartTerminator">
-            <a:avLst/>
-          </a:prstGeom>
-          <a:solidFill>
-            <a:schemeClr val="accent6">
-              <a:lumMod val="40000"/>
-              <a:lumOff val="60000"/>
-            </a:schemeClr>
-          </a:solidFill>
-          <a:ln>
-            <a:solidFill>
-              <a:schemeClr val="accent6"/>
-            </a:solidFill>
-          </a:ln>
-          <a:effectLst>
-            <a:outerShdw blurRad="50800" dist="38100" dir="8100000" algn="tr" rotWithShape="0">
-              <a:prstClr val="black">
-                <a:alpha val="40000"/>
-              </a:prstClr>
-            </a:outerShdw>
-          </a:effectLst>
-        </p:spPr>
-        <p:style>
-          <a:lnRef idx="3">
-            <a:schemeClr val="lt1"/>
-          </a:lnRef>
-          <a:fillRef idx="1">
-            <a:schemeClr val="accent6"/>
-          </a:fillRef>
-          <a:effectRef idx="1">
-            <a:schemeClr val="accent6"/>
-          </a:effectRef>
-          <a:fontRef idx="minor">
-            <a:schemeClr val="lt1"/>
-          </a:fontRef>
-        </p:style>
-        <p:txBody>
-          <a:bodyPr rtlCol="0" anchor="ctr"/>
-          <a:p>
-            <a:pPr algn="ctr"/>
-            <a:r>
-              <a:rPr lang="en-US" sz="450" b="1">
-                <a:solidFill>
-                  <a:schemeClr val="tx1">
-                    <a:lumMod val="75000"/>
-                    <a:lumOff val="25000"/>
-                  </a:schemeClr>
-                </a:solidFill>
-              </a:rPr>
-              <a:t>orders</a:t>
-            </a:r>
-            <a:endParaRPr lang="en-US" sz="450" b="1">
-              <a:solidFill>
-                <a:schemeClr val="tx1">
-                  <a:lumMod val="75000"/>
-                  <a:lumOff val="25000"/>
-                </a:schemeClr>
-              </a:solidFill>
-            </a:endParaRPr>
-          </a:p>
-        </p:txBody>
-      </p:sp>
       <p:cxnSp>
         <p:nvCxnSpPr>
           <p:cNvPr id="41" name="Straight Arrow Connector 40"/>
@@ -17366,7 +16878,7 @@
         </p:nvCxnSpPr>
         <p:spPr>
           <a:xfrm>
-            <a:off x="8298180" y="7009765"/>
+            <a:off x="8298180" y="6872605"/>
             <a:ext cx="2540" cy="422910"/>
           </a:xfrm>
           <a:prstGeom prst="straightConnector1">
@@ -17406,7 +16918,7 @@
         </p:nvSpPr>
         <p:spPr>
           <a:xfrm>
-            <a:off x="8223830" y="7105558"/>
+            <a:off x="8223830" y="6968398"/>
             <a:ext cx="148022" cy="159452"/>
           </a:xfrm>
           <a:prstGeom prst="ellipse">
@@ -17454,7 +16966,7 @@
         </p:nvSpPr>
         <p:spPr>
           <a:xfrm>
-            <a:off x="7281545" y="6208395"/>
+            <a:off x="7281545" y="6071235"/>
             <a:ext cx="553720" cy="128905"/>
           </a:xfrm>
           <a:prstGeom prst="flowChartTerminator">
@@ -17529,8 +17041,8 @@
         </p:nvCxnSpPr>
         <p:spPr>
           <a:xfrm flipV="1">
-            <a:off x="6927850" y="6273165"/>
-            <a:ext cx="353695" cy="1905"/>
+            <a:off x="6708775" y="6136005"/>
+            <a:ext cx="572770" cy="3175"/>
           </a:xfrm>
           <a:prstGeom prst="straightConnector1">
             <a:avLst/>
@@ -17572,7 +17084,7 @@
         </p:nvCxnSpPr>
         <p:spPr>
           <a:xfrm rot="10800000" flipV="1">
-            <a:off x="7156450" y="7677150"/>
+            <a:off x="7156450" y="7539990"/>
             <a:ext cx="811530" cy="365125"/>
           </a:xfrm>
           <a:prstGeom prst="bentConnector3">
@@ -17614,7 +17126,7 @@
         </p:nvSpPr>
         <p:spPr>
           <a:xfrm>
-            <a:off x="7719715" y="7585821"/>
+            <a:off x="7719715" y="7448661"/>
             <a:ext cx="148022" cy="159452"/>
           </a:xfrm>
           <a:prstGeom prst="ellipse">
@@ -17665,7 +17177,7 @@
         </p:nvCxnSpPr>
         <p:spPr>
           <a:xfrm rot="10800000">
-            <a:off x="7156450" y="8042275"/>
+            <a:off x="7156450" y="7905115"/>
             <a:ext cx="808990" cy="523240"/>
           </a:xfrm>
           <a:prstGeom prst="bentConnector3">
@@ -17707,7 +17219,7 @@
         </p:nvSpPr>
         <p:spPr>
           <a:xfrm>
-            <a:off x="7718994" y="8482123"/>
+            <a:off x="7718994" y="8344963"/>
             <a:ext cx="148022" cy="159452"/>
           </a:xfrm>
           <a:prstGeom prst="ellipse">
@@ -17758,7 +17270,7 @@
         </p:nvCxnSpPr>
         <p:spPr>
           <a:xfrm rot="10800000">
-            <a:off x="9448800" y="5824855"/>
+            <a:off x="9448800" y="5687695"/>
             <a:ext cx="643890" cy="2078990"/>
           </a:xfrm>
           <a:prstGeom prst="bentConnector3">
@@ -17801,14 +17313,14 @@
           <p:nvPr/>
         </p:nvPicPr>
         <p:blipFill>
-          <a:blip r:embed="rId11"/>
+          <a:blip r:embed="rId9"/>
           <a:stretch>
             <a:fillRect/>
           </a:stretch>
         </p:blipFill>
         <p:spPr>
           <a:xfrm>
-            <a:off x="11395710" y="7658735"/>
+            <a:off x="11395710" y="7521575"/>
             <a:ext cx="1387475" cy="2009775"/>
           </a:xfrm>
           <a:prstGeom prst="rect">
@@ -17834,7 +17346,7 @@
         </p:nvCxnSpPr>
         <p:spPr>
           <a:xfrm flipH="1">
-            <a:off x="8298180" y="7921625"/>
+            <a:off x="8298180" y="7784465"/>
             <a:ext cx="2540" cy="399415"/>
           </a:xfrm>
           <a:prstGeom prst="straightConnector1">
@@ -17874,7 +17386,7 @@
         </p:nvSpPr>
         <p:spPr>
           <a:xfrm>
-            <a:off x="8223830" y="8012338"/>
+            <a:off x="8223830" y="7875178"/>
             <a:ext cx="148022" cy="159452"/>
           </a:xfrm>
           <a:prstGeom prst="ellipse">
@@ -17922,7 +17434,7 @@
         </p:nvSpPr>
         <p:spPr>
           <a:xfrm>
-            <a:off x="7965506" y="9188494"/>
+            <a:off x="7965506" y="9051334"/>
             <a:ext cx="664670" cy="488644"/>
           </a:xfrm>
           <a:prstGeom prst="flowChartDecision">
@@ -18002,7 +17514,7 @@
         </p:nvCxnSpPr>
         <p:spPr>
           <a:xfrm>
-            <a:off x="8298180" y="8809990"/>
+            <a:off x="8298180" y="8672830"/>
             <a:ext cx="0" cy="378460"/>
           </a:xfrm>
           <a:prstGeom prst="straightConnector1">
@@ -18042,7 +17554,7 @@
         </p:nvSpPr>
         <p:spPr>
           <a:xfrm>
-            <a:off x="8226370" y="8900068"/>
+            <a:off x="8226370" y="8762908"/>
             <a:ext cx="148022" cy="159452"/>
           </a:xfrm>
           <a:prstGeom prst="ellipse">
@@ -18093,7 +17605,7 @@
         </p:nvCxnSpPr>
         <p:spPr>
           <a:xfrm flipH="1" flipV="1">
-            <a:off x="7249160" y="9432290"/>
+            <a:off x="7249160" y="9295130"/>
             <a:ext cx="716280" cy="635"/>
           </a:xfrm>
           <a:prstGeom prst="straightConnector1">
@@ -18133,7 +17645,7 @@
         </p:nvSpPr>
         <p:spPr>
           <a:xfrm>
-            <a:off x="7666289" y="9352708"/>
+            <a:off x="7666289" y="9215548"/>
             <a:ext cx="148022" cy="159452"/>
           </a:xfrm>
           <a:prstGeom prst="ellipse">
@@ -18181,7 +17693,7 @@
         </p:nvGrpSpPr>
         <p:grpSpPr>
           <a:xfrm rot="0">
-            <a:off x="5881370" y="5614035"/>
+            <a:off x="5881370" y="5476875"/>
             <a:ext cx="427355" cy="334010"/>
             <a:chOff x="16290" y="4518"/>
             <a:chExt cx="748" cy="584"/>
@@ -18283,37 +17795,6 @@
           </p:spPr>
         </p:pic>
       </p:grpSp>
-      <p:pic>
-        <p:nvPicPr>
-          <p:cNvPr id="45" name="Picture 44"/>
-          <p:cNvPicPr>
-            <a:picLocks noChangeAspect="1"/>
-          </p:cNvPicPr>
-          <p:nvPr/>
-        </p:nvPicPr>
-        <p:blipFill>
-          <a:blip r:embed="rId12"/>
-          <a:stretch>
-            <a:fillRect/>
-          </a:stretch>
-        </p:blipFill>
-        <p:spPr>
-          <a:xfrm>
-            <a:off x="5986780" y="5872480"/>
-            <a:ext cx="992505" cy="1299210"/>
-          </a:xfrm>
-          <a:prstGeom prst="rect">
-            <a:avLst/>
-          </a:prstGeom>
-          <a:effectLst>
-            <a:outerShdw blurRad="50800" dist="38100" dir="8100000" algn="tr" rotWithShape="0">
-              <a:prstClr val="black">
-                <a:alpha val="40000"/>
-              </a:prstClr>
-            </a:outerShdw>
-          </a:effectLst>
-        </p:spPr>
-      </p:pic>
       <p:grpSp>
         <p:nvGrpSpPr>
           <p:cNvPr id="226" name="Group 225"/>
@@ -18322,7 +17803,7 @@
         </p:nvGrpSpPr>
         <p:grpSpPr>
           <a:xfrm rot="0">
-            <a:off x="8362315" y="4321810"/>
+            <a:off x="8362315" y="4184650"/>
             <a:ext cx="363855" cy="287020"/>
             <a:chOff x="10155" y="438"/>
             <a:chExt cx="1146" cy="883"/>
@@ -18351,7 +17832,7 @@
               <p:nvPr/>
             </p:nvPicPr>
             <p:blipFill>
-              <a:blip r:embed="rId4"/>
+              <a:blip r:embed="rId3"/>
               <a:stretch>
                 <a:fillRect/>
               </a:stretch>
@@ -18400,7 +17881,7 @@
             <p:nvPr/>
           </p:nvPicPr>
           <p:blipFill>
-            <a:blip r:embed="rId5"/>
+            <a:blip r:embed="rId4"/>
             <a:stretch>
               <a:fillRect/>
             </a:stretch>
@@ -18424,7 +17905,7 @@
         </p:nvGrpSpPr>
         <p:grpSpPr>
           <a:xfrm rot="0">
-            <a:off x="8362315" y="3248660"/>
+            <a:off x="8362315" y="3111500"/>
             <a:ext cx="363855" cy="287020"/>
             <a:chOff x="10155" y="438"/>
             <a:chExt cx="1146" cy="883"/>
@@ -18453,7 +17934,7 @@
               <p:nvPr/>
             </p:nvPicPr>
             <p:blipFill>
-              <a:blip r:embed="rId4"/>
+              <a:blip r:embed="rId3"/>
               <a:stretch>
                 <a:fillRect/>
               </a:stretch>
@@ -18502,7 +17983,7 @@
             <p:nvPr/>
           </p:nvPicPr>
           <p:blipFill>
-            <a:blip r:embed="rId5"/>
+            <a:blip r:embed="rId4"/>
             <a:stretch>
               <a:fillRect/>
             </a:stretch>
@@ -18526,7 +18007,7 @@
         </p:nvGrpSpPr>
         <p:grpSpPr>
           <a:xfrm rot="0">
-            <a:off x="9950450" y="7487285"/>
+            <a:off x="9950450" y="7350125"/>
             <a:ext cx="363855" cy="287020"/>
             <a:chOff x="10155" y="414"/>
             <a:chExt cx="1146" cy="883"/>
@@ -18555,7 +18036,7 @@
               <p:nvPr/>
             </p:nvPicPr>
             <p:blipFill>
-              <a:blip r:embed="rId4"/>
+              <a:blip r:embed="rId3"/>
               <a:stretch>
                 <a:fillRect/>
               </a:stretch>
@@ -18604,7 +18085,7 @@
             <p:nvPr/>
           </p:nvPicPr>
           <p:blipFill>
-            <a:blip r:embed="rId5"/>
+            <a:blip r:embed="rId4"/>
             <a:stretch>
               <a:fillRect/>
             </a:stretch>
@@ -18620,6 +18101,508 @@
           </p:spPr>
         </p:pic>
       </p:grpSp>
+      <p:cxnSp>
+        <p:nvCxnSpPr>
+          <p:cNvPr id="286" name="Straight Arrow Connector 285"/>
+          <p:cNvCxnSpPr>
+            <a:stCxn id="215" idx="1"/>
+            <a:endCxn id="314" idx="6"/>
+          </p:cNvCxnSpPr>
+          <p:nvPr/>
+        </p:nvCxnSpPr>
+        <p:spPr>
+          <a:xfrm flipH="1">
+            <a:off x="3707130" y="6811645"/>
+            <a:ext cx="201930" cy="1905"/>
+          </a:xfrm>
+          <a:prstGeom prst="straightConnector1">
+            <a:avLst/>
+          </a:prstGeom>
+          <a:ln>
+            <a:tailEnd type="triangle"/>
+          </a:ln>
+          <a:effectLst>
+            <a:outerShdw blurRad="50800" dist="38100" dir="8100000" algn="tr" rotWithShape="0">
+              <a:prstClr val="black">
+                <a:alpha val="40000"/>
+              </a:prstClr>
+            </a:outerShdw>
+          </a:effectLst>
+        </p:spPr>
+        <p:style>
+          <a:lnRef idx="1">
+            <a:schemeClr val="accent1"/>
+          </a:lnRef>
+          <a:fillRef idx="0">
+            <a:schemeClr val="accent1"/>
+          </a:fillRef>
+          <a:effectRef idx="0">
+            <a:schemeClr val="accent1"/>
+          </a:effectRef>
+          <a:fontRef idx="minor">
+            <a:schemeClr val="tx1"/>
+          </a:fontRef>
+        </p:style>
+      </p:cxnSp>
+      <p:pic>
+        <p:nvPicPr>
+          <p:cNvPr id="287" name="Picture 286"/>
+          <p:cNvPicPr>
+            <a:picLocks noChangeAspect="1"/>
+          </p:cNvPicPr>
+          <p:nvPr/>
+        </p:nvPicPr>
+        <p:blipFill>
+          <a:blip r:embed="rId10"/>
+          <a:stretch>
+            <a:fillRect/>
+          </a:stretch>
+        </p:blipFill>
+        <p:spPr>
+          <a:xfrm>
+            <a:off x="5925820" y="3398520"/>
+            <a:ext cx="827405" cy="2033270"/>
+          </a:xfrm>
+          <a:prstGeom prst="rect">
+            <a:avLst/>
+          </a:prstGeom>
+          <a:effectLst>
+            <a:outerShdw blurRad="50800" dist="38100" dir="8100000" algn="tr" rotWithShape="0">
+              <a:prstClr val="black">
+                <a:alpha val="40000"/>
+              </a:prstClr>
+            </a:outerShdw>
+          </a:effectLst>
+        </p:spPr>
+      </p:pic>
+      <p:sp>
+        <p:nvSpPr>
+          <p:cNvPr id="241" name="Flowchart: Terminator 240"/>
+          <p:cNvSpPr/>
+          <p:nvPr/>
+        </p:nvSpPr>
+        <p:spPr>
+          <a:xfrm>
+            <a:off x="6639226" y="4688062"/>
+            <a:ext cx="518934" cy="128590"/>
+          </a:xfrm>
+          <a:prstGeom prst="flowChartTerminator">
+            <a:avLst/>
+          </a:prstGeom>
+          <a:solidFill>
+            <a:schemeClr val="accent6">
+              <a:lumMod val="40000"/>
+              <a:lumOff val="60000"/>
+            </a:schemeClr>
+          </a:solidFill>
+          <a:ln>
+            <a:solidFill>
+              <a:schemeClr val="accent6"/>
+            </a:solidFill>
+          </a:ln>
+          <a:effectLst>
+            <a:outerShdw blurRad="50800" dist="38100" dir="8100000" algn="tr" rotWithShape="0">
+              <a:prstClr val="black">
+                <a:alpha val="40000"/>
+              </a:prstClr>
+            </a:outerShdw>
+          </a:effectLst>
+        </p:spPr>
+        <p:style>
+          <a:lnRef idx="3">
+            <a:schemeClr val="lt1"/>
+          </a:lnRef>
+          <a:fillRef idx="1">
+            <a:schemeClr val="accent6"/>
+          </a:fillRef>
+          <a:effectRef idx="1">
+            <a:schemeClr val="accent6"/>
+          </a:effectRef>
+          <a:fontRef idx="minor">
+            <a:schemeClr val="lt1"/>
+          </a:fontRef>
+        </p:style>
+        <p:txBody>
+          <a:bodyPr rtlCol="0" anchor="ctr"/>
+          <a:p>
+            <a:pPr algn="ctr"/>
+            <a:r>
+              <a:rPr lang="en-US" sz="450" b="1">
+                <a:solidFill>
+                  <a:schemeClr val="tx1">
+                    <a:lumMod val="75000"/>
+                    <a:lumOff val="25000"/>
+                  </a:schemeClr>
+                </a:solidFill>
+              </a:rPr>
+              <a:t>closed</a:t>
+            </a:r>
+            <a:endParaRPr lang="en-US" sz="450" b="1">
+              <a:solidFill>
+                <a:schemeClr val="tx1">
+                  <a:lumMod val="75000"/>
+                  <a:lumOff val="25000"/>
+                </a:schemeClr>
+              </a:solidFill>
+            </a:endParaRPr>
+          </a:p>
+        </p:txBody>
+      </p:sp>
+      <p:sp>
+        <p:nvSpPr>
+          <p:cNvPr id="243" name="Flowchart: Terminator 242"/>
+          <p:cNvSpPr/>
+          <p:nvPr/>
+        </p:nvSpPr>
+        <p:spPr>
+          <a:xfrm>
+            <a:off x="6646084" y="5018397"/>
+            <a:ext cx="518934" cy="128590"/>
+          </a:xfrm>
+          <a:prstGeom prst="flowChartTerminator">
+            <a:avLst/>
+          </a:prstGeom>
+          <a:solidFill>
+            <a:schemeClr val="accent6">
+              <a:lumMod val="40000"/>
+              <a:lumOff val="60000"/>
+            </a:schemeClr>
+          </a:solidFill>
+          <a:ln>
+            <a:solidFill>
+              <a:schemeClr val="accent6"/>
+            </a:solidFill>
+          </a:ln>
+          <a:effectLst>
+            <a:outerShdw blurRad="50800" dist="38100" dir="8100000" algn="tr" rotWithShape="0">
+              <a:prstClr val="black">
+                <a:alpha val="40000"/>
+              </a:prstClr>
+            </a:outerShdw>
+          </a:effectLst>
+        </p:spPr>
+        <p:style>
+          <a:lnRef idx="3">
+            <a:schemeClr val="lt1"/>
+          </a:lnRef>
+          <a:fillRef idx="1">
+            <a:schemeClr val="accent6"/>
+          </a:fillRef>
+          <a:effectRef idx="1">
+            <a:schemeClr val="accent6"/>
+          </a:effectRef>
+          <a:fontRef idx="minor">
+            <a:schemeClr val="lt1"/>
+          </a:fontRef>
+        </p:style>
+        <p:txBody>
+          <a:bodyPr rtlCol="0" anchor="ctr"/>
+          <a:p>
+            <a:pPr algn="ctr"/>
+            <a:r>
+              <a:rPr lang="en-US" sz="450" b="1">
+                <a:solidFill>
+                  <a:schemeClr val="tx1">
+                    <a:lumMod val="75000"/>
+                    <a:lumOff val="25000"/>
+                  </a:schemeClr>
+                </a:solidFill>
+                <a:sym typeface="+mn-ea"/>
+              </a:rPr>
+              <a:t>canceled</a:t>
+            </a:r>
+            <a:endParaRPr lang="en-US" sz="450" b="1">
+              <a:solidFill>
+                <a:schemeClr val="tx1">
+                  <a:lumMod val="75000"/>
+                  <a:lumOff val="25000"/>
+                </a:schemeClr>
+              </a:solidFill>
+            </a:endParaRPr>
+          </a:p>
+        </p:txBody>
+      </p:sp>
+      <p:sp>
+        <p:nvSpPr>
+          <p:cNvPr id="264" name="Flowchart: Terminator 263"/>
+          <p:cNvSpPr/>
+          <p:nvPr/>
+        </p:nvSpPr>
+        <p:spPr>
+          <a:xfrm>
+            <a:off x="6599220" y="3615332"/>
+            <a:ext cx="518934" cy="128590"/>
+          </a:xfrm>
+          <a:prstGeom prst="flowChartTerminator">
+            <a:avLst/>
+          </a:prstGeom>
+          <a:solidFill>
+            <a:schemeClr val="accent6">
+              <a:lumMod val="40000"/>
+              <a:lumOff val="60000"/>
+            </a:schemeClr>
+          </a:solidFill>
+          <a:ln>
+            <a:solidFill>
+              <a:schemeClr val="accent6"/>
+            </a:solidFill>
+          </a:ln>
+          <a:effectLst>
+            <a:outerShdw blurRad="50800" dist="38100" dir="8100000" algn="tr" rotWithShape="0">
+              <a:prstClr val="black">
+                <a:alpha val="40000"/>
+              </a:prstClr>
+            </a:outerShdw>
+          </a:effectLst>
+        </p:spPr>
+        <p:style>
+          <a:lnRef idx="3">
+            <a:schemeClr val="lt1"/>
+          </a:lnRef>
+          <a:fillRef idx="1">
+            <a:schemeClr val="accent6"/>
+          </a:fillRef>
+          <a:effectRef idx="1">
+            <a:schemeClr val="accent6"/>
+          </a:effectRef>
+          <a:fontRef idx="minor">
+            <a:schemeClr val="lt1"/>
+          </a:fontRef>
+        </p:style>
+        <p:txBody>
+          <a:bodyPr rtlCol="0" anchor="ctr"/>
+          <a:p>
+            <a:pPr algn="ctr"/>
+            <a:r>
+              <a:rPr lang="en-US" sz="450" b="1">
+                <a:solidFill>
+                  <a:schemeClr val="tx1">
+                    <a:lumMod val="75000"/>
+                    <a:lumOff val="25000"/>
+                  </a:schemeClr>
+                </a:solidFill>
+              </a:rPr>
+              <a:t>pending</a:t>
+            </a:r>
+            <a:endParaRPr lang="en-US" sz="450" b="1">
+              <a:solidFill>
+                <a:schemeClr val="tx1">
+                  <a:lumMod val="75000"/>
+                  <a:lumOff val="25000"/>
+                </a:schemeClr>
+              </a:solidFill>
+            </a:endParaRPr>
+          </a:p>
+        </p:txBody>
+      </p:sp>
+      <p:sp>
+        <p:nvSpPr>
+          <p:cNvPr id="266" name="Flowchart: Terminator 265"/>
+          <p:cNvSpPr/>
+          <p:nvPr/>
+        </p:nvSpPr>
+        <p:spPr>
+          <a:xfrm>
+            <a:off x="6606078" y="3958938"/>
+            <a:ext cx="518934" cy="128590"/>
+          </a:xfrm>
+          <a:prstGeom prst="flowChartTerminator">
+            <a:avLst/>
+          </a:prstGeom>
+          <a:solidFill>
+            <a:schemeClr val="accent6">
+              <a:lumMod val="40000"/>
+              <a:lumOff val="60000"/>
+            </a:schemeClr>
+          </a:solidFill>
+          <a:ln>
+            <a:solidFill>
+              <a:schemeClr val="accent6"/>
+            </a:solidFill>
+          </a:ln>
+          <a:effectLst>
+            <a:outerShdw blurRad="50800" dist="38100" dir="8100000" algn="tr" rotWithShape="0">
+              <a:prstClr val="black">
+                <a:alpha val="40000"/>
+              </a:prstClr>
+            </a:outerShdw>
+          </a:effectLst>
+        </p:spPr>
+        <p:style>
+          <a:lnRef idx="3">
+            <a:schemeClr val="lt1"/>
+          </a:lnRef>
+          <a:fillRef idx="1">
+            <a:schemeClr val="accent6"/>
+          </a:fillRef>
+          <a:effectRef idx="1">
+            <a:schemeClr val="accent6"/>
+          </a:effectRef>
+          <a:fontRef idx="minor">
+            <a:schemeClr val="lt1"/>
+          </a:fontRef>
+        </p:style>
+        <p:txBody>
+          <a:bodyPr rtlCol="0" anchor="ctr"/>
+          <a:p>
+            <a:pPr algn="ctr"/>
+            <a:r>
+              <a:rPr lang="en-US" sz="450" b="1">
+                <a:solidFill>
+                  <a:schemeClr val="tx1">
+                    <a:lumMod val="75000"/>
+                    <a:lumOff val="25000"/>
+                  </a:schemeClr>
+                </a:solidFill>
+              </a:rPr>
+              <a:t>rejected</a:t>
+            </a:r>
+            <a:endParaRPr lang="en-US" sz="450" b="1">
+              <a:solidFill>
+                <a:schemeClr val="tx1">
+                  <a:lumMod val="75000"/>
+                  <a:lumOff val="25000"/>
+                </a:schemeClr>
+              </a:solidFill>
+            </a:endParaRPr>
+          </a:p>
+        </p:txBody>
+      </p:sp>
+      <p:pic>
+        <p:nvPicPr>
+          <p:cNvPr id="290" name="Picture 289"/>
+          <p:cNvPicPr>
+            <a:picLocks noChangeAspect="1"/>
+          </p:cNvPicPr>
+          <p:nvPr/>
+        </p:nvPicPr>
+        <p:blipFill>
+          <a:blip r:embed="rId11"/>
+          <a:stretch>
+            <a:fillRect/>
+          </a:stretch>
+        </p:blipFill>
+        <p:spPr>
+          <a:xfrm>
+            <a:off x="5979795" y="5742940"/>
+            <a:ext cx="905510" cy="1155700"/>
+          </a:xfrm>
+          <a:prstGeom prst="rect">
+            <a:avLst/>
+          </a:prstGeom>
+          <a:effectLst>
+            <a:outerShdw blurRad="50800" dist="38100" dir="8100000" algn="tr" rotWithShape="0">
+              <a:prstClr val="black">
+                <a:alpha val="40000"/>
+              </a:prstClr>
+            </a:outerShdw>
+          </a:effectLst>
+        </p:spPr>
+      </p:pic>
+      <p:pic>
+        <p:nvPicPr>
+          <p:cNvPr id="295" name="Picture 294"/>
+          <p:cNvPicPr>
+            <a:picLocks noChangeAspect="1"/>
+          </p:cNvPicPr>
+          <p:nvPr/>
+        </p:nvPicPr>
+        <p:blipFill>
+          <a:blip r:embed="rId12"/>
+          <a:stretch>
+            <a:fillRect/>
+          </a:stretch>
+        </p:blipFill>
+        <p:spPr>
+          <a:xfrm>
+            <a:off x="6053455" y="7369175"/>
+            <a:ext cx="773430" cy="2171065"/>
+          </a:xfrm>
+          <a:prstGeom prst="rect">
+            <a:avLst/>
+          </a:prstGeom>
+          <a:effectLst>
+            <a:outerShdw blurRad="50800" dist="38100" dir="8100000" algn="tr" rotWithShape="0">
+              <a:prstClr val="black">
+                <a:alpha val="40000"/>
+              </a:prstClr>
+            </a:outerShdw>
+          </a:effectLst>
+        </p:spPr>
+      </p:pic>
+      <p:sp>
+        <p:nvSpPr>
+          <p:cNvPr id="285" name="Flowchart: Terminator 284"/>
+          <p:cNvSpPr/>
+          <p:nvPr/>
+        </p:nvSpPr>
+        <p:spPr>
+          <a:xfrm>
+            <a:off x="6800136" y="9230662"/>
+            <a:ext cx="449209" cy="128590"/>
+          </a:xfrm>
+          <a:prstGeom prst="flowChartTerminator">
+            <a:avLst/>
+          </a:prstGeom>
+          <a:solidFill>
+            <a:schemeClr val="accent6">
+              <a:lumMod val="40000"/>
+              <a:lumOff val="60000"/>
+            </a:schemeClr>
+          </a:solidFill>
+          <a:ln>
+            <a:solidFill>
+              <a:schemeClr val="accent6"/>
+            </a:solidFill>
+          </a:ln>
+          <a:effectLst>
+            <a:outerShdw blurRad="50800" dist="38100" dir="8100000" algn="tr" rotWithShape="0">
+              <a:prstClr val="black">
+                <a:alpha val="40000"/>
+              </a:prstClr>
+            </a:outerShdw>
+          </a:effectLst>
+        </p:spPr>
+        <p:style>
+          <a:lnRef idx="3">
+            <a:schemeClr val="lt1"/>
+          </a:lnRef>
+          <a:fillRef idx="1">
+            <a:schemeClr val="accent6"/>
+          </a:fillRef>
+          <a:effectRef idx="1">
+            <a:schemeClr val="accent6"/>
+          </a:effectRef>
+          <a:fontRef idx="minor">
+            <a:schemeClr val="lt1"/>
+          </a:fontRef>
+        </p:style>
+        <p:txBody>
+          <a:bodyPr rtlCol="0" anchor="ctr"/>
+          <a:p>
+            <a:pPr algn="ctr"/>
+            <a:r>
+              <a:rPr lang="en-US" sz="450" b="1">
+                <a:solidFill>
+                  <a:schemeClr val="tx1">
+                    <a:lumMod val="75000"/>
+                    <a:lumOff val="25000"/>
+                  </a:schemeClr>
+                </a:solidFill>
+              </a:rPr>
+              <a:t>orders</a:t>
+            </a:r>
+            <a:endParaRPr lang="en-US" sz="450" b="1">
+              <a:solidFill>
+                <a:schemeClr val="tx1">
+                  <a:lumMod val="75000"/>
+                  <a:lumOff val="25000"/>
+                </a:schemeClr>
+              </a:solidFill>
+            </a:endParaRPr>
+          </a:p>
+        </p:txBody>
+      </p:sp>
     </p:spTree>
   </p:cSld>
   <p:clrMapOvr>
@@ -18824,7 +18807,7 @@
         </p:nvSpPr>
         <p:spPr>
           <a:xfrm>
-            <a:off x="9249410" y="3536315"/>
+            <a:off x="9187180" y="3910330"/>
             <a:ext cx="2003425" cy="368300"/>
           </a:xfrm>
           <a:prstGeom prst="rect">
@@ -18876,7 +18859,7 @@
         </p:nvCxnSpPr>
         <p:spPr>
           <a:xfrm>
-            <a:off x="5782310" y="4937125"/>
+            <a:off x="5775325" y="4937125"/>
             <a:ext cx="635" cy="374015"/>
           </a:xfrm>
           <a:prstGeom prst="straightConnector1">
@@ -18921,7 +18904,7 @@
         </p:nvCxnSpPr>
         <p:spPr>
           <a:xfrm flipV="1">
-            <a:off x="4617085" y="4719320"/>
+            <a:off x="4610100" y="4719320"/>
             <a:ext cx="635000" cy="635"/>
           </a:xfrm>
           <a:prstGeom prst="straightConnector1">
@@ -18964,7 +18947,7 @@
         </p:nvSpPr>
         <p:spPr>
           <a:xfrm>
-            <a:off x="5565140" y="4206240"/>
+            <a:off x="5556113" y="4206240"/>
             <a:ext cx="438912" cy="219456"/>
           </a:xfrm>
           <a:prstGeom prst="flowChartOffpageConnector">
@@ -19060,8 +19043,8 @@
         </p:nvCxnSpPr>
         <p:spPr>
           <a:xfrm flipH="1">
-            <a:off x="5782310" y="4425950"/>
-            <a:ext cx="2540" cy="228600"/>
+            <a:off x="5775325" y="4425950"/>
+            <a:ext cx="635" cy="228600"/>
           </a:xfrm>
           <a:prstGeom prst="straightConnector1">
             <a:avLst/>
@@ -19111,7 +19094,7 @@
         </p:blipFill>
         <p:spPr>
           <a:xfrm>
-            <a:off x="3842385" y="4095750"/>
+            <a:off x="3750945" y="4095750"/>
             <a:ext cx="1123950" cy="1619250"/>
           </a:xfrm>
           <a:prstGeom prst="rect">
@@ -19134,7 +19117,7 @@
         </p:nvSpPr>
         <p:spPr>
           <a:xfrm>
-            <a:off x="5450205" y="5311140"/>
+            <a:off x="5443147" y="5311140"/>
             <a:ext cx="664845" cy="485140"/>
           </a:xfrm>
           <a:prstGeom prst="flowChartDecision">
@@ -19291,8 +19274,8 @@
         </p:nvCxnSpPr>
         <p:spPr>
           <a:xfrm flipH="1">
-            <a:off x="5777865" y="5796280"/>
-            <a:ext cx="5080" cy="480060"/>
+            <a:off x="5775325" y="5796280"/>
+            <a:ext cx="635" cy="480060"/>
           </a:xfrm>
           <a:prstGeom prst="straightConnector1">
             <a:avLst/>
@@ -19334,7 +19317,7 @@
         </p:nvSpPr>
         <p:spPr>
           <a:xfrm>
-            <a:off x="5707908" y="5935345"/>
+            <a:off x="5701558" y="5935345"/>
             <a:ext cx="148022" cy="159385"/>
           </a:xfrm>
           <a:prstGeom prst="ellipse">
@@ -19382,7 +19365,7 @@
         </p:nvSpPr>
         <p:spPr>
           <a:xfrm>
-            <a:off x="5443220" y="6737350"/>
+            <a:off x="5443147" y="6737350"/>
             <a:ext cx="664845" cy="485140"/>
           </a:xfrm>
           <a:prstGeom prst="flowChartDecision">
@@ -19550,7 +19533,7 @@
         </p:nvGrpSpPr>
         <p:grpSpPr>
           <a:xfrm>
-            <a:off x="5247640" y="6276340"/>
+            <a:off x="5245344" y="6276340"/>
             <a:ext cx="1060450" cy="285750"/>
             <a:chOff x="8264" y="9884"/>
             <a:chExt cx="1670" cy="450"/>
@@ -19726,15 +19709,13 @@
       <p:cxnSp>
         <p:nvCxnSpPr>
           <p:cNvPr id="69" name="Straight Arrow Connector 68"/>
-          <p:cNvCxnSpPr>
-            <a:endCxn id="65" idx="1"/>
-          </p:cNvCxnSpPr>
+          <p:cNvCxnSpPr/>
           <p:nvPr/>
         </p:nvCxnSpPr>
         <p:spPr>
           <a:xfrm flipV="1">
-            <a:off x="4313555" y="6493510"/>
-            <a:ext cx="504825" cy="2540"/>
+            <a:off x="4331335" y="6496685"/>
+            <a:ext cx="487045" cy="635"/>
           </a:xfrm>
           <a:prstGeom prst="straightConnector1">
             <a:avLst/>
@@ -19769,8 +19750,8 @@
         </p:nvCxnSpPr>
         <p:spPr>
           <a:xfrm flipV="1">
-            <a:off x="6115050" y="5551805"/>
-            <a:ext cx="1397635" cy="1905"/>
+            <a:off x="6108065" y="5551805"/>
+            <a:ext cx="1404620" cy="1905"/>
           </a:xfrm>
           <a:prstGeom prst="straightConnector1">
             <a:avLst/>
@@ -19859,9 +19840,9 @@
           <p:nvPr/>
         </p:nvCxnSpPr>
         <p:spPr>
-          <a:xfrm flipH="1">
-            <a:off x="5775960" y="6562090"/>
-            <a:ext cx="1905" cy="175260"/>
+          <a:xfrm>
+            <a:off x="5775325" y="6562090"/>
+            <a:ext cx="635" cy="175260"/>
           </a:xfrm>
           <a:prstGeom prst="straightConnector1">
             <a:avLst/>
@@ -19903,7 +19884,7 @@
         </p:nvGrpSpPr>
         <p:grpSpPr>
           <a:xfrm>
-            <a:off x="3736975" y="5842000"/>
+            <a:off x="3743960" y="5728970"/>
             <a:ext cx="781050" cy="2398395"/>
             <a:chOff x="3393" y="7555"/>
             <a:chExt cx="1230" cy="3777"/>
@@ -20478,7 +20459,7 @@
         </p:nvSpPr>
         <p:spPr>
           <a:xfrm>
-            <a:off x="6548120" y="7350760"/>
+            <a:off x="6548120" y="7843520"/>
             <a:ext cx="478790" cy="144145"/>
           </a:xfrm>
           <a:prstGeom prst="flowChartTerminator">
@@ -21771,100 +21752,6 @@
           </a:fontRef>
         </p:style>
       </p:cxnSp>
-      <p:cxnSp>
-        <p:nvCxnSpPr>
-          <p:cNvPr id="200" name="Elbow Connector 199"/>
-          <p:cNvCxnSpPr>
-            <a:stCxn id="34" idx="2"/>
-            <a:endCxn id="98" idx="1"/>
-          </p:cNvCxnSpPr>
-          <p:nvPr/>
-        </p:nvCxnSpPr>
-        <p:spPr>
-          <a:xfrm rot="5400000" flipV="1">
-            <a:off x="6061710" y="6936740"/>
-            <a:ext cx="200660" cy="772160"/>
-          </a:xfrm>
-          <a:prstGeom prst="bentConnector2">
-            <a:avLst/>
-          </a:prstGeom>
-          <a:gradFill rotWithShape="0">
-            <a:gsLst>
-              <a:gs pos="0">
-                <a:schemeClr val="accent1"/>
-              </a:gs>
-              <a:gs pos="100000">
-                <a:schemeClr val="accent2"/>
-              </a:gs>
-            </a:gsLst>
-            <a:lin ang="5400000" scaled="1"/>
-          </a:gradFill>
-          <a:ln w="9525" cap="flat" cmpd="sng" algn="ctr">
-            <a:solidFill>
-              <a:schemeClr val="accent1"/>
-            </a:solidFill>
-            <a:prstDash val="solid"/>
-            <a:round/>
-            <a:headEnd type="none" w="med" len="med"/>
-            <a:tailEnd type="triangle" w="med" len="med"/>
-          </a:ln>
-          <a:effectLst>
-            <a:outerShdw blurRad="50800" dist="38100" dir="8100000" algn="tr" rotWithShape="0">
-              <a:prstClr val="black">
-                <a:alpha val="40000"/>
-              </a:prstClr>
-            </a:outerShdw>
-          </a:effectLst>
-        </p:spPr>
-      </p:cxnSp>
-      <p:sp>
-        <p:nvSpPr>
-          <p:cNvPr id="41" name="Oval 40"/>
-          <p:cNvSpPr/>
-          <p:nvPr/>
-        </p:nvSpPr>
-        <p:spPr>
-          <a:xfrm>
-            <a:off x="6225433" y="7330440"/>
-            <a:ext cx="148022" cy="159385"/>
-          </a:xfrm>
-          <a:prstGeom prst="ellipse">
-            <a:avLst/>
-          </a:prstGeom>
-          <a:effectLst>
-            <a:outerShdw blurRad="50800" dist="38100" dir="8100000" algn="tr" rotWithShape="0">
-              <a:prstClr val="black">
-                <a:alpha val="40000"/>
-              </a:prstClr>
-            </a:outerShdw>
-          </a:effectLst>
-        </p:spPr>
-        <p:style>
-          <a:lnRef idx="1">
-            <a:schemeClr val="accent2"/>
-          </a:lnRef>
-          <a:fillRef idx="2">
-            <a:schemeClr val="accent2"/>
-          </a:fillRef>
-          <a:effectRef idx="1">
-            <a:schemeClr val="accent2"/>
-          </a:effectRef>
-          <a:fontRef idx="minor">
-            <a:schemeClr val="dk1"/>
-          </a:fontRef>
-        </p:style>
-        <p:txBody>
-          <a:bodyPr rtlCol="0" anchor="ctr"/>
-          <a:p>
-            <a:pPr algn="ctr"/>
-            <a:r>
-              <a:rPr lang="en-US" sz="630"/>
-              <a:t>y</a:t>
-            </a:r>
-            <a:endParaRPr lang="en-US" sz="630"/>
-          </a:p>
-        </p:txBody>
-      </p:sp>
       <p:grpSp>
         <p:nvGrpSpPr>
           <p:cNvPr id="203" name="Group 202"/>
@@ -21873,7 +21760,7 @@
         </p:nvGrpSpPr>
         <p:grpSpPr>
           <a:xfrm>
-            <a:off x="5252085" y="4654550"/>
+            <a:off x="5245344" y="4654550"/>
             <a:ext cx="1060450" cy="281940"/>
             <a:chOff x="8271" y="7330"/>
             <a:chExt cx="1670" cy="444"/>
@@ -21980,6 +21867,342 @@
           </p:txBody>
         </p:sp>
       </p:grpSp>
+      <p:cxnSp>
+        <p:nvCxnSpPr>
+          <p:cNvPr id="204" name="Straight Arrow Connector 203"/>
+          <p:cNvCxnSpPr/>
+          <p:nvPr/>
+        </p:nvCxnSpPr>
+        <p:spPr>
+          <a:xfrm flipH="1">
+            <a:off x="5771515" y="7207885"/>
+            <a:ext cx="4445" cy="468630"/>
+          </a:xfrm>
+          <a:prstGeom prst="straightConnector1">
+            <a:avLst/>
+          </a:prstGeom>
+          <a:ln>
+            <a:solidFill>
+              <a:schemeClr val="accent1"/>
+            </a:solidFill>
+            <a:tailEnd type="triangle"/>
+          </a:ln>
+          <a:effectLst>
+            <a:outerShdw blurRad="50800" dist="38100" dir="8100000" algn="tr" rotWithShape="0">
+              <a:prstClr val="black">
+                <a:alpha val="40000"/>
+              </a:prstClr>
+            </a:outerShdw>
+          </a:effectLst>
+        </p:spPr>
+        <p:style>
+          <a:lnRef idx="1">
+            <a:schemeClr val="accent1"/>
+          </a:lnRef>
+          <a:fillRef idx="0">
+            <a:schemeClr val="accent1"/>
+          </a:fillRef>
+          <a:effectRef idx="0">
+            <a:schemeClr val="accent1"/>
+          </a:effectRef>
+          <a:fontRef idx="minor">
+            <a:schemeClr val="tx1"/>
+          </a:fontRef>
+        </p:style>
+      </p:cxnSp>
+      <p:sp>
+        <p:nvSpPr>
+          <p:cNvPr id="205" name="Oval 204"/>
+          <p:cNvSpPr/>
+          <p:nvPr/>
+        </p:nvSpPr>
+        <p:spPr>
+          <a:xfrm>
+            <a:off x="5701558" y="7335520"/>
+            <a:ext cx="148022" cy="159385"/>
+          </a:xfrm>
+          <a:prstGeom prst="ellipse">
+            <a:avLst/>
+          </a:prstGeom>
+          <a:effectLst>
+            <a:outerShdw blurRad="50800" dist="38100" dir="8100000" algn="tr" rotWithShape="0">
+              <a:prstClr val="black">
+                <a:alpha val="40000"/>
+              </a:prstClr>
+            </a:outerShdw>
+          </a:effectLst>
+        </p:spPr>
+        <p:style>
+          <a:lnRef idx="1">
+            <a:schemeClr val="accent2"/>
+          </a:lnRef>
+          <a:fillRef idx="2">
+            <a:schemeClr val="accent2"/>
+          </a:fillRef>
+          <a:effectRef idx="1">
+            <a:schemeClr val="accent2"/>
+          </a:effectRef>
+          <a:fontRef idx="minor">
+            <a:schemeClr val="dk1"/>
+          </a:fontRef>
+        </p:style>
+        <p:txBody>
+          <a:bodyPr rtlCol="0" anchor="ctr"/>
+          <a:p>
+            <a:pPr algn="ctr"/>
+            <a:r>
+              <a:rPr lang="en-US" sz="630"/>
+              <a:t>y</a:t>
+            </a:r>
+            <a:endParaRPr lang="en-US" sz="630"/>
+          </a:p>
+        </p:txBody>
+      </p:sp>
+      <p:sp>
+        <p:nvSpPr>
+          <p:cNvPr id="206" name="Flowchart: Decision 205"/>
+          <p:cNvSpPr/>
+          <p:nvPr/>
+        </p:nvSpPr>
+        <p:spPr>
+          <a:xfrm>
+            <a:off x="5443147" y="7676515"/>
+            <a:ext cx="664845" cy="485140"/>
+          </a:xfrm>
+          <a:prstGeom prst="flowChartDecision">
+            <a:avLst/>
+          </a:prstGeom>
+          <a:effectLst>
+            <a:outerShdw blurRad="50800" dist="38100" dir="8100000" algn="tr" rotWithShape="0">
+              <a:prstClr val="black">
+                <a:alpha val="40000"/>
+              </a:prstClr>
+            </a:outerShdw>
+          </a:effectLst>
+        </p:spPr>
+        <p:style>
+          <a:lnRef idx="2">
+            <a:schemeClr val="accent5">
+              <a:shade val="50000"/>
+            </a:schemeClr>
+          </a:lnRef>
+          <a:fillRef idx="1">
+            <a:schemeClr val="accent5"/>
+          </a:fillRef>
+          <a:effectRef idx="0">
+            <a:schemeClr val="accent5"/>
+          </a:effectRef>
+          <a:fontRef idx="minor">
+            <a:schemeClr val="lt1"/>
+          </a:fontRef>
+        </p:style>
+        <p:txBody>
+          <a:bodyPr lIns="0" rIns="0" rtlCol="0" anchor="ctr">
+            <a:scene3d>
+              <a:camera prst="orthographicFront"/>
+              <a:lightRig rig="threePt" dir="t"/>
+            </a:scene3d>
+          </a:bodyPr>
+          <a:p>
+            <a:pPr algn="ctr"/>
+            <a:r>
+              <a:rPr lang="en-US" sz="520">
+                <a:solidFill>
+                  <a:schemeClr val="tx1"/>
+                </a:solidFill>
+                <a:effectLst>
+                  <a:outerShdw blurRad="38100" dist="25400" dir="5400000" algn="ctr" rotWithShape="0">
+                    <a:srgbClr val="6E747A">
+                      <a:alpha val="43000"/>
+                    </a:srgbClr>
+                  </a:outerShdw>
+                </a:effectLst>
+                <a:sym typeface="+mn-ea"/>
+              </a:rPr>
+              <a:t>request</a:t>
+            </a:r>
+            <a:endParaRPr lang="en-US" sz="520">
+              <a:solidFill>
+                <a:schemeClr val="tx1"/>
+              </a:solidFill>
+              <a:effectLst>
+                <a:outerShdw blurRad="38100" dist="25400" dir="5400000" algn="ctr" rotWithShape="0">
+                  <a:srgbClr val="6E747A">
+                    <a:alpha val="43000"/>
+                  </a:srgbClr>
+                </a:outerShdw>
+              </a:effectLst>
+            </a:endParaRPr>
+          </a:p>
+          <a:p>
+            <a:pPr algn="ctr"/>
+            <a:r>
+              <a:rPr lang="en-US" sz="520">
+                <a:solidFill>
+                  <a:schemeClr val="tx1"/>
+                </a:solidFill>
+                <a:effectLst>
+                  <a:outerShdw blurRad="38100" dist="25400" dir="5400000" algn="ctr" rotWithShape="0">
+                    <a:srgbClr val="6E747A">
+                      <a:alpha val="43000"/>
+                    </a:srgbClr>
+                  </a:outerShdw>
+                </a:effectLst>
+              </a:rPr>
+              <a:t>&gt; max</a:t>
+            </a:r>
+            <a:endParaRPr lang="en-US" sz="520">
+              <a:solidFill>
+                <a:schemeClr val="tx1"/>
+              </a:solidFill>
+              <a:effectLst>
+                <a:outerShdw blurRad="38100" dist="25400" dir="5400000" algn="ctr" rotWithShape="0">
+                  <a:srgbClr val="6E747A">
+                    <a:alpha val="43000"/>
+                  </a:srgbClr>
+                </a:outerShdw>
+              </a:effectLst>
+            </a:endParaRPr>
+          </a:p>
+          <a:p>
+            <a:pPr algn="ctr"/>
+            <a:r>
+              <a:rPr lang="en-US" sz="520">
+                <a:solidFill>
+                  <a:schemeClr val="tx1"/>
+                </a:solidFill>
+                <a:effectLst>
+                  <a:outerShdw blurRad="38100" dist="25400" dir="5400000" algn="ctr" rotWithShape="0">
+                    <a:srgbClr val="6E747A">
+                      <a:alpha val="43000"/>
+                    </a:srgbClr>
+                  </a:outerShdw>
+                </a:effectLst>
+                <a:sym typeface="+mn-ea"/>
+              </a:rPr>
+              <a:t>create</a:t>
+            </a:r>
+            <a:r>
+              <a:rPr lang="en-US" sz="520">
+                <a:solidFill>
+                  <a:schemeClr val="tx1"/>
+                </a:solidFill>
+                <a:effectLst>
+                  <a:outerShdw blurRad="38100" dist="25400" dir="5400000" algn="ctr" rotWithShape="0">
+                    <a:srgbClr val="6E747A">
+                      <a:alpha val="43000"/>
+                    </a:srgbClr>
+                  </a:outerShdw>
+                </a:effectLst>
+              </a:rPr>
+              <a:t>?</a:t>
+            </a:r>
+            <a:endParaRPr lang="en-US" sz="520">
+              <a:solidFill>
+                <a:schemeClr val="tx1"/>
+              </a:solidFill>
+              <a:effectLst>
+                <a:outerShdw blurRad="38100" dist="25400" dir="5400000" algn="ctr" rotWithShape="0">
+                  <a:srgbClr val="6E747A">
+                    <a:alpha val="43000"/>
+                  </a:srgbClr>
+                </a:outerShdw>
+              </a:effectLst>
+            </a:endParaRPr>
+          </a:p>
+        </p:txBody>
+      </p:sp>
+      <p:cxnSp>
+        <p:nvCxnSpPr>
+          <p:cNvPr id="207" name="Straight Arrow Connector 206"/>
+          <p:cNvCxnSpPr>
+            <a:stCxn id="206" idx="3"/>
+            <a:endCxn id="98" idx="1"/>
+          </p:cNvCxnSpPr>
+          <p:nvPr/>
+        </p:nvCxnSpPr>
+        <p:spPr>
+          <a:xfrm flipV="1">
+            <a:off x="6108065" y="7915910"/>
+            <a:ext cx="440055" cy="3175"/>
+          </a:xfrm>
+          <a:prstGeom prst="straightConnector1">
+            <a:avLst/>
+          </a:prstGeom>
+          <a:ln>
+            <a:tailEnd type="triangle"/>
+          </a:ln>
+          <a:effectLst>
+            <a:outerShdw blurRad="50800" dist="38100" dir="8100000" algn="tr" rotWithShape="0">
+              <a:prstClr val="black">
+                <a:alpha val="40000"/>
+              </a:prstClr>
+            </a:outerShdw>
+          </a:effectLst>
+        </p:spPr>
+        <p:style>
+          <a:lnRef idx="1">
+            <a:schemeClr val="accent1"/>
+          </a:lnRef>
+          <a:fillRef idx="0">
+            <a:schemeClr val="accent1"/>
+          </a:fillRef>
+          <a:effectRef idx="0">
+            <a:schemeClr val="accent1"/>
+          </a:effectRef>
+          <a:fontRef idx="minor">
+            <a:schemeClr val="tx1"/>
+          </a:fontRef>
+        </p:style>
+      </p:cxnSp>
+      <p:sp>
+        <p:nvSpPr>
+          <p:cNvPr id="41" name="Oval 40"/>
+          <p:cNvSpPr/>
+          <p:nvPr/>
+        </p:nvSpPr>
+        <p:spPr>
+          <a:xfrm>
+            <a:off x="6224163" y="7833360"/>
+            <a:ext cx="148022" cy="159385"/>
+          </a:xfrm>
+          <a:prstGeom prst="ellipse">
+            <a:avLst/>
+          </a:prstGeom>
+          <a:effectLst>
+            <a:outerShdw blurRad="50800" dist="38100" dir="8100000" algn="tr" rotWithShape="0">
+              <a:prstClr val="black">
+                <a:alpha val="40000"/>
+              </a:prstClr>
+            </a:outerShdw>
+          </a:effectLst>
+        </p:spPr>
+        <p:style>
+          <a:lnRef idx="1">
+            <a:schemeClr val="accent2"/>
+          </a:lnRef>
+          <a:fillRef idx="2">
+            <a:schemeClr val="accent2"/>
+          </a:fillRef>
+          <a:effectRef idx="1">
+            <a:schemeClr val="accent2"/>
+          </a:effectRef>
+          <a:fontRef idx="minor">
+            <a:schemeClr val="dk1"/>
+          </a:fontRef>
+        </p:style>
+        <p:txBody>
+          <a:bodyPr rtlCol="0" anchor="ctr"/>
+          <a:p>
+            <a:pPr algn="ctr"/>
+            <a:r>
+              <a:rPr lang="en-US" sz="630"/>
+              <a:t>y</a:t>
+            </a:r>
+            <a:endParaRPr lang="en-US" sz="630"/>
+          </a:p>
+        </p:txBody>
+      </p:sp>
     </p:spTree>
   </p:cSld>
   <p:clrMapOvr>

</xml_diff>

<commit_message>
Major Baseline: Critical Functionality Tested; full-cycle regression test complete; See fcrt folder;
</commit_message>
<xml_diff>
--- a/~Documents/AppArchitecture.pptx
+++ b/~Documents/AppArchitecture.pptx
@@ -8,7 +8,7 @@
     <p:notesMasterId r:id="rId4"/>
   </p:notesMasterIdLst>
   <p:handoutMasterIdLst>
-    <p:handoutMasterId r:id="rId15"/>
+    <p:handoutMasterId r:id="rId13"/>
   </p:handoutMasterIdLst>
   <p:sldIdLst>
     <p:sldId id="257" r:id="rId3"/>
@@ -20,8 +20,6 @@
     <p:sldId id="270" r:id="rId10"/>
     <p:sldId id="272" r:id="rId11"/>
     <p:sldId id="274" r:id="rId12"/>
-    <p:sldId id="261" r:id="rId13"/>
-    <p:sldId id="275" r:id="rId14"/>
   </p:sldIdLst>
   <p:sldSz cx="14630400" cy="10972800"/>
   <p:notesSz cx="10234295" cy="7103745"/>
@@ -4075,287 +4073,6 @@
 </p:sld>
 </file>
 
-<file path=ppt/slides/slide10.xml><?xml version="1.0" encoding="utf-8"?>
-<p:sld xmlns:a="http://schemas.openxmlformats.org/drawingml/2006/main" xmlns:r="http://schemas.openxmlformats.org/officeDocument/2006/relationships" xmlns:p="http://schemas.openxmlformats.org/presentationml/2006/main">
-  <p:cSld>
-    <p:spTree>
-      <p:nvGrpSpPr>
-        <p:cNvPr id="1" name=""/>
-        <p:cNvGrpSpPr/>
-        <p:nvPr/>
-      </p:nvGrpSpPr>
-      <p:grpSpPr/>
-      <p:pic>
-        <p:nvPicPr>
-          <p:cNvPr id="4" name="Picture 3"/>
-          <p:cNvPicPr>
-            <a:picLocks noChangeAspect="1"/>
-          </p:cNvPicPr>
-          <p:nvPr/>
-        </p:nvPicPr>
-        <p:blipFill>
-          <a:blip r:embed="rId1"/>
-          <a:stretch>
-            <a:fillRect/>
-          </a:stretch>
-        </p:blipFill>
-        <p:spPr>
-          <a:xfrm>
-            <a:off x="2701310" y="3478166"/>
-            <a:ext cx="3222191" cy="3892004"/>
-          </a:xfrm>
-          <a:prstGeom prst="rect">
-            <a:avLst/>
-          </a:prstGeom>
-        </p:spPr>
-      </p:pic>
-    </p:spTree>
-  </p:cSld>
-  <p:clrMapOvr>
-    <a:masterClrMapping/>
-  </p:clrMapOvr>
-</p:sld>
-</file>
-
-<file path=ppt/slides/slide11.xml><?xml version="1.0" encoding="utf-8"?>
-<p:sld xmlns:a="http://schemas.openxmlformats.org/drawingml/2006/main" xmlns:r="http://schemas.openxmlformats.org/officeDocument/2006/relationships" xmlns:p="http://schemas.openxmlformats.org/presentationml/2006/main">
-  <p:cSld>
-    <p:spTree>
-      <p:nvGrpSpPr>
-        <p:cNvPr id="1" name=""/>
-        <p:cNvGrpSpPr/>
-        <p:nvPr/>
-      </p:nvGrpSpPr>
-      <p:grpSpPr/>
-      <p:pic>
-        <p:nvPicPr>
-          <p:cNvPr id="9" name="Picture 8"/>
-          <p:cNvPicPr>
-            <a:picLocks noChangeAspect="1"/>
-          </p:cNvPicPr>
-          <p:nvPr/>
-        </p:nvPicPr>
-        <p:blipFill>
-          <a:blip r:embed="rId1"/>
-          <a:stretch>
-            <a:fillRect/>
-          </a:stretch>
-        </p:blipFill>
-        <p:spPr>
-          <a:xfrm>
-            <a:off x="1802765" y="3310890"/>
-            <a:ext cx="10203815" cy="5273040"/>
-          </a:xfrm>
-          <a:prstGeom prst="rect">
-            <a:avLst/>
-          </a:prstGeom>
-        </p:spPr>
-      </p:pic>
-      <p:sp>
-        <p:nvSpPr>
-          <p:cNvPr id="10" name="Rectangles 9"/>
-          <p:cNvSpPr/>
-          <p:nvPr/>
-        </p:nvSpPr>
-        <p:spPr>
-          <a:xfrm>
-            <a:off x="7685405" y="7718425"/>
-            <a:ext cx="692150" cy="290830"/>
-          </a:xfrm>
-          <a:prstGeom prst="rect">
-            <a:avLst/>
-          </a:prstGeom>
-          <a:noFill/>
-          <a:ln w="28575">
-            <a:solidFill>
-              <a:srgbClr val="FF0000"/>
-            </a:solidFill>
-            <a:headEnd type="none" w="med" len="med"/>
-            <a:tailEnd type="none" w="med" len="med"/>
-          </a:ln>
-          <a:extLst>
-            <a:ext uri="{909E8E84-426E-40DD-AFC4-6F175D3DCCD1}">
-              <a14:hiddenFill xmlns:a14="http://schemas.microsoft.com/office/drawing/2010/main">
-                <a:solidFill>
-                  <a:schemeClr val="lt1"/>
-                </a:solidFill>
-              </a14:hiddenFill>
-            </a:ext>
-          </a:extLst>
-        </p:spPr>
-        <p:style>
-          <a:lnRef idx="2">
-            <a:schemeClr val="accent6"/>
-          </a:lnRef>
-          <a:fillRef idx="1">
-            <a:schemeClr val="lt1"/>
-          </a:fillRef>
-          <a:effectRef idx="0">
-            <a:schemeClr val="accent6"/>
-          </a:effectRef>
-          <a:fontRef idx="minor">
-            <a:schemeClr val="dk1"/>
-          </a:fontRef>
-        </p:style>
-        <p:txBody>
-          <a:bodyPr vert="horz" wrap="none" lIns="91440" tIns="45720" rIns="91440" bIns="45720" numCol="1" anchor="ctr" anchorCtr="0" compatLnSpc="1"/>
-          <a:p>
-            <a:pPr marL="0" marR="0" indent="0" algn="l" defTabSz="914400" rtl="0" eaLnBrk="1" fontAlgn="base" latinLnBrk="0" hangingPunct="1">
-              <a:lnSpc>
-                <a:spcPct val="100000"/>
-              </a:lnSpc>
-              <a:spcBef>
-                <a:spcPct val="0"/>
-              </a:spcBef>
-              <a:spcAft>
-                <a:spcPct val="0"/>
-              </a:spcAft>
-              <a:buClrTx/>
-              <a:buSzTx/>
-              <a:buFontTx/>
-              <a:buNone/>
-            </a:pPr>
-            <a:endParaRPr kumimoji="0" lang="zh-CN" altLang="en-US" sz="1800" b="0" i="0" u="none" strike="noStrike" cap="none" normalizeH="0" baseline="0" smtClean="0">
-              <a:ln>
-                <a:noFill/>
-              </a:ln>
-              <a:solidFill>
-                <a:schemeClr val="tx1"/>
-              </a:solidFill>
-              <a:effectLst/>
-              <a:latin typeface="Arial" panose="02080604020202020204" pitchFamily="34" charset="0"/>
-              <a:ea typeface="SimSun" pitchFamily="2" charset="-122"/>
-            </a:endParaRPr>
-          </a:p>
-        </p:txBody>
-      </p:sp>
-      <p:sp>
-        <p:nvSpPr>
-          <p:cNvPr id="11" name="Rectangles 10"/>
-          <p:cNvSpPr/>
-          <p:nvPr/>
-        </p:nvSpPr>
-        <p:spPr>
-          <a:xfrm>
-            <a:off x="8552180" y="7766050"/>
-            <a:ext cx="486410" cy="242570"/>
-          </a:xfrm>
-          <a:prstGeom prst="rect">
-            <a:avLst/>
-          </a:prstGeom>
-          <a:noFill/>
-          <a:ln w="28575">
-            <a:solidFill>
-              <a:srgbClr val="FF0000"/>
-            </a:solidFill>
-            <a:headEnd type="none" w="med" len="med"/>
-            <a:tailEnd type="none" w="med" len="med"/>
-          </a:ln>
-          <a:extLst>
-            <a:ext uri="{909E8E84-426E-40DD-AFC4-6F175D3DCCD1}">
-              <a14:hiddenFill xmlns:a14="http://schemas.microsoft.com/office/drawing/2010/main">
-                <a:solidFill>
-                  <a:schemeClr val="lt1"/>
-                </a:solidFill>
-              </a14:hiddenFill>
-            </a:ext>
-          </a:extLst>
-        </p:spPr>
-        <p:style>
-          <a:lnRef idx="2">
-            <a:schemeClr val="accent6"/>
-          </a:lnRef>
-          <a:fillRef idx="1">
-            <a:schemeClr val="lt1"/>
-          </a:fillRef>
-          <a:effectRef idx="0">
-            <a:schemeClr val="accent6"/>
-          </a:effectRef>
-          <a:fontRef idx="minor">
-            <a:schemeClr val="dk1"/>
-          </a:fontRef>
-        </p:style>
-        <p:txBody>
-          <a:bodyPr vert="horz" wrap="none" lIns="91440" tIns="45720" rIns="91440" bIns="45720" numCol="1" anchor="ctr" anchorCtr="0" compatLnSpc="1"/>
-          <a:p>
-            <a:pPr marL="0" marR="0" indent="0" algn="l" defTabSz="914400" rtl="0" eaLnBrk="1" fontAlgn="base" latinLnBrk="0" hangingPunct="1">
-              <a:lnSpc>
-                <a:spcPct val="100000"/>
-              </a:lnSpc>
-              <a:spcBef>
-                <a:spcPct val="0"/>
-              </a:spcBef>
-              <a:spcAft>
-                <a:spcPct val="0"/>
-              </a:spcAft>
-              <a:buClrTx/>
-              <a:buSzTx/>
-              <a:buFontTx/>
-              <a:buNone/>
-            </a:pPr>
-            <a:endParaRPr kumimoji="0" lang="zh-CN" altLang="en-US" sz="1800" b="0" i="0" u="none" strike="noStrike" cap="none" normalizeH="0" baseline="0" smtClean="0">
-              <a:ln>
-                <a:noFill/>
-              </a:ln>
-              <a:solidFill>
-                <a:schemeClr val="tx1"/>
-              </a:solidFill>
-              <a:effectLst/>
-              <a:latin typeface="Arial" panose="02080604020202020204" pitchFamily="34" charset="0"/>
-              <a:ea typeface="SimSun" pitchFamily="2" charset="-122"/>
-            </a:endParaRPr>
-          </a:p>
-        </p:txBody>
-      </p:sp>
-      <p:cxnSp>
-        <p:nvCxnSpPr>
-          <p:cNvPr id="12" name="Elbow Connector 11"/>
-          <p:cNvCxnSpPr>
-            <a:stCxn id="10" idx="2"/>
-            <a:endCxn id="11" idx="2"/>
-          </p:cNvCxnSpPr>
-          <p:nvPr/>
-        </p:nvCxnSpPr>
-        <p:spPr>
-          <a:xfrm rot="5400000" flipH="1" flipV="1">
-            <a:off x="8413115" y="7626985"/>
-            <a:ext cx="635" cy="763905"/>
-          </a:xfrm>
-          <a:prstGeom prst="bentConnector3">
-            <a:avLst>
-              <a:gd name="adj1" fmla="val -37500000"/>
-            </a:avLst>
-          </a:prstGeom>
-          <a:gradFill rotWithShape="0">
-            <a:gsLst>
-              <a:gs pos="0">
-                <a:schemeClr val="accent1"/>
-              </a:gs>
-              <a:gs pos="100000">
-                <a:schemeClr val="accent2"/>
-              </a:gs>
-            </a:gsLst>
-            <a:lin ang="5400000" scaled="1"/>
-          </a:gradFill>
-          <a:ln w="28575" cap="flat" cmpd="sng" algn="ctr">
-            <a:solidFill>
-              <a:srgbClr val="FF0000"/>
-            </a:solidFill>
-            <a:prstDash val="solid"/>
-            <a:round/>
-            <a:headEnd type="none" w="med" len="med"/>
-            <a:tailEnd type="arrow" w="med" len="med"/>
-          </a:ln>
-        </p:spPr>
-      </p:cxnSp>
-    </p:spTree>
-  </p:cSld>
-  <p:clrMapOvr>
-    <a:masterClrMapping/>
-  </p:clrMapOvr>
-</p:sld>
-</file>
-
 <file path=ppt/slides/slide2.xml><?xml version="1.0" encoding="utf-8"?>
 <p:sld xmlns:a="http://schemas.openxmlformats.org/drawingml/2006/main" xmlns:r="http://schemas.openxmlformats.org/officeDocument/2006/relationships" xmlns:p="http://schemas.openxmlformats.org/presentationml/2006/main">
   <p:cSld>
@@ -10710,9 +10427,9 @@
           <p:nvPr/>
         </p:nvCxnSpPr>
         <p:spPr>
-          <a:xfrm>
-            <a:off x="11064875" y="6471920"/>
-            <a:ext cx="529590" cy="6350"/>
+          <a:xfrm flipV="1">
+            <a:off x="11106785" y="6466840"/>
+            <a:ext cx="810260" cy="5080"/>
           </a:xfrm>
           <a:prstGeom prst="straightConnector1">
             <a:avLst/>
@@ -10791,53 +10508,15 @@
       <p:cxnSp>
         <p:nvCxnSpPr>
           <p:cNvPr id="64" name="Straight Arrow Connector 63"/>
-          <p:cNvCxnSpPr/>
+          <p:cNvCxnSpPr>
+            <a:endCxn id="30" idx="3"/>
+          </p:cNvCxnSpPr>
           <p:nvPr/>
         </p:nvCxnSpPr>
         <p:spPr>
-          <a:xfrm flipH="1" flipV="1">
-            <a:off x="11185525" y="5065395"/>
-            <a:ext cx="588010" cy="6350"/>
-          </a:xfrm>
-          <a:prstGeom prst="straightConnector1">
-            <a:avLst/>
-          </a:prstGeom>
-          <a:ln>
-            <a:tailEnd type="triangle"/>
-          </a:ln>
-          <a:effectLst>
-            <a:outerShdw blurRad="50800" dist="38100" dir="8100000" algn="tr" rotWithShape="0">
-              <a:prstClr val="black">
-                <a:alpha val="40000"/>
-              </a:prstClr>
-            </a:outerShdw>
-          </a:effectLst>
-        </p:spPr>
-        <p:style>
-          <a:lnRef idx="1">
-            <a:schemeClr val="accent1"/>
-          </a:lnRef>
-          <a:fillRef idx="0">
-            <a:schemeClr val="accent1"/>
-          </a:fillRef>
-          <a:effectRef idx="0">
-            <a:schemeClr val="accent1"/>
-          </a:effectRef>
-          <a:fontRef idx="minor">
-            <a:schemeClr val="tx1"/>
-          </a:fontRef>
-        </p:style>
-      </p:cxnSp>
-      <p:cxnSp>
-        <p:nvCxnSpPr>
-          <p:cNvPr id="66" name="Straight Arrow Connector 65"/>
-          <p:cNvCxnSpPr/>
-          <p:nvPr/>
-        </p:nvCxnSpPr>
-        <p:spPr>
           <a:xfrm flipH="1">
-            <a:off x="11184890" y="6606540"/>
-            <a:ext cx="656590" cy="3810"/>
+            <a:off x="11560175" y="5051425"/>
+            <a:ext cx="622300" cy="2540"/>
           </a:xfrm>
           <a:prstGeom prst="straightConnector1">
             <a:avLst/>
@@ -14480,68 +14159,6 @@
           </a:p>
         </p:txBody>
       </p:sp>
-      <p:pic>
-        <p:nvPicPr>
-          <p:cNvPr id="63" name="Picture 62"/>
-          <p:cNvPicPr>
-            <a:picLocks noChangeAspect="1"/>
-          </p:cNvPicPr>
-          <p:nvPr/>
-        </p:nvPicPr>
-        <p:blipFill>
-          <a:blip r:embed="rId6"/>
-          <a:stretch>
-            <a:fillRect/>
-          </a:stretch>
-        </p:blipFill>
-        <p:spPr>
-          <a:xfrm>
-            <a:off x="11585225" y="3507317"/>
-            <a:ext cx="1108735" cy="1859704"/>
-          </a:xfrm>
-          <a:prstGeom prst="rect">
-            <a:avLst/>
-          </a:prstGeom>
-          <a:effectLst>
-            <a:outerShdw blurRad="50800" dist="38100" dir="8100000" algn="tr" rotWithShape="0">
-              <a:prstClr val="black">
-                <a:alpha val="40000"/>
-              </a:prstClr>
-            </a:outerShdw>
-          </a:effectLst>
-        </p:spPr>
-      </p:pic>
-      <p:pic>
-        <p:nvPicPr>
-          <p:cNvPr id="65" name="Picture 64"/>
-          <p:cNvPicPr>
-            <a:picLocks noChangeAspect="1"/>
-          </p:cNvPicPr>
-          <p:nvPr/>
-        </p:nvPicPr>
-        <p:blipFill>
-          <a:blip r:embed="rId7"/>
-          <a:stretch>
-            <a:fillRect/>
-          </a:stretch>
-        </p:blipFill>
-        <p:spPr>
-          <a:xfrm>
-            <a:off x="11570937" y="5493580"/>
-            <a:ext cx="1122452" cy="1916855"/>
-          </a:xfrm>
-          <a:prstGeom prst="rect">
-            <a:avLst/>
-          </a:prstGeom>
-          <a:effectLst>
-            <a:outerShdw blurRad="50800" dist="38100" dir="8100000" algn="tr" rotWithShape="0">
-              <a:prstClr val="black">
-                <a:alpha val="40000"/>
-              </a:prstClr>
-            </a:outerShdw>
-          </a:effectLst>
-        </p:spPr>
-      </p:pic>
       <p:sp>
         <p:nvSpPr>
           <p:cNvPr id="7" name="Oval 6"/>
@@ -14716,46 +14333,6 @@
           </a:p>
         </p:txBody>
       </p:sp>
-      <p:cxnSp>
-        <p:nvCxnSpPr>
-          <p:cNvPr id="40" name="Straight Arrow Connector 39"/>
-          <p:cNvCxnSpPr/>
-          <p:nvPr/>
-        </p:nvCxnSpPr>
-        <p:spPr>
-          <a:xfrm flipH="1" flipV="1">
-            <a:off x="11189970" y="7766685"/>
-            <a:ext cx="370205" cy="6985"/>
-          </a:xfrm>
-          <a:prstGeom prst="straightConnector1">
-            <a:avLst/>
-          </a:prstGeom>
-          <a:ln>
-            <a:tailEnd type="triangle"/>
-          </a:ln>
-          <a:effectLst>
-            <a:outerShdw blurRad="50800" dist="38100" dir="8100000" algn="tr" rotWithShape="0">
-              <a:prstClr val="black">
-                <a:alpha val="40000"/>
-              </a:prstClr>
-            </a:outerShdw>
-          </a:effectLst>
-        </p:spPr>
-        <p:style>
-          <a:lnRef idx="1">
-            <a:schemeClr val="accent1"/>
-          </a:lnRef>
-          <a:fillRef idx="0">
-            <a:schemeClr val="accent1"/>
-          </a:fillRef>
-          <a:effectRef idx="0">
-            <a:schemeClr val="accent1"/>
-          </a:effectRef>
-          <a:fontRef idx="minor">
-            <a:schemeClr val="tx1"/>
-          </a:fontRef>
-        </p:style>
-      </p:cxnSp>
       <p:cxnSp>
         <p:nvCxnSpPr>
           <p:cNvPr id="42" name="Straight Arrow Connector 41"/>
@@ -16626,7 +16203,7 @@
           <p:nvPr/>
         </p:nvPicPr>
         <p:blipFill>
-          <a:blip r:embed="rId8"/>
+          <a:blip r:embed="rId6"/>
           <a:stretch>
             <a:fillRect/>
           </a:stretch>
@@ -17304,37 +16881,6 @@
           </a:fontRef>
         </p:style>
       </p:cxnSp>
-      <p:pic>
-        <p:nvPicPr>
-          <p:cNvPr id="16" name="Picture 15"/>
-          <p:cNvPicPr>
-            <a:picLocks noChangeAspect="1"/>
-          </p:cNvPicPr>
-          <p:nvPr/>
-        </p:nvPicPr>
-        <p:blipFill>
-          <a:blip r:embed="rId9"/>
-          <a:stretch>
-            <a:fillRect/>
-          </a:stretch>
-        </p:blipFill>
-        <p:spPr>
-          <a:xfrm>
-            <a:off x="11395710" y="7521575"/>
-            <a:ext cx="1387475" cy="2009775"/>
-          </a:xfrm>
-          <a:prstGeom prst="rect">
-            <a:avLst/>
-          </a:prstGeom>
-          <a:effectLst>
-            <a:outerShdw blurRad="50800" dist="38100" dir="8100000" algn="tr" rotWithShape="0">
-              <a:prstClr val="black">
-                <a:alpha val="40000"/>
-              </a:prstClr>
-            </a:outerShdw>
-          </a:effectLst>
-        </p:spPr>
-      </p:pic>
       <p:cxnSp>
         <p:nvCxnSpPr>
           <p:cNvPr id="88" name="Straight Arrow Connector 87"/>
@@ -18153,7 +17699,7 @@
           <p:nvPr/>
         </p:nvPicPr>
         <p:blipFill>
-          <a:blip r:embed="rId10"/>
+          <a:blip r:embed="rId7"/>
           <a:stretch>
             <a:fillRect/>
           </a:stretch>
@@ -18477,7 +18023,7 @@
           <p:nvPr/>
         </p:nvPicPr>
         <p:blipFill>
-          <a:blip r:embed="rId11"/>
+          <a:blip r:embed="rId8"/>
           <a:stretch>
             <a:fillRect/>
           </a:stretch>
@@ -18508,7 +18054,7 @@
           <p:nvPr/>
         </p:nvPicPr>
         <p:blipFill>
-          <a:blip r:embed="rId12"/>
+          <a:blip r:embed="rId9"/>
           <a:stretch>
             <a:fillRect/>
           </a:stretch>
@@ -18603,6 +18149,405 @@
           </a:p>
         </p:txBody>
       </p:sp>
+      <p:sp>
+        <p:nvSpPr>
+          <p:cNvPr id="30" name="Flowchart: Terminator 29"/>
+          <p:cNvSpPr/>
+          <p:nvPr/>
+        </p:nvSpPr>
+        <p:spPr>
+          <a:xfrm>
+            <a:off x="11041554" y="4989822"/>
+            <a:ext cx="518934" cy="128590"/>
+          </a:xfrm>
+          <a:prstGeom prst="flowChartTerminator">
+            <a:avLst/>
+          </a:prstGeom>
+          <a:solidFill>
+            <a:schemeClr val="accent6">
+              <a:lumMod val="40000"/>
+              <a:lumOff val="60000"/>
+            </a:schemeClr>
+          </a:solidFill>
+          <a:ln>
+            <a:solidFill>
+              <a:schemeClr val="accent6"/>
+            </a:solidFill>
+          </a:ln>
+          <a:effectLst>
+            <a:outerShdw blurRad="50800" dist="38100" dir="8100000" algn="tr" rotWithShape="0">
+              <a:prstClr val="black">
+                <a:alpha val="40000"/>
+              </a:prstClr>
+            </a:outerShdw>
+          </a:effectLst>
+        </p:spPr>
+        <p:style>
+          <a:lnRef idx="3">
+            <a:schemeClr val="lt1"/>
+          </a:lnRef>
+          <a:fillRef idx="1">
+            <a:schemeClr val="accent6"/>
+          </a:fillRef>
+          <a:effectRef idx="1">
+            <a:schemeClr val="accent6"/>
+          </a:effectRef>
+          <a:fontRef idx="minor">
+            <a:schemeClr val="lt1"/>
+          </a:fontRef>
+        </p:style>
+        <p:txBody>
+          <a:bodyPr rtlCol="0" anchor="ctr"/>
+          <a:p>
+            <a:pPr algn="ctr"/>
+            <a:r>
+              <a:rPr lang="en-US" sz="450" b="1">
+                <a:solidFill>
+                  <a:schemeClr val="tx1">
+                    <a:lumMod val="75000"/>
+                    <a:lumOff val="25000"/>
+                  </a:schemeClr>
+                </a:solidFill>
+                <a:sym typeface="+mn-ea"/>
+              </a:rPr>
+              <a:t>live</a:t>
+            </a:r>
+            <a:endParaRPr lang="en-US" sz="450" b="1">
+              <a:solidFill>
+                <a:schemeClr val="tx1">
+                  <a:lumMod val="75000"/>
+                  <a:lumOff val="25000"/>
+                </a:schemeClr>
+              </a:solidFill>
+            </a:endParaRPr>
+          </a:p>
+        </p:txBody>
+      </p:sp>
+      <p:pic>
+        <p:nvPicPr>
+          <p:cNvPr id="63" name="Picture 62"/>
+          <p:cNvPicPr>
+            <a:picLocks noChangeAspect="1"/>
+          </p:cNvPicPr>
+          <p:nvPr/>
+        </p:nvPicPr>
+        <p:blipFill>
+          <a:blip r:embed="rId10"/>
+          <a:stretch>
+            <a:fillRect/>
+          </a:stretch>
+        </p:blipFill>
+        <p:spPr>
+          <a:xfrm>
+            <a:off x="11947175" y="3507317"/>
+            <a:ext cx="1108735" cy="1859704"/>
+          </a:xfrm>
+          <a:prstGeom prst="rect">
+            <a:avLst/>
+          </a:prstGeom>
+          <a:effectLst>
+            <a:outerShdw blurRad="50800" dist="38100" dir="8100000" algn="tr" rotWithShape="0">
+              <a:prstClr val="black">
+                <a:alpha val="40000"/>
+              </a:prstClr>
+            </a:outerShdw>
+          </a:effectLst>
+        </p:spPr>
+      </p:pic>
+      <p:cxnSp>
+        <p:nvCxnSpPr>
+          <p:cNvPr id="31" name="Straight Arrow Connector 30"/>
+          <p:cNvCxnSpPr>
+            <a:endCxn id="43" idx="3"/>
+          </p:cNvCxnSpPr>
+          <p:nvPr/>
+        </p:nvCxnSpPr>
+        <p:spPr>
+          <a:xfrm flipH="1">
+            <a:off x="11634470" y="6629400"/>
+            <a:ext cx="622300" cy="2540"/>
+          </a:xfrm>
+          <a:prstGeom prst="straightConnector1">
+            <a:avLst/>
+          </a:prstGeom>
+          <a:ln>
+            <a:tailEnd type="triangle"/>
+          </a:ln>
+          <a:effectLst>
+            <a:outerShdw blurRad="50800" dist="38100" dir="8100000" algn="tr" rotWithShape="0">
+              <a:prstClr val="black">
+                <a:alpha val="40000"/>
+              </a:prstClr>
+            </a:outerShdw>
+          </a:effectLst>
+        </p:spPr>
+        <p:style>
+          <a:lnRef idx="1">
+            <a:schemeClr val="accent1"/>
+          </a:lnRef>
+          <a:fillRef idx="0">
+            <a:schemeClr val="accent1"/>
+          </a:fillRef>
+          <a:effectRef idx="0">
+            <a:schemeClr val="accent1"/>
+          </a:effectRef>
+          <a:fontRef idx="minor">
+            <a:schemeClr val="tx1"/>
+          </a:fontRef>
+        </p:style>
+      </p:cxnSp>
+      <p:sp>
+        <p:nvSpPr>
+          <p:cNvPr id="43" name="Flowchart: Terminator 42"/>
+          <p:cNvSpPr/>
+          <p:nvPr/>
+        </p:nvSpPr>
+        <p:spPr>
+          <a:xfrm>
+            <a:off x="11115849" y="6567162"/>
+            <a:ext cx="518934" cy="128590"/>
+          </a:xfrm>
+          <a:prstGeom prst="flowChartTerminator">
+            <a:avLst/>
+          </a:prstGeom>
+          <a:solidFill>
+            <a:schemeClr val="accent6">
+              <a:lumMod val="40000"/>
+              <a:lumOff val="60000"/>
+            </a:schemeClr>
+          </a:solidFill>
+          <a:ln>
+            <a:solidFill>
+              <a:schemeClr val="accent6"/>
+            </a:solidFill>
+          </a:ln>
+          <a:effectLst>
+            <a:outerShdw blurRad="50800" dist="38100" dir="8100000" algn="tr" rotWithShape="0">
+              <a:prstClr val="black">
+                <a:alpha val="40000"/>
+              </a:prstClr>
+            </a:outerShdw>
+          </a:effectLst>
+        </p:spPr>
+        <p:style>
+          <a:lnRef idx="3">
+            <a:schemeClr val="lt1"/>
+          </a:lnRef>
+          <a:fillRef idx="1">
+            <a:schemeClr val="accent6"/>
+          </a:fillRef>
+          <a:effectRef idx="1">
+            <a:schemeClr val="accent6"/>
+          </a:effectRef>
+          <a:fontRef idx="minor">
+            <a:schemeClr val="lt1"/>
+          </a:fontRef>
+        </p:style>
+        <p:txBody>
+          <a:bodyPr rtlCol="0" anchor="ctr"/>
+          <a:p>
+            <a:pPr algn="ctr"/>
+            <a:r>
+              <a:rPr lang="en-US" sz="450" b="1">
+                <a:solidFill>
+                  <a:schemeClr val="tx1">
+                    <a:lumMod val="75000"/>
+                    <a:lumOff val="25000"/>
+                  </a:schemeClr>
+                </a:solidFill>
+                <a:sym typeface="+mn-ea"/>
+              </a:rPr>
+              <a:t>live</a:t>
+            </a:r>
+            <a:endParaRPr lang="en-US" sz="450" b="1">
+              <a:solidFill>
+                <a:schemeClr val="tx1">
+                  <a:lumMod val="75000"/>
+                  <a:lumOff val="25000"/>
+                </a:schemeClr>
+              </a:solidFill>
+            </a:endParaRPr>
+          </a:p>
+        </p:txBody>
+      </p:sp>
+      <p:pic>
+        <p:nvPicPr>
+          <p:cNvPr id="65" name="Picture 64"/>
+          <p:cNvPicPr>
+            <a:picLocks noChangeAspect="1"/>
+          </p:cNvPicPr>
+          <p:nvPr/>
+        </p:nvPicPr>
+        <p:blipFill>
+          <a:blip r:embed="rId11"/>
+          <a:stretch>
+            <a:fillRect/>
+          </a:stretch>
+        </p:blipFill>
+        <p:spPr>
+          <a:xfrm>
+            <a:off x="11932887" y="5477070"/>
+            <a:ext cx="1122452" cy="1916855"/>
+          </a:xfrm>
+          <a:prstGeom prst="rect">
+            <a:avLst/>
+          </a:prstGeom>
+          <a:effectLst>
+            <a:outerShdw blurRad="50800" dist="38100" dir="8100000" algn="tr" rotWithShape="0">
+              <a:prstClr val="black">
+                <a:alpha val="40000"/>
+              </a:prstClr>
+            </a:outerShdw>
+          </a:effectLst>
+        </p:spPr>
+      </p:pic>
+      <p:cxnSp>
+        <p:nvCxnSpPr>
+          <p:cNvPr id="45" name="Straight Arrow Connector 44"/>
+          <p:cNvCxnSpPr>
+            <a:endCxn id="51" idx="3"/>
+          </p:cNvCxnSpPr>
+          <p:nvPr/>
+        </p:nvCxnSpPr>
+        <p:spPr>
+          <a:xfrm flipH="1">
+            <a:off x="11669395" y="7754620"/>
+            <a:ext cx="622300" cy="2540"/>
+          </a:xfrm>
+          <a:prstGeom prst="straightConnector1">
+            <a:avLst/>
+          </a:prstGeom>
+          <a:ln>
+            <a:tailEnd type="triangle"/>
+          </a:ln>
+          <a:effectLst>
+            <a:outerShdw blurRad="50800" dist="38100" dir="8100000" algn="tr" rotWithShape="0">
+              <a:prstClr val="black">
+                <a:alpha val="40000"/>
+              </a:prstClr>
+            </a:outerShdw>
+          </a:effectLst>
+        </p:spPr>
+        <p:style>
+          <a:lnRef idx="1">
+            <a:schemeClr val="accent1"/>
+          </a:lnRef>
+          <a:fillRef idx="0">
+            <a:schemeClr val="accent1"/>
+          </a:fillRef>
+          <a:effectRef idx="0">
+            <a:schemeClr val="accent1"/>
+          </a:effectRef>
+          <a:fontRef idx="minor">
+            <a:schemeClr val="tx1"/>
+          </a:fontRef>
+        </p:style>
+      </p:cxnSp>
+      <p:sp>
+        <p:nvSpPr>
+          <p:cNvPr id="51" name="Flowchart: Terminator 50"/>
+          <p:cNvSpPr/>
+          <p:nvPr/>
+        </p:nvSpPr>
+        <p:spPr>
+          <a:xfrm>
+            <a:off x="11150600" y="7683500"/>
+            <a:ext cx="518795" cy="147320"/>
+          </a:xfrm>
+          <a:prstGeom prst="flowChartTerminator">
+            <a:avLst/>
+          </a:prstGeom>
+          <a:solidFill>
+            <a:schemeClr val="accent6">
+              <a:lumMod val="40000"/>
+              <a:lumOff val="60000"/>
+            </a:schemeClr>
+          </a:solidFill>
+          <a:ln>
+            <a:solidFill>
+              <a:schemeClr val="accent6"/>
+            </a:solidFill>
+          </a:ln>
+          <a:effectLst>
+            <a:outerShdw blurRad="50800" dist="38100" dir="8100000" algn="tr" rotWithShape="0">
+              <a:prstClr val="black">
+                <a:alpha val="40000"/>
+              </a:prstClr>
+            </a:outerShdw>
+          </a:effectLst>
+        </p:spPr>
+        <p:style>
+          <a:lnRef idx="3">
+            <a:schemeClr val="lt1"/>
+          </a:lnRef>
+          <a:fillRef idx="1">
+            <a:schemeClr val="accent6"/>
+          </a:fillRef>
+          <a:effectRef idx="1">
+            <a:schemeClr val="accent6"/>
+          </a:effectRef>
+          <a:fontRef idx="minor">
+            <a:schemeClr val="lt1"/>
+          </a:fontRef>
+        </p:style>
+        <p:txBody>
+          <a:bodyPr rtlCol="0" anchor="ctr"/>
+          <a:p>
+            <a:pPr algn="ctr"/>
+            <a:r>
+              <a:rPr lang="en-US" sz="450" b="1">
+                <a:solidFill>
+                  <a:schemeClr val="tx1">
+                    <a:lumMod val="75000"/>
+                    <a:lumOff val="25000"/>
+                  </a:schemeClr>
+                </a:solidFill>
+                <a:sym typeface="+mn-ea"/>
+              </a:rPr>
+              <a:t>filled or canceled</a:t>
+            </a:r>
+            <a:endParaRPr lang="en-US" sz="450" b="1">
+              <a:solidFill>
+                <a:schemeClr val="tx1">
+                  <a:lumMod val="75000"/>
+                  <a:lumOff val="25000"/>
+                </a:schemeClr>
+              </a:solidFill>
+            </a:endParaRPr>
+          </a:p>
+        </p:txBody>
+      </p:sp>
+      <p:pic>
+        <p:nvPicPr>
+          <p:cNvPr id="16" name="Picture 15"/>
+          <p:cNvPicPr>
+            <a:picLocks noChangeAspect="1"/>
+          </p:cNvPicPr>
+          <p:nvPr/>
+        </p:nvPicPr>
+        <p:blipFill>
+          <a:blip r:embed="rId12"/>
+          <a:stretch>
+            <a:fillRect/>
+          </a:stretch>
+        </p:blipFill>
+        <p:spPr>
+          <a:xfrm>
+            <a:off x="11979910" y="7521575"/>
+            <a:ext cx="1387475" cy="2009775"/>
+          </a:xfrm>
+          <a:prstGeom prst="rect">
+            <a:avLst/>
+          </a:prstGeom>
+          <a:effectLst>
+            <a:outerShdw blurRad="50800" dist="38100" dir="8100000" algn="tr" rotWithShape="0">
+              <a:prstClr val="black">
+                <a:alpha val="40000"/>
+              </a:prstClr>
+            </a:outerShdw>
+          </a:effectLst>
+        </p:spPr>
+      </p:pic>
     </p:spTree>
   </p:cSld>
   <p:clrMapOvr>

</xml_diff>

<commit_message>
Working Release; Many changes to finalize account and schema divsions; FCRT 2.1.1 completed successfuly; this is a working release and est. 75% complete til production ready; next up, stops handling - should go quickly; same methodology as request->orders; finalizing FCRT 2.1.2, 2.1.3 and possibly new FCRT 2.1.4;
</commit_message>
<xml_diff>
--- a/~Documents/AppArchitecture.pptx
+++ b/~Documents/AppArchitecture.pptx
@@ -9212,7 +9212,7 @@
         </p:nvSpPr>
         <p:spPr>
           <a:xfrm>
-            <a:off x="10935677" y="3089394"/>
+            <a:off x="8358212" y="3109714"/>
             <a:ext cx="1241898" cy="368300"/>
           </a:xfrm>
           <a:prstGeom prst="rect">
@@ -9280,7 +9280,7 @@
         </p:nvGrpSpPr>
         <p:grpSpPr>
           <a:xfrm rot="0">
-            <a:off x="5819140" y="3243580"/>
+            <a:off x="5794375" y="3243580"/>
             <a:ext cx="427355" cy="334010"/>
             <a:chOff x="16290" y="4518"/>
             <a:chExt cx="748" cy="584"/>
@@ -9701,8 +9701,8 @@
         </p:nvCxnSpPr>
         <p:spPr>
           <a:xfrm rot="10800000" flipV="1">
-            <a:off x="5667375" y="5273040"/>
-            <a:ext cx="730250" cy="3141345"/>
+            <a:off x="5667375" y="5322570"/>
+            <a:ext cx="730250" cy="3091815"/>
           </a:xfrm>
           <a:prstGeom prst="bentConnector2">
             <a:avLst/>
@@ -9744,8 +9744,8 @@
         </p:nvCxnSpPr>
         <p:spPr>
           <a:xfrm>
-            <a:off x="6473825" y="5273040"/>
-            <a:ext cx="1092835" cy="642620"/>
+            <a:off x="6473825" y="5322570"/>
+            <a:ext cx="1092835" cy="593090"/>
           </a:xfrm>
           <a:prstGeom prst="bentConnector2">
             <a:avLst/>
@@ -9784,7 +9784,7 @@
         </p:nvSpPr>
         <p:spPr>
           <a:xfrm>
-            <a:off x="6397625" y="5234940"/>
+            <a:off x="6397625" y="5284470"/>
             <a:ext cx="76200" cy="76200"/>
           </a:xfrm>
           <a:prstGeom prst="ellipse">
@@ -11811,7 +11811,7 @@
         </p:nvSpPr>
         <p:spPr>
           <a:xfrm>
-            <a:off x="9114000" y="3925664"/>
+            <a:off x="9188295" y="3925664"/>
             <a:ext cx="270897" cy="263468"/>
           </a:xfrm>
           <a:prstGeom prst="ellipse">
@@ -11901,7 +11901,7 @@
         </p:nvCxnSpPr>
         <p:spPr>
           <a:xfrm>
-            <a:off x="9250084" y="4189131"/>
+            <a:off x="9324379" y="4189131"/>
             <a:ext cx="6350" cy="198120"/>
           </a:xfrm>
           <a:prstGeom prst="straightConnector1">
@@ -11941,7 +11941,7 @@
         </p:nvSpPr>
         <p:spPr>
           <a:xfrm>
-            <a:off x="7750688" y="4501178"/>
+            <a:off x="7824983" y="4501178"/>
             <a:ext cx="664670" cy="488644"/>
           </a:xfrm>
           <a:prstGeom prst="flowChartDecision">
@@ -12023,7 +12023,7 @@
         </p:nvCxnSpPr>
         <p:spPr>
           <a:xfrm flipH="1" flipV="1">
-            <a:off x="8415873" y="4745214"/>
+            <a:off x="8490168" y="4745214"/>
             <a:ext cx="292100" cy="4445"/>
           </a:xfrm>
           <a:prstGeom prst="straightConnector1">
@@ -12066,7 +12066,7 @@
         </p:nvCxnSpPr>
         <p:spPr>
           <a:xfrm flipH="1">
-            <a:off x="7287138" y="4745150"/>
+            <a:off x="7361433" y="4745150"/>
             <a:ext cx="463550" cy="7620"/>
           </a:xfrm>
           <a:prstGeom prst="straightConnector1">
@@ -12109,7 +12109,7 @@
         </p:nvCxnSpPr>
         <p:spPr>
           <a:xfrm rot="5400000">
-            <a:off x="7642225" y="4641850"/>
+            <a:off x="7716520" y="4641850"/>
             <a:ext cx="93345" cy="789305"/>
           </a:xfrm>
           <a:prstGeom prst="bentConnector2">
@@ -12149,7 +12149,7 @@
         </p:nvSpPr>
         <p:spPr>
           <a:xfrm>
-            <a:off x="7493125" y="4665773"/>
+            <a:off x="7567420" y="4665773"/>
             <a:ext cx="148022" cy="159452"/>
           </a:xfrm>
           <a:prstGeom prst="ellipse">
@@ -12197,7 +12197,7 @@
         </p:nvSpPr>
         <p:spPr>
           <a:xfrm>
-            <a:off x="7493125" y="4996679"/>
+            <a:off x="7567420" y="4996679"/>
             <a:ext cx="148022" cy="159452"/>
           </a:xfrm>
           <a:prstGeom prst="ellipse">
@@ -12288,7 +12288,7 @@
         </p:nvSpPr>
         <p:spPr>
           <a:xfrm>
-            <a:off x="9119398" y="2845504"/>
+            <a:off x="9193693" y="2845504"/>
             <a:ext cx="270897" cy="266897"/>
           </a:xfrm>
           <a:prstGeom prst="ellipse">
@@ -12377,7 +12377,7 @@
         </p:nvCxnSpPr>
         <p:spPr>
           <a:xfrm>
-            <a:off x="9254846" y="3112401"/>
+            <a:off x="9329141" y="3112401"/>
             <a:ext cx="1270" cy="201930"/>
           </a:xfrm>
           <a:prstGeom prst="straightConnector1">
@@ -12417,7 +12417,7 @@
         </p:nvSpPr>
         <p:spPr>
           <a:xfrm>
-            <a:off x="7750688" y="3433591"/>
+            <a:off x="7824983" y="3433591"/>
             <a:ext cx="664670" cy="488644"/>
           </a:xfrm>
           <a:prstGeom prst="flowChartDecision">
@@ -12499,7 +12499,7 @@
         </p:nvCxnSpPr>
         <p:spPr>
           <a:xfrm flipH="1">
-            <a:off x="8415873" y="3672928"/>
+            <a:off x="8490168" y="3672928"/>
             <a:ext cx="292100" cy="5080"/>
           </a:xfrm>
           <a:prstGeom prst="straightConnector1">
@@ -12542,7 +12542,7 @@
         </p:nvCxnSpPr>
         <p:spPr>
           <a:xfrm flipH="1">
-            <a:off x="7285233" y="3678199"/>
+            <a:off x="7359528" y="3678199"/>
             <a:ext cx="465455" cy="1905"/>
           </a:xfrm>
           <a:prstGeom prst="straightConnector1">
@@ -12585,7 +12585,7 @@
         </p:nvCxnSpPr>
         <p:spPr>
           <a:xfrm rot="5400000">
-            <a:off x="7637145" y="3577590"/>
+            <a:off x="7711440" y="3577590"/>
             <a:ext cx="101600" cy="791210"/>
           </a:xfrm>
           <a:prstGeom prst="bentConnector2">
@@ -12625,7 +12625,7 @@
         </p:nvSpPr>
         <p:spPr>
           <a:xfrm>
-            <a:off x="7493125" y="3594631"/>
+            <a:off x="7567420" y="3594631"/>
             <a:ext cx="148022" cy="159452"/>
           </a:xfrm>
           <a:prstGeom prst="ellipse">
@@ -12673,7 +12673,7 @@
         </p:nvSpPr>
         <p:spPr>
           <a:xfrm>
-            <a:off x="7493125" y="3938300"/>
+            <a:off x="7567420" y="3938300"/>
             <a:ext cx="148022" cy="159452"/>
           </a:xfrm>
           <a:prstGeom prst="ellipse">
@@ -12721,7 +12721,7 @@
         </p:nvGrpSpPr>
         <p:grpSpPr>
           <a:xfrm>
-            <a:off x="8707755" y="3314065"/>
+            <a:off x="8782050" y="3314065"/>
             <a:ext cx="1100455" cy="422656"/>
             <a:chOff x="13409" y="5435"/>
             <a:chExt cx="1733" cy="666"/>
@@ -12910,7 +12910,7 @@
         </p:nvGrpSpPr>
         <p:grpSpPr>
           <a:xfrm>
-            <a:off x="8707755" y="4387215"/>
+            <a:off x="8782050" y="4387215"/>
             <a:ext cx="1100455" cy="426466"/>
             <a:chOff x="13409" y="7125"/>
             <a:chExt cx="1733" cy="672"/>
@@ -13465,7 +13465,7 @@
         </p:nvSpPr>
         <p:spPr>
           <a:xfrm>
-            <a:off x="11150600" y="2743835"/>
+            <a:off x="11440795" y="2477135"/>
             <a:ext cx="1543050" cy="368300"/>
           </a:xfrm>
           <a:prstGeom prst="rect">
@@ -15636,7 +15636,7 @@
         </p:nvGrpSpPr>
         <p:grpSpPr>
           <a:xfrm rot="0">
-            <a:off x="8555355" y="4184650"/>
+            <a:off x="8629650" y="4184650"/>
             <a:ext cx="363855" cy="287020"/>
             <a:chOff x="10155" y="438"/>
             <a:chExt cx="1146" cy="883"/>
@@ -15738,7 +15738,7 @@
         </p:nvGrpSpPr>
         <p:grpSpPr>
           <a:xfrm rot="0">
-            <a:off x="8555355" y="3111500"/>
+            <a:off x="8629650" y="3111500"/>
             <a:ext cx="363855" cy="287020"/>
             <a:chOff x="10155" y="438"/>
             <a:chExt cx="1146" cy="883"/>
@@ -16143,8 +16143,8 @@
         </p:blipFill>
         <p:spPr>
           <a:xfrm>
-            <a:off x="5894070" y="3522980"/>
-            <a:ext cx="1043305" cy="1790700"/>
+            <a:off x="5869305" y="3522980"/>
+            <a:ext cx="1109345" cy="1904365"/>
           </a:xfrm>
           <a:prstGeom prst="rect">
             <a:avLst/>
@@ -16166,7 +16166,7 @@
         </p:nvSpPr>
         <p:spPr>
           <a:xfrm>
-            <a:off x="6768766" y="4688062"/>
+            <a:off x="6843061" y="4688062"/>
             <a:ext cx="518934" cy="128590"/>
           </a:xfrm>
           <a:prstGeom prst="flowChartTerminator">
@@ -16239,7 +16239,7 @@
         </p:nvSpPr>
         <p:spPr>
           <a:xfrm>
-            <a:off x="6775624" y="5018397"/>
+            <a:off x="6849919" y="5018397"/>
             <a:ext cx="518934" cy="128590"/>
           </a:xfrm>
           <a:prstGeom prst="flowChartTerminator">
@@ -16313,7 +16313,7 @@
         </p:nvSpPr>
         <p:spPr>
           <a:xfrm>
-            <a:off x="6766860" y="3615332"/>
+            <a:off x="6841155" y="3615332"/>
             <a:ext cx="518934" cy="128590"/>
           </a:xfrm>
           <a:prstGeom prst="flowChartTerminator">
@@ -16386,7 +16386,7 @@
         </p:nvSpPr>
         <p:spPr>
           <a:xfrm>
-            <a:off x="6773718" y="3958938"/>
+            <a:off x="6848013" y="3958938"/>
             <a:ext cx="518934" cy="128590"/>
           </a:xfrm>
           <a:prstGeom prst="flowChartTerminator">
@@ -17291,61 +17291,54 @@
           <a:prstGeom prst="flowChartDecision">
             <a:avLst/>
           </a:prstGeom>
-          <a:ln>
-            <a:solidFill>
-              <a:schemeClr val="accent1"/>
-            </a:solidFill>
-          </a:ln>
-        </p:spPr>
-        <p:style>
-          <a:lnRef idx="1">
+          <a:solidFill>
+            <a:srgbClr val="92D050"/>
+          </a:solidFill>
+        </p:spPr>
+        <p:style>
+          <a:lnRef idx="0">
             <a:schemeClr val="accent6"/>
           </a:lnRef>
-          <a:fillRef idx="2">
+          <a:fillRef idx="3">
             <a:schemeClr val="accent6"/>
           </a:fillRef>
-          <a:effectRef idx="1">
+          <a:effectRef idx="3">
             <a:schemeClr val="accent6"/>
           </a:effectRef>
           <a:fontRef idx="minor">
-            <a:schemeClr val="dk1"/>
+            <a:schemeClr val="lt1"/>
           </a:fontRef>
         </p:style>
         <p:txBody>
-          <a:bodyPr lIns="0" rIns="0" rtlCol="0" anchor="ctr">
-            <a:scene3d>
-              <a:camera prst="orthographicFront"/>
-              <a:lightRig rig="threePt" dir="t"/>
-            </a:scene3d>
+          <a:bodyPr vertOverflow="overflow" horzOverflow="overflow" vert="horz" wrap="square" lIns="0" rIns="0" numCol="1" spcCol="0" rtlCol="0" fromWordArt="0" anchor="ctr" anchorCtr="0" forceAA="0" compatLnSpc="1">
+            <a:noAutofit/>
           </a:bodyPr>
           <a:p>
-            <a:pPr algn="ctr"/>
+            <a:pPr lvl="0" algn="ctr">
+              <a:buClrTx/>
+              <a:buSzTx/>
+              <a:buFontTx/>
+            </a:pPr>
             <a:r>
-              <a:rPr lang="en-US" sz="540">
+              <a:rPr lang="en-US" sz="550" b="1">
                 <a:solidFill>
-                  <a:schemeClr val="tx1"/>
+                  <a:schemeClr val="tx2">
+                    <a:lumMod val="85000"/>
+                    <a:lumOff val="15000"/>
+                  </a:schemeClr>
                 </a:solidFill>
-                <a:effectLst>
-                  <a:outerShdw blurRad="38100" dist="25400" dir="5400000" algn="ctr" rotWithShape="0">
-                    <a:srgbClr val="6E747A">
-                      <a:alpha val="43000"/>
-                    </a:srgbClr>
-                  </a:outerShdw>
-                </a:effectLst>
+                <a:sym typeface="+mn-ea"/>
               </a:rPr>
               <a:t>Newer?</a:t>
             </a:r>
-            <a:endParaRPr lang="en-US" sz="540">
+            <a:endParaRPr lang="en-US" sz="550" b="1">
               <a:solidFill>
-                <a:schemeClr val="tx1"/>
+                <a:schemeClr val="tx2">
+                  <a:lumMod val="85000"/>
+                  <a:lumOff val="15000"/>
+                </a:schemeClr>
               </a:solidFill>
-              <a:effectLst>
-                <a:outerShdw blurRad="38100" dist="25400" dir="5400000" algn="ctr" rotWithShape="0">
-                  <a:srgbClr val="6E747A">
-                    <a:alpha val="43000"/>
-                  </a:srgbClr>
-                </a:outerShdw>
-              </a:effectLst>
+              <a:sym typeface="+mn-ea"/>
             </a:endParaRPr>
           </a:p>
         </p:txBody>
@@ -17364,61 +17357,54 @@
           <a:prstGeom prst="flowChartDecision">
             <a:avLst/>
           </a:prstGeom>
-          <a:ln>
-            <a:solidFill>
-              <a:schemeClr val="accent1"/>
-            </a:solidFill>
-          </a:ln>
-        </p:spPr>
-        <p:style>
-          <a:lnRef idx="1">
+          <a:solidFill>
+            <a:srgbClr val="92D050"/>
+          </a:solidFill>
+        </p:spPr>
+        <p:style>
+          <a:lnRef idx="0">
             <a:schemeClr val="accent6"/>
           </a:lnRef>
-          <a:fillRef idx="2">
+          <a:fillRef idx="3">
             <a:schemeClr val="accent6"/>
           </a:fillRef>
-          <a:effectRef idx="1">
+          <a:effectRef idx="3">
             <a:schemeClr val="accent6"/>
           </a:effectRef>
           <a:fontRef idx="minor">
-            <a:schemeClr val="dk1"/>
+            <a:schemeClr val="lt1"/>
           </a:fontRef>
         </p:style>
         <p:txBody>
-          <a:bodyPr lIns="0" rIns="0" rtlCol="0" anchor="ctr">
-            <a:scene3d>
-              <a:camera prst="orthographicFront"/>
-              <a:lightRig rig="threePt" dir="t"/>
-            </a:scene3d>
+          <a:bodyPr vertOverflow="overflow" horzOverflow="overflow" vert="horz" wrap="square" lIns="0" rIns="0" numCol="1" spcCol="0" rtlCol="0" fromWordArt="0" anchor="ctr" anchorCtr="0" forceAA="0" compatLnSpc="1">
+            <a:noAutofit/>
           </a:bodyPr>
           <a:p>
-            <a:pPr algn="ctr"/>
+            <a:pPr lvl="0" algn="ctr">
+              <a:buClrTx/>
+              <a:buSzTx/>
+              <a:buFontTx/>
+            </a:pPr>
             <a:r>
-              <a:rPr lang="en-US" sz="540">
+              <a:rPr lang="en-US" sz="550" b="1">
                 <a:solidFill>
-                  <a:schemeClr val="tx1"/>
+                  <a:schemeClr val="tx2">
+                    <a:lumMod val="85000"/>
+                    <a:lumOff val="15000"/>
+                  </a:schemeClr>
                 </a:solidFill>
-                <a:effectLst>
-                  <a:outerShdw blurRad="38100" dist="25400" dir="5400000" algn="ctr" rotWithShape="0">
-                    <a:srgbClr val="6E747A">
-                      <a:alpha val="43000"/>
-                    </a:srgbClr>
-                  </a:outerShdw>
-                </a:effectLst>
+                <a:sym typeface="+mn-ea"/>
               </a:rPr>
               <a:t>Found?</a:t>
             </a:r>
-            <a:endParaRPr lang="en-US" sz="540">
+            <a:endParaRPr lang="en-US" sz="550" b="1">
               <a:solidFill>
-                <a:schemeClr val="tx1"/>
+                <a:schemeClr val="tx2">
+                  <a:lumMod val="85000"/>
+                  <a:lumOff val="15000"/>
+                </a:schemeClr>
               </a:solidFill>
-              <a:effectLst>
-                <a:outerShdw blurRad="38100" dist="25400" dir="5400000" algn="ctr" rotWithShape="0">
-                  <a:srgbClr val="6E747A">
-                    <a:alpha val="43000"/>
-                  </a:srgbClr>
-                </a:outerShdw>
-              </a:effectLst>
+              <a:sym typeface="+mn-ea"/>
             </a:endParaRPr>
           </a:p>
         </p:txBody>
@@ -17492,80 +17478,6 @@
                   <a:lumOff val="25000"/>
                 </a:schemeClr>
               </a:solidFill>
-            </a:endParaRPr>
-          </a:p>
-        </p:txBody>
-      </p:sp>
-      <p:sp>
-        <p:nvSpPr>
-          <p:cNvPr id="133" name="Flowchart: Decision 132"/>
-          <p:cNvSpPr/>
-          <p:nvPr/>
-        </p:nvSpPr>
-        <p:spPr>
-          <a:xfrm>
-            <a:off x="4363085" y="4299585"/>
-            <a:ext cx="564515" cy="363220"/>
-          </a:xfrm>
-          <a:prstGeom prst="flowChartDecision">
-            <a:avLst/>
-          </a:prstGeom>
-          <a:ln>
-            <a:solidFill>
-              <a:schemeClr val="accent1"/>
-            </a:solidFill>
-          </a:ln>
-        </p:spPr>
-        <p:style>
-          <a:lnRef idx="1">
-            <a:schemeClr val="accent6"/>
-          </a:lnRef>
-          <a:fillRef idx="2">
-            <a:schemeClr val="accent6"/>
-          </a:fillRef>
-          <a:effectRef idx="1">
-            <a:schemeClr val="accent6"/>
-          </a:effectRef>
-          <a:fontRef idx="minor">
-            <a:schemeClr val="dk1"/>
-          </a:fontRef>
-        </p:style>
-        <p:txBody>
-          <a:bodyPr lIns="0" rIns="0" rtlCol="0" anchor="ctr">
-            <a:scene3d>
-              <a:camera prst="orthographicFront"/>
-              <a:lightRig rig="threePt" dir="t"/>
-            </a:scene3d>
-          </a:bodyPr>
-          <a:p>
-            <a:pPr algn="ctr"/>
-            <a:r>
-              <a:rPr lang="en-US" sz="540">
-                <a:solidFill>
-                  <a:schemeClr val="tx1"/>
-                </a:solidFill>
-                <a:effectLst>
-                  <a:outerShdw blurRad="38100" dist="25400" dir="5400000" algn="ctr" rotWithShape="0">
-                    <a:srgbClr val="6E747A">
-                      <a:alpha val="43000"/>
-                    </a:srgbClr>
-                  </a:outerShdw>
-                </a:effectLst>
-                <a:sym typeface="+mn-ea"/>
-              </a:rPr>
-              <a:t>Pending?</a:t>
-            </a:r>
-            <a:endParaRPr lang="en-US" sz="540">
-              <a:solidFill>
-                <a:schemeClr val="tx1"/>
-              </a:solidFill>
-              <a:effectLst>
-                <a:outerShdw blurRad="38100" dist="25400" dir="5400000" algn="ctr" rotWithShape="0">
-                  <a:srgbClr val="6E747A">
-                    <a:alpha val="43000"/>
-                  </a:srgbClr>
-                </a:outerShdw>
-              </a:effectLst>
             </a:endParaRPr>
           </a:p>
         </p:txBody>
@@ -17937,15 +17849,15 @@
         <p:nvCxnSpPr>
           <p:cNvPr id="153" name="Elbow Connector 152"/>
           <p:cNvCxnSpPr>
-            <a:stCxn id="133" idx="2"/>
+            <a:stCxn id="40" idx="2"/>
             <a:endCxn id="155" idx="1"/>
           </p:cNvCxnSpPr>
           <p:nvPr/>
         </p:nvCxnSpPr>
         <p:spPr>
           <a:xfrm rot="5400000" flipV="1">
-            <a:off x="4916805" y="4391025"/>
-            <a:ext cx="212090" cy="755015"/>
+            <a:off x="4923790" y="4398010"/>
+            <a:ext cx="208915" cy="744855"/>
           </a:xfrm>
           <a:prstGeom prst="bentConnector2">
             <a:avLst/>
@@ -18108,14 +18020,14 @@
           <p:cNvPr id="157" name="Straight Arrow Connector 156"/>
           <p:cNvCxnSpPr>
             <a:stCxn id="127" idx="3"/>
-            <a:endCxn id="133" idx="1"/>
+            <a:endCxn id="40" idx="1"/>
           </p:cNvCxnSpPr>
           <p:nvPr/>
         </p:nvCxnSpPr>
         <p:spPr>
-          <a:xfrm flipV="1">
-            <a:off x="3940810" y="4481195"/>
-            <a:ext cx="422275" cy="2540"/>
+          <a:xfrm>
+            <a:off x="3940810" y="4483735"/>
+            <a:ext cx="432435" cy="635"/>
           </a:xfrm>
           <a:prstGeom prst="straightConnector1">
             <a:avLst/>
@@ -19401,15 +19313,15 @@
         <p:nvCxnSpPr>
           <p:cNvPr id="172" name="Straight Arrow Connector 171"/>
           <p:cNvCxnSpPr>
-            <a:stCxn id="133" idx="3"/>
+            <a:stCxn id="40" idx="3"/>
             <a:endCxn id="171" idx="1"/>
           </p:cNvCxnSpPr>
           <p:nvPr/>
         </p:nvCxnSpPr>
         <p:spPr>
-          <a:xfrm>
-            <a:off x="4927600" y="4481195"/>
-            <a:ext cx="501015" cy="1905"/>
+          <a:xfrm flipV="1">
+            <a:off x="4937760" y="4483100"/>
+            <a:ext cx="490855" cy="1270"/>
           </a:xfrm>
           <a:prstGeom prst="straightConnector1">
             <a:avLst/>
@@ -20082,6 +19994,112 @@
             </a:prstGeom>
           </p:spPr>
         </p:pic>
+      </p:grpSp>
+      <p:grpSp>
+        <p:nvGrpSpPr>
+          <p:cNvPr id="45" name="Group 44"/>
+          <p:cNvGrpSpPr/>
+          <p:nvPr/>
+        </p:nvGrpSpPr>
+        <p:grpSpPr>
+          <a:xfrm>
+            <a:off x="4371975" y="4302760"/>
+            <a:ext cx="567690" cy="363220"/>
+            <a:chOff x="6885" y="6776"/>
+            <a:chExt cx="894" cy="572"/>
+          </a:xfrm>
+          <a:solidFill>
+            <a:srgbClr val="92D050"/>
+          </a:solidFill>
+        </p:grpSpPr>
+        <p:sp>
+          <p:nvSpPr>
+            <p:cNvPr id="40" name="Flowchart: Decision 39"/>
+            <p:cNvSpPr/>
+            <p:nvPr/>
+          </p:nvSpPr>
+          <p:spPr>
+            <a:xfrm>
+              <a:off x="6887" y="6776"/>
+              <a:ext cx="889" cy="572"/>
+            </a:xfrm>
+            <a:prstGeom prst="flowChartDecision">
+              <a:avLst/>
+            </a:prstGeom>
+            <a:grpFill/>
+          </p:spPr>
+          <p:style>
+            <a:lnRef idx="0">
+              <a:schemeClr val="accent6"/>
+            </a:lnRef>
+            <a:fillRef idx="3">
+              <a:schemeClr val="accent6"/>
+            </a:fillRef>
+            <a:effectRef idx="3">
+              <a:schemeClr val="accent6"/>
+            </a:effectRef>
+            <a:fontRef idx="minor">
+              <a:schemeClr val="lt1"/>
+            </a:fontRef>
+          </p:style>
+          <p:txBody>
+            <a:bodyPr vertOverflow="overflow" horzOverflow="overflow" vert="horz" wrap="square" lIns="0" rIns="0" numCol="1" spcCol="0" rtlCol="0" fromWordArt="0" anchor="ctr" anchorCtr="0" forceAA="0" compatLnSpc="1">
+              <a:noAutofit/>
+            </a:bodyPr>
+            <a:p>
+              <a:pPr lvl="0" algn="ctr">
+                <a:buClrTx/>
+                <a:buSzTx/>
+                <a:buFontTx/>
+              </a:pPr>
+              <a:endParaRPr lang="en-US" sz="550" b="1">
+                <a:solidFill>
+                  <a:schemeClr val="tx2">
+                    <a:lumMod val="85000"/>
+                    <a:lumOff val="15000"/>
+                  </a:schemeClr>
+                </a:solidFill>
+                <a:sym typeface="+mn-ea"/>
+              </a:endParaRPr>
+            </a:p>
+          </p:txBody>
+        </p:sp>
+        <p:sp>
+          <p:nvSpPr>
+            <p:cNvPr id="24" name="Text Box 23"/>
+            <p:cNvSpPr txBox="1"/>
+            <p:nvPr/>
+          </p:nvSpPr>
+          <p:spPr>
+            <a:xfrm>
+              <a:off x="6885" y="6924"/>
+              <a:ext cx="894" cy="277"/>
+            </a:xfrm>
+            <a:prstGeom prst="rect">
+              <a:avLst/>
+            </a:prstGeom>
+            <a:noFill/>
+          </p:spPr>
+          <p:txBody>
+            <a:bodyPr wrap="square" rtlCol="0">
+              <a:spAutoFit/>
+            </a:bodyPr>
+            <a:p>
+              <a:r>
+                <a:rPr lang="en-US" sz="550" b="1">
+                  <a:solidFill>
+                    <a:schemeClr val="tx2">
+                      <a:lumMod val="85000"/>
+                      <a:lumOff val="15000"/>
+                    </a:schemeClr>
+                  </a:solidFill>
+                </a:rPr>
+                <a:t>Pending?</a:t>
+              </a:r>
+              <a:endParaRPr lang="en-US"/>
+            </a:p>
+          </p:txBody>
+        </p:sp>
       </p:grpSp>
     </p:spTree>
   </p:cSld>

</xml_diff>

<commit_message>
Savepoint; FCRT 2.2.1 & 2 complete; 2.2.2 not finalized, although 100% ok. Next up: FCRT 2.2.3, poss. 2.1.4 and 2.2.4
</commit_message>
<xml_diff>
--- a/~Documents/AppArchitecture.pptx
+++ b/~Documents/AppArchitecture.pptx
@@ -27285,7 +27285,7 @@
         </p:nvSpPr>
         <p:spPr>
           <a:xfrm>
-            <a:off x="854075" y="2980055"/>
+            <a:off x="854075" y="2834005"/>
             <a:ext cx="4243070" cy="1811020"/>
           </a:xfrm>
           <a:prstGeom prst="rect">
@@ -27352,7 +27352,7 @@
         </p:nvSpPr>
         <p:spPr>
           <a:xfrm>
-            <a:off x="10751185" y="3773170"/>
+            <a:off x="10751185" y="3627120"/>
             <a:ext cx="2282825" cy="2573655"/>
           </a:xfrm>
           <a:prstGeom prst="rect">
@@ -27421,7 +27421,7 @@
         </p:nvCxnSpPr>
         <p:spPr>
           <a:xfrm flipH="1">
-            <a:off x="8724900" y="7325360"/>
+            <a:off x="8724900" y="7179310"/>
             <a:ext cx="1905" cy="441325"/>
           </a:xfrm>
           <a:prstGeom prst="straightConnector1">
@@ -27464,7 +27464,7 @@
         </p:nvCxnSpPr>
         <p:spPr>
           <a:xfrm flipH="1">
-            <a:off x="8724900" y="8033385"/>
+            <a:off x="8724900" y="7887335"/>
             <a:ext cx="1905" cy="222250"/>
           </a:xfrm>
           <a:prstGeom prst="straightConnector1">
@@ -27506,7 +27506,7 @@
         </p:nvCxnSpPr>
         <p:spPr>
           <a:xfrm flipV="1">
-            <a:off x="2211705" y="5784850"/>
+            <a:off x="2211705" y="5638800"/>
             <a:ext cx="384810" cy="1270"/>
           </a:xfrm>
           <a:prstGeom prst="straightConnector1">
@@ -27546,7 +27546,7 @@
         </p:nvSpPr>
         <p:spPr>
           <a:xfrm>
-            <a:off x="8190865" y="5118735"/>
+            <a:off x="8190865" y="4972685"/>
             <a:ext cx="1060450" cy="128905"/>
           </a:xfrm>
           <a:prstGeom prst="rect">
@@ -27606,7 +27606,7 @@
         </p:nvSpPr>
         <p:spPr>
           <a:xfrm>
-            <a:off x="8190865" y="5269865"/>
+            <a:off x="8190865" y="5123815"/>
             <a:ext cx="1060450" cy="128905"/>
           </a:xfrm>
           <a:prstGeom prst="rect">
@@ -27666,7 +27666,7 @@
         </p:nvSpPr>
         <p:spPr>
           <a:xfrm>
-            <a:off x="8190865" y="5575300"/>
+            <a:off x="8190865" y="5429250"/>
             <a:ext cx="1060450" cy="128905"/>
           </a:xfrm>
           <a:prstGeom prst="rect">
@@ -27726,7 +27726,7 @@
         </p:nvSpPr>
         <p:spPr>
           <a:xfrm>
-            <a:off x="8190865" y="5422265"/>
+            <a:off x="8190865" y="5276215"/>
             <a:ext cx="1060450" cy="128905"/>
           </a:xfrm>
           <a:prstGeom prst="rect">
@@ -27789,7 +27789,7 @@
         </p:nvCxnSpPr>
         <p:spPr>
           <a:xfrm rot="16200000">
-            <a:off x="7365365" y="5391150"/>
+            <a:off x="7365365" y="5245100"/>
             <a:ext cx="219710" cy="454660"/>
           </a:xfrm>
           <a:prstGeom prst="bentConnector2">
@@ -27831,7 +27831,7 @@
         </p:nvCxnSpPr>
         <p:spPr>
           <a:xfrm flipH="1">
-            <a:off x="12004040" y="4401820"/>
+            <a:off x="12004040" y="4255770"/>
             <a:ext cx="440690" cy="635"/>
           </a:xfrm>
           <a:prstGeom prst="straightConnector1">
@@ -27877,7 +27877,7 @@
         </p:nvSpPr>
         <p:spPr>
           <a:xfrm>
-            <a:off x="8560915" y="3850099"/>
+            <a:off x="8560915" y="3704049"/>
             <a:ext cx="270897" cy="263468"/>
           </a:xfrm>
           <a:prstGeom prst="ellipse">
@@ -27973,7 +27973,7 @@
         </p:nvCxnSpPr>
         <p:spPr>
           <a:xfrm>
-            <a:off x="8696999" y="4113566"/>
+            <a:off x="8696999" y="3967516"/>
             <a:ext cx="1270" cy="198120"/>
           </a:xfrm>
           <a:prstGeom prst="straightConnector1">
@@ -28006,7 +28006,7 @@
         </p:nvSpPr>
         <p:spPr>
           <a:xfrm>
-            <a:off x="7187374" y="4425613"/>
+            <a:off x="7187374" y="4279563"/>
             <a:ext cx="664670" cy="488644"/>
           </a:xfrm>
           <a:prstGeom prst="flowChartDecision">
@@ -28090,7 +28090,7 @@
         </p:nvSpPr>
         <p:spPr>
           <a:xfrm>
-            <a:off x="8162925" y="4300855"/>
+            <a:off x="8162925" y="4154805"/>
             <a:ext cx="1069975" cy="131445"/>
           </a:xfrm>
           <a:prstGeom prst="rect">
@@ -28150,7 +28150,7 @@
         </p:nvSpPr>
         <p:spPr>
           <a:xfrm>
-            <a:off x="8162925" y="4451985"/>
+            <a:off x="8162925" y="4305935"/>
             <a:ext cx="1069975" cy="131445"/>
           </a:xfrm>
           <a:prstGeom prst="rect">
@@ -28210,7 +28210,7 @@
         </p:nvGrpSpPr>
         <p:grpSpPr>
           <a:xfrm rot="0">
-            <a:off x="8010525" y="4098925"/>
+            <a:off x="8010525" y="3952875"/>
             <a:ext cx="363855" cy="287020"/>
             <a:chOff x="10155" y="438"/>
             <a:chExt cx="1146" cy="883"/>
@@ -28312,7 +28312,7 @@
         </p:nvSpPr>
         <p:spPr>
           <a:xfrm>
-            <a:off x="8162925" y="4604385"/>
+            <a:off x="8162925" y="4458335"/>
             <a:ext cx="1069975" cy="131445"/>
           </a:xfrm>
           <a:prstGeom prst="rect">
@@ -28374,7 +28374,7 @@
         </p:nvCxnSpPr>
         <p:spPr>
           <a:xfrm flipH="1">
-            <a:off x="7852410" y="4665345"/>
+            <a:off x="7852410" y="4519295"/>
             <a:ext cx="376555" cy="4445"/>
           </a:xfrm>
           <a:prstGeom prst="straightConnector1">
@@ -28417,7 +28417,7 @@
         </p:nvCxnSpPr>
         <p:spPr>
           <a:xfrm flipH="1">
-            <a:off x="6748023" y="4669585"/>
+            <a:off x="6748023" y="4523535"/>
             <a:ext cx="439420" cy="7620"/>
           </a:xfrm>
           <a:prstGeom prst="straightConnector1">
@@ -28457,7 +28457,7 @@
         </p:nvSpPr>
         <p:spPr>
           <a:xfrm>
-            <a:off x="6911868" y="4590208"/>
+            <a:off x="6911868" y="4444158"/>
             <a:ext cx="148022" cy="159452"/>
           </a:xfrm>
           <a:prstGeom prst="ellipse">
@@ -28515,7 +28515,7 @@
         </p:nvSpPr>
         <p:spPr>
           <a:xfrm>
-            <a:off x="8558058" y="2846139"/>
+            <a:off x="8558058" y="2700089"/>
             <a:ext cx="270897" cy="266897"/>
           </a:xfrm>
           <a:prstGeom prst="ellipse">
@@ -28611,7 +28611,7 @@
         </p:nvCxnSpPr>
         <p:spPr>
           <a:xfrm>
-            <a:off x="8693506" y="3113036"/>
+            <a:off x="8693506" y="2966986"/>
             <a:ext cx="4445" cy="195580"/>
           </a:xfrm>
           <a:prstGeom prst="straightConnector1">
@@ -28644,7 +28644,7 @@
         </p:nvSpPr>
         <p:spPr>
           <a:xfrm>
-            <a:off x="7187374" y="3434226"/>
+            <a:off x="7187374" y="3288176"/>
             <a:ext cx="664670" cy="488644"/>
           </a:xfrm>
           <a:prstGeom prst="flowChartDecision">
@@ -28723,7 +28723,7 @@
         </p:nvSpPr>
         <p:spPr>
           <a:xfrm>
-            <a:off x="8162925" y="3318510"/>
+            <a:off x="8162925" y="3172460"/>
             <a:ext cx="1069975" cy="131445"/>
           </a:xfrm>
           <a:prstGeom prst="rect">
@@ -28783,7 +28783,7 @@
         </p:nvSpPr>
         <p:spPr>
           <a:xfrm>
-            <a:off x="8162925" y="3472180"/>
+            <a:off x="8162925" y="3326130"/>
             <a:ext cx="1069975" cy="131445"/>
           </a:xfrm>
           <a:prstGeom prst="rect">
@@ -28843,7 +28843,7 @@
         </p:nvGrpSpPr>
         <p:grpSpPr>
           <a:xfrm rot="0">
-            <a:off x="8010525" y="3116580"/>
+            <a:off x="8010525" y="2970530"/>
             <a:ext cx="363855" cy="287020"/>
             <a:chOff x="10155" y="438"/>
             <a:chExt cx="1146" cy="883"/>
@@ -28945,7 +28945,7 @@
         </p:nvSpPr>
         <p:spPr>
           <a:xfrm>
-            <a:off x="8162925" y="3629025"/>
+            <a:off x="8162925" y="3482975"/>
             <a:ext cx="1069975" cy="131445"/>
           </a:xfrm>
           <a:prstGeom prst="rect">
@@ -29008,7 +29008,7 @@
         </p:nvCxnSpPr>
         <p:spPr>
           <a:xfrm flipH="1" flipV="1">
-            <a:off x="7852410" y="3678555"/>
+            <a:off x="7852410" y="3532505"/>
             <a:ext cx="310515" cy="16510"/>
           </a:xfrm>
           <a:prstGeom prst="straightConnector1">
@@ -29051,7 +29051,7 @@
         </p:nvCxnSpPr>
         <p:spPr>
           <a:xfrm flipH="1">
-            <a:off x="6748023" y="3678834"/>
+            <a:off x="6748023" y="3532784"/>
             <a:ext cx="439420" cy="1905"/>
           </a:xfrm>
           <a:prstGeom prst="straightConnector1">
@@ -29091,7 +29091,7 @@
         </p:nvSpPr>
         <p:spPr>
           <a:xfrm>
-            <a:off x="6911868" y="3607966"/>
+            <a:off x="6911868" y="3461916"/>
             <a:ext cx="137160" cy="137160"/>
           </a:xfrm>
           <a:prstGeom prst="ellipse">
@@ -29139,7 +29139,7 @@
         </p:nvCxnSpPr>
         <p:spPr>
           <a:xfrm>
-            <a:off x="9232900" y="3538220"/>
+            <a:off x="9232900" y="3392170"/>
             <a:ext cx="3175" cy="150495"/>
           </a:xfrm>
           <a:prstGeom prst="bentConnector3">
@@ -29181,7 +29181,7 @@
         </p:nvCxnSpPr>
         <p:spPr>
           <a:xfrm>
-            <a:off x="9233015" y="4526770"/>
+            <a:off x="9233015" y="4380720"/>
             <a:ext cx="2858" cy="145164"/>
           </a:xfrm>
           <a:prstGeom prst="bentConnector3">
@@ -29223,7 +29223,7 @@
         </p:nvSpPr>
         <p:spPr>
           <a:xfrm>
-            <a:off x="10813415" y="2689860"/>
+            <a:off x="10813415" y="2543810"/>
             <a:ext cx="2003425" cy="368300"/>
           </a:xfrm>
           <a:prstGeom prst="rect">
@@ -29280,7 +29280,7 @@
         </p:blipFill>
         <p:spPr>
           <a:xfrm>
-            <a:off x="12353290" y="3623310"/>
+            <a:off x="12353290" y="3477260"/>
             <a:ext cx="1320165" cy="1299845"/>
           </a:xfrm>
           <a:prstGeom prst="rect">
@@ -29305,7 +29305,7 @@
         </p:nvCxnSpPr>
         <p:spPr>
           <a:xfrm flipV="1">
-            <a:off x="11065510" y="6001385"/>
+            <a:off x="11065510" y="5855335"/>
             <a:ext cx="2540" cy="613410"/>
           </a:xfrm>
           <a:prstGeom prst="straightConnector1">
@@ -29341,7 +29341,7 @@
         </p:nvCxnSpPr>
         <p:spPr>
           <a:xfrm>
-            <a:off x="11598275" y="4269740"/>
+            <a:off x="11598275" y="4123690"/>
             <a:ext cx="755015" cy="3810"/>
           </a:xfrm>
           <a:prstGeom prst="straightConnector1">
@@ -29387,7 +29387,7 @@
         </p:nvSpPr>
         <p:spPr>
           <a:xfrm>
-            <a:off x="9090660" y="5135245"/>
+            <a:off x="9090660" y="4989195"/>
             <a:ext cx="756285" cy="125730"/>
           </a:xfrm>
           <a:prstGeom prst="flowChartTerminator">
@@ -29468,7 +29468,7 @@
         </p:nvSpPr>
         <p:spPr>
           <a:xfrm>
-            <a:off x="7702550" y="5454650"/>
+            <a:off x="7702550" y="5308600"/>
             <a:ext cx="518795" cy="107315"/>
           </a:xfrm>
           <a:prstGeom prst="flowChartTerminator">
@@ -29551,7 +29551,7 @@
         </p:nvCxnSpPr>
         <p:spPr>
           <a:xfrm flipH="1">
-            <a:off x="4509770" y="5936615"/>
+            <a:off x="4509770" y="5790565"/>
             <a:ext cx="2330450" cy="7620"/>
           </a:xfrm>
           <a:prstGeom prst="straightConnector1">
@@ -29594,7 +29594,7 @@
         </p:nvCxnSpPr>
         <p:spPr>
           <a:xfrm flipH="1">
-            <a:off x="3514090" y="6164580"/>
+            <a:off x="3514090" y="6018530"/>
             <a:ext cx="2540" cy="307975"/>
           </a:xfrm>
           <a:prstGeom prst="straightConnector1">
@@ -29637,7 +29637,7 @@
         </p:nvCxnSpPr>
         <p:spPr>
           <a:xfrm rot="5400000">
-            <a:off x="7057708" y="3613468"/>
+            <a:off x="7057708" y="3467418"/>
             <a:ext cx="153035" cy="772160"/>
           </a:xfrm>
           <a:prstGeom prst="bentConnector2">
@@ -29677,7 +29677,7 @@
         </p:nvGrpSpPr>
         <p:grpSpPr>
           <a:xfrm>
-            <a:off x="2986405" y="5579110"/>
+            <a:off x="2986405" y="5433060"/>
             <a:ext cx="1060450" cy="585470"/>
             <a:chOff x="4703" y="8729"/>
             <a:chExt cx="1670" cy="922"/>
@@ -29925,8 +29925,8 @@
         </p:nvCxnSpPr>
         <p:spPr>
           <a:xfrm flipV="1">
-            <a:off x="4906645" y="9429115"/>
-            <a:ext cx="551815" cy="635"/>
+            <a:off x="4906645" y="9283065"/>
+            <a:ext cx="575310" cy="635"/>
           </a:xfrm>
           <a:prstGeom prst="straightConnector1">
             <a:avLst/>
@@ -29958,7 +29958,7 @@
         </p:nvSpPr>
         <p:spPr>
           <a:xfrm>
-            <a:off x="5458318" y="9295834"/>
+            <a:off x="5481813" y="9149784"/>
             <a:ext cx="270897" cy="266897"/>
           </a:xfrm>
           <a:prstGeom prst="ellipse">
@@ -30055,7 +30055,7 @@
         </p:nvCxnSpPr>
         <p:spPr>
           <a:xfrm>
-            <a:off x="3517265" y="8776970"/>
+            <a:off x="3517265" y="8630920"/>
             <a:ext cx="0" cy="413385"/>
           </a:xfrm>
           <a:prstGeom prst="straightConnector1">
@@ -30095,7 +30095,7 @@
         </p:nvSpPr>
         <p:spPr>
           <a:xfrm>
-            <a:off x="3442619" y="8869045"/>
+            <a:off x="3442619" y="8722995"/>
             <a:ext cx="148022" cy="159385"/>
           </a:xfrm>
           <a:prstGeom prst="ellipse">
@@ -30155,7 +30155,7 @@
         </p:nvCxnSpPr>
         <p:spPr>
           <a:xfrm flipV="1">
-            <a:off x="2145030" y="5342255"/>
+            <a:off x="2145030" y="5196205"/>
             <a:ext cx="5560695" cy="8255"/>
           </a:xfrm>
           <a:prstGeom prst="straightConnector1">
@@ -30195,7 +30195,7 @@
         </p:nvGrpSpPr>
         <p:grpSpPr>
           <a:xfrm>
-            <a:off x="6673215" y="5458460"/>
+            <a:off x="6673215" y="5312410"/>
             <a:ext cx="1067435" cy="1804035"/>
             <a:chOff x="10064" y="7889"/>
             <a:chExt cx="1681" cy="2841"/>
@@ -30351,7 +30351,7 @@
         </p:nvSpPr>
         <p:spPr>
           <a:xfrm>
-            <a:off x="6893453" y="3988435"/>
+            <a:off x="6893453" y="3842385"/>
             <a:ext cx="148022" cy="159385"/>
           </a:xfrm>
           <a:prstGeom prst="ellipse">
@@ -30412,7 +30412,7 @@
         </p:nvCxnSpPr>
         <p:spPr>
           <a:xfrm rot="10800000" flipV="1">
-            <a:off x="9846945" y="4424045"/>
+            <a:off x="9846945" y="4277995"/>
             <a:ext cx="690880" cy="774065"/>
           </a:xfrm>
           <a:prstGeom prst="bentConnector3">
@@ -30456,7 +30456,7 @@
         </p:nvCxnSpPr>
         <p:spPr>
           <a:xfrm>
-            <a:off x="8721090" y="5704205"/>
+            <a:off x="8721090" y="5558155"/>
             <a:ext cx="2540" cy="209550"/>
           </a:xfrm>
           <a:prstGeom prst="straightConnector1">
@@ -30496,7 +30496,7 @@
         </p:nvSpPr>
         <p:spPr>
           <a:xfrm>
-            <a:off x="8394065" y="6840220"/>
+            <a:off x="8394065" y="6694170"/>
             <a:ext cx="664845" cy="485140"/>
           </a:xfrm>
           <a:prstGeom prst="flowChartDecision">
@@ -30580,7 +30580,7 @@
         </p:nvSpPr>
         <p:spPr>
           <a:xfrm>
-            <a:off x="8392174" y="8255784"/>
+            <a:off x="8392174" y="8109734"/>
             <a:ext cx="664670" cy="488644"/>
           </a:xfrm>
           <a:prstGeom prst="flowChartDecision">
@@ -30683,7 +30683,7 @@
         </p:nvCxnSpPr>
         <p:spPr>
           <a:xfrm flipH="1">
-            <a:off x="8004175" y="8500110"/>
+            <a:off x="8004175" y="8354060"/>
             <a:ext cx="387985" cy="5080"/>
           </a:xfrm>
           <a:prstGeom prst="straightConnector1">
@@ -30723,7 +30723,7 @@
         </p:nvSpPr>
         <p:spPr>
           <a:xfrm>
-            <a:off x="8159008" y="8416125"/>
+            <a:off x="8161661" y="8270075"/>
             <a:ext cx="148022" cy="159452"/>
           </a:xfrm>
           <a:prstGeom prst="ellipse">
@@ -30781,7 +30781,7 @@
         </p:nvGrpSpPr>
         <p:grpSpPr>
           <a:xfrm>
-            <a:off x="6746875" y="7624445"/>
+            <a:off x="6746875" y="7478395"/>
             <a:ext cx="798195" cy="1292860"/>
             <a:chOff x="8348" y="9775"/>
             <a:chExt cx="1257" cy="2036"/>
@@ -30937,7 +30937,7 @@
         </p:nvSpPr>
         <p:spPr>
           <a:xfrm>
-            <a:off x="7485350" y="8440277"/>
+            <a:off x="7485350" y="8294227"/>
             <a:ext cx="518934" cy="128590"/>
           </a:xfrm>
           <a:prstGeom prst="flowChartTerminator">
@@ -31018,7 +31018,7 @@
         </p:nvSpPr>
         <p:spPr>
           <a:xfrm>
-            <a:off x="10845800" y="6614795"/>
+            <a:off x="10845800" y="6468745"/>
             <a:ext cx="438912" cy="219456"/>
           </a:xfrm>
           <a:prstGeom prst="flowChartOffpageConnector">
@@ -31111,7 +31111,7 @@
         </p:nvGrpSpPr>
         <p:grpSpPr>
           <a:xfrm rot="0">
-            <a:off x="11209655" y="6474460"/>
+            <a:off x="11209655" y="6328410"/>
             <a:ext cx="203200" cy="215900"/>
             <a:chOff x="8092" y="1237"/>
             <a:chExt cx="482" cy="524"/>
@@ -31219,7 +31219,7 @@
         </p:nvSpPr>
         <p:spPr>
           <a:xfrm>
-            <a:off x="2596515" y="5720080"/>
+            <a:off x="2596515" y="5574030"/>
             <a:ext cx="544195" cy="128905"/>
           </a:xfrm>
           <a:prstGeom prst="flowChartTerminator">
@@ -31300,7 +31300,7 @@
         </p:nvSpPr>
         <p:spPr>
           <a:xfrm>
-            <a:off x="3956685" y="5879465"/>
+            <a:off x="3956685" y="5733415"/>
             <a:ext cx="553085" cy="128905"/>
           </a:xfrm>
           <a:prstGeom prst="flowChartTerminator">
@@ -31381,7 +31381,7 @@
         </p:nvGrpSpPr>
         <p:grpSpPr>
           <a:xfrm rot="0">
-            <a:off x="3965575" y="5453380"/>
+            <a:off x="3965575" y="5307330"/>
             <a:ext cx="203200" cy="215900"/>
             <a:chOff x="8092" y="1237"/>
             <a:chExt cx="482" cy="524"/>
@@ -31484,7 +31484,7 @@
         </p:nvCxnSpPr>
         <p:spPr>
           <a:xfrm flipH="1">
-            <a:off x="12004040" y="5932805"/>
+            <a:off x="12004040" y="5786755"/>
             <a:ext cx="337820" cy="0"/>
           </a:xfrm>
           <a:prstGeom prst="straightConnector1">
@@ -31532,7 +31532,7 @@
         </p:nvCxnSpPr>
         <p:spPr>
           <a:xfrm>
-            <a:off x="11585575" y="5775960"/>
+            <a:off x="11585575" y="5629910"/>
             <a:ext cx="758825" cy="3810"/>
           </a:xfrm>
           <a:prstGeom prst="straightConnector1">
@@ -31578,7 +31578,7 @@
         </p:nvSpPr>
         <p:spPr>
           <a:xfrm>
-            <a:off x="11397615" y="3478530"/>
+            <a:off x="11397615" y="3332480"/>
             <a:ext cx="597535" cy="357505"/>
           </a:xfrm>
           <a:prstGeom prst="flowChartOffpageConnector">
@@ -31697,7 +31697,7 @@
         </p:blipFill>
         <p:spPr>
           <a:xfrm>
-            <a:off x="12344400" y="5057775"/>
+            <a:off x="12344400" y="4911725"/>
             <a:ext cx="1329055" cy="1443355"/>
           </a:xfrm>
           <a:prstGeom prst="rect">
@@ -31723,7 +31723,7 @@
         </p:nvCxnSpPr>
         <p:spPr>
           <a:xfrm rot="10800000">
-            <a:off x="9846945" y="5198110"/>
+            <a:off x="9846945" y="5052060"/>
             <a:ext cx="690880" cy="739140"/>
           </a:xfrm>
           <a:prstGeom prst="bentConnector3">
@@ -31765,7 +31765,7 @@
         </p:nvCxnSpPr>
         <p:spPr>
           <a:xfrm flipV="1">
-            <a:off x="11064875" y="4488180"/>
+            <a:off x="11064875" y="4342130"/>
             <a:ext cx="3175" cy="1073150"/>
           </a:xfrm>
           <a:prstGeom prst="straightConnector1">
@@ -31799,7 +31799,7 @@
         </p:nvGrpSpPr>
         <p:grpSpPr>
           <a:xfrm>
-            <a:off x="1374140" y="4829175"/>
+            <a:off x="1374140" y="4683125"/>
             <a:ext cx="977265" cy="3460750"/>
             <a:chOff x="9380" y="8369"/>
             <a:chExt cx="1539" cy="5450"/>
@@ -31957,7 +31957,7 @@
         </p:nvCxnSpPr>
         <p:spPr>
           <a:xfrm>
-            <a:off x="8723630" y="6398895"/>
+            <a:off x="8723630" y="6252845"/>
             <a:ext cx="3175" cy="441325"/>
           </a:xfrm>
           <a:prstGeom prst="straightConnector1">
@@ -31997,7 +31997,7 @@
         </p:nvGrpSpPr>
         <p:grpSpPr>
           <a:xfrm>
-            <a:off x="8282305" y="5913755"/>
+            <a:off x="8282305" y="5767705"/>
             <a:ext cx="881380" cy="485140"/>
             <a:chOff x="12036" y="7556"/>
             <a:chExt cx="1388" cy="764"/>
@@ -32153,7 +32153,7 @@
         </p:nvSpPr>
         <p:spPr>
           <a:xfrm>
-            <a:off x="8648593" y="6497955"/>
+            <a:off x="8648593" y="6351905"/>
             <a:ext cx="148022" cy="159385"/>
           </a:xfrm>
           <a:prstGeom prst="ellipse">
@@ -32211,7 +32211,7 @@
         </p:nvSpPr>
         <p:spPr>
           <a:xfrm>
-            <a:off x="8649863" y="7424420"/>
+            <a:off x="8649863" y="7278370"/>
             <a:ext cx="148022" cy="159385"/>
           </a:xfrm>
           <a:prstGeom prst="ellipse">
@@ -32269,7 +32269,7 @@
         </p:nvSpPr>
         <p:spPr>
           <a:xfrm>
-            <a:off x="8591078" y="7766904"/>
+            <a:off x="8591078" y="7620854"/>
             <a:ext cx="270897" cy="266897"/>
           </a:xfrm>
           <a:prstGeom prst="ellipse">
@@ -32363,7 +32363,7 @@
         </p:nvSpPr>
         <p:spPr>
           <a:xfrm>
-            <a:off x="3015172" y="2237630"/>
+            <a:off x="3015172" y="2091580"/>
             <a:ext cx="270897" cy="274320"/>
           </a:xfrm>
           <a:prstGeom prst="ellipse">
@@ -32453,7 +32453,7 @@
         </p:nvCxnSpPr>
         <p:spPr>
           <a:xfrm>
-            <a:off x="3150870" y="2512060"/>
+            <a:off x="3150870" y="2366010"/>
             <a:ext cx="2540" cy="188595"/>
           </a:xfrm>
           <a:prstGeom prst="straightConnector1">
@@ -32489,7 +32489,7 @@
         </p:nvCxnSpPr>
         <p:spPr>
           <a:xfrm flipH="1">
-            <a:off x="3136900" y="3058160"/>
+            <a:off x="3136900" y="2912110"/>
             <a:ext cx="16510" cy="554355"/>
           </a:xfrm>
           <a:prstGeom prst="straightConnector1">
@@ -32535,7 +32535,7 @@
         </p:nvSpPr>
         <p:spPr>
           <a:xfrm>
-            <a:off x="2627630" y="3228340"/>
+            <a:off x="2627630" y="3082290"/>
             <a:ext cx="1097280" cy="128905"/>
           </a:xfrm>
           <a:prstGeom prst="rect">
@@ -32577,7 +32577,7 @@
         </p:nvSpPr>
         <p:spPr>
           <a:xfrm>
-            <a:off x="2625725" y="3152140"/>
+            <a:off x="2625725" y="3006090"/>
             <a:ext cx="1097280" cy="128270"/>
           </a:xfrm>
           <a:prstGeom prst="rect">
@@ -32620,7 +32620,7 @@
         </p:nvSpPr>
         <p:spPr>
           <a:xfrm>
-            <a:off x="2625725" y="3300730"/>
+            <a:off x="2625725" y="3154680"/>
             <a:ext cx="1097280" cy="128270"/>
           </a:xfrm>
           <a:prstGeom prst="rect">
@@ -32666,7 +32666,7 @@
         </p:nvCxnSpPr>
         <p:spPr>
           <a:xfrm>
-            <a:off x="2339975" y="3359150"/>
+            <a:off x="2339975" y="3213100"/>
             <a:ext cx="285750" cy="5715"/>
           </a:xfrm>
           <a:prstGeom prst="straightConnector1">
@@ -32712,7 +32712,7 @@
         </p:nvSpPr>
         <p:spPr>
           <a:xfrm>
-            <a:off x="610235" y="3248660"/>
+            <a:off x="610235" y="3102610"/>
             <a:ext cx="438912" cy="219456"/>
           </a:xfrm>
           <a:prstGeom prst="flowChartOffpageConnector">
@@ -32812,7 +32812,7 @@
         </p:nvSpPr>
         <p:spPr>
           <a:xfrm>
-            <a:off x="2854325" y="2700655"/>
+            <a:off x="2854325" y="2554605"/>
             <a:ext cx="597535" cy="357505"/>
           </a:xfrm>
           <a:prstGeom prst="flowChartOffpageConnector">
@@ -32926,7 +32926,7 @@
         </p:nvCxnSpPr>
         <p:spPr>
           <a:xfrm>
-            <a:off x="3136900" y="3975735"/>
+            <a:off x="3136900" y="3829685"/>
             <a:ext cx="3175" cy="347345"/>
           </a:xfrm>
           <a:prstGeom prst="straightConnector1">
@@ -32972,7 +32972,7 @@
         </p:nvSpPr>
         <p:spPr>
           <a:xfrm>
-            <a:off x="2857500" y="4323080"/>
+            <a:off x="2857500" y="4177030"/>
             <a:ext cx="564515" cy="363220"/>
           </a:xfrm>
           <a:prstGeom prst="flowChartDecision">
@@ -33038,7 +33038,7 @@
         </p:nvSpPr>
         <p:spPr>
           <a:xfrm>
-            <a:off x="2854325" y="3612515"/>
+            <a:off x="2854325" y="3466465"/>
             <a:ext cx="564515" cy="363220"/>
           </a:xfrm>
           <a:prstGeom prst="flowChartDecision">
@@ -33104,7 +33104,7 @@
         </p:nvSpPr>
         <p:spPr>
           <a:xfrm>
-            <a:off x="3062782" y="4026666"/>
+            <a:off x="3062782" y="3880616"/>
             <a:ext cx="148022" cy="159452"/>
           </a:xfrm>
           <a:prstGeom prst="ellipse">
@@ -33155,7 +33155,7 @@
         </p:nvCxnSpPr>
         <p:spPr>
           <a:xfrm>
-            <a:off x="1049020" y="3358515"/>
+            <a:off x="1049020" y="3212465"/>
             <a:ext cx="276860" cy="635"/>
           </a:xfrm>
           <a:prstGeom prst="straightConnector1">
@@ -33204,7 +33204,7 @@
         </p:nvCxnSpPr>
         <p:spPr>
           <a:xfrm>
-            <a:off x="3418840" y="3794125"/>
+            <a:off x="3418840" y="3648075"/>
             <a:ext cx="1468120" cy="2540"/>
           </a:xfrm>
           <a:prstGeom prst="straightConnector1">
@@ -33250,7 +33250,7 @@
         </p:nvSpPr>
         <p:spPr>
           <a:xfrm>
-            <a:off x="3535972" y="3714874"/>
+            <a:off x="3535972" y="3568824"/>
             <a:ext cx="148022" cy="159452"/>
           </a:xfrm>
           <a:prstGeom prst="ellipse">
@@ -33300,7 +33300,7 @@
         </p:nvCxnSpPr>
         <p:spPr>
           <a:xfrm rot="16200000">
-            <a:off x="4403725" y="3846195"/>
+            <a:off x="4403725" y="3700145"/>
             <a:ext cx="210185" cy="744855"/>
           </a:xfrm>
           <a:prstGeom prst="bentConnector2">
@@ -33346,7 +33346,7 @@
         </p:nvSpPr>
         <p:spPr>
           <a:xfrm>
-            <a:off x="4565827" y="4033651"/>
+            <a:off x="4565827" y="3887601"/>
             <a:ext cx="148022" cy="159452"/>
           </a:xfrm>
           <a:prstGeom prst="ellipse">
@@ -33396,7 +33396,7 @@
         </p:nvCxnSpPr>
         <p:spPr>
           <a:xfrm>
-            <a:off x="3422015" y="4504690"/>
+            <a:off x="3422015" y="4358640"/>
             <a:ext cx="432435" cy="635"/>
           </a:xfrm>
           <a:prstGeom prst="straightConnector1">
@@ -33442,7 +33442,7 @@
         </p:nvSpPr>
         <p:spPr>
           <a:xfrm>
-            <a:off x="3535972" y="4416556"/>
+            <a:off x="3535972" y="4270506"/>
             <a:ext cx="148022" cy="159452"/>
           </a:xfrm>
           <a:prstGeom prst="ellipse">
@@ -33492,7 +33492,7 @@
         </p:nvCxnSpPr>
         <p:spPr>
           <a:xfrm flipV="1">
-            <a:off x="4418965" y="4504055"/>
+            <a:off x="4418965" y="4358005"/>
             <a:ext cx="490855" cy="1270"/>
           </a:xfrm>
           <a:prstGeom prst="straightConnector1">
@@ -33538,7 +33538,7 @@
         </p:nvSpPr>
         <p:spPr>
           <a:xfrm>
-            <a:off x="4565827" y="4415914"/>
+            <a:off x="4565827" y="4269864"/>
             <a:ext cx="148022" cy="159452"/>
           </a:xfrm>
           <a:prstGeom prst="ellipse">
@@ -33586,7 +33586,7 @@
         </p:nvGrpSpPr>
         <p:grpSpPr>
           <a:xfrm>
-            <a:off x="3853180" y="4323715"/>
+            <a:off x="3853180" y="4177665"/>
             <a:ext cx="567690" cy="363220"/>
             <a:chOff x="6885" y="6776"/>
             <a:chExt cx="894" cy="572"/>
@@ -33692,7 +33692,7 @@
         </p:nvGrpSpPr>
         <p:grpSpPr>
           <a:xfrm>
-            <a:off x="10387330" y="3849370"/>
+            <a:off x="10387330" y="3703320"/>
             <a:ext cx="1220470" cy="638175"/>
             <a:chOff x="16890" y="5259"/>
             <a:chExt cx="1922" cy="1005"/>
@@ -34055,7 +34055,7 @@
         </p:nvSpPr>
         <p:spPr>
           <a:xfrm>
-            <a:off x="11546840" y="4333867"/>
+            <a:off x="11546840" y="4187817"/>
             <a:ext cx="457200" cy="137160"/>
           </a:xfrm>
           <a:prstGeom prst="flowChartTerminator">
@@ -34129,7 +34129,7 @@
         </p:nvGrpSpPr>
         <p:grpSpPr>
           <a:xfrm>
-            <a:off x="10387330" y="5362575"/>
+            <a:off x="10387330" y="5216525"/>
             <a:ext cx="1220470" cy="638175"/>
             <a:chOff x="16890" y="5259"/>
             <a:chExt cx="1922" cy="1005"/>
@@ -34492,7 +34492,7 @@
         </p:nvSpPr>
         <p:spPr>
           <a:xfrm>
-            <a:off x="11546840" y="5864225"/>
+            <a:off x="11546840" y="5718175"/>
             <a:ext cx="457200" cy="137160"/>
           </a:xfrm>
           <a:prstGeom prst="flowChartTerminator">
@@ -34574,7 +34574,7 @@
         </p:blipFill>
         <p:spPr>
           <a:xfrm>
-            <a:off x="1325880" y="2840355"/>
+            <a:off x="1325880" y="2694305"/>
             <a:ext cx="1014095" cy="1036955"/>
           </a:xfrm>
           <a:prstGeom prst="rect">
@@ -34590,7 +34590,7 @@
         </p:nvGrpSpPr>
         <p:grpSpPr>
           <a:xfrm>
-            <a:off x="5251450" y="3259455"/>
+            <a:off x="5251450" y="3113405"/>
             <a:ext cx="1069975" cy="1911350"/>
             <a:chOff x="8270" y="4526"/>
             <a:chExt cx="1685" cy="3010"/>
@@ -34746,7 +34746,7 @@
         </p:nvSpPr>
         <p:spPr>
           <a:xfrm>
-            <a:off x="6229320" y="4612497"/>
+            <a:off x="6229320" y="4466447"/>
             <a:ext cx="518934" cy="128590"/>
           </a:xfrm>
           <a:prstGeom prst="flowChartTerminator">
@@ -34827,7 +34827,7 @@
         </p:nvSpPr>
         <p:spPr>
           <a:xfrm>
-            <a:off x="6229320" y="3615967"/>
+            <a:off x="6229320" y="3469917"/>
             <a:ext cx="518934" cy="128590"/>
           </a:xfrm>
           <a:prstGeom prst="flowChartTerminator">
@@ -34908,7 +34908,7 @@
         </p:nvSpPr>
         <p:spPr>
           <a:xfrm>
-            <a:off x="6229320" y="4011152"/>
+            <a:off x="6229320" y="3865102"/>
             <a:ext cx="518934" cy="128590"/>
           </a:xfrm>
           <a:prstGeom prst="flowChartTerminator">
@@ -34989,7 +34989,7 @@
         </p:nvSpPr>
         <p:spPr>
           <a:xfrm>
-            <a:off x="4887260" y="3732172"/>
+            <a:off x="4887260" y="3586122"/>
             <a:ext cx="518934" cy="128590"/>
           </a:xfrm>
           <a:prstGeom prst="flowChartTerminator">
@@ -35062,7 +35062,7 @@
         </p:nvSpPr>
         <p:spPr>
           <a:xfrm>
-            <a:off x="4882180" y="4049037"/>
+            <a:off x="4882180" y="3902987"/>
             <a:ext cx="518934" cy="128590"/>
           </a:xfrm>
           <a:prstGeom prst="flowChartTerminator">
@@ -35135,7 +35135,7 @@
         </p:nvSpPr>
         <p:spPr>
           <a:xfrm>
-            <a:off x="4910120" y="4439562"/>
+            <a:off x="4910120" y="4293512"/>
             <a:ext cx="518934" cy="128590"/>
           </a:xfrm>
           <a:prstGeom prst="flowChartTerminator">
@@ -35208,7 +35208,7 @@
         </p:nvSpPr>
         <p:spPr>
           <a:xfrm>
-            <a:off x="7705725" y="5277485"/>
+            <a:off x="7705725" y="5131435"/>
             <a:ext cx="544195" cy="128905"/>
           </a:xfrm>
           <a:prstGeom prst="flowChartTerminator">
@@ -35289,7 +35289,7 @@
         </p:nvSpPr>
         <p:spPr>
           <a:xfrm>
-            <a:off x="3181120" y="6472555"/>
+            <a:off x="3181120" y="6326505"/>
             <a:ext cx="664670" cy="488315"/>
           </a:xfrm>
           <a:prstGeom prst="flowChartDecision">
@@ -35360,7 +35360,7 @@
         </p:nvSpPr>
         <p:spPr>
           <a:xfrm>
-            <a:off x="4241800" y="6482715"/>
+            <a:off x="4241800" y="6336665"/>
             <a:ext cx="664845" cy="485140"/>
           </a:xfrm>
           <a:prstGeom prst="flowChartDecision">
@@ -35480,7 +35480,7 @@
         </p:nvSpPr>
         <p:spPr>
           <a:xfrm>
-            <a:off x="5334300" y="6660792"/>
+            <a:off x="5357795" y="6514742"/>
             <a:ext cx="518934" cy="128590"/>
           </a:xfrm>
           <a:prstGeom prst="flowChartTerminator">
@@ -35553,7 +35553,7 @@
         </p:nvSpPr>
         <p:spPr>
           <a:xfrm>
-            <a:off x="5334300" y="7095132"/>
+            <a:off x="5357795" y="6949082"/>
             <a:ext cx="518934" cy="128590"/>
           </a:xfrm>
           <a:prstGeom prst="flowChartTerminator">
@@ -35629,8 +35629,8 @@
         </p:nvCxnSpPr>
         <p:spPr>
           <a:xfrm>
-            <a:off x="4906645" y="6725285"/>
-            <a:ext cx="427355" cy="0"/>
+            <a:off x="4906645" y="6579235"/>
+            <a:ext cx="450850" cy="0"/>
           </a:xfrm>
           <a:prstGeom prst="straightConnector1">
             <a:avLst/>
@@ -35669,7 +35669,7 @@
         </p:nvSpPr>
         <p:spPr>
           <a:xfrm>
-            <a:off x="6237094" y="6811864"/>
+            <a:off x="6237094" y="6665814"/>
             <a:ext cx="270897" cy="266897"/>
           </a:xfrm>
           <a:prstGeom prst="ellipse">
@@ -35763,7 +35763,7 @@
         </p:nvSpPr>
         <p:spPr>
           <a:xfrm>
-            <a:off x="5033135" y="6634376"/>
+            <a:off x="5032500" y="6488326"/>
             <a:ext cx="148022" cy="159452"/>
           </a:xfrm>
           <a:prstGeom prst="ellipse">
@@ -35824,8 +35824,8 @@
         </p:nvCxnSpPr>
         <p:spPr>
           <a:xfrm rot="5400000" flipV="1">
-            <a:off x="4858385" y="6684010"/>
-            <a:ext cx="191770" cy="759460"/>
+            <a:off x="4870133" y="6526213"/>
+            <a:ext cx="191770" cy="782955"/>
           </a:xfrm>
           <a:prstGeom prst="bentConnector2">
             <a:avLst/>
@@ -35864,7 +35864,7 @@
         </p:nvSpPr>
         <p:spPr>
           <a:xfrm>
-            <a:off x="5033135" y="7079450"/>
+            <a:off x="5032500" y="6933400"/>
             <a:ext cx="148022" cy="159452"/>
           </a:xfrm>
           <a:prstGeom prst="ellipse">
@@ -35925,12 +35925,12 @@
         </p:nvCxnSpPr>
         <p:spPr>
           <a:xfrm flipV="1">
-            <a:off x="5852795" y="6944995"/>
-            <a:ext cx="384175" cy="214630"/>
+            <a:off x="5876290" y="6798945"/>
+            <a:ext cx="360680" cy="214630"/>
           </a:xfrm>
           <a:prstGeom prst="bentConnector3">
             <a:avLst>
-              <a:gd name="adj1" fmla="val 50083"/>
+              <a:gd name="adj1" fmla="val 50000"/>
             </a:avLst>
           </a:prstGeom>
           <a:ln>
@@ -35970,12 +35970,12 @@
         </p:nvCxnSpPr>
         <p:spPr>
           <a:xfrm>
-            <a:off x="5852795" y="6725285"/>
-            <a:ext cx="384175" cy="219710"/>
+            <a:off x="5876290" y="6579235"/>
+            <a:ext cx="360680" cy="219710"/>
           </a:xfrm>
           <a:prstGeom prst="bentConnector3">
             <a:avLst>
-              <a:gd name="adj1" fmla="val 50083"/>
+              <a:gd name="adj1" fmla="val 50000"/>
             </a:avLst>
           </a:prstGeom>
           <a:ln>
@@ -36015,7 +36015,7 @@
         </p:nvCxnSpPr>
         <p:spPr>
           <a:xfrm>
-            <a:off x="3846195" y="6717030"/>
+            <a:off x="3846195" y="6570980"/>
             <a:ext cx="395605" cy="8255"/>
           </a:xfrm>
           <a:prstGeom prst="straightConnector1">
@@ -36055,7 +36055,7 @@
         </p:nvSpPr>
         <p:spPr>
           <a:xfrm>
-            <a:off x="3944110" y="6645806"/>
+            <a:off x="3944110" y="6499756"/>
             <a:ext cx="148022" cy="159452"/>
           </a:xfrm>
           <a:prstGeom prst="ellipse">
@@ -36116,7 +36116,7 @@
         </p:nvCxnSpPr>
         <p:spPr>
           <a:xfrm>
-            <a:off x="3517265" y="7887970"/>
+            <a:off x="3517265" y="7741920"/>
             <a:ext cx="0" cy="400685"/>
           </a:xfrm>
           <a:prstGeom prst="straightConnector1">
@@ -36156,7 +36156,7 @@
         </p:nvSpPr>
         <p:spPr>
           <a:xfrm>
-            <a:off x="3184295" y="8288655"/>
+            <a:off x="3184295" y="8142605"/>
             <a:ext cx="664670" cy="488315"/>
           </a:xfrm>
           <a:prstGeom prst="flowChartDecision">
@@ -36259,7 +36259,7 @@
         </p:nvSpPr>
         <p:spPr>
           <a:xfrm>
-            <a:off x="4241800" y="8305800"/>
+            <a:off x="4241800" y="8159750"/>
             <a:ext cx="664845" cy="485140"/>
           </a:xfrm>
           <a:prstGeom prst="flowChartDecision">
@@ -36379,7 +36379,7 @@
         </p:nvSpPr>
         <p:spPr>
           <a:xfrm>
-            <a:off x="5334300" y="8918217"/>
+            <a:off x="5357795" y="8772167"/>
             <a:ext cx="518934" cy="128590"/>
           </a:xfrm>
           <a:prstGeom prst="flowChartTerminator">
@@ -36452,7 +36452,7 @@
         </p:nvSpPr>
         <p:spPr>
           <a:xfrm>
-            <a:off x="6237094" y="8634949"/>
+            <a:off x="6237094" y="8488899"/>
             <a:ext cx="270897" cy="266897"/>
           </a:xfrm>
           <a:prstGeom prst="ellipse">
@@ -36549,8 +36549,8 @@
         </p:nvCxnSpPr>
         <p:spPr>
           <a:xfrm rot="5400000" flipV="1">
-            <a:off x="4858385" y="8507095"/>
-            <a:ext cx="191770" cy="759460"/>
+            <a:off x="4870133" y="8349298"/>
+            <a:ext cx="191770" cy="782955"/>
           </a:xfrm>
           <a:prstGeom prst="bentConnector2">
             <a:avLst/>
@@ -36589,7 +36589,7 @@
         </p:nvSpPr>
         <p:spPr>
           <a:xfrm>
-            <a:off x="5033135" y="8902535"/>
+            <a:off x="5032500" y="8756485"/>
             <a:ext cx="148022" cy="159452"/>
           </a:xfrm>
           <a:prstGeom prst="ellipse">
@@ -36650,12 +36650,12 @@
         </p:nvCxnSpPr>
         <p:spPr>
           <a:xfrm flipV="1">
-            <a:off x="5852795" y="8768080"/>
-            <a:ext cx="384175" cy="214630"/>
+            <a:off x="5876290" y="8622030"/>
+            <a:ext cx="360680" cy="214630"/>
           </a:xfrm>
           <a:prstGeom prst="bentConnector3">
             <a:avLst>
-              <a:gd name="adj1" fmla="val 50083"/>
+              <a:gd name="adj1" fmla="val 50000"/>
             </a:avLst>
           </a:prstGeom>
           <a:ln>
@@ -36695,8 +36695,8 @@
         </p:nvCxnSpPr>
         <p:spPr>
           <a:xfrm flipV="1">
-            <a:off x="4906645" y="8547735"/>
-            <a:ext cx="427355" cy="635"/>
+            <a:off x="4906645" y="8401685"/>
+            <a:ext cx="450850" cy="635"/>
           </a:xfrm>
           <a:prstGeom prst="straightConnector1">
             <a:avLst/>
@@ -36738,7 +36738,7 @@
         </p:nvCxnSpPr>
         <p:spPr>
           <a:xfrm>
-            <a:off x="3849370" y="8533130"/>
+            <a:off x="3849370" y="8387080"/>
             <a:ext cx="392430" cy="15240"/>
           </a:xfrm>
           <a:prstGeom prst="straightConnector1">
@@ -36778,7 +36778,7 @@
         </p:nvSpPr>
         <p:spPr>
           <a:xfrm>
-            <a:off x="3944110" y="8494291"/>
+            <a:off x="3944110" y="8348241"/>
             <a:ext cx="148022" cy="159452"/>
           </a:xfrm>
           <a:prstGeom prst="ellipse">
@@ -36836,7 +36836,7 @@
         </p:nvSpPr>
         <p:spPr>
           <a:xfrm>
-            <a:off x="5033135" y="8457461"/>
+            <a:off x="5032500" y="8311411"/>
             <a:ext cx="148022" cy="159452"/>
           </a:xfrm>
           <a:prstGeom prst="ellipse">
@@ -36897,7 +36897,7 @@
         </p:nvCxnSpPr>
         <p:spPr>
           <a:xfrm rot="5400000">
-            <a:off x="7056755" y="4603750"/>
+            <a:off x="7056755" y="4457700"/>
             <a:ext cx="152400" cy="772795"/>
           </a:xfrm>
           <a:prstGeom prst="bentConnector2">
@@ -36937,7 +36937,7 @@
         </p:nvSpPr>
         <p:spPr>
           <a:xfrm>
-            <a:off x="6892183" y="4979670"/>
+            <a:off x="6892183" y="4833620"/>
             <a:ext cx="148022" cy="159385"/>
           </a:xfrm>
           <a:prstGeom prst="ellipse">
@@ -36995,7 +36995,7 @@
         </p:nvSpPr>
         <p:spPr>
           <a:xfrm>
-            <a:off x="6228050" y="5002387"/>
+            <a:off x="6228050" y="4856337"/>
             <a:ext cx="518934" cy="128590"/>
           </a:xfrm>
           <a:prstGeom prst="flowChartTerminator">
@@ -37076,7 +37076,7 @@
         </p:nvSpPr>
         <p:spPr>
           <a:xfrm>
-            <a:off x="3184295" y="9190355"/>
+            <a:off x="3184295" y="9044305"/>
             <a:ext cx="664670" cy="488315"/>
           </a:xfrm>
           <a:prstGeom prst="flowChartDecision">
@@ -37163,7 +37163,7 @@
         </p:nvSpPr>
         <p:spPr>
           <a:xfrm>
-            <a:off x="6040120" y="9182735"/>
+            <a:off x="6040120" y="9036685"/>
             <a:ext cx="664845" cy="485140"/>
           </a:xfrm>
           <a:prstGeom prst="flowChartDecision">
@@ -37247,7 +37247,7 @@
         </p:nvSpPr>
         <p:spPr>
           <a:xfrm>
-            <a:off x="7161195" y="9360812"/>
+            <a:off x="7171990" y="9214762"/>
             <a:ext cx="518934" cy="128590"/>
           </a:xfrm>
           <a:prstGeom prst="flowChartTerminator">
@@ -37323,8 +37323,8 @@
         </p:nvCxnSpPr>
         <p:spPr>
           <a:xfrm>
-            <a:off x="6704965" y="9425305"/>
-            <a:ext cx="455930" cy="0"/>
+            <a:off x="6704965" y="9279255"/>
+            <a:ext cx="466725" cy="0"/>
           </a:xfrm>
           <a:prstGeom prst="straightConnector1">
             <a:avLst/>
@@ -37363,7 +37363,7 @@
         </p:nvSpPr>
         <p:spPr>
           <a:xfrm>
-            <a:off x="8089428" y="9511884"/>
+            <a:off x="8100223" y="9365834"/>
             <a:ext cx="270897" cy="266897"/>
           </a:xfrm>
           <a:prstGeom prst="ellipse">
@@ -37457,7 +37457,7 @@
         </p:nvSpPr>
         <p:spPr>
           <a:xfrm>
-            <a:off x="6804785" y="9334396"/>
+            <a:off x="6805420" y="9188346"/>
             <a:ext cx="148022" cy="159452"/>
           </a:xfrm>
           <a:prstGeom prst="ellipse">
@@ -37518,12 +37518,12 @@
         </p:nvCxnSpPr>
         <p:spPr>
           <a:xfrm>
-            <a:off x="7679690" y="9425305"/>
+            <a:off x="7690485" y="9279255"/>
             <a:ext cx="409575" cy="219710"/>
           </a:xfrm>
           <a:prstGeom prst="bentConnector3">
             <a:avLst>
-              <a:gd name="adj1" fmla="val 46821"/>
+              <a:gd name="adj1" fmla="val 50078"/>
             </a:avLst>
           </a:prstGeom>
           <a:ln>
@@ -37560,7 +37560,7 @@
         </p:nvSpPr>
         <p:spPr>
           <a:xfrm>
-            <a:off x="4241800" y="9187180"/>
+            <a:off x="4241800" y="9041130"/>
             <a:ext cx="664845" cy="485140"/>
           </a:xfrm>
           <a:prstGeom prst="flowChartDecision">
@@ -37680,7 +37680,7 @@
         </p:nvSpPr>
         <p:spPr>
           <a:xfrm>
-            <a:off x="7135795" y="9799597"/>
+            <a:off x="7171990" y="9653547"/>
             <a:ext cx="518934" cy="128590"/>
           </a:xfrm>
           <a:prstGeom prst="flowChartTerminator">
@@ -37748,15 +37748,12 @@
       <p:cxnSp>
         <p:nvCxnSpPr>
           <p:cNvPr id="354" name="Elbow Connector 353"/>
-          <p:cNvCxnSpPr>
-            <a:stCxn id="351" idx="2"/>
-            <a:endCxn id="352" idx="1"/>
-          </p:cNvCxnSpPr>
+          <p:cNvCxnSpPr/>
           <p:nvPr/>
         </p:nvCxnSpPr>
         <p:spPr>
           <a:xfrm rot="5400000" flipV="1">
-            <a:off x="5759133" y="8487728"/>
+            <a:off x="5759133" y="8341678"/>
             <a:ext cx="191770" cy="2560955"/>
           </a:xfrm>
           <a:prstGeom prst="bentConnector2">
@@ -37796,7 +37793,7 @@
         </p:nvSpPr>
         <p:spPr>
           <a:xfrm>
-            <a:off x="5033135" y="9783915"/>
+            <a:off x="5032500" y="9637865"/>
             <a:ext cx="148022" cy="159452"/>
           </a:xfrm>
           <a:prstGeom prst="ellipse">
@@ -37857,12 +37854,12 @@
         </p:nvCxnSpPr>
         <p:spPr>
           <a:xfrm flipV="1">
-            <a:off x="7654290" y="9645015"/>
-            <a:ext cx="434975" cy="219075"/>
+            <a:off x="7690485" y="9498965"/>
+            <a:ext cx="409575" cy="219075"/>
           </a:xfrm>
           <a:prstGeom prst="bentConnector3">
             <a:avLst>
-              <a:gd name="adj1" fmla="val 50073"/>
+              <a:gd name="adj1" fmla="val 50078"/>
             </a:avLst>
           </a:prstGeom>
           <a:ln>
@@ -37902,8 +37899,8 @@
         </p:nvCxnSpPr>
         <p:spPr>
           <a:xfrm flipV="1">
-            <a:off x="5729605" y="9425305"/>
-            <a:ext cx="310515" cy="3810"/>
+            <a:off x="5753100" y="9279255"/>
+            <a:ext cx="287020" cy="3810"/>
           </a:xfrm>
           <a:prstGeom prst="straightConnector1">
             <a:avLst/>
@@ -37945,7 +37942,7 @@
         </p:nvCxnSpPr>
         <p:spPr>
           <a:xfrm flipV="1">
-            <a:off x="3849370" y="9429750"/>
+            <a:off x="3849370" y="9283700"/>
             <a:ext cx="392430" cy="5080"/>
           </a:xfrm>
           <a:prstGeom prst="straightConnector1">
@@ -37985,7 +37982,7 @@
         </p:nvSpPr>
         <p:spPr>
           <a:xfrm>
-            <a:off x="3944110" y="9350271"/>
+            <a:off x="3944110" y="9204221"/>
             <a:ext cx="148022" cy="159452"/>
           </a:xfrm>
           <a:prstGeom prst="ellipse">
@@ -38043,7 +38040,7 @@
         </p:nvSpPr>
         <p:spPr>
           <a:xfrm>
-            <a:off x="5033135" y="9338841"/>
+            <a:off x="5032500" y="9192791"/>
             <a:ext cx="148022" cy="159452"/>
           </a:xfrm>
           <a:prstGeom prst="ellipse">
@@ -38104,7 +38101,7 @@
         </p:nvCxnSpPr>
         <p:spPr>
           <a:xfrm>
-            <a:off x="3514090" y="6960870"/>
+            <a:off x="3514090" y="6814820"/>
             <a:ext cx="3175" cy="438785"/>
           </a:xfrm>
           <a:prstGeom prst="straightConnector1">
@@ -38144,7 +38141,7 @@
         </p:nvSpPr>
         <p:spPr>
           <a:xfrm>
-            <a:off x="3442619" y="7967345"/>
+            <a:off x="3442619" y="7821295"/>
             <a:ext cx="148022" cy="159385"/>
           </a:xfrm>
           <a:prstGeom prst="ellipse">
@@ -38194,42 +38191,6 @@
           </a:p>
         </p:txBody>
       </p:sp>
-      <p:cxnSp>
-        <p:nvCxnSpPr>
-          <p:cNvPr id="363" name="Straight Arrow Connector 362"/>
-          <p:cNvCxnSpPr>
-            <a:stCxn id="370" idx="1"/>
-            <a:endCxn id="365" idx="2"/>
-          </p:cNvCxnSpPr>
-          <p:nvPr/>
-        </p:nvCxnSpPr>
-        <p:spPr>
-          <a:xfrm flipV="1">
-            <a:off x="3184525" y="10337165"/>
-            <a:ext cx="1254125" cy="5715"/>
-          </a:xfrm>
-          <a:prstGeom prst="straightConnector1">
-            <a:avLst/>
-          </a:prstGeom>
-          <a:ln>
-            <a:tailEnd type="triangle"/>
-          </a:ln>
-        </p:spPr>
-        <p:style>
-          <a:lnRef idx="1">
-            <a:schemeClr val="accent1"/>
-          </a:lnRef>
-          <a:fillRef idx="0">
-            <a:schemeClr val="accent1"/>
-          </a:fillRef>
-          <a:effectRef idx="0">
-            <a:schemeClr val="accent1"/>
-          </a:effectRef>
-          <a:fontRef idx="minor">
-            <a:schemeClr val="tx1"/>
-          </a:fontRef>
-        </p:style>
-      </p:cxnSp>
       <p:sp>
         <p:nvSpPr>
           <p:cNvPr id="364" name="Oval 363"/>
@@ -38238,7 +38199,7 @@
         </p:nvSpPr>
         <p:spPr>
           <a:xfrm>
-            <a:off x="3944110" y="10261496"/>
+            <a:off x="3944110" y="10115446"/>
             <a:ext cx="148022" cy="159452"/>
           </a:xfrm>
           <a:prstGeom prst="ellipse">
@@ -38288,100 +38249,6 @@
           </a:p>
         </p:txBody>
       </p:sp>
-      <p:sp>
-        <p:nvSpPr>
-          <p:cNvPr id="365" name="Oval 364"/>
-          <p:cNvSpPr/>
-          <p:nvPr/>
-        </p:nvSpPr>
-        <p:spPr>
-          <a:xfrm>
-            <a:off x="4438774" y="10203884"/>
-            <a:ext cx="270897" cy="266897"/>
-          </a:xfrm>
-          <a:prstGeom prst="ellipse">
-            <a:avLst/>
-          </a:prstGeom>
-          <a:solidFill>
-            <a:schemeClr val="accent1">
-              <a:lumMod val="60000"/>
-              <a:lumOff val="40000"/>
-            </a:schemeClr>
-          </a:solidFill>
-          <a:effectLst>
-            <a:outerShdw blurRad="50800" dist="38100" dir="8100000" algn="tr" rotWithShape="0">
-              <a:prstClr val="black">
-                <a:alpha val="40000"/>
-              </a:prstClr>
-            </a:outerShdw>
-          </a:effectLst>
-        </p:spPr>
-        <p:style>
-          <a:lnRef idx="2">
-            <a:schemeClr val="accent1">
-              <a:shade val="50000"/>
-            </a:schemeClr>
-          </a:lnRef>
-          <a:fillRef idx="1">
-            <a:schemeClr val="accent1"/>
-          </a:fillRef>
-          <a:effectRef idx="0">
-            <a:schemeClr val="accent1"/>
-          </a:effectRef>
-          <a:fontRef idx="minor">
-            <a:schemeClr val="lt1"/>
-          </a:fontRef>
-        </p:style>
-        <p:txBody>
-          <a:bodyPr vertOverflow="overflow" horzOverflow="overflow" vert="horz" wrap="square" numCol="1" spcCol="0" rtlCol="0" fromWordArt="0" anchor="ctr" anchorCtr="0" forceAA="0" compatLnSpc="1">
-            <a:noAutofit/>
-            <a:scene3d>
-              <a:camera prst="orthographicFront"/>
-              <a:lightRig rig="threePt" dir="t"/>
-            </a:scene3d>
-          </a:bodyPr>
-          <a:p>
-            <a:pPr lvl="0" algn="ctr">
-              <a:buClrTx/>
-              <a:buSzTx/>
-              <a:buFontTx/>
-            </a:pPr>
-            <a:r>
-              <a:rPr lang="en-US" sz="1080">
-                <a:solidFill>
-                  <a:schemeClr val="accent1">
-                    <a:lumMod val="50000"/>
-                  </a:schemeClr>
-                </a:solidFill>
-                <a:effectLst>
-                  <a:outerShdw blurRad="38100" dist="25400" dir="5400000" algn="ctr" rotWithShape="0">
-                    <a:srgbClr val="6E747A">
-                      <a:alpha val="43000"/>
-                    </a:srgbClr>
-                  </a:outerShdw>
-                </a:effectLst>
-                <a:sym typeface="+mn-ea"/>
-              </a:rPr>
-              <a:t>P</a:t>
-            </a:r>
-            <a:endParaRPr lang="en-US" sz="1080">
-              <a:solidFill>
-                <a:schemeClr val="accent1">
-                  <a:lumMod val="50000"/>
-                </a:schemeClr>
-              </a:solidFill>
-              <a:effectLst>
-                <a:outerShdw blurRad="38100" dist="25400" dir="5400000" algn="ctr" rotWithShape="0">
-                  <a:srgbClr val="6E747A">
-                    <a:alpha val="43000"/>
-                  </a:srgbClr>
-                </a:outerShdw>
-              </a:effectLst>
-              <a:sym typeface="+mn-ea"/>
-            </a:endParaRPr>
-          </a:p>
-        </p:txBody>
-      </p:sp>
       <p:cxnSp>
         <p:nvCxnSpPr>
           <p:cNvPr id="366" name="Straight Arrow Connector 365"/>
@@ -38393,7 +38260,7 @@
         </p:nvCxnSpPr>
         <p:spPr>
           <a:xfrm>
-            <a:off x="3849370" y="7644130"/>
+            <a:off x="3849370" y="7498080"/>
             <a:ext cx="577215" cy="1905"/>
           </a:xfrm>
           <a:prstGeom prst="straightConnector1">
@@ -38426,7 +38293,7 @@
         </p:nvSpPr>
         <p:spPr>
           <a:xfrm>
-            <a:off x="3932045" y="7560206"/>
+            <a:off x="3932045" y="7414156"/>
             <a:ext cx="148022" cy="159452"/>
           </a:xfrm>
           <a:prstGeom prst="ellipse">
@@ -38484,7 +38351,7 @@
         </p:nvSpPr>
         <p:spPr>
           <a:xfrm>
-            <a:off x="4426709" y="7512754"/>
+            <a:off x="4426709" y="7366704"/>
             <a:ext cx="270897" cy="266897"/>
           </a:xfrm>
           <a:prstGeom prst="ellipse">
@@ -38578,7 +38445,7 @@
         </p:nvSpPr>
         <p:spPr>
           <a:xfrm>
-            <a:off x="3184295" y="7399655"/>
+            <a:off x="3184295" y="7253605"/>
             <a:ext cx="664670" cy="488315"/>
           </a:xfrm>
           <a:prstGeom prst="flowChartDecision">
@@ -38643,7 +38510,7 @@
         </p:nvSpPr>
         <p:spPr>
           <a:xfrm>
-            <a:off x="3184295" y="10098405"/>
+            <a:off x="3184295" y="9952355"/>
             <a:ext cx="664670" cy="488315"/>
           </a:xfrm>
           <a:prstGeom prst="flowChartDecision">
@@ -38730,7 +38597,7 @@
         </p:nvSpPr>
         <p:spPr>
           <a:xfrm>
-            <a:off x="3239770" y="7562850"/>
+            <a:off x="3239770" y="7416800"/>
             <a:ext cx="553720" cy="173990"/>
           </a:xfrm>
           <a:prstGeom prst="rect">
@@ -38780,7 +38647,7 @@
         </p:nvCxnSpPr>
         <p:spPr>
           <a:xfrm>
-            <a:off x="3517265" y="9678670"/>
+            <a:off x="3517265" y="9532620"/>
             <a:ext cx="0" cy="419735"/>
           </a:xfrm>
           <a:prstGeom prst="straightConnector1">
@@ -38820,7 +38687,7 @@
         </p:nvSpPr>
         <p:spPr>
           <a:xfrm>
-            <a:off x="3452144" y="9783445"/>
+            <a:off x="3452144" y="9637395"/>
             <a:ext cx="148022" cy="159385"/>
           </a:xfrm>
           <a:prstGeom prst="ellipse">
@@ -38878,7 +38745,7 @@
         </p:nvSpPr>
         <p:spPr>
           <a:xfrm>
-            <a:off x="3442619" y="7078345"/>
+            <a:off x="3442619" y="6932295"/>
             <a:ext cx="148022" cy="159385"/>
           </a:xfrm>
           <a:prstGeom prst="ellipse">
@@ -38936,7 +38803,7 @@
         </p:nvSpPr>
         <p:spPr>
           <a:xfrm>
-            <a:off x="5334300" y="8483242"/>
+            <a:off x="5357795" y="8337192"/>
             <a:ext cx="518934" cy="128590"/>
           </a:xfrm>
           <a:prstGeom prst="flowChartTerminator">
@@ -39012,12 +38879,12 @@
         </p:nvCxnSpPr>
         <p:spPr>
           <a:xfrm>
-            <a:off x="5852795" y="8547735"/>
-            <a:ext cx="384175" cy="220345"/>
+            <a:off x="5876290" y="8401685"/>
+            <a:ext cx="360680" cy="220345"/>
           </a:xfrm>
           <a:prstGeom prst="bentConnector3">
             <a:avLst>
-              <a:gd name="adj1" fmla="val 50083"/>
+              <a:gd name="adj1" fmla="val 50000"/>
             </a:avLst>
           </a:prstGeom>
           <a:ln>
@@ -39054,7 +38921,7 @@
         </p:nvSpPr>
         <p:spPr>
           <a:xfrm>
-            <a:off x="3236595" y="6626860"/>
+            <a:off x="3236595" y="6480810"/>
             <a:ext cx="553720" cy="173990"/>
           </a:xfrm>
           <a:prstGeom prst="rect">
@@ -39101,6 +38968,1175 @@
                   </a:srgbClr>
                 </a:outerShdw>
               </a:effectLst>
+              <a:sym typeface="+mn-ea"/>
+            </a:endParaRPr>
+          </a:p>
+        </p:txBody>
+      </p:sp>
+      <p:sp>
+        <p:nvSpPr>
+          <p:cNvPr id="5" name="Oval 4"/>
+          <p:cNvSpPr/>
+          <p:nvPr/>
+        </p:nvSpPr>
+        <p:spPr>
+          <a:xfrm>
+            <a:off x="5481813" y="10483284"/>
+            <a:ext cx="270897" cy="266897"/>
+          </a:xfrm>
+          <a:prstGeom prst="ellipse">
+            <a:avLst/>
+          </a:prstGeom>
+          <a:solidFill>
+            <a:schemeClr val="accent1">
+              <a:lumMod val="60000"/>
+              <a:lumOff val="40000"/>
+            </a:schemeClr>
+          </a:solidFill>
+          <a:effectLst>
+            <a:outerShdw blurRad="50800" dist="38100" dir="8100000" algn="tr" rotWithShape="0">
+              <a:prstClr val="black">
+                <a:alpha val="40000"/>
+              </a:prstClr>
+            </a:outerShdw>
+          </a:effectLst>
+        </p:spPr>
+        <p:style>
+          <a:lnRef idx="2">
+            <a:schemeClr val="accent1">
+              <a:shade val="50000"/>
+            </a:schemeClr>
+          </a:lnRef>
+          <a:fillRef idx="1">
+            <a:schemeClr val="accent1"/>
+          </a:fillRef>
+          <a:effectRef idx="0">
+            <a:schemeClr val="accent1"/>
+          </a:effectRef>
+          <a:fontRef idx="minor">
+            <a:schemeClr val="lt1"/>
+          </a:fontRef>
+        </p:style>
+        <p:txBody>
+          <a:bodyPr vertOverflow="overflow" horzOverflow="overflow" vert="horz" wrap="square" numCol="1" spcCol="0" rtlCol="0" fromWordArt="0" anchor="ctr" anchorCtr="0" forceAA="0" compatLnSpc="1">
+            <a:noAutofit/>
+            <a:scene3d>
+              <a:camera prst="orthographicFront"/>
+              <a:lightRig rig="threePt" dir="t"/>
+            </a:scene3d>
+          </a:bodyPr>
+          <a:p>
+            <a:pPr lvl="0" algn="ctr">
+              <a:buClrTx/>
+              <a:buSzTx/>
+              <a:buFontTx/>
+            </a:pPr>
+            <a:r>
+              <a:rPr lang="en-US" sz="1080">
+                <a:solidFill>
+                  <a:schemeClr val="accent1">
+                    <a:lumMod val="50000"/>
+                  </a:schemeClr>
+                </a:solidFill>
+                <a:effectLst>
+                  <a:outerShdw blurRad="38100" dist="25400" dir="5400000" algn="ctr" rotWithShape="0">
+                    <a:srgbClr val="6E747A">
+                      <a:alpha val="43000"/>
+                    </a:srgbClr>
+                  </a:outerShdw>
+                </a:effectLst>
+                <a:sym typeface="+mn-ea"/>
+              </a:rPr>
+              <a:t>P</a:t>
+            </a:r>
+            <a:endParaRPr lang="en-US" sz="1080">
+              <a:solidFill>
+                <a:schemeClr val="accent1">
+                  <a:lumMod val="50000"/>
+                </a:schemeClr>
+              </a:solidFill>
+              <a:effectLst>
+                <a:outerShdw blurRad="38100" dist="25400" dir="5400000" algn="ctr" rotWithShape="0">
+                  <a:srgbClr val="6E747A">
+                    <a:alpha val="43000"/>
+                  </a:srgbClr>
+                </a:outerShdw>
+              </a:effectLst>
+              <a:sym typeface="+mn-ea"/>
+            </a:endParaRPr>
+          </a:p>
+        </p:txBody>
+      </p:sp>
+      <p:sp>
+        <p:nvSpPr>
+          <p:cNvPr id="6" name="Flowchart: Decision 5"/>
+          <p:cNvSpPr/>
+          <p:nvPr/>
+        </p:nvSpPr>
+        <p:spPr>
+          <a:xfrm>
+            <a:off x="6040120" y="9951085"/>
+            <a:ext cx="664845" cy="485140"/>
+          </a:xfrm>
+          <a:prstGeom prst="flowChartDecision">
+            <a:avLst/>
+          </a:prstGeom>
+          <a:effectLst>
+            <a:outerShdw blurRad="50800" dist="38100" dir="8100000" algn="tr" rotWithShape="0">
+              <a:prstClr val="black">
+                <a:alpha val="40000"/>
+              </a:prstClr>
+            </a:outerShdw>
+          </a:effectLst>
+        </p:spPr>
+        <p:style>
+          <a:lnRef idx="2">
+            <a:schemeClr val="accent5">
+              <a:shade val="50000"/>
+            </a:schemeClr>
+          </a:lnRef>
+          <a:fillRef idx="1">
+            <a:schemeClr val="accent5"/>
+          </a:fillRef>
+          <a:effectRef idx="0">
+            <a:schemeClr val="accent5"/>
+          </a:effectRef>
+          <a:fontRef idx="minor">
+            <a:schemeClr val="lt1"/>
+          </a:fontRef>
+        </p:style>
+        <p:txBody>
+          <a:bodyPr vertOverflow="overflow" horzOverflow="overflow" vert="horz" wrap="square" lIns="0" rIns="0" numCol="1" spcCol="0" rtlCol="0" fromWordArt="0" anchor="ctr" anchorCtr="0" forceAA="0" compatLnSpc="1">
+            <a:noAutofit/>
+            <a:scene3d>
+              <a:camera prst="orthographicFront"/>
+              <a:lightRig rig="threePt" dir="t"/>
+            </a:scene3d>
+          </a:bodyPr>
+          <a:p>
+            <a:pPr lvl="0" algn="ctr">
+              <a:buClrTx/>
+              <a:buSzTx/>
+              <a:buFontTx/>
+            </a:pPr>
+            <a:r>
+              <a:rPr lang="en-US" sz="540">
+                <a:solidFill>
+                  <a:schemeClr val="tx1"/>
+                </a:solidFill>
+                <a:effectLst>
+                  <a:outerShdw blurRad="38100" dist="25400" dir="5400000" algn="ctr" rotWithShape="0">
+                    <a:srgbClr val="6E747A">
+                      <a:alpha val="43000"/>
+                    </a:srgbClr>
+                  </a:outerShdw>
+                </a:effectLst>
+                <a:sym typeface="+mn-ea"/>
+              </a:rPr>
+              <a:t>request</a:t>
+            </a:r>
+            <a:endParaRPr lang="en-US" sz="540">
+              <a:solidFill>
+                <a:schemeClr val="tx1"/>
+              </a:solidFill>
+              <a:effectLst>
+                <a:outerShdw blurRad="38100" dist="25400" dir="5400000" algn="ctr" rotWithShape="0">
+                  <a:srgbClr val="6E747A">
+                    <a:alpha val="43000"/>
+                  </a:srgbClr>
+                </a:outerShdw>
+              </a:effectLst>
+              <a:sym typeface="+mn-ea"/>
+            </a:endParaRPr>
+          </a:p>
+          <a:p>
+            <a:pPr lvl="0" algn="ctr">
+              <a:buClrTx/>
+              <a:buSzTx/>
+              <a:buFontTx/>
+            </a:pPr>
+            <a:r>
+              <a:rPr lang="en-US" sz="540">
+                <a:solidFill>
+                  <a:schemeClr val="tx1"/>
+                </a:solidFill>
+                <a:effectLst>
+                  <a:outerShdw blurRad="38100" dist="25400" dir="5400000" algn="ctr" rotWithShape="0">
+                    <a:srgbClr val="6E747A">
+                      <a:alpha val="43000"/>
+                    </a:srgbClr>
+                  </a:outerShdw>
+                </a:effectLst>
+                <a:sym typeface="+mn-ea"/>
+              </a:rPr>
+              <a:t>open?</a:t>
+            </a:r>
+            <a:endParaRPr lang="en-US" sz="540">
+              <a:solidFill>
+                <a:schemeClr val="tx1"/>
+              </a:solidFill>
+              <a:effectLst>
+                <a:outerShdw blurRad="38100" dist="25400" dir="5400000" algn="ctr" rotWithShape="0">
+                  <a:srgbClr val="6E747A">
+                    <a:alpha val="43000"/>
+                  </a:srgbClr>
+                </a:outerShdw>
+              </a:effectLst>
+              <a:sym typeface="+mn-ea"/>
+            </a:endParaRPr>
+          </a:p>
+        </p:txBody>
+      </p:sp>
+      <p:sp>
+        <p:nvSpPr>
+          <p:cNvPr id="7" name="Flowchart: Terminator 6"/>
+          <p:cNvSpPr/>
+          <p:nvPr/>
+        </p:nvSpPr>
+        <p:spPr>
+          <a:xfrm>
+            <a:off x="7171990" y="10129162"/>
+            <a:ext cx="518934" cy="128590"/>
+          </a:xfrm>
+          <a:prstGeom prst="flowChartTerminator">
+            <a:avLst/>
+          </a:prstGeom>
+          <a:solidFill>
+            <a:schemeClr val="accent6">
+              <a:lumMod val="40000"/>
+              <a:lumOff val="60000"/>
+            </a:schemeClr>
+          </a:solidFill>
+          <a:ln>
+            <a:solidFill>
+              <a:schemeClr val="accent6"/>
+            </a:solidFill>
+          </a:ln>
+          <a:effectLst>
+            <a:outerShdw blurRad="50800" dist="38100" dir="8100000" algn="tr" rotWithShape="0">
+              <a:prstClr val="black">
+                <a:alpha val="40000"/>
+              </a:prstClr>
+            </a:outerShdw>
+          </a:effectLst>
+        </p:spPr>
+        <p:style>
+          <a:lnRef idx="3">
+            <a:schemeClr val="lt1"/>
+          </a:lnRef>
+          <a:fillRef idx="1">
+            <a:schemeClr val="accent6"/>
+          </a:fillRef>
+          <a:effectRef idx="1">
+            <a:schemeClr val="accent6"/>
+          </a:effectRef>
+          <a:fontRef idx="minor">
+            <a:schemeClr val="lt1"/>
+          </a:fontRef>
+        </p:style>
+        <p:txBody>
+          <a:bodyPr rtlCol="0" anchor="ctr"/>
+          <a:p>
+            <a:pPr algn="ctr"/>
+            <a:r>
+              <a:rPr lang="en-US" sz="450" b="1">
+                <a:solidFill>
+                  <a:schemeClr val="tx1">
+                    <a:lumMod val="75000"/>
+                    <a:lumOff val="25000"/>
+                  </a:schemeClr>
+                </a:solidFill>
+              </a:rPr>
+              <a:t>queued</a:t>
+            </a:r>
+            <a:endParaRPr lang="en-US" sz="450" b="1">
+              <a:solidFill>
+                <a:schemeClr val="tx1">
+                  <a:lumMod val="75000"/>
+                  <a:lumOff val="25000"/>
+                </a:schemeClr>
+              </a:solidFill>
+            </a:endParaRPr>
+          </a:p>
+        </p:txBody>
+      </p:sp>
+      <p:cxnSp>
+        <p:nvCxnSpPr>
+          <p:cNvPr id="9" name="Straight Arrow Connector 8"/>
+          <p:cNvCxnSpPr>
+            <a:stCxn id="6" idx="3"/>
+            <a:endCxn id="7" idx="1"/>
+          </p:cNvCxnSpPr>
+          <p:nvPr/>
+        </p:nvCxnSpPr>
+        <p:spPr>
+          <a:xfrm>
+            <a:off x="6704965" y="10193655"/>
+            <a:ext cx="466725" cy="0"/>
+          </a:xfrm>
+          <a:prstGeom prst="straightConnector1">
+            <a:avLst/>
+          </a:prstGeom>
+          <a:ln>
+            <a:tailEnd type="triangle"/>
+          </a:ln>
+          <a:effectLst>
+            <a:outerShdw blurRad="50800" dist="38100" dir="8100000" algn="tr" rotWithShape="0">
+              <a:prstClr val="black">
+                <a:alpha val="40000"/>
+              </a:prstClr>
+            </a:outerShdw>
+          </a:effectLst>
+        </p:spPr>
+        <p:style>
+          <a:lnRef idx="1">
+            <a:schemeClr val="accent1"/>
+          </a:lnRef>
+          <a:fillRef idx="0">
+            <a:schemeClr val="accent1"/>
+          </a:fillRef>
+          <a:effectRef idx="0">
+            <a:schemeClr val="accent1"/>
+          </a:effectRef>
+          <a:fontRef idx="minor">
+            <a:schemeClr val="tx1"/>
+          </a:fontRef>
+        </p:style>
+      </p:cxnSp>
+      <p:sp>
+        <p:nvSpPr>
+          <p:cNvPr id="10" name="Oval 9"/>
+          <p:cNvSpPr/>
+          <p:nvPr/>
+        </p:nvSpPr>
+        <p:spPr>
+          <a:xfrm>
+            <a:off x="8100223" y="10280234"/>
+            <a:ext cx="270897" cy="266897"/>
+          </a:xfrm>
+          <a:prstGeom prst="ellipse">
+            <a:avLst/>
+          </a:prstGeom>
+          <a:solidFill>
+            <a:schemeClr val="accent1">
+              <a:lumMod val="60000"/>
+              <a:lumOff val="40000"/>
+            </a:schemeClr>
+          </a:solidFill>
+          <a:effectLst>
+            <a:outerShdw blurRad="50800" dist="38100" dir="8100000" algn="tr" rotWithShape="0">
+              <a:prstClr val="black">
+                <a:alpha val="40000"/>
+              </a:prstClr>
+            </a:outerShdw>
+          </a:effectLst>
+        </p:spPr>
+        <p:style>
+          <a:lnRef idx="2">
+            <a:schemeClr val="accent1">
+              <a:shade val="50000"/>
+            </a:schemeClr>
+          </a:lnRef>
+          <a:fillRef idx="1">
+            <a:schemeClr val="accent1"/>
+          </a:fillRef>
+          <a:effectRef idx="0">
+            <a:schemeClr val="accent1"/>
+          </a:effectRef>
+          <a:fontRef idx="minor">
+            <a:schemeClr val="lt1"/>
+          </a:fontRef>
+        </p:style>
+        <p:txBody>
+          <a:bodyPr vertOverflow="overflow" horzOverflow="overflow" vert="horz" wrap="square" numCol="1" spcCol="0" rtlCol="0" fromWordArt="0" anchor="ctr" anchorCtr="0" forceAA="0" compatLnSpc="1">
+            <a:noAutofit/>
+            <a:scene3d>
+              <a:camera prst="orthographicFront"/>
+              <a:lightRig rig="threePt" dir="t"/>
+            </a:scene3d>
+          </a:bodyPr>
+          <a:p>
+            <a:pPr lvl="0" algn="ctr">
+              <a:buClrTx/>
+              <a:buSzTx/>
+              <a:buFontTx/>
+            </a:pPr>
+            <a:r>
+              <a:rPr lang="en-US" sz="1080">
+                <a:solidFill>
+                  <a:schemeClr val="accent1">
+                    <a:lumMod val="50000"/>
+                  </a:schemeClr>
+                </a:solidFill>
+                <a:effectLst>
+                  <a:outerShdw blurRad="38100" dist="25400" dir="5400000" algn="ctr" rotWithShape="0">
+                    <a:srgbClr val="6E747A">
+                      <a:alpha val="43000"/>
+                    </a:srgbClr>
+                  </a:outerShdw>
+                </a:effectLst>
+                <a:sym typeface="+mn-ea"/>
+              </a:rPr>
+              <a:t>S</a:t>
+            </a:r>
+            <a:endParaRPr lang="en-US" sz="1080">
+              <a:solidFill>
+                <a:schemeClr val="accent1">
+                  <a:lumMod val="50000"/>
+                </a:schemeClr>
+              </a:solidFill>
+              <a:effectLst>
+                <a:outerShdw blurRad="38100" dist="25400" dir="5400000" algn="ctr" rotWithShape="0">
+                  <a:srgbClr val="6E747A">
+                    <a:alpha val="43000"/>
+                  </a:srgbClr>
+                </a:outerShdw>
+              </a:effectLst>
+              <a:sym typeface="+mn-ea"/>
+            </a:endParaRPr>
+          </a:p>
+        </p:txBody>
+      </p:sp>
+      <p:sp>
+        <p:nvSpPr>
+          <p:cNvPr id="11" name="Oval 10"/>
+          <p:cNvSpPr/>
+          <p:nvPr/>
+        </p:nvSpPr>
+        <p:spPr>
+          <a:xfrm>
+            <a:off x="6805420" y="10102746"/>
+            <a:ext cx="148022" cy="159452"/>
+          </a:xfrm>
+          <a:prstGeom prst="ellipse">
+            <a:avLst/>
+          </a:prstGeom>
+          <a:effectLst>
+            <a:outerShdw blurRad="50800" dist="38100" dir="8100000" algn="tr" rotWithShape="0">
+              <a:prstClr val="black">
+                <a:alpha val="40000"/>
+              </a:prstClr>
+            </a:outerShdw>
+          </a:effectLst>
+        </p:spPr>
+        <p:style>
+          <a:lnRef idx="1">
+            <a:schemeClr val="accent2"/>
+          </a:lnRef>
+          <a:fillRef idx="2">
+            <a:schemeClr val="accent2"/>
+          </a:fillRef>
+          <a:effectRef idx="1">
+            <a:schemeClr val="accent2"/>
+          </a:effectRef>
+          <a:fontRef idx="minor">
+            <a:schemeClr val="dk1"/>
+          </a:fontRef>
+        </p:style>
+        <p:txBody>
+          <a:bodyPr vertOverflow="overflow" horzOverflow="overflow" vert="horz" wrap="square" numCol="1" spcCol="0" rtlCol="0" fromWordArt="0" anchor="ctr" anchorCtr="0" forceAA="0" compatLnSpc="1">
+            <a:noAutofit/>
+          </a:bodyPr>
+          <a:p>
+            <a:pPr lvl="0" algn="ctr">
+              <a:buClrTx/>
+              <a:buSzTx/>
+              <a:buFontTx/>
+            </a:pPr>
+            <a:r>
+              <a:rPr lang="en-US" sz="630">
+                <a:sym typeface="+mn-ea"/>
+              </a:rPr>
+              <a:t>y</a:t>
+            </a:r>
+            <a:endParaRPr lang="en-US" sz="630">
+              <a:sym typeface="+mn-ea"/>
+            </a:endParaRPr>
+          </a:p>
+        </p:txBody>
+      </p:sp>
+      <p:cxnSp>
+        <p:nvCxnSpPr>
+          <p:cNvPr id="16" name="Elbow Connector 15"/>
+          <p:cNvCxnSpPr>
+            <a:stCxn id="7" idx="3"/>
+            <a:endCxn id="10" idx="2"/>
+          </p:cNvCxnSpPr>
+          <p:nvPr/>
+        </p:nvCxnSpPr>
+        <p:spPr>
+          <a:xfrm>
+            <a:off x="7690485" y="10193655"/>
+            <a:ext cx="409575" cy="219710"/>
+          </a:xfrm>
+          <a:prstGeom prst="bentConnector3">
+            <a:avLst>
+              <a:gd name="adj1" fmla="val 50078"/>
+            </a:avLst>
+          </a:prstGeom>
+          <a:ln>
+            <a:tailEnd type="triangle"/>
+          </a:ln>
+          <a:effectLst>
+            <a:outerShdw blurRad="50800" dist="38100" dir="8100000" algn="tr" rotWithShape="0">
+              <a:prstClr val="black">
+                <a:alpha val="40000"/>
+              </a:prstClr>
+            </a:outerShdw>
+          </a:effectLst>
+        </p:spPr>
+        <p:style>
+          <a:lnRef idx="1">
+            <a:schemeClr val="accent1"/>
+          </a:lnRef>
+          <a:fillRef idx="0">
+            <a:schemeClr val="accent1"/>
+          </a:fillRef>
+          <a:effectRef idx="0">
+            <a:schemeClr val="accent1"/>
+          </a:effectRef>
+          <a:fontRef idx="minor">
+            <a:schemeClr val="tx1"/>
+          </a:fontRef>
+        </p:style>
+      </p:cxnSp>
+      <p:sp>
+        <p:nvSpPr>
+          <p:cNvPr id="18" name="Flowchart: Decision 17"/>
+          <p:cNvSpPr/>
+          <p:nvPr/>
+        </p:nvSpPr>
+        <p:spPr>
+          <a:xfrm>
+            <a:off x="4244975" y="9955530"/>
+            <a:ext cx="664845" cy="485140"/>
+          </a:xfrm>
+          <a:prstGeom prst="flowChartDecision">
+            <a:avLst/>
+          </a:prstGeom>
+          <a:effectLst>
+            <a:outerShdw blurRad="50800" dist="38100" dir="8100000" algn="tr" rotWithShape="0">
+              <a:prstClr val="black">
+                <a:alpha val="40000"/>
+              </a:prstClr>
+            </a:outerShdw>
+          </a:effectLst>
+        </p:spPr>
+        <p:style>
+          <a:lnRef idx="2">
+            <a:schemeClr val="accent5">
+              <a:shade val="50000"/>
+            </a:schemeClr>
+          </a:lnRef>
+          <a:fillRef idx="1">
+            <a:schemeClr val="accent5"/>
+          </a:fillRef>
+          <a:effectRef idx="0">
+            <a:schemeClr val="accent5"/>
+          </a:effectRef>
+          <a:fontRef idx="minor">
+            <a:schemeClr val="lt1"/>
+          </a:fontRef>
+        </p:style>
+        <p:txBody>
+          <a:bodyPr vertOverflow="overflow" horzOverflow="overflow" vert="horz" wrap="square" lIns="0" rIns="0" numCol="1" spcCol="0" rtlCol="0" fromWordArt="0" anchor="ctr" anchorCtr="0" forceAA="0" compatLnSpc="1">
+            <a:noAutofit/>
+            <a:scene3d>
+              <a:camera prst="orthographicFront"/>
+              <a:lightRig rig="threePt" dir="t"/>
+            </a:scene3d>
+          </a:bodyPr>
+          <a:p>
+            <a:pPr lvl="0" algn="ctr">
+              <a:buClrTx/>
+              <a:buSzTx/>
+              <a:buFontTx/>
+            </a:pPr>
+            <a:r>
+              <a:rPr lang="en-US" sz="540">
+                <a:solidFill>
+                  <a:schemeClr val="tx1"/>
+                </a:solidFill>
+                <a:effectLst>
+                  <a:outerShdw blurRad="38100" dist="25400" dir="5400000" algn="ctr" rotWithShape="0">
+                    <a:srgbClr val="6E747A">
+                      <a:alpha val="43000"/>
+                    </a:srgbClr>
+                  </a:outerShdw>
+                </a:effectLst>
+                <a:sym typeface="+mn-ea"/>
+              </a:rPr>
+              <a:t>position</a:t>
+            </a:r>
+            <a:endParaRPr lang="en-US" sz="540">
+              <a:solidFill>
+                <a:schemeClr val="tx1"/>
+              </a:solidFill>
+              <a:effectLst>
+                <a:outerShdw blurRad="38100" dist="25400" dir="5400000" algn="ctr" rotWithShape="0">
+                  <a:srgbClr val="6E747A">
+                    <a:alpha val="43000"/>
+                  </a:srgbClr>
+                </a:outerShdw>
+              </a:effectLst>
+              <a:sym typeface="+mn-ea"/>
+            </a:endParaRPr>
+          </a:p>
+          <a:p>
+            <a:pPr lvl="0" algn="ctr">
+              <a:buClrTx/>
+              <a:buSzTx/>
+              <a:buFontTx/>
+            </a:pPr>
+            <a:r>
+              <a:rPr lang="en-US" sz="540">
+                <a:solidFill>
+                  <a:schemeClr val="tx1"/>
+                </a:solidFill>
+                <a:effectLst>
+                  <a:outerShdw blurRad="38100" dist="25400" dir="5400000" algn="ctr" rotWithShape="0">
+                    <a:srgbClr val="6E747A">
+                      <a:alpha val="43000"/>
+                    </a:srgbClr>
+                  </a:outerShdw>
+                </a:effectLst>
+                <a:sym typeface="+mn-ea"/>
+              </a:rPr>
+              <a:t>open?</a:t>
+            </a:r>
+            <a:endParaRPr lang="en-US" sz="540">
+              <a:solidFill>
+                <a:schemeClr val="tx1"/>
+              </a:solidFill>
+              <a:effectLst>
+                <a:outerShdw blurRad="38100" dist="25400" dir="5400000" algn="ctr" rotWithShape="0">
+                  <a:srgbClr val="6E747A">
+                    <a:alpha val="43000"/>
+                  </a:srgbClr>
+                </a:outerShdw>
+              </a:effectLst>
+              <a:sym typeface="+mn-ea"/>
+            </a:endParaRPr>
+          </a:p>
+        </p:txBody>
+      </p:sp>
+      <p:sp>
+        <p:nvSpPr>
+          <p:cNvPr id="19" name="Flowchart: Terminator 18"/>
+          <p:cNvSpPr/>
+          <p:nvPr/>
+        </p:nvSpPr>
+        <p:spPr>
+          <a:xfrm>
+            <a:off x="7171990" y="10567947"/>
+            <a:ext cx="518934" cy="128590"/>
+          </a:xfrm>
+          <a:prstGeom prst="flowChartTerminator">
+            <a:avLst/>
+          </a:prstGeom>
+          <a:solidFill>
+            <a:schemeClr val="accent6">
+              <a:lumMod val="40000"/>
+              <a:lumOff val="60000"/>
+            </a:schemeClr>
+          </a:solidFill>
+          <a:ln>
+            <a:solidFill>
+              <a:schemeClr val="accent6"/>
+            </a:solidFill>
+          </a:ln>
+          <a:effectLst>
+            <a:outerShdw blurRad="50800" dist="38100" dir="8100000" algn="tr" rotWithShape="0">
+              <a:prstClr val="black">
+                <a:alpha val="40000"/>
+              </a:prstClr>
+            </a:outerShdw>
+          </a:effectLst>
+        </p:spPr>
+        <p:style>
+          <a:lnRef idx="3">
+            <a:schemeClr val="lt1"/>
+          </a:lnRef>
+          <a:fillRef idx="1">
+            <a:schemeClr val="accent6"/>
+          </a:fillRef>
+          <a:effectRef idx="1">
+            <a:schemeClr val="accent6"/>
+          </a:effectRef>
+          <a:fontRef idx="minor">
+            <a:schemeClr val="lt1"/>
+          </a:fontRef>
+        </p:style>
+        <p:txBody>
+          <a:bodyPr rtlCol="0" anchor="ctr"/>
+          <a:p>
+            <a:pPr algn="ctr"/>
+            <a:r>
+              <a:rPr lang="en-US" sz="450" b="1">
+                <a:solidFill>
+                  <a:schemeClr val="tx1">
+                    <a:lumMod val="75000"/>
+                    <a:lumOff val="25000"/>
+                  </a:schemeClr>
+                </a:solidFill>
+              </a:rPr>
+              <a:t>expired</a:t>
+            </a:r>
+            <a:endParaRPr lang="en-US" sz="450" b="1">
+              <a:solidFill>
+                <a:schemeClr val="tx1">
+                  <a:lumMod val="75000"/>
+                  <a:lumOff val="25000"/>
+                </a:schemeClr>
+              </a:solidFill>
+            </a:endParaRPr>
+          </a:p>
+        </p:txBody>
+      </p:sp>
+      <p:cxnSp>
+        <p:nvCxnSpPr>
+          <p:cNvPr id="20" name="Elbow Connector 19"/>
+          <p:cNvCxnSpPr>
+            <a:stCxn id="6" idx="2"/>
+            <a:endCxn id="19" idx="1"/>
+          </p:cNvCxnSpPr>
+          <p:nvPr/>
+        </p:nvCxnSpPr>
+        <p:spPr>
+          <a:xfrm rot="5400000" flipV="1">
+            <a:off x="6674168" y="10134918"/>
+            <a:ext cx="196215" cy="798830"/>
+          </a:xfrm>
+          <a:prstGeom prst="bentConnector2">
+            <a:avLst/>
+          </a:prstGeom>
+          <a:ln>
+            <a:tailEnd type="triangle"/>
+          </a:ln>
+          <a:effectLst>
+            <a:outerShdw blurRad="50800" dist="38100" dir="8100000" algn="tr" rotWithShape="0">
+              <a:prstClr val="black">
+                <a:alpha val="40000"/>
+              </a:prstClr>
+            </a:outerShdw>
+          </a:effectLst>
+        </p:spPr>
+        <p:style>
+          <a:lnRef idx="1">
+            <a:schemeClr val="accent1"/>
+          </a:lnRef>
+          <a:fillRef idx="0">
+            <a:schemeClr val="accent1"/>
+          </a:fillRef>
+          <a:effectRef idx="0">
+            <a:schemeClr val="accent1"/>
+          </a:effectRef>
+          <a:fontRef idx="minor">
+            <a:schemeClr val="tx1"/>
+          </a:fontRef>
+        </p:style>
+      </p:cxnSp>
+      <p:cxnSp>
+        <p:nvCxnSpPr>
+          <p:cNvPr id="22" name="Elbow Connector 21"/>
+          <p:cNvCxnSpPr>
+            <a:stCxn id="19" idx="3"/>
+            <a:endCxn id="10" idx="2"/>
+          </p:cNvCxnSpPr>
+          <p:nvPr/>
+        </p:nvCxnSpPr>
+        <p:spPr>
+          <a:xfrm flipV="1">
+            <a:off x="7690485" y="10413365"/>
+            <a:ext cx="409575" cy="219075"/>
+          </a:xfrm>
+          <a:prstGeom prst="bentConnector3">
+            <a:avLst>
+              <a:gd name="adj1" fmla="val 50078"/>
+            </a:avLst>
+          </a:prstGeom>
+          <a:ln>
+            <a:tailEnd type="triangle"/>
+          </a:ln>
+          <a:effectLst>
+            <a:outerShdw blurRad="50800" dist="38100" dir="8100000" algn="tr" rotWithShape="0">
+              <a:prstClr val="black">
+                <a:alpha val="40000"/>
+              </a:prstClr>
+            </a:outerShdw>
+          </a:effectLst>
+        </p:spPr>
+        <p:style>
+          <a:lnRef idx="1">
+            <a:schemeClr val="accent1"/>
+          </a:lnRef>
+          <a:fillRef idx="0">
+            <a:schemeClr val="accent1"/>
+          </a:fillRef>
+          <a:effectRef idx="0">
+            <a:schemeClr val="accent1"/>
+          </a:effectRef>
+          <a:fontRef idx="minor">
+            <a:schemeClr val="tx1"/>
+          </a:fontRef>
+        </p:style>
+      </p:cxnSp>
+      <p:cxnSp>
+        <p:nvCxnSpPr>
+          <p:cNvPr id="23" name="Straight Arrow Connector 22"/>
+          <p:cNvCxnSpPr>
+            <a:stCxn id="18" idx="3"/>
+            <a:endCxn id="6" idx="1"/>
+          </p:cNvCxnSpPr>
+          <p:nvPr/>
+        </p:nvCxnSpPr>
+        <p:spPr>
+          <a:xfrm flipV="1">
+            <a:off x="4909820" y="10193655"/>
+            <a:ext cx="1130300" cy="4445"/>
+          </a:xfrm>
+          <a:prstGeom prst="straightConnector1">
+            <a:avLst/>
+          </a:prstGeom>
+          <a:ln>
+            <a:tailEnd type="triangle"/>
+          </a:ln>
+          <a:effectLst>
+            <a:outerShdw blurRad="50800" dist="38100" dir="8100000" algn="tr" rotWithShape="0">
+              <a:prstClr val="black">
+                <a:alpha val="40000"/>
+              </a:prstClr>
+            </a:outerShdw>
+          </a:effectLst>
+        </p:spPr>
+        <p:style>
+          <a:lnRef idx="1">
+            <a:schemeClr val="accent1"/>
+          </a:lnRef>
+          <a:fillRef idx="0">
+            <a:schemeClr val="accent1"/>
+          </a:fillRef>
+          <a:effectRef idx="0">
+            <a:schemeClr val="accent1"/>
+          </a:effectRef>
+          <a:fontRef idx="minor">
+            <a:schemeClr val="tx1"/>
+          </a:fontRef>
+        </p:style>
+      </p:cxnSp>
+      <p:cxnSp>
+        <p:nvCxnSpPr>
+          <p:cNvPr id="24" name="Straight Arrow Connector 23"/>
+          <p:cNvCxnSpPr>
+            <a:stCxn id="370" idx="3"/>
+            <a:endCxn id="18" idx="1"/>
+          </p:cNvCxnSpPr>
+          <p:nvPr/>
+        </p:nvCxnSpPr>
+        <p:spPr>
+          <a:xfrm>
+            <a:off x="3849370" y="10196830"/>
+            <a:ext cx="395605" cy="1270"/>
+          </a:xfrm>
+          <a:prstGeom prst="straightConnector1">
+            <a:avLst/>
+          </a:prstGeom>
+          <a:ln>
+            <a:tailEnd type="triangle"/>
+          </a:ln>
+          <a:effectLst>
+            <a:outerShdw blurRad="50800" dist="38100" dir="8100000" algn="tr" rotWithShape="0">
+              <a:prstClr val="black">
+                <a:alpha val="40000"/>
+              </a:prstClr>
+            </a:outerShdw>
+          </a:effectLst>
+        </p:spPr>
+        <p:style>
+          <a:lnRef idx="1">
+            <a:schemeClr val="accent1"/>
+          </a:lnRef>
+          <a:fillRef idx="0">
+            <a:schemeClr val="accent1"/>
+          </a:fillRef>
+          <a:effectRef idx="0">
+            <a:schemeClr val="accent1"/>
+          </a:effectRef>
+          <a:fontRef idx="minor">
+            <a:schemeClr val="tx1"/>
+          </a:fontRef>
+        </p:style>
+      </p:cxnSp>
+      <p:sp>
+        <p:nvSpPr>
+          <p:cNvPr id="25" name="Oval 24"/>
+          <p:cNvSpPr/>
+          <p:nvPr/>
+        </p:nvSpPr>
+        <p:spPr>
+          <a:xfrm>
+            <a:off x="3947285" y="10118621"/>
+            <a:ext cx="148022" cy="159452"/>
+          </a:xfrm>
+          <a:prstGeom prst="ellipse">
+            <a:avLst/>
+          </a:prstGeom>
+          <a:effectLst>
+            <a:outerShdw blurRad="50800" dist="38100" dir="8100000" algn="tr" rotWithShape="0">
+              <a:prstClr val="black">
+                <a:alpha val="40000"/>
+              </a:prstClr>
+            </a:outerShdw>
+          </a:effectLst>
+        </p:spPr>
+        <p:style>
+          <a:lnRef idx="1">
+            <a:schemeClr val="accent2"/>
+          </a:lnRef>
+          <a:fillRef idx="2">
+            <a:schemeClr val="accent2"/>
+          </a:fillRef>
+          <a:effectRef idx="1">
+            <a:schemeClr val="accent2"/>
+          </a:effectRef>
+          <a:fontRef idx="minor">
+            <a:schemeClr val="dk1"/>
+          </a:fontRef>
+        </p:style>
+        <p:txBody>
+          <a:bodyPr vertOverflow="overflow" horzOverflow="overflow" vert="horz" wrap="square" numCol="1" spcCol="0" rtlCol="0" fromWordArt="0" anchor="ctr" anchorCtr="0" forceAA="0" compatLnSpc="1">
+            <a:noAutofit/>
+          </a:bodyPr>
+          <a:p>
+            <a:pPr lvl="0" algn="ctr">
+              <a:buClrTx/>
+              <a:buSzTx/>
+              <a:buFontTx/>
+            </a:pPr>
+            <a:r>
+              <a:rPr lang="en-US" sz="630">
+                <a:sym typeface="+mn-ea"/>
+              </a:rPr>
+              <a:t>y</a:t>
+            </a:r>
+            <a:endParaRPr lang="en-US" sz="630">
+              <a:sym typeface="+mn-ea"/>
+            </a:endParaRPr>
+          </a:p>
+        </p:txBody>
+      </p:sp>
+      <p:sp>
+        <p:nvSpPr>
+          <p:cNvPr id="31" name="Oval 30"/>
+          <p:cNvSpPr/>
+          <p:nvPr/>
+        </p:nvSpPr>
+        <p:spPr>
+          <a:xfrm>
+            <a:off x="6805420" y="10537025"/>
+            <a:ext cx="148022" cy="159452"/>
+          </a:xfrm>
+          <a:prstGeom prst="ellipse">
+            <a:avLst/>
+          </a:prstGeom>
+          <a:effectLst>
+            <a:outerShdw blurRad="50800" dist="38100" dir="8100000" algn="tr" rotWithShape="0">
+              <a:prstClr val="black">
+                <a:alpha val="40000"/>
+              </a:prstClr>
+            </a:outerShdw>
+          </a:effectLst>
+        </p:spPr>
+        <p:style>
+          <a:lnRef idx="1">
+            <a:schemeClr val="accent2"/>
+          </a:lnRef>
+          <a:fillRef idx="2">
+            <a:schemeClr val="accent2"/>
+          </a:fillRef>
+          <a:effectRef idx="1">
+            <a:schemeClr val="accent2"/>
+          </a:effectRef>
+          <a:fontRef idx="minor">
+            <a:schemeClr val="dk1"/>
+          </a:fontRef>
+        </p:style>
+        <p:txBody>
+          <a:bodyPr vertOverflow="overflow" horzOverflow="overflow" vert="horz" wrap="square" numCol="1" spcCol="0" rtlCol="0" fromWordArt="0" anchor="ctr" anchorCtr="0" forceAA="0" compatLnSpc="1">
+            <a:noAutofit/>
+          </a:bodyPr>
+          <a:p>
+            <a:pPr lvl="0" algn="ctr">
+              <a:buClrTx/>
+              <a:buSzTx/>
+              <a:buFontTx/>
+            </a:pPr>
+            <a:r>
+              <a:rPr lang="en-US" sz="630">
+                <a:sym typeface="+mn-ea"/>
+              </a:rPr>
+              <a:t>n</a:t>
+            </a:r>
+            <a:endParaRPr lang="en-US" sz="630">
+              <a:sym typeface="+mn-ea"/>
+            </a:endParaRPr>
+          </a:p>
+        </p:txBody>
+      </p:sp>
+      <p:sp>
+        <p:nvSpPr>
+          <p:cNvPr id="32" name="Oval 31"/>
+          <p:cNvSpPr/>
+          <p:nvPr/>
+        </p:nvSpPr>
+        <p:spPr>
+          <a:xfrm>
+            <a:off x="5032500" y="10113480"/>
+            <a:ext cx="148022" cy="159452"/>
+          </a:xfrm>
+          <a:prstGeom prst="ellipse">
+            <a:avLst/>
+          </a:prstGeom>
+          <a:effectLst>
+            <a:outerShdw blurRad="50800" dist="38100" dir="8100000" algn="tr" rotWithShape="0">
+              <a:prstClr val="black">
+                <a:alpha val="40000"/>
+              </a:prstClr>
+            </a:outerShdw>
+          </a:effectLst>
+        </p:spPr>
+        <p:style>
+          <a:lnRef idx="1">
+            <a:schemeClr val="accent2"/>
+          </a:lnRef>
+          <a:fillRef idx="2">
+            <a:schemeClr val="accent2"/>
+          </a:fillRef>
+          <a:effectRef idx="1">
+            <a:schemeClr val="accent2"/>
+          </a:effectRef>
+          <a:fontRef idx="minor">
+            <a:schemeClr val="dk1"/>
+          </a:fontRef>
+        </p:style>
+        <p:txBody>
+          <a:bodyPr vertOverflow="overflow" horzOverflow="overflow" vert="horz" wrap="square" numCol="1" spcCol="0" rtlCol="0" fromWordArt="0" anchor="ctr" anchorCtr="0" forceAA="0" compatLnSpc="1">
+            <a:noAutofit/>
+          </a:bodyPr>
+          <a:p>
+            <a:pPr lvl="0" algn="ctr">
+              <a:buClrTx/>
+              <a:buSzTx/>
+              <a:buFontTx/>
+            </a:pPr>
+            <a:r>
+              <a:rPr lang="en-US" sz="630">
+                <a:sym typeface="+mn-ea"/>
+              </a:rPr>
+              <a:t>n</a:t>
+            </a:r>
+            <a:endParaRPr lang="en-US" sz="630">
+              <a:sym typeface="+mn-ea"/>
+            </a:endParaRPr>
+          </a:p>
+        </p:txBody>
+      </p:sp>
+      <p:cxnSp>
+        <p:nvCxnSpPr>
+          <p:cNvPr id="33" name="Elbow Connector 32"/>
+          <p:cNvCxnSpPr>
+            <a:stCxn id="18" idx="2"/>
+            <a:endCxn id="5" idx="2"/>
+          </p:cNvCxnSpPr>
+          <p:nvPr/>
+        </p:nvCxnSpPr>
+        <p:spPr>
+          <a:xfrm rot="5400000" flipV="1">
+            <a:off x="4941888" y="10076498"/>
+            <a:ext cx="175895" cy="904240"/>
+          </a:xfrm>
+          <a:prstGeom prst="bentConnector2">
+            <a:avLst/>
+          </a:prstGeom>
+          <a:ln>
+            <a:tailEnd type="triangle"/>
+          </a:ln>
+          <a:effectLst>
+            <a:outerShdw blurRad="50800" dist="38100" dir="8100000" algn="tr" rotWithShape="0">
+              <a:prstClr val="black">
+                <a:alpha val="40000"/>
+              </a:prstClr>
+            </a:outerShdw>
+          </a:effectLst>
+        </p:spPr>
+        <p:style>
+          <a:lnRef idx="1">
+            <a:schemeClr val="accent1"/>
+          </a:lnRef>
+          <a:fillRef idx="0">
+            <a:schemeClr val="accent1"/>
+          </a:fillRef>
+          <a:effectRef idx="0">
+            <a:schemeClr val="accent1"/>
+          </a:effectRef>
+          <a:fontRef idx="minor">
+            <a:schemeClr val="tx1"/>
+          </a:fontRef>
+        </p:style>
+      </p:cxnSp>
+      <p:sp>
+        <p:nvSpPr>
+          <p:cNvPr id="34" name="Oval 33"/>
+          <p:cNvSpPr/>
+          <p:nvPr/>
+        </p:nvSpPr>
+        <p:spPr>
+          <a:xfrm>
+            <a:off x="5032500" y="10521846"/>
+            <a:ext cx="148022" cy="159452"/>
+          </a:xfrm>
+          <a:prstGeom prst="ellipse">
+            <a:avLst/>
+          </a:prstGeom>
+          <a:effectLst>
+            <a:outerShdw blurRad="50800" dist="38100" dir="8100000" algn="tr" rotWithShape="0">
+              <a:prstClr val="black">
+                <a:alpha val="40000"/>
+              </a:prstClr>
+            </a:outerShdw>
+          </a:effectLst>
+        </p:spPr>
+        <p:style>
+          <a:lnRef idx="1">
+            <a:schemeClr val="accent2"/>
+          </a:lnRef>
+          <a:fillRef idx="2">
+            <a:schemeClr val="accent2"/>
+          </a:fillRef>
+          <a:effectRef idx="1">
+            <a:schemeClr val="accent2"/>
+          </a:effectRef>
+          <a:fontRef idx="minor">
+            <a:schemeClr val="dk1"/>
+          </a:fontRef>
+        </p:style>
+        <p:txBody>
+          <a:bodyPr vertOverflow="overflow" horzOverflow="overflow" vert="horz" wrap="square" numCol="1" spcCol="0" rtlCol="0" fromWordArt="0" anchor="ctr" anchorCtr="0" forceAA="0" compatLnSpc="1">
+            <a:noAutofit/>
+          </a:bodyPr>
+          <a:p>
+            <a:pPr lvl="0" algn="ctr">
+              <a:buClrTx/>
+              <a:buSzTx/>
+              <a:buFontTx/>
+            </a:pPr>
+            <a:r>
+              <a:rPr lang="en-US" sz="630">
+                <a:sym typeface="+mn-ea"/>
+              </a:rPr>
+              <a:t>y</a:t>
+            </a:r>
+            <a:endParaRPr lang="en-US" sz="630">
               <a:sym typeface="+mn-ea"/>
             </a:endParaRPr>
           </a:p>

</xml_diff>

<commit_message>
Major Savepoint: All issues resolved FCRT 2.1-3; all tests ok; remaining items: 1/testing sole expiry_time updates that don't seem to take; 2/lingering reduceOnly attribute corrections (all s/b set to true (not valid while account is in 'hedge mode'; and 3/set leverage on leverage change prior to position opening (leverage updates on open positions);
</commit_message>
<xml_diff>
--- a/~Documents/AppArchitecture.pptx
+++ b/~Documents/AppArchitecture.pptx
@@ -8,7 +8,7 @@
     <p:notesMasterId r:id="rId4"/>
   </p:notesMasterIdLst>
   <p:handoutMasterIdLst>
-    <p:handoutMasterId r:id="rId14"/>
+    <p:handoutMasterId r:id="rId13"/>
   </p:handoutMasterIdLst>
   <p:sldIdLst>
     <p:sldId id="257" r:id="rId3"/>
@@ -20,7 +20,6 @@
     <p:sldId id="270" r:id="rId10"/>
     <p:sldId id="272" r:id="rId11"/>
     <p:sldId id="274" r:id="rId12"/>
-    <p:sldId id="282" r:id="rId13"/>
   </p:sldIdLst>
   <p:sldSz cx="14630400" cy="10972800"/>
   <p:notesSz cx="10234295" cy="7103745"/>
@@ -4074,470 +4073,6 @@
 </p:sld>
 </file>
 
-<file path=ppt/slides/slide10.xml><?xml version="1.0" encoding="utf-8"?>
-<p:sld xmlns:a="http://schemas.openxmlformats.org/drawingml/2006/main" xmlns:r="http://schemas.openxmlformats.org/officeDocument/2006/relationships" xmlns:p="http://schemas.openxmlformats.org/presentationml/2006/main">
-  <p:cSld>
-    <p:bg>
-      <p:bgPr>
-        <a:solidFill>
-          <a:schemeClr val="bg1"/>
-        </a:solidFill>
-        <a:effectLst/>
-      </p:bgPr>
-    </p:bg>
-    <p:spTree>
-      <p:nvGrpSpPr>
-        <p:cNvPr id="1" name=""/>
-        <p:cNvGrpSpPr/>
-        <p:nvPr/>
-      </p:nvGrpSpPr>
-      <p:grpSpPr/>
-      <p:grpSp>
-        <p:nvGrpSpPr>
-          <p:cNvPr id="16" name="Group 15"/>
-          <p:cNvGrpSpPr/>
-          <p:nvPr/>
-        </p:nvGrpSpPr>
-        <p:grpSpPr>
-          <a:xfrm>
-            <a:off x="4410075" y="3841750"/>
-            <a:ext cx="1097915" cy="1015111"/>
-            <a:chOff x="6945" y="6266"/>
-            <a:chExt cx="1729" cy="1599"/>
-          </a:xfrm>
-          <a:effectLst>
-            <a:outerShdw blurRad="50800" dist="38100" dir="8100000" algn="tr" rotWithShape="0">
-              <a:prstClr val="black">
-                <a:alpha val="40000"/>
-              </a:prstClr>
-            </a:outerShdw>
-          </a:effectLst>
-        </p:grpSpPr>
-        <p:sp>
-          <p:nvSpPr>
-            <p:cNvPr id="25" name="Rectangles 24"/>
-            <p:cNvSpPr/>
-            <p:nvPr/>
-          </p:nvSpPr>
-          <p:spPr>
-            <a:xfrm>
-              <a:off x="6945" y="6393"/>
-              <a:ext cx="1447" cy="1308"/>
-            </a:xfrm>
-            <a:prstGeom prst="rect">
-              <a:avLst/>
-            </a:prstGeom>
-            <a:ln>
-              <a:noFill/>
-            </a:ln>
-          </p:spPr>
-          <p:style>
-            <a:lnRef idx="2">
-              <a:schemeClr val="accent3">
-                <a:shade val="50000"/>
-              </a:schemeClr>
-            </a:lnRef>
-            <a:fillRef idx="1">
-              <a:schemeClr val="accent3"/>
-            </a:fillRef>
-            <a:effectRef idx="0">
-              <a:schemeClr val="accent3"/>
-            </a:effectRef>
-            <a:fontRef idx="minor">
-              <a:schemeClr val="lt1"/>
-            </a:fontRef>
-          </p:style>
-          <p:txBody>
-            <a:bodyPr rtlCol="0" anchor="ctr"/>
-            <a:p>
-              <a:pPr algn="ctr"/>
-              <a:endParaRPr lang="en-US" sz="720"/>
-            </a:p>
-          </p:txBody>
-        </p:sp>
-        <p:sp>
-          <p:nvSpPr>
-            <p:cNvPr id="150" name="Rectangles 149"/>
-            <p:cNvSpPr/>
-            <p:nvPr/>
-          </p:nvSpPr>
-          <p:spPr>
-            <a:xfrm>
-              <a:off x="6946" y="6266"/>
-              <a:ext cx="1728" cy="202"/>
-            </a:xfrm>
-            <a:prstGeom prst="rect">
-              <a:avLst/>
-            </a:prstGeom>
-          </p:spPr>
-          <p:style>
-            <a:lnRef idx="2">
-              <a:schemeClr val="dk1">
-                <a:shade val="50000"/>
-              </a:schemeClr>
-            </a:lnRef>
-            <a:fillRef idx="1">
-              <a:schemeClr val="dk1"/>
-            </a:fillRef>
-            <a:effectRef idx="0">
-              <a:schemeClr val="dk1"/>
-            </a:effectRef>
-            <a:fontRef idx="minor">
-              <a:schemeClr val="lt1"/>
-            </a:fontRef>
-          </p:style>
-          <p:txBody>
-            <a:bodyPr rtlCol="0" anchor="ctr"/>
-            <a:p>
-              <a:pPr algn="ctr"/>
-              <a:r>
-                <a:rPr lang="en-US" sz="720"/>
-                <a:t>Submit</a:t>
-              </a:r>
-              <a:endParaRPr lang="en-US" sz="720"/>
-            </a:p>
-          </p:txBody>
-        </p:sp>
-        <p:sp>
-          <p:nvSpPr>
-            <p:cNvPr id="31" name="Rectangles 30"/>
-            <p:cNvSpPr/>
-            <p:nvPr/>
-          </p:nvSpPr>
-          <p:spPr>
-            <a:xfrm>
-              <a:off x="6946" y="6495"/>
-              <a:ext cx="1728" cy="202"/>
-            </a:xfrm>
-            <a:prstGeom prst="rect">
-              <a:avLst/>
-            </a:prstGeom>
-          </p:spPr>
-          <p:style>
-            <a:lnRef idx="2">
-              <a:schemeClr val="accent1">
-                <a:shade val="50000"/>
-              </a:schemeClr>
-            </a:lnRef>
-            <a:fillRef idx="1">
-              <a:schemeClr val="accent1"/>
-            </a:fillRef>
-            <a:effectRef idx="0">
-              <a:schemeClr val="accent1"/>
-            </a:effectRef>
-            <a:fontRef idx="minor">
-              <a:schemeClr val="lt1"/>
-            </a:fontRef>
-          </p:style>
-          <p:txBody>
-            <a:bodyPr rtlCol="0" anchor="ctr"/>
-            <a:p>
-              <a:pPr algn="ctr"/>
-              <a:r>
-                <a:rPr lang="en-US" sz="720"/>
-                <a:t>Queued</a:t>
-              </a:r>
-              <a:endParaRPr lang="en-US" sz="720"/>
-            </a:p>
-          </p:txBody>
-        </p:sp>
-        <p:sp>
-          <p:nvSpPr>
-            <p:cNvPr id="186" name="Rectangles 185"/>
-            <p:cNvSpPr/>
-            <p:nvPr/>
-          </p:nvSpPr>
-          <p:spPr>
-            <a:xfrm>
-              <a:off x="6946" y="6731"/>
-              <a:ext cx="1728" cy="202"/>
-            </a:xfrm>
-            <a:prstGeom prst="rect">
-              <a:avLst/>
-            </a:prstGeom>
-          </p:spPr>
-          <p:style>
-            <a:lnRef idx="2">
-              <a:schemeClr val="accent1">
-                <a:shade val="50000"/>
-              </a:schemeClr>
-            </a:lnRef>
-            <a:fillRef idx="1">
-              <a:schemeClr val="accent1"/>
-            </a:fillRef>
-            <a:effectRef idx="0">
-              <a:schemeClr val="accent1"/>
-            </a:effectRef>
-            <a:fontRef idx="minor">
-              <a:schemeClr val="lt1"/>
-            </a:fontRef>
-          </p:style>
-          <p:txBody>
-            <a:bodyPr rtlCol="0" anchor="ctr"/>
-            <a:p>
-              <a:pPr algn="ctr"/>
-              <a:r>
-                <a:rPr lang="en-US" sz="720"/>
-                <a:t>Pending</a:t>
-              </a:r>
-              <a:endParaRPr lang="en-US" sz="720"/>
-            </a:p>
-          </p:txBody>
-        </p:sp>
-        <p:sp>
-          <p:nvSpPr>
-            <p:cNvPr id="187" name="Rectangles 186"/>
-            <p:cNvSpPr/>
-            <p:nvPr/>
-          </p:nvSpPr>
-          <p:spPr>
-            <a:xfrm>
-              <a:off x="6946" y="6967"/>
-              <a:ext cx="1728" cy="202"/>
-            </a:xfrm>
-            <a:prstGeom prst="rect">
-              <a:avLst/>
-            </a:prstGeom>
-          </p:spPr>
-          <p:style>
-            <a:lnRef idx="2">
-              <a:schemeClr val="accent1">
-                <a:shade val="50000"/>
-              </a:schemeClr>
-            </a:lnRef>
-            <a:fillRef idx="1">
-              <a:schemeClr val="accent1"/>
-            </a:fillRef>
-            <a:effectRef idx="0">
-              <a:schemeClr val="accent1"/>
-            </a:effectRef>
-            <a:fontRef idx="minor">
-              <a:schemeClr val="lt1"/>
-            </a:fontRef>
-          </p:style>
-          <p:txBody>
-            <a:bodyPr rtlCol="0" anchor="ctr"/>
-            <a:p>
-              <a:pPr algn="ctr"/>
-              <a:r>
-                <a:rPr lang="en-US" sz="720"/>
-                <a:t>Canceled</a:t>
-              </a:r>
-              <a:endParaRPr lang="en-US" sz="720"/>
-            </a:p>
-          </p:txBody>
-        </p:sp>
-        <p:sp>
-          <p:nvSpPr>
-            <p:cNvPr id="188" name="Rectangles 187"/>
-            <p:cNvSpPr/>
-            <p:nvPr/>
-          </p:nvSpPr>
-          <p:spPr>
-            <a:xfrm>
-              <a:off x="6946" y="7202"/>
-              <a:ext cx="1728" cy="203"/>
-            </a:xfrm>
-            <a:prstGeom prst="rect">
-              <a:avLst/>
-            </a:prstGeom>
-          </p:spPr>
-          <p:style>
-            <a:lnRef idx="2">
-              <a:schemeClr val="accent1">
-                <a:shade val="50000"/>
-              </a:schemeClr>
-            </a:lnRef>
-            <a:fillRef idx="1">
-              <a:schemeClr val="accent1"/>
-            </a:fillRef>
-            <a:effectRef idx="0">
-              <a:schemeClr val="accent1"/>
-            </a:effectRef>
-            <a:fontRef idx="minor">
-              <a:schemeClr val="lt1"/>
-            </a:fontRef>
-          </p:style>
-          <p:txBody>
-            <a:bodyPr rtlCol="0" anchor="ctr"/>
-            <a:p>
-              <a:pPr algn="ctr"/>
-              <a:r>
-                <a:rPr lang="en-US" sz="720"/>
-                <a:t>Rejected</a:t>
-              </a:r>
-              <a:endParaRPr lang="en-US" sz="720"/>
-            </a:p>
-          </p:txBody>
-        </p:sp>
-        <p:sp>
-          <p:nvSpPr>
-            <p:cNvPr id="189" name="Rectangles 188"/>
-            <p:cNvSpPr/>
-            <p:nvPr/>
-          </p:nvSpPr>
-          <p:spPr>
-            <a:xfrm>
-              <a:off x="6946" y="7663"/>
-              <a:ext cx="1728" cy="202"/>
-            </a:xfrm>
-            <a:prstGeom prst="rect">
-              <a:avLst/>
-            </a:prstGeom>
-          </p:spPr>
-          <p:style>
-            <a:lnRef idx="2">
-              <a:schemeClr val="accent1">
-                <a:shade val="50000"/>
-              </a:schemeClr>
-            </a:lnRef>
-            <a:fillRef idx="1">
-              <a:schemeClr val="accent1"/>
-            </a:fillRef>
-            <a:effectRef idx="0">
-              <a:schemeClr val="accent1"/>
-            </a:effectRef>
-            <a:fontRef idx="minor">
-              <a:schemeClr val="lt1"/>
-            </a:fontRef>
-          </p:style>
-          <p:txBody>
-            <a:bodyPr rtlCol="0" anchor="ctr"/>
-            <a:p>
-              <a:pPr algn="ctr"/>
-              <a:r>
-                <a:rPr lang="en-US" sz="720"/>
-                <a:t>Closed</a:t>
-              </a:r>
-              <a:endParaRPr lang="en-US" sz="720"/>
-            </a:p>
-          </p:txBody>
-        </p:sp>
-        <p:sp>
-          <p:nvSpPr>
-            <p:cNvPr id="195" name="Rectangles 194"/>
-            <p:cNvSpPr/>
-            <p:nvPr/>
-          </p:nvSpPr>
-          <p:spPr>
-            <a:xfrm>
-              <a:off x="6945" y="7433"/>
-              <a:ext cx="1728" cy="202"/>
-            </a:xfrm>
-            <a:prstGeom prst="rect">
-              <a:avLst/>
-            </a:prstGeom>
-          </p:spPr>
-          <p:style>
-            <a:lnRef idx="2">
-              <a:schemeClr val="accent1">
-                <a:shade val="50000"/>
-              </a:schemeClr>
-            </a:lnRef>
-            <a:fillRef idx="1">
-              <a:schemeClr val="accent1"/>
-            </a:fillRef>
-            <a:effectRef idx="0">
-              <a:schemeClr val="accent1"/>
-            </a:effectRef>
-            <a:fontRef idx="minor">
-              <a:schemeClr val="lt1"/>
-            </a:fontRef>
-          </p:style>
-          <p:txBody>
-            <a:bodyPr rtlCol="0" anchor="ctr"/>
-            <a:p>
-              <a:pPr algn="ctr"/>
-              <a:r>
-                <a:rPr lang="en-US" sz="720"/>
-                <a:t>Fulfilled</a:t>
-              </a:r>
-              <a:endParaRPr lang="en-US" sz="720"/>
-            </a:p>
-          </p:txBody>
-        </p:sp>
-      </p:grpSp>
-      <p:sp>
-        <p:nvSpPr>
-          <p:cNvPr id="41" name="Flowchart: Terminator 40"/>
-          <p:cNvSpPr/>
-          <p:nvPr/>
-        </p:nvSpPr>
-        <p:spPr>
-          <a:xfrm>
-            <a:off x="3775075" y="3843020"/>
-            <a:ext cx="702945" cy="128905"/>
-          </a:xfrm>
-          <a:prstGeom prst="flowChartTerminator">
-            <a:avLst/>
-          </a:prstGeom>
-          <a:solidFill>
-            <a:schemeClr val="accent6">
-              <a:lumMod val="40000"/>
-              <a:lumOff val="60000"/>
-            </a:schemeClr>
-          </a:solidFill>
-          <a:ln>
-            <a:solidFill>
-              <a:schemeClr val="accent6"/>
-            </a:solidFill>
-          </a:ln>
-          <a:effectLst>
-            <a:outerShdw blurRad="50800" dist="38100" dir="8100000" algn="tr" rotWithShape="0">
-              <a:prstClr val="black">
-                <a:alpha val="40000"/>
-              </a:prstClr>
-            </a:outerShdw>
-          </a:effectLst>
-        </p:spPr>
-        <p:style>
-          <a:lnRef idx="3">
-            <a:schemeClr val="lt1"/>
-          </a:lnRef>
-          <a:fillRef idx="1">
-            <a:schemeClr val="accent6"/>
-          </a:fillRef>
-          <a:effectRef idx="1">
-            <a:schemeClr val="accent6"/>
-          </a:effectRef>
-          <a:fontRef idx="minor">
-            <a:schemeClr val="lt1"/>
-          </a:fontRef>
-        </p:style>
-        <p:txBody>
-          <a:bodyPr rtlCol="0" anchor="ctr"/>
-          <a:p>
-            <a:pPr algn="ctr"/>
-            <a:r>
-              <a:rPr lang="en-US" sz="450" b="1">
-                <a:solidFill>
-                  <a:schemeClr val="tx1">
-                    <a:lumMod val="75000"/>
-                    <a:lumOff val="25000"/>
-                  </a:schemeClr>
-                </a:solidFill>
-              </a:rPr>
-              <a:t>app request</a:t>
-            </a:r>
-            <a:endParaRPr lang="en-US" sz="450" b="1">
-              <a:solidFill>
-                <a:schemeClr val="tx1">
-                  <a:lumMod val="75000"/>
-                  <a:lumOff val="25000"/>
-                </a:schemeClr>
-              </a:solidFill>
-            </a:endParaRPr>
-          </a:p>
-        </p:txBody>
-      </p:sp>
-    </p:spTree>
-  </p:cSld>
-  <p:clrMapOvr>
-    <a:masterClrMapping/>
-  </p:clrMapOvr>
-</p:sld>
-</file>
-
 <file path=ppt/slides/slide2.xml><?xml version="1.0" encoding="utf-8"?>
 <p:sld xmlns:a="http://schemas.openxmlformats.org/drawingml/2006/main" xmlns:r="http://schemas.openxmlformats.org/officeDocument/2006/relationships" xmlns:p="http://schemas.openxmlformats.org/presentationml/2006/main">
   <p:cSld>
@@ -23947,186 +23482,97 @@
         <p:nvPr/>
       </p:nvGrpSpPr>
       <p:grpSpPr/>
-      <p:cxnSp>
-        <p:nvCxnSpPr>
-          <p:cNvPr id="307" name="Straight Arrow Connector 306"/>
-          <p:cNvCxnSpPr>
-            <a:endCxn id="308" idx="3"/>
-          </p:cNvCxnSpPr>
-          <p:nvPr/>
-        </p:nvCxnSpPr>
-        <p:spPr>
-          <a:xfrm flipH="1">
-            <a:off x="5184775" y="7621270"/>
-            <a:ext cx="660400" cy="7620"/>
-          </a:xfrm>
-          <a:prstGeom prst="straightConnector1">
-            <a:avLst/>
-          </a:prstGeom>
-          <a:ln>
-            <a:tailEnd type="triangle" w="med" len="med"/>
+      <p:pic>
+        <p:nvPicPr>
+          <p:cNvPr id="241" name="Picture 240"/>
+          <p:cNvPicPr>
+            <a:picLocks noChangeAspect="1"/>
+          </p:cNvPicPr>
+          <p:nvPr/>
+        </p:nvPicPr>
+        <p:blipFill>
+          <a:blip r:embed="rId1"/>
+          <a:stretch>
+            <a:fillRect/>
+          </a:stretch>
+        </p:blipFill>
+        <p:spPr>
+          <a:xfrm>
+            <a:off x="4326255" y="6912610"/>
+            <a:ext cx="1000125" cy="1175385"/>
+          </a:xfrm>
+          <a:prstGeom prst="rect">
+            <a:avLst/>
+          </a:prstGeom>
+        </p:spPr>
+      </p:pic>
+      <p:sp>
+        <p:nvSpPr>
+          <p:cNvPr id="6" name="Rectangles 5"/>
+          <p:cNvSpPr/>
+          <p:nvPr/>
+        </p:nvSpPr>
+        <p:spPr>
+          <a:xfrm>
+            <a:off x="9009380" y="5269230"/>
+            <a:ext cx="1724660" cy="1126490"/>
+          </a:xfrm>
+          <a:prstGeom prst="rect">
+            <a:avLst/>
+          </a:prstGeom>
+          <a:gradFill rotWithShape="0">
+            <a:gsLst>
+              <a:gs pos="0">
+                <a:schemeClr val="accent1"/>
+              </a:gs>
+              <a:gs pos="100000">
+                <a:schemeClr val="accent2"/>
+              </a:gs>
+            </a:gsLst>
+            <a:lin ang="5400000" scaled="1"/>
+          </a:gradFill>
+          <a:ln w="9525" cap="flat" cmpd="sng" algn="ctr">
+            <a:solidFill>
+              <a:schemeClr val="accent1"/>
+            </a:solidFill>
+            <a:prstDash val="solid"/>
+            <a:round/>
+            <a:headEnd type="none" w="med" len="med"/>
+            <a:tailEnd type="none" w="med" len="med"/>
           </a:ln>
         </p:spPr>
-        <p:style>
-          <a:lnRef idx="1">
-            <a:schemeClr val="accent1"/>
-          </a:lnRef>
-          <a:fillRef idx="0">
-            <a:schemeClr val="accent1"/>
-          </a:fillRef>
-          <a:effectRef idx="0">
-            <a:schemeClr val="accent1"/>
-          </a:effectRef>
-          <a:fontRef idx="minor">
-            <a:schemeClr val="tx1"/>
-          </a:fontRef>
-        </p:style>
-      </p:cxnSp>
-      <p:cxnSp>
-        <p:nvCxnSpPr>
-          <p:cNvPr id="276" name="Straight Arrow Connector 275"/>
-          <p:cNvCxnSpPr>
-            <a:endCxn id="277" idx="3"/>
-          </p:cNvCxnSpPr>
-          <p:nvPr/>
-        </p:nvCxnSpPr>
-        <p:spPr>
-          <a:xfrm flipH="1">
-            <a:off x="5179695" y="7458710"/>
-            <a:ext cx="660400" cy="7620"/>
-          </a:xfrm>
-          <a:prstGeom prst="straightConnector1">
-            <a:avLst/>
-          </a:prstGeom>
-          <a:ln>
-            <a:tailEnd type="triangle" w="med" len="med"/>
-          </a:ln>
-        </p:spPr>
-        <p:style>
-          <a:lnRef idx="1">
-            <a:schemeClr val="accent1"/>
-          </a:lnRef>
-          <a:fillRef idx="0">
-            <a:schemeClr val="accent1"/>
-          </a:fillRef>
-          <a:effectRef idx="0">
-            <a:schemeClr val="accent1"/>
-          </a:effectRef>
-          <a:fontRef idx="minor">
-            <a:schemeClr val="tx1"/>
-          </a:fontRef>
-        </p:style>
-      </p:cxnSp>
-      <p:grpSp>
-        <p:nvGrpSpPr>
-          <p:cNvPr id="268" name="Group 267"/>
-          <p:cNvGrpSpPr/>
-          <p:nvPr/>
-        </p:nvGrpSpPr>
-        <p:grpSpPr>
-          <a:xfrm rot="0">
-            <a:off x="5405120" y="4138930"/>
-            <a:ext cx="427355" cy="334010"/>
-            <a:chOff x="16290" y="4518"/>
-            <a:chExt cx="748" cy="584"/>
-          </a:xfrm>
-        </p:grpSpPr>
-        <p:pic>
-          <p:nvPicPr>
-            <p:cNvPr id="269" name="Picture 268"/>
-            <p:cNvPicPr>
-              <a:picLocks noChangeAspect="1"/>
-            </p:cNvPicPr>
-            <p:nvPr/>
-          </p:nvPicPr>
-          <p:blipFill>
-            <a:blip r:embed="rId1"/>
-            <a:stretch>
-              <a:fillRect/>
-            </a:stretch>
-          </p:blipFill>
-          <p:spPr>
-            <a:xfrm>
-              <a:off x="16290" y="4760"/>
-              <a:ext cx="301" cy="342"/>
-            </a:xfrm>
-            <a:prstGeom prst="rect">
-              <a:avLst/>
-            </a:prstGeom>
-          </p:spPr>
-        </p:pic>
-        <p:sp>
-          <p:nvSpPr>
-            <p:cNvPr id="270" name="Oval 269"/>
-            <p:cNvSpPr/>
-            <p:nvPr/>
-          </p:nvSpPr>
-          <p:spPr>
-            <a:xfrm>
-              <a:off x="16568" y="4588"/>
-              <a:ext cx="389" cy="383"/>
-            </a:xfrm>
-            <a:prstGeom prst="ellipse">
-              <a:avLst/>
-            </a:prstGeom>
-            <a:solidFill>
-              <a:schemeClr val="bg1"/>
-            </a:solidFill>
-            <a:ln>
+        <p:txBody>
+          <a:bodyPr vert="horz" wrap="none" lIns="91440" tIns="45720" rIns="91440" bIns="45720" numCol="1" anchor="ctr" anchorCtr="0" compatLnSpc="1"/>
+          <a:p>
+            <a:pPr marL="0" marR="0" indent="0" algn="l" defTabSz="914400" rtl="0" eaLnBrk="1" fontAlgn="base" latinLnBrk="0" hangingPunct="1">
+              <a:lnSpc>
+                <a:spcPct val="100000"/>
+              </a:lnSpc>
+              <a:spcBef>
+                <a:spcPct val="0"/>
+              </a:spcBef>
+              <a:spcAft>
+                <a:spcPct val="0"/>
+              </a:spcAft>
+              <a:buClrTx/>
+              <a:buSzTx/>
+              <a:buFontTx/>
+              <a:buNone/>
+            </a:pPr>
+            <a:endParaRPr kumimoji="0" lang="zh-CN" altLang="en-US" sz="1800" b="0" i="0" u="none" strike="noStrike" cap="none" normalizeH="0" baseline="0" smtClean="0">
+              <a:ln>
+                <a:noFill/>
+              </a:ln>
               <a:solidFill>
-                <a:srgbClr val="E7971C"/>
+                <a:schemeClr val="tx1"/>
               </a:solidFill>
-            </a:ln>
-          </p:spPr>
-          <p:style>
-            <a:lnRef idx="2">
-              <a:schemeClr val="accent1">
-                <a:shade val="50000"/>
-              </a:schemeClr>
-            </a:lnRef>
-            <a:fillRef idx="1">
-              <a:schemeClr val="accent1"/>
-            </a:fillRef>
-            <a:effectRef idx="0">
-              <a:schemeClr val="accent1"/>
-            </a:effectRef>
-            <a:fontRef idx="minor">
-              <a:schemeClr val="lt1"/>
-            </a:fontRef>
-          </p:style>
-          <p:txBody>
-            <a:bodyPr rtlCol="0" anchor="ctr"/>
-            <a:p>
-              <a:pPr algn="ctr"/>
-              <a:endParaRPr lang="en-US" sz="1620"/>
-            </a:p>
-          </p:txBody>
-        </p:sp>
-        <p:pic>
-          <p:nvPicPr>
-            <p:cNvPr id="271" name="Picture 270"/>
-            <p:cNvPicPr>
-              <a:picLocks noChangeAspect="1"/>
-            </p:cNvPicPr>
-            <p:nvPr/>
-          </p:nvPicPr>
-          <p:blipFill>
-            <a:blip r:embed="rId2"/>
-            <a:stretch>
-              <a:fillRect/>
-            </a:stretch>
-          </p:blipFill>
-          <p:spPr>
-            <a:xfrm>
-              <a:off x="16474" y="4518"/>
-              <a:ext cx="565" cy="519"/>
-            </a:xfrm>
-            <a:prstGeom prst="rect">
-              <a:avLst/>
-            </a:prstGeom>
-          </p:spPr>
-        </p:pic>
-      </p:grpSp>
+              <a:effectLst/>
+              <a:latin typeface="Arial" panose="02080604020202020204" pitchFamily="34" charset="0"/>
+              <a:ea typeface="SimSun" pitchFamily="2" charset="-122"/>
+            </a:endParaRPr>
+          </a:p>
+        </p:txBody>
+      </p:sp>
       <p:grpSp>
         <p:nvGrpSpPr>
           <p:cNvPr id="272" name="Group 271"/>
@@ -24135,7 +23581,7 @@
         </p:nvGrpSpPr>
         <p:grpSpPr>
           <a:xfrm rot="0">
-            <a:off x="5408295" y="6641465"/>
+            <a:off x="4239895" y="6641465"/>
             <a:ext cx="427355" cy="334010"/>
             <a:chOff x="16290" y="4518"/>
             <a:chExt cx="748" cy="584"/>
@@ -24150,7 +23596,7 @@
             <p:nvPr/>
           </p:nvPicPr>
           <p:blipFill>
-            <a:blip r:embed="rId1"/>
+            <a:blip r:embed="rId2"/>
             <a:stretch>
               <a:fillRect/>
             </a:stretch>
@@ -24221,7 +23667,7 @@
             <p:nvPr/>
           </p:nvPicPr>
           <p:blipFill>
-            <a:blip r:embed="rId2"/>
+            <a:blip r:embed="rId3"/>
             <a:stretch>
               <a:fillRect/>
             </a:stretch>
@@ -24237,54 +23683,6 @@
           </p:spPr>
         </p:pic>
       </p:grpSp>
-      <p:pic>
-        <p:nvPicPr>
-          <p:cNvPr id="237" name="Picture 236"/>
-          <p:cNvPicPr>
-            <a:picLocks noChangeAspect="1"/>
-          </p:cNvPicPr>
-          <p:nvPr/>
-        </p:nvPicPr>
-        <p:blipFill>
-          <a:blip r:embed="rId3"/>
-          <a:stretch>
-            <a:fillRect/>
-          </a:stretch>
-        </p:blipFill>
-        <p:spPr>
-          <a:xfrm>
-            <a:off x="5510530" y="6917055"/>
-            <a:ext cx="967105" cy="864235"/>
-          </a:xfrm>
-          <a:prstGeom prst="rect">
-            <a:avLst/>
-          </a:prstGeom>
-        </p:spPr>
-      </p:pic>
-      <p:pic>
-        <p:nvPicPr>
-          <p:cNvPr id="245" name="Picture 244"/>
-          <p:cNvPicPr>
-            <a:picLocks noChangeAspect="1"/>
-          </p:cNvPicPr>
-          <p:nvPr/>
-        </p:nvPicPr>
-        <p:blipFill>
-          <a:blip r:embed="rId4"/>
-          <a:stretch>
-            <a:fillRect/>
-          </a:stretch>
-        </p:blipFill>
-        <p:spPr>
-          <a:xfrm>
-            <a:off x="5510530" y="4407535"/>
-            <a:ext cx="951865" cy="2018665"/>
-          </a:xfrm>
-          <a:prstGeom prst="rect">
-            <a:avLst/>
-          </a:prstGeom>
-        </p:spPr>
-      </p:pic>
       <p:sp>
         <p:nvSpPr>
           <p:cNvPr id="22" name="Flowchart: Decision 21"/>
@@ -24293,12 +23691,19 @@
         </p:nvSpPr>
         <p:spPr>
           <a:xfrm>
-            <a:off x="7506401" y="6909584"/>
+            <a:off x="6346595" y="6909584"/>
             <a:ext cx="664670" cy="488644"/>
           </a:xfrm>
           <a:prstGeom prst="flowChartDecision">
             <a:avLst/>
           </a:prstGeom>
+          <a:effectLst>
+            <a:outerShdw blurRad="50800" dist="38100" dir="8100000" algn="tr" rotWithShape="0">
+              <a:prstClr val="black">
+                <a:alpha val="40000"/>
+              </a:prstClr>
+            </a:outerShdw>
+          </a:effectLst>
         </p:spPr>
         <p:style>
           <a:lnRef idx="2">
@@ -24363,7 +23768,7 @@
         </p:nvCxnSpPr>
         <p:spPr>
           <a:xfrm>
-            <a:off x="7837170" y="6563360"/>
+            <a:off x="6677978" y="6563360"/>
             <a:ext cx="1905" cy="325755"/>
           </a:xfrm>
           <a:prstGeom prst="straightConnector1">
@@ -24372,6 +23777,13 @@
           <a:ln>
             <a:tailEnd type="triangle" w="med" len="med"/>
           </a:ln>
+          <a:effectLst>
+            <a:outerShdw blurRad="50800" dist="38100" dir="8100000" algn="tr" rotWithShape="0">
+              <a:prstClr val="black">
+                <a:alpha val="40000"/>
+              </a:prstClr>
+            </a:outerShdw>
+          </a:effectLst>
         </p:spPr>
         <p:style>
           <a:lnRef idx="1">
@@ -24390,429 +23802,99 @@
       </p:cxnSp>
       <p:grpSp>
         <p:nvGrpSpPr>
-          <p:cNvPr id="303" name="Group 302"/>
+          <p:cNvPr id="233" name="Group 232"/>
           <p:cNvGrpSpPr/>
           <p:nvPr/>
         </p:nvGrpSpPr>
         <p:grpSpPr>
           <a:xfrm>
-            <a:off x="9576435" y="5320030"/>
-            <a:ext cx="1210945" cy="631126"/>
-            <a:chOff x="16442" y="7775"/>
-            <a:chExt cx="1907" cy="994"/>
-          </a:xfrm>
-        </p:grpSpPr>
-        <p:grpSp>
-          <p:nvGrpSpPr>
-            <p:cNvPr id="30" name="Group 29"/>
-            <p:cNvGrpSpPr/>
-            <p:nvPr/>
-          </p:nvGrpSpPr>
-          <p:grpSpPr>
-            <a:xfrm rot="0">
-              <a:off x="16679" y="8099"/>
-              <a:ext cx="1670" cy="670"/>
-              <a:chOff x="13390" y="2057"/>
-              <a:chExt cx="1855" cy="745"/>
-            </a:xfrm>
-          </p:grpSpPr>
-          <p:sp>
-            <p:nvSpPr>
-              <p:cNvPr id="31" name="Rectangles 30"/>
-              <p:cNvSpPr/>
-              <p:nvPr/>
-            </p:nvSpPr>
-            <p:spPr>
-              <a:xfrm>
-                <a:off x="13390" y="2057"/>
-                <a:ext cx="1855" cy="226"/>
-              </a:xfrm>
-              <a:prstGeom prst="rect">
-                <a:avLst/>
-              </a:prstGeom>
-            </p:spPr>
-            <p:style>
-              <a:lnRef idx="2">
-                <a:schemeClr val="dk1">
-                  <a:shade val="50000"/>
-                </a:schemeClr>
-              </a:lnRef>
-              <a:fillRef idx="1">
-                <a:schemeClr val="dk1"/>
-              </a:fillRef>
-              <a:effectRef idx="0">
-                <a:schemeClr val="dk1"/>
-              </a:effectRef>
-              <a:fontRef idx="minor">
-                <a:schemeClr val="lt1"/>
-              </a:fontRef>
-            </p:style>
-            <p:txBody>
-              <a:bodyPr rtlCol="0" anchor="ctr"/>
-              <a:p>
-                <a:pPr algn="ctr"/>
-                <a:r>
-                  <a:rPr lang="en-US" sz="720"/>
-                  <a:t>REST API</a:t>
-                </a:r>
-                <a:endParaRPr lang="en-US" sz="720"/>
-              </a:p>
-            </p:txBody>
-          </p:sp>
-          <p:sp>
-            <p:nvSpPr>
-              <p:cNvPr id="32" name="Rectangles 31"/>
-              <p:cNvSpPr/>
-              <p:nvPr/>
-            </p:nvSpPr>
-            <p:spPr>
-              <a:xfrm>
-                <a:off x="13390" y="2314"/>
-                <a:ext cx="1855" cy="226"/>
-              </a:xfrm>
-              <a:prstGeom prst="rect">
-                <a:avLst/>
-              </a:prstGeom>
-            </p:spPr>
-            <p:style>
-              <a:lnRef idx="2">
-                <a:schemeClr val="accent1">
-                  <a:shade val="50000"/>
-                </a:schemeClr>
-              </a:lnRef>
-              <a:fillRef idx="1">
-                <a:schemeClr val="accent1"/>
-              </a:fillRef>
-              <a:effectRef idx="0">
-                <a:schemeClr val="accent1"/>
-              </a:effectRef>
-              <a:fontRef idx="minor">
-                <a:schemeClr val="lt1"/>
-              </a:fontRef>
-            </p:style>
-            <p:txBody>
-              <a:bodyPr rtlCol="0" anchor="ctr"/>
-              <a:p>
-                <a:pPr algn="ctr"/>
-                <a:r>
-                  <a:rPr lang="en-US" sz="720">
-                    <a:sym typeface="+mn-ea"/>
-                  </a:rPr>
-                  <a:t>Import</a:t>
-                </a:r>
-                <a:endParaRPr lang="en-US" sz="720"/>
-              </a:p>
-            </p:txBody>
-          </p:sp>
-          <p:sp>
-            <p:nvSpPr>
-              <p:cNvPr id="34" name="Rectangles 33"/>
-              <p:cNvSpPr/>
-              <p:nvPr/>
-            </p:nvSpPr>
-            <p:spPr>
-              <a:xfrm>
-                <a:off x="13390" y="2576"/>
-                <a:ext cx="1855" cy="226"/>
-              </a:xfrm>
-              <a:prstGeom prst="rect">
-                <a:avLst/>
-              </a:prstGeom>
-            </p:spPr>
-            <p:style>
-              <a:lnRef idx="2">
-                <a:schemeClr val="accent1">
-                  <a:shade val="50000"/>
-                </a:schemeClr>
-              </a:lnRef>
-              <a:fillRef idx="1">
-                <a:schemeClr val="accent1"/>
-              </a:fillRef>
-              <a:effectRef idx="0">
-                <a:schemeClr val="accent1"/>
-              </a:effectRef>
-              <a:fontRef idx="minor">
-                <a:schemeClr val="lt1"/>
-              </a:fontRef>
-            </p:style>
-            <p:txBody>
-              <a:bodyPr rtlCol="0" anchor="ctr"/>
-              <a:p>
-                <a:pPr algn="ctr"/>
-                <a:r>
-                  <a:rPr lang="en-US" sz="720">
-                    <a:sym typeface="+mn-ea"/>
-                  </a:rPr>
-                  <a:t>Fetch Active</a:t>
-                </a:r>
-                <a:endParaRPr lang="en-US" sz="720"/>
-              </a:p>
-            </p:txBody>
-          </p:sp>
-        </p:grpSp>
-        <p:grpSp>
-          <p:nvGrpSpPr>
-            <p:cNvPr id="138" name="Group 137"/>
-            <p:cNvGrpSpPr/>
-            <p:nvPr/>
-          </p:nvGrpSpPr>
-          <p:grpSpPr>
-            <a:xfrm rot="0">
-              <a:off x="16442" y="7775"/>
-              <a:ext cx="573" cy="452"/>
-              <a:chOff x="10155" y="414"/>
-              <a:chExt cx="1146" cy="883"/>
-            </a:xfrm>
-          </p:grpSpPr>
-          <p:grpSp>
-            <p:nvGrpSpPr>
-              <p:cNvPr id="139" name="Group 138"/>
-              <p:cNvGrpSpPr/>
-              <p:nvPr/>
-            </p:nvGrpSpPr>
-            <p:grpSpPr>
-              <a:xfrm>
-                <a:off x="10155" y="414"/>
-                <a:ext cx="854" cy="770"/>
-                <a:chOff x="1264" y="991"/>
-                <a:chExt cx="854" cy="770"/>
-              </a:xfrm>
-            </p:grpSpPr>
-            <p:pic>
-              <p:nvPicPr>
-                <p:cNvPr id="140" name="Picture 139"/>
-                <p:cNvPicPr>
-                  <a:picLocks noChangeAspect="1"/>
-                </p:cNvPicPr>
-                <p:nvPr/>
-              </p:nvPicPr>
-              <p:blipFill>
-                <a:blip r:embed="rId5"/>
-                <a:stretch>
-                  <a:fillRect/>
-                </a:stretch>
-              </p:blipFill>
-              <p:spPr>
-                <a:xfrm>
-                  <a:off x="1264" y="991"/>
-                  <a:ext cx="854" cy="618"/>
-                </a:xfrm>
-                <a:prstGeom prst="rect">
-                  <a:avLst/>
-                </a:prstGeom>
-              </p:spPr>
-            </p:pic>
-            <p:pic>
-              <p:nvPicPr>
-                <p:cNvPr id="141" name="Picture 140"/>
-                <p:cNvPicPr>
-                  <a:picLocks noChangeAspect="1"/>
-                </p:cNvPicPr>
-                <p:nvPr/>
-              </p:nvPicPr>
-              <p:blipFill>
-                <a:blip r:embed="rId1"/>
-                <a:stretch>
-                  <a:fillRect/>
-                </a:stretch>
-              </p:blipFill>
-              <p:spPr>
-                <a:xfrm>
-                  <a:off x="1464" y="1201"/>
-                  <a:ext cx="454" cy="560"/>
-                </a:xfrm>
-                <a:prstGeom prst="rect">
-                  <a:avLst/>
-                </a:prstGeom>
-              </p:spPr>
-            </p:pic>
-          </p:grpSp>
-          <p:pic>
-            <p:nvPicPr>
-              <p:cNvPr id="142" name="Picture 141"/>
-              <p:cNvPicPr>
-                <a:picLocks noChangeAspect="1"/>
-              </p:cNvPicPr>
-              <p:nvPr/>
-            </p:nvPicPr>
-            <p:blipFill>
-              <a:blip r:embed="rId6"/>
-              <a:stretch>
-                <a:fillRect/>
-              </a:stretch>
-            </p:blipFill>
-            <p:spPr>
-              <a:xfrm>
-                <a:off x="10626" y="1033"/>
-                <a:ext cx="675" cy="264"/>
-              </a:xfrm>
-              <a:prstGeom prst="rect">
-                <a:avLst/>
-              </a:prstGeom>
-            </p:spPr>
-          </p:pic>
-        </p:grpSp>
-      </p:grpSp>
-      <p:cxnSp>
-        <p:nvCxnSpPr>
-          <p:cNvPr id="37" name="Straight Arrow Connector 36"/>
-          <p:cNvCxnSpPr/>
-          <p:nvPr/>
-        </p:nvCxnSpPr>
-        <p:spPr>
-          <a:xfrm flipH="1">
-            <a:off x="10257155" y="4874895"/>
-            <a:ext cx="1270" cy="650875"/>
-          </a:xfrm>
-          <a:prstGeom prst="straightConnector1">
-            <a:avLst/>
-          </a:prstGeom>
-          <a:ln>
-            <a:tailEnd type="triangle"/>
-          </a:ln>
-        </p:spPr>
-        <p:style>
-          <a:lnRef idx="1">
-            <a:schemeClr val="accent1"/>
-          </a:lnRef>
-          <a:fillRef idx="0">
-            <a:schemeClr val="accent1"/>
-          </a:fillRef>
-          <a:effectRef idx="0">
-            <a:schemeClr val="accent1"/>
-          </a:effectRef>
-          <a:fontRef idx="minor">
-            <a:schemeClr val="tx1"/>
-          </a:fontRef>
-        </p:style>
-      </p:cxnSp>
-      <p:cxnSp>
-        <p:nvCxnSpPr>
-          <p:cNvPr id="38" name="Straight Arrow Connector 37"/>
-          <p:cNvCxnSpPr/>
-          <p:nvPr/>
-        </p:nvCxnSpPr>
-        <p:spPr>
-          <a:xfrm>
-            <a:off x="10787594" y="5743783"/>
-            <a:ext cx="299473" cy="3429"/>
-          </a:xfrm>
-          <a:prstGeom prst="straightConnector1">
-            <a:avLst/>
-          </a:prstGeom>
-          <a:ln>
-            <a:tailEnd type="triangle"/>
-          </a:ln>
-        </p:spPr>
-        <p:style>
-          <a:lnRef idx="1">
-            <a:schemeClr val="accent1"/>
-          </a:lnRef>
-          <a:fillRef idx="0">
-            <a:schemeClr val="accent1"/>
-          </a:fillRef>
-          <a:effectRef idx="0">
-            <a:schemeClr val="accent1"/>
-          </a:effectRef>
-          <a:fontRef idx="minor">
-            <a:schemeClr val="tx1"/>
-          </a:fontRef>
-        </p:style>
-      </p:cxnSp>
-      <p:cxnSp>
-        <p:nvCxnSpPr>
-          <p:cNvPr id="64" name="Straight Arrow Connector 63"/>
-          <p:cNvCxnSpPr/>
-          <p:nvPr/>
-        </p:nvCxnSpPr>
-        <p:spPr>
-          <a:xfrm flipH="1" flipV="1">
-            <a:off x="10788015" y="4518025"/>
-            <a:ext cx="353060" cy="635"/>
-          </a:xfrm>
-          <a:prstGeom prst="straightConnector1">
-            <a:avLst/>
-          </a:prstGeom>
-          <a:ln>
-            <a:tailEnd type="triangle"/>
-          </a:ln>
-        </p:spPr>
-        <p:style>
-          <a:lnRef idx="1">
-            <a:schemeClr val="accent1"/>
-          </a:lnRef>
-          <a:fillRef idx="0">
-            <a:schemeClr val="accent1"/>
-          </a:fillRef>
-          <a:effectRef idx="0">
-            <a:schemeClr val="accent1"/>
-          </a:effectRef>
-          <a:fontRef idx="minor">
-            <a:schemeClr val="tx1"/>
-          </a:fontRef>
-        </p:style>
-      </p:cxnSp>
-      <p:cxnSp>
-        <p:nvCxnSpPr>
-          <p:cNvPr id="66" name="Straight Arrow Connector 65"/>
-          <p:cNvCxnSpPr/>
-          <p:nvPr/>
-        </p:nvCxnSpPr>
-        <p:spPr>
-          <a:xfrm flipH="1">
-            <a:off x="10788015" y="5884545"/>
-            <a:ext cx="339725" cy="3175"/>
-          </a:xfrm>
-          <a:prstGeom prst="straightConnector1">
-            <a:avLst/>
-          </a:prstGeom>
-          <a:ln>
-            <a:tailEnd type="triangle"/>
-          </a:ln>
-        </p:spPr>
-        <p:style>
-          <a:lnRef idx="1">
-            <a:schemeClr val="accent1"/>
-          </a:lnRef>
-          <a:fillRef idx="0">
-            <a:schemeClr val="accent1"/>
-          </a:fillRef>
-          <a:effectRef idx="0">
-            <a:schemeClr val="accent1"/>
-          </a:effectRef>
-          <a:fontRef idx="minor">
-            <a:schemeClr val="tx1"/>
-          </a:fontRef>
-        </p:style>
-      </p:cxnSp>
-      <p:grpSp>
-        <p:nvGrpSpPr>
-          <p:cNvPr id="87" name="Group 86"/>
-          <p:cNvGrpSpPr/>
-          <p:nvPr/>
-        </p:nvGrpSpPr>
-        <p:grpSpPr>
-          <a:xfrm>
-            <a:off x="9728009" y="4451786"/>
-            <a:ext cx="1060157" cy="428635"/>
-            <a:chOff x="12732" y="1607"/>
-            <a:chExt cx="1855" cy="750"/>
+            <a:off x="8458835" y="5320030"/>
+            <a:ext cx="1210945" cy="630555"/>
+            <a:chOff x="13321" y="8378"/>
+            <a:chExt cx="1907" cy="993"/>
           </a:xfrm>
         </p:grpSpPr>
         <p:sp>
           <p:nvSpPr>
-            <p:cNvPr id="148" name="Rectangles 147"/>
+            <p:cNvPr id="31" name="Rectangles 30"/>
             <p:cNvSpPr/>
             <p:nvPr/>
           </p:nvSpPr>
           <p:spPr>
             <a:xfrm>
-              <a:off x="12732" y="2131"/>
-              <a:ext cx="1855" cy="226"/>
+              <a:off x="13558" y="8692"/>
+              <a:ext cx="1670" cy="203"/>
             </a:xfrm>
             <a:prstGeom prst="rect">
               <a:avLst/>
             </a:prstGeom>
+            <a:effectLst>
+              <a:outerShdw blurRad="50800" dist="38100" dir="8100000" algn="tr" rotWithShape="0">
+                <a:prstClr val="black">
+                  <a:alpha val="40000"/>
+                </a:prstClr>
+              </a:outerShdw>
+            </a:effectLst>
+          </p:spPr>
+          <p:style>
+            <a:lnRef idx="2">
+              <a:schemeClr val="dk1">
+                <a:shade val="50000"/>
+              </a:schemeClr>
+            </a:lnRef>
+            <a:fillRef idx="1">
+              <a:schemeClr val="dk1"/>
+            </a:fillRef>
+            <a:effectRef idx="0">
+              <a:schemeClr val="dk1"/>
+            </a:effectRef>
+            <a:fontRef idx="minor">
+              <a:schemeClr val="lt1"/>
+            </a:fontRef>
+          </p:style>
+          <p:txBody>
+            <a:bodyPr vertOverflow="overflow" horzOverflow="overflow" vert="horz" wrap="square" numCol="1" spcCol="0" rtlCol="0" fromWordArt="0" anchor="ctr" anchorCtr="0" forceAA="0" compatLnSpc="1">
+              <a:noAutofit/>
+            </a:bodyPr>
+            <a:p>
+              <a:pPr lvl="0" algn="ctr">
+                <a:buClrTx/>
+                <a:buSzTx/>
+                <a:buFontTx/>
+              </a:pPr>
+              <a:r>
+                <a:rPr lang="en-US" sz="720">
+                  <a:sym typeface="+mn-ea"/>
+                </a:rPr>
+                <a:t>REST API</a:t>
+              </a:r>
+              <a:endParaRPr lang="en-US" sz="720">
+                <a:sym typeface="+mn-ea"/>
+              </a:endParaRPr>
+            </a:p>
+          </p:txBody>
+        </p:sp>
+        <p:sp>
+          <p:nvSpPr>
+            <p:cNvPr id="32" name="Rectangles 31"/>
+            <p:cNvSpPr/>
+            <p:nvPr/>
+          </p:nvSpPr>
+          <p:spPr>
+            <a:xfrm>
+              <a:off x="13558" y="8933"/>
+              <a:ext cx="1670" cy="203"/>
+            </a:xfrm>
+            <a:prstGeom prst="rect">
+              <a:avLst/>
+            </a:prstGeom>
+            <a:effectLst>
+              <a:outerShdw blurRad="50800" dist="38100" dir="8100000" algn="tr" rotWithShape="0">
+                <a:prstClr val="black">
+                  <a:alpha val="40000"/>
+                </a:prstClr>
+              </a:outerShdw>
+            </a:effectLst>
           </p:spPr>
           <p:style>
             <a:lnRef idx="2">
@@ -24831,17 +23913,323 @@
             </a:fontRef>
           </p:style>
           <p:txBody>
-            <a:bodyPr rtlCol="0" anchor="ctr"/>
+            <a:bodyPr vertOverflow="overflow" horzOverflow="overflow" vert="horz" wrap="square" numCol="1" spcCol="0" rtlCol="0" fromWordArt="0" anchor="ctr" anchorCtr="0" forceAA="0" compatLnSpc="1">
+              <a:noAutofit/>
+            </a:bodyPr>
             <a:p>
-              <a:pPr algn="ctr"/>
+              <a:pPr lvl="0" algn="ctr">
+                <a:buClrTx/>
+                <a:buSzTx/>
+                <a:buFontTx/>
+              </a:pPr>
               <a:r>
-                <a:rPr lang="en-US" sz="720"/>
-                <a:t>Timer</a:t>
+                <a:rPr lang="en-US" sz="720">
+                  <a:sym typeface="+mn-ea"/>
+                </a:rPr>
+                <a:t>Import</a:t>
               </a:r>
-              <a:endParaRPr lang="en-US" sz="720"/>
+              <a:endParaRPr lang="en-US" sz="720">
+                <a:sym typeface="+mn-ea"/>
+              </a:endParaRPr>
             </a:p>
           </p:txBody>
         </p:sp>
+        <p:sp>
+          <p:nvSpPr>
+            <p:cNvPr id="34" name="Rectangles 33"/>
+            <p:cNvSpPr/>
+            <p:nvPr/>
+          </p:nvSpPr>
+          <p:spPr>
+            <a:xfrm>
+              <a:off x="13558" y="9169"/>
+              <a:ext cx="1670" cy="203"/>
+            </a:xfrm>
+            <a:prstGeom prst="rect">
+              <a:avLst/>
+            </a:prstGeom>
+            <a:effectLst>
+              <a:outerShdw blurRad="50800" dist="38100" dir="8100000" algn="tr" rotWithShape="0">
+                <a:prstClr val="black">
+                  <a:alpha val="40000"/>
+                </a:prstClr>
+              </a:outerShdw>
+            </a:effectLst>
+          </p:spPr>
+          <p:style>
+            <a:lnRef idx="2">
+              <a:schemeClr val="accent1">
+                <a:shade val="50000"/>
+              </a:schemeClr>
+            </a:lnRef>
+            <a:fillRef idx="1">
+              <a:schemeClr val="accent1"/>
+            </a:fillRef>
+            <a:effectRef idx="0">
+              <a:schemeClr val="accent1"/>
+            </a:effectRef>
+            <a:fontRef idx="minor">
+              <a:schemeClr val="lt1"/>
+            </a:fontRef>
+          </p:style>
+          <p:txBody>
+            <a:bodyPr vertOverflow="overflow" horzOverflow="overflow" vert="horz" wrap="square" numCol="1" spcCol="0" rtlCol="0" fromWordArt="0" anchor="ctr" anchorCtr="0" forceAA="0" compatLnSpc="1">
+              <a:noAutofit/>
+            </a:bodyPr>
+            <a:p>
+              <a:pPr lvl="0" algn="ctr">
+                <a:buClrTx/>
+                <a:buSzTx/>
+                <a:buFontTx/>
+              </a:pPr>
+              <a:r>
+                <a:rPr lang="en-US" sz="720">
+                  <a:sym typeface="+mn-ea"/>
+                </a:rPr>
+                <a:t>Fetch Active</a:t>
+              </a:r>
+              <a:endParaRPr lang="en-US" sz="720">
+                <a:sym typeface="+mn-ea"/>
+              </a:endParaRPr>
+            </a:p>
+          </p:txBody>
+        </p:sp>
+        <p:grpSp>
+          <p:nvGrpSpPr>
+            <p:cNvPr id="139" name="Group 138"/>
+            <p:cNvGrpSpPr/>
+            <p:nvPr/>
+          </p:nvGrpSpPr>
+          <p:grpSpPr>
+            <a:xfrm rot="0">
+              <a:off x="13321" y="8378"/>
+              <a:ext cx="427" cy="394"/>
+              <a:chOff x="1264" y="991"/>
+              <a:chExt cx="854" cy="770"/>
+            </a:xfrm>
+          </p:grpSpPr>
+          <p:pic>
+            <p:nvPicPr>
+              <p:cNvPr id="140" name="Picture 139"/>
+              <p:cNvPicPr>
+                <a:picLocks noChangeAspect="1"/>
+              </p:cNvPicPr>
+              <p:nvPr/>
+            </p:nvPicPr>
+            <p:blipFill>
+              <a:blip r:embed="rId4"/>
+              <a:stretch>
+                <a:fillRect/>
+              </a:stretch>
+            </p:blipFill>
+            <p:spPr>
+              <a:xfrm>
+                <a:off x="1264" y="991"/>
+                <a:ext cx="854" cy="618"/>
+              </a:xfrm>
+              <a:prstGeom prst="rect">
+                <a:avLst/>
+              </a:prstGeom>
+            </p:spPr>
+          </p:pic>
+          <p:pic>
+            <p:nvPicPr>
+              <p:cNvPr id="141" name="Picture 140"/>
+              <p:cNvPicPr>
+                <a:picLocks noChangeAspect="1"/>
+              </p:cNvPicPr>
+              <p:nvPr/>
+            </p:nvPicPr>
+            <p:blipFill>
+              <a:blip r:embed="rId2"/>
+              <a:stretch>
+                <a:fillRect/>
+              </a:stretch>
+            </p:blipFill>
+            <p:spPr>
+              <a:xfrm>
+                <a:off x="1464" y="1201"/>
+                <a:ext cx="454" cy="560"/>
+              </a:xfrm>
+              <a:prstGeom prst="rect">
+                <a:avLst/>
+              </a:prstGeom>
+            </p:spPr>
+          </p:pic>
+        </p:grpSp>
+        <p:pic>
+          <p:nvPicPr>
+            <p:cNvPr id="142" name="Picture 141"/>
+            <p:cNvPicPr>
+              <a:picLocks noChangeAspect="1"/>
+            </p:cNvPicPr>
+            <p:nvPr/>
+          </p:nvPicPr>
+          <p:blipFill>
+            <a:blip r:embed="rId5"/>
+            <a:stretch>
+              <a:fillRect/>
+            </a:stretch>
+          </p:blipFill>
+          <p:spPr>
+            <a:xfrm>
+              <a:off x="13557" y="8695"/>
+              <a:ext cx="338" cy="135"/>
+            </a:xfrm>
+            <a:prstGeom prst="rect">
+              <a:avLst/>
+            </a:prstGeom>
+          </p:spPr>
+        </p:pic>
+      </p:grpSp>
+      <p:cxnSp>
+        <p:nvCxnSpPr>
+          <p:cNvPr id="38" name="Straight Arrow Connector 37"/>
+          <p:cNvCxnSpPr/>
+          <p:nvPr/>
+        </p:nvCxnSpPr>
+        <p:spPr>
+          <a:xfrm>
+            <a:off x="9669780" y="5737225"/>
+            <a:ext cx="712470" cy="3810"/>
+          </a:xfrm>
+          <a:prstGeom prst="straightConnector1">
+            <a:avLst/>
+          </a:prstGeom>
+          <a:ln>
+            <a:solidFill>
+              <a:schemeClr val="accent6">
+                <a:lumMod val="40000"/>
+                <a:lumOff val="60000"/>
+              </a:schemeClr>
+            </a:solidFill>
+            <a:tailEnd type="triangle"/>
+          </a:ln>
+          <a:effectLst>
+            <a:outerShdw blurRad="50800" dist="38100" dir="8100000" algn="tr" rotWithShape="0">
+              <a:prstClr val="black">
+                <a:alpha val="40000"/>
+              </a:prstClr>
+            </a:outerShdw>
+          </a:effectLst>
+        </p:spPr>
+        <p:style>
+          <a:lnRef idx="1">
+            <a:schemeClr val="accent1"/>
+          </a:lnRef>
+          <a:fillRef idx="0">
+            <a:schemeClr val="accent1"/>
+          </a:fillRef>
+          <a:effectRef idx="0">
+            <a:schemeClr val="accent1"/>
+          </a:effectRef>
+          <a:fontRef idx="minor">
+            <a:schemeClr val="tx1"/>
+          </a:fontRef>
+        </p:style>
+      </p:cxnSp>
+      <p:cxnSp>
+        <p:nvCxnSpPr>
+          <p:cNvPr id="64" name="Straight Arrow Connector 63"/>
+          <p:cNvCxnSpPr/>
+          <p:nvPr/>
+        </p:nvCxnSpPr>
+        <p:spPr>
+          <a:xfrm flipH="1">
+            <a:off x="9670415" y="4517390"/>
+            <a:ext cx="751840" cy="635"/>
+          </a:xfrm>
+          <a:prstGeom prst="straightConnector1">
+            <a:avLst/>
+          </a:prstGeom>
+          <a:ln>
+            <a:tailEnd type="triangle"/>
+          </a:ln>
+          <a:effectLst>
+            <a:outerShdw blurRad="50800" dist="38100" dir="8100000" algn="tr" rotWithShape="0">
+              <a:prstClr val="black">
+                <a:alpha val="40000"/>
+              </a:prstClr>
+            </a:outerShdw>
+          </a:effectLst>
+        </p:spPr>
+        <p:style>
+          <a:lnRef idx="1">
+            <a:schemeClr val="accent1"/>
+          </a:lnRef>
+          <a:fillRef idx="0">
+            <a:schemeClr val="accent1"/>
+          </a:fillRef>
+          <a:effectRef idx="0">
+            <a:schemeClr val="accent1"/>
+          </a:effectRef>
+          <a:fontRef idx="minor">
+            <a:schemeClr val="tx1"/>
+          </a:fontRef>
+        </p:style>
+      </p:cxnSp>
+      <p:cxnSp>
+        <p:nvCxnSpPr>
+          <p:cNvPr id="66" name="Straight Arrow Connector 65"/>
+          <p:cNvCxnSpPr>
+            <a:endCxn id="7" idx="3"/>
+          </p:cNvCxnSpPr>
+          <p:nvPr/>
+        </p:nvCxnSpPr>
+        <p:spPr>
+          <a:xfrm flipH="1">
+            <a:off x="10096500" y="5885180"/>
+            <a:ext cx="421640" cy="1905"/>
+          </a:xfrm>
+          <a:prstGeom prst="straightConnector1">
+            <a:avLst/>
+          </a:prstGeom>
+          <a:ln>
+            <a:solidFill>
+              <a:schemeClr val="accent6">
+                <a:lumMod val="40000"/>
+                <a:lumOff val="60000"/>
+              </a:schemeClr>
+            </a:solidFill>
+            <a:tailEnd type="triangle"/>
+          </a:ln>
+          <a:effectLst>
+            <a:outerShdw blurRad="50800" dist="38100" dir="8100000" algn="tr" rotWithShape="0">
+              <a:prstClr val="black">
+                <a:alpha val="40000"/>
+              </a:prstClr>
+            </a:outerShdw>
+          </a:effectLst>
+        </p:spPr>
+        <p:style>
+          <a:lnRef idx="1">
+            <a:schemeClr val="accent1"/>
+          </a:lnRef>
+          <a:fillRef idx="0">
+            <a:schemeClr val="accent1"/>
+          </a:fillRef>
+          <a:effectRef idx="0">
+            <a:schemeClr val="accent1"/>
+          </a:effectRef>
+          <a:fontRef idx="minor">
+            <a:schemeClr val="tx1"/>
+          </a:fontRef>
+        </p:style>
+      </p:cxnSp>
+      <p:grpSp>
+        <p:nvGrpSpPr>
+          <p:cNvPr id="242" name="Group 241"/>
+          <p:cNvGrpSpPr/>
+          <p:nvPr/>
+        </p:nvGrpSpPr>
+        <p:grpSpPr>
+          <a:xfrm>
+            <a:off x="8458200" y="4249420"/>
+            <a:ext cx="1212850" cy="479425"/>
+            <a:chOff x="13320" y="6692"/>
+            <a:chExt cx="1910" cy="755"/>
+          </a:xfrm>
+        </p:grpSpPr>
         <p:sp>
           <p:nvSpPr>
             <p:cNvPr id="8" name="Rectangles 7"/>
@@ -24850,12 +24238,19 @@
           </p:nvSpPr>
           <p:spPr>
             <a:xfrm>
-              <a:off x="12732" y="1607"/>
-              <a:ext cx="1855" cy="226"/>
+              <a:off x="13560" y="7011"/>
+              <a:ext cx="1670" cy="203"/>
             </a:xfrm>
             <a:prstGeom prst="rect">
               <a:avLst/>
             </a:prstGeom>
+            <a:effectLst>
+              <a:outerShdw blurRad="50800" dist="38100" dir="8100000" algn="tr" rotWithShape="0">
+                <a:prstClr val="black">
+                  <a:alpha val="40000"/>
+                </a:prstClr>
+              </a:outerShdw>
+            </a:effectLst>
           </p:spPr>
           <p:style>
             <a:lnRef idx="2">
@@ -24874,14 +24269,24 @@
             </a:fontRef>
           </p:style>
           <p:txBody>
-            <a:bodyPr rtlCol="0" anchor="ctr"/>
+            <a:bodyPr vertOverflow="overflow" horzOverflow="overflow" vert="horz" wrap="square" numCol="1" spcCol="0" rtlCol="0" fromWordArt="0" anchor="ctr" anchorCtr="0" forceAA="0" compatLnSpc="1">
+              <a:noAutofit/>
+            </a:bodyPr>
             <a:p>
-              <a:pPr algn="ctr"/>
+              <a:pPr lvl="0" algn="ctr">
+                <a:buClrTx/>
+                <a:buSzTx/>
+                <a:buFontTx/>
+              </a:pPr>
               <a:r>
-                <a:rPr lang="en-US" sz="720"/>
+                <a:rPr lang="en-US" sz="720">
+                  <a:sym typeface="+mn-ea"/>
+                </a:rPr>
                 <a:t>Websocket</a:t>
               </a:r>
-              <a:endParaRPr lang="en-US" sz="720"/>
+              <a:endParaRPr lang="en-US" sz="720">
+                <a:sym typeface="+mn-ea"/>
+              </a:endParaRPr>
             </a:p>
           </p:txBody>
         </p:sp>
@@ -24893,12 +24298,19 @@
           </p:nvSpPr>
           <p:spPr>
             <a:xfrm>
-              <a:off x="12732" y="1867"/>
-              <a:ext cx="1855" cy="226"/>
+              <a:off x="13560" y="7245"/>
+              <a:ext cx="1670" cy="203"/>
             </a:xfrm>
             <a:prstGeom prst="rect">
               <a:avLst/>
             </a:prstGeom>
+            <a:effectLst>
+              <a:outerShdw blurRad="50800" dist="38100" dir="8100000" algn="tr" rotWithShape="0">
+                <a:prstClr val="black">
+                  <a:alpha val="40000"/>
+                </a:prstClr>
+              </a:outerShdw>
+            </a:effectLst>
           </p:spPr>
           <p:style>
             <a:lnRef idx="2">
@@ -24917,205 +24329,114 @@
             </a:fontRef>
           </p:style>
           <p:txBody>
-            <a:bodyPr rtlCol="0" anchor="ctr"/>
+            <a:bodyPr vertOverflow="overflow" horzOverflow="overflow" vert="horz" wrap="square" numCol="1" spcCol="0" rtlCol="0" fromWordArt="0" anchor="ctr" anchorCtr="0" forceAA="0" compatLnSpc="1">
+              <a:noAutofit/>
+            </a:bodyPr>
             <a:p>
-              <a:pPr algn="ctr"/>
+              <a:pPr lvl="0" algn="ctr">
+                <a:buClrTx/>
+                <a:buSzTx/>
+                <a:buFontTx/>
+              </a:pPr>
               <a:r>
-                <a:rPr lang="en-US" sz="720"/>
+                <a:rPr lang="en-US" sz="720">
+                  <a:sym typeface="+mn-ea"/>
+                </a:rPr>
                 <a:t>Message</a:t>
               </a:r>
-              <a:endParaRPr lang="en-US" sz="720"/>
+              <a:endParaRPr lang="en-US" sz="720">
+                <a:sym typeface="+mn-ea"/>
+              </a:endParaRPr>
             </a:p>
           </p:txBody>
         </p:sp>
-      </p:grpSp>
-      <p:grpSp>
-        <p:nvGrpSpPr>
-          <p:cNvPr id="96" name="Group 95"/>
-          <p:cNvGrpSpPr/>
-          <p:nvPr/>
-        </p:nvGrpSpPr>
-        <p:grpSpPr>
-          <a:xfrm>
-            <a:off x="9575987" y="4244581"/>
-            <a:ext cx="363482" cy="286900"/>
-            <a:chOff x="12459" y="1283"/>
-            <a:chExt cx="636" cy="502"/>
-          </a:xfrm>
-        </p:grpSpPr>
-        <p:pic>
-          <p:nvPicPr>
-            <p:cNvPr id="93" name="Picture 92"/>
-            <p:cNvPicPr>
-              <a:picLocks noChangeAspect="1"/>
-            </p:cNvPicPr>
+        <p:grpSp>
+          <p:nvGrpSpPr>
+            <p:cNvPr id="96" name="Group 95"/>
+            <p:cNvGrpSpPr/>
             <p:nvPr/>
-          </p:nvPicPr>
-          <p:blipFill>
-            <a:blip r:embed="rId5"/>
-            <a:stretch>
-              <a:fillRect/>
-            </a:stretch>
-          </p:blipFill>
-          <p:spPr>
-            <a:xfrm>
-              <a:off x="12459" y="1283"/>
-              <a:ext cx="475" cy="351"/>
+          </p:nvGrpSpPr>
+          <p:grpSpPr>
+            <a:xfrm rot="0">
+              <a:off x="13320" y="6692"/>
+              <a:ext cx="572" cy="452"/>
+              <a:chOff x="12459" y="1283"/>
+              <a:chExt cx="636" cy="502"/>
             </a:xfrm>
-            <a:prstGeom prst="rect">
-              <a:avLst/>
-            </a:prstGeom>
-          </p:spPr>
-        </p:pic>
-        <p:pic>
-          <p:nvPicPr>
-            <p:cNvPr id="94" name="Picture 93"/>
-            <p:cNvPicPr>
-              <a:picLocks noChangeAspect="1"/>
-            </p:cNvPicPr>
-            <p:nvPr/>
-          </p:nvPicPr>
-          <p:blipFill>
-            <a:blip r:embed="rId1"/>
-            <a:stretch>
-              <a:fillRect/>
-            </a:stretch>
-          </p:blipFill>
-          <p:spPr>
-            <a:xfrm>
-              <a:off x="12570" y="1402"/>
-              <a:ext cx="252" cy="318"/>
-            </a:xfrm>
-            <a:prstGeom prst="rect">
-              <a:avLst/>
-            </a:prstGeom>
-          </p:spPr>
-        </p:pic>
-        <p:pic>
-          <p:nvPicPr>
-            <p:cNvPr id="95" name="Picture 94"/>
-            <p:cNvPicPr>
-              <a:picLocks noChangeAspect="1"/>
-            </p:cNvPicPr>
-            <p:nvPr/>
-          </p:nvPicPr>
-          <p:blipFill>
-            <a:blip r:embed="rId6"/>
-            <a:stretch>
-              <a:fillRect/>
-            </a:stretch>
-          </p:blipFill>
-          <p:spPr>
-            <a:xfrm>
-              <a:off x="12721" y="1635"/>
-              <a:ext cx="375" cy="150"/>
-            </a:xfrm>
-            <a:prstGeom prst="rect">
-              <a:avLst/>
-            </a:prstGeom>
-          </p:spPr>
-        </p:pic>
-      </p:grpSp>
-      <p:grpSp>
-        <p:nvGrpSpPr>
-          <p:cNvPr id="102" name="Group 101"/>
-          <p:cNvGrpSpPr/>
-          <p:nvPr/>
-        </p:nvGrpSpPr>
-        <p:grpSpPr>
-          <a:xfrm>
-            <a:off x="10650431" y="4760025"/>
-            <a:ext cx="203459" cy="216032"/>
-            <a:chOff x="8092" y="1237"/>
-            <a:chExt cx="482" cy="524"/>
-          </a:xfrm>
-        </p:grpSpPr>
-        <p:sp>
-          <p:nvSpPr>
-            <p:cNvPr id="101" name="Oval 100"/>
-            <p:cNvSpPr/>
-            <p:nvPr/>
-          </p:nvSpPr>
-          <p:spPr>
-            <a:xfrm>
-              <a:off x="8092" y="1237"/>
-              <a:ext cx="482" cy="524"/>
-            </a:xfrm>
-            <a:prstGeom prst="ellipse">
-              <a:avLst/>
-            </a:prstGeom>
-            <a:solidFill>
-              <a:schemeClr val="bg2"/>
-            </a:solidFill>
-            <a:ln>
-              <a:solidFill>
-                <a:schemeClr val="tx1">
-                  <a:lumMod val="50000"/>
-                  <a:lumOff val="50000"/>
-                </a:schemeClr>
-              </a:solidFill>
-            </a:ln>
-          </p:spPr>
-          <p:style>
-            <a:lnRef idx="1">
-              <a:schemeClr val="accent1"/>
-            </a:lnRef>
-            <a:fillRef idx="3">
-              <a:schemeClr val="accent1"/>
-            </a:fillRef>
-            <a:effectRef idx="2">
-              <a:schemeClr val="accent1"/>
-            </a:effectRef>
-            <a:fontRef idx="minor">
-              <a:schemeClr val="lt1"/>
-            </a:fontRef>
-          </p:style>
-          <p:txBody>
-            <a:bodyPr rtlCol="0" anchor="ctr"/>
-            <a:p>
-              <a:pPr algn="ctr"/>
-              <a:endParaRPr lang="en-US" sz="1620"/>
-            </a:p>
-          </p:txBody>
-        </p:sp>
-        <p:pic>
-          <p:nvPicPr>
-            <p:cNvPr id="99" name="Picture 98"/>
-            <p:cNvPicPr>
-              <a:picLocks noChangeAspect="1"/>
-            </p:cNvPicPr>
-            <p:nvPr/>
-          </p:nvPicPr>
-          <p:blipFill>
-            <a:blip r:embed="rId7">
-              <a:clrChange>
-                <a:clrFrom>
-                  <a:srgbClr val="FFFFFF">
-                    <a:alpha val="100000"/>
-                  </a:srgbClr>
-                </a:clrFrom>
-                <a:clrTo>
-                  <a:srgbClr val="FFFFFF">
-                    <a:alpha val="100000"/>
-                    <a:alpha val="0"/>
-                  </a:srgbClr>
-                </a:clrTo>
-              </a:clrChange>
-            </a:blip>
-            <a:stretch>
-              <a:fillRect/>
-            </a:stretch>
-          </p:blipFill>
-          <p:spPr>
-            <a:xfrm>
-              <a:off x="8130" y="1345"/>
-              <a:ext cx="444" cy="408"/>
-            </a:xfrm>
-            <a:prstGeom prst="rect">
-              <a:avLst/>
-            </a:prstGeom>
-          </p:spPr>
-        </p:pic>
+          </p:grpSpPr>
+          <p:pic>
+            <p:nvPicPr>
+              <p:cNvPr id="93" name="Picture 92"/>
+              <p:cNvPicPr>
+                <a:picLocks noChangeAspect="1"/>
+              </p:cNvPicPr>
+              <p:nvPr/>
+            </p:nvPicPr>
+            <p:blipFill>
+              <a:blip r:embed="rId4"/>
+              <a:stretch>
+                <a:fillRect/>
+              </a:stretch>
+            </p:blipFill>
+            <p:spPr>
+              <a:xfrm>
+                <a:off x="12459" y="1283"/>
+                <a:ext cx="475" cy="351"/>
+              </a:xfrm>
+              <a:prstGeom prst="rect">
+                <a:avLst/>
+              </a:prstGeom>
+            </p:spPr>
+          </p:pic>
+          <p:pic>
+            <p:nvPicPr>
+              <p:cNvPr id="94" name="Picture 93"/>
+              <p:cNvPicPr>
+                <a:picLocks noChangeAspect="1"/>
+              </p:cNvPicPr>
+              <p:nvPr/>
+            </p:nvPicPr>
+            <p:blipFill>
+              <a:blip r:embed="rId2"/>
+              <a:stretch>
+                <a:fillRect/>
+              </a:stretch>
+            </p:blipFill>
+            <p:spPr>
+              <a:xfrm>
+                <a:off x="12570" y="1402"/>
+                <a:ext cx="252" cy="318"/>
+              </a:xfrm>
+              <a:prstGeom prst="rect">
+                <a:avLst/>
+              </a:prstGeom>
+            </p:spPr>
+          </p:pic>
+          <p:pic>
+            <p:nvPicPr>
+              <p:cNvPr id="95" name="Picture 94"/>
+              <p:cNvPicPr>
+                <a:picLocks noChangeAspect="1"/>
+              </p:cNvPicPr>
+              <p:nvPr/>
+            </p:nvPicPr>
+            <p:blipFill>
+              <a:blip r:embed="rId5"/>
+              <a:stretch>
+                <a:fillRect/>
+              </a:stretch>
+            </p:blipFill>
+            <p:spPr>
+              <a:xfrm>
+                <a:off x="12721" y="1635"/>
+                <a:ext cx="375" cy="150"/>
+              </a:xfrm>
+              <a:prstGeom prst="rect">
+                <a:avLst/>
+              </a:prstGeom>
+            </p:spPr>
+          </p:pic>
+        </p:grpSp>
       </p:grpSp>
       <p:cxnSp>
         <p:nvCxnSpPr>
@@ -25128,8 +24449,8 @@
         </p:nvCxnSpPr>
         <p:spPr>
           <a:xfrm flipH="1">
-            <a:off x="6845935" y="7153910"/>
-            <a:ext cx="660400" cy="7620"/>
+            <a:off x="5728335" y="7153910"/>
+            <a:ext cx="618490" cy="7620"/>
           </a:xfrm>
           <a:prstGeom prst="straightConnector1">
             <a:avLst/>
@@ -25137,6 +24458,13 @@
           <a:ln>
             <a:tailEnd type="triangle" w="med" len="med"/>
           </a:ln>
+          <a:effectLst>
+            <a:outerShdw blurRad="50800" dist="38100" dir="8100000" algn="tr" rotWithShape="0">
+              <a:prstClr val="black">
+                <a:alpha val="40000"/>
+              </a:prstClr>
+            </a:outerShdw>
+          </a:effectLst>
         </p:spPr>
         <p:style>
           <a:lnRef idx="1">
@@ -25161,12 +24489,19 @@
         </p:nvSpPr>
         <p:spPr>
           <a:xfrm>
-            <a:off x="7118243" y="7068655"/>
+            <a:off x="6000643" y="7068655"/>
             <a:ext cx="148022" cy="159452"/>
           </a:xfrm>
           <a:prstGeom prst="ellipse">
             <a:avLst/>
           </a:prstGeom>
+          <a:effectLst>
+            <a:outerShdw blurRad="50800" dist="38100" dir="8100000" algn="tr" rotWithShape="0">
+              <a:prstClr val="black">
+                <a:alpha val="40000"/>
+              </a:prstClr>
+            </a:outerShdw>
+          </a:effectLst>
         </p:spPr>
         <p:style>
           <a:lnRef idx="1">
@@ -25202,7 +24537,7 @@
         </p:nvSpPr>
         <p:spPr>
           <a:xfrm>
-            <a:off x="10556240" y="2962910"/>
+            <a:off x="9853930" y="2962910"/>
             <a:ext cx="2003425" cy="368300"/>
           </a:xfrm>
           <a:prstGeom prst="rect">
@@ -25252,19 +24587,26 @@
           <p:nvPr/>
         </p:nvPicPr>
         <p:blipFill>
-          <a:blip r:embed="rId8"/>
+          <a:blip r:embed="rId6"/>
           <a:stretch>
             <a:fillRect/>
           </a:stretch>
         </p:blipFill>
         <p:spPr>
           <a:xfrm>
-            <a:off x="11087100" y="5279390"/>
+            <a:off x="10407650" y="5400040"/>
             <a:ext cx="1473200" cy="1500505"/>
           </a:xfrm>
           <a:prstGeom prst="rect">
             <a:avLst/>
           </a:prstGeom>
+          <a:effectLst>
+            <a:outerShdw blurRad="50800" dist="38100" dir="8100000" algn="tr" rotWithShape="0">
+              <a:prstClr val="black">
+                <a:alpha val="40000"/>
+              </a:prstClr>
+            </a:outerShdw>
+          </a:effectLst>
         </p:spPr>
       </p:pic>
       <p:pic>
@@ -25276,19 +24618,26 @@
           <p:nvPr/>
         </p:nvPicPr>
         <p:blipFill>
-          <a:blip r:embed="rId9"/>
+          <a:blip r:embed="rId7"/>
           <a:stretch>
             <a:fillRect/>
           </a:stretch>
         </p:blipFill>
         <p:spPr>
           <a:xfrm>
-            <a:off x="11087100" y="3693795"/>
+            <a:off x="10407650" y="3528695"/>
             <a:ext cx="1472565" cy="1543685"/>
           </a:xfrm>
           <a:prstGeom prst="rect">
             <a:avLst/>
           </a:prstGeom>
+          <a:effectLst>
+            <a:outerShdw blurRad="50800" dist="38100" dir="8100000" algn="tr" rotWithShape="0">
+              <a:prstClr val="black">
+                <a:alpha val="40000"/>
+              </a:prstClr>
+            </a:outerShdw>
+          </a:effectLst>
         </p:spPr>
       </p:pic>
       <p:sp>
@@ -25299,7 +24648,7 @@
         </p:nvSpPr>
         <p:spPr>
           <a:xfrm>
-            <a:off x="6360795" y="7094220"/>
+            <a:off x="5243195" y="7094220"/>
             <a:ext cx="485140" cy="133985"/>
           </a:xfrm>
           <a:prstGeom prst="flowChartTerminator">
@@ -25316,6 +24665,13 @@
               <a:schemeClr val="accent6"/>
             </a:solidFill>
           </a:ln>
+          <a:effectLst>
+            <a:outerShdw blurRad="50800" dist="38100" dir="8100000" algn="tr" rotWithShape="0">
+              <a:prstClr val="black">
+                <a:alpha val="40000"/>
+              </a:prstClr>
+            </a:outerShdw>
+          </a:effectLst>
         </p:spPr>
         <p:style>
           <a:lnRef idx="3">
@@ -25359,14 +24715,14 @@
       </p:sp>
       <p:sp>
         <p:nvSpPr>
-          <p:cNvPr id="312" name="Flowchart: Terminator 311"/>
+          <p:cNvPr id="82" name="Flowchart: Terminator 81"/>
           <p:cNvSpPr/>
           <p:nvPr/>
         </p:nvSpPr>
         <p:spPr>
           <a:xfrm>
-            <a:off x="6360160" y="5995670"/>
-            <a:ext cx="501015" cy="128905"/>
+            <a:off x="7165975" y="5777865"/>
+            <a:ext cx="679450" cy="209550"/>
           </a:xfrm>
           <a:prstGeom prst="flowChartTerminator">
             <a:avLst/>
@@ -25410,7 +24766,7 @@
                   </a:schemeClr>
                 </a:solidFill>
               </a:rPr>
-              <a:t>update</a:t>
+              <a:t>api positions array</a:t>
             </a:r>
             <a:endParaRPr lang="en-US" sz="450" b="1">
               <a:solidFill>
@@ -25423,18 +24779,56 @@
           </a:p>
         </p:txBody>
       </p:sp>
+      <p:cxnSp>
+        <p:nvCxnSpPr>
+          <p:cNvPr id="27" name="Elbow Connector 26"/>
+          <p:cNvCxnSpPr>
+            <a:stCxn id="54" idx="3"/>
+            <a:endCxn id="33" idx="3"/>
+          </p:cNvCxnSpPr>
+          <p:nvPr/>
+        </p:nvCxnSpPr>
+        <p:spPr>
+          <a:xfrm>
+            <a:off x="7209155" y="6054090"/>
+            <a:ext cx="511175" cy="159385"/>
+          </a:xfrm>
+          <a:prstGeom prst="bentConnector3">
+            <a:avLst>
+              <a:gd name="adj1" fmla="val 146584"/>
+            </a:avLst>
+          </a:prstGeom>
+          <a:ln>
+            <a:tailEnd type="triangle"/>
+          </a:ln>
+        </p:spPr>
+        <p:style>
+          <a:lnRef idx="1">
+            <a:schemeClr val="accent1"/>
+          </a:lnRef>
+          <a:fillRef idx="0">
+            <a:schemeClr val="accent1"/>
+          </a:fillRef>
+          <a:effectRef idx="0">
+            <a:schemeClr val="accent1"/>
+          </a:effectRef>
+          <a:fontRef idx="minor">
+            <a:schemeClr val="tx1"/>
+          </a:fontRef>
+        </p:style>
+      </p:cxnSp>
       <p:grpSp>
         <p:nvGrpSpPr>
-          <p:cNvPr id="29" name="Group 28"/>
+          <p:cNvPr id="230" name="Group 229"/>
           <p:cNvGrpSpPr/>
           <p:nvPr/>
         </p:nvGrpSpPr>
         <p:grpSpPr>
           <a:xfrm>
-            <a:off x="6861175" y="5777865"/>
-            <a:ext cx="2101850" cy="785060"/>
-            <a:chOff x="11390" y="8692"/>
-            <a:chExt cx="3310" cy="1236"/>
+            <a:off x="6148705" y="5838190"/>
+            <a:ext cx="1060450" cy="730250"/>
+            <a:chOff x="9683" y="9194"/>
+            <a:chExt cx="1670" cy="1150"/>
           </a:xfrm>
         </p:grpSpPr>
         <p:sp>
@@ -25445,12 +24839,19 @@
           </p:nvSpPr>
           <p:spPr>
             <a:xfrm>
-              <a:off x="12092" y="8805"/>
+              <a:off x="9683" y="9194"/>
               <a:ext cx="1670" cy="203"/>
             </a:xfrm>
             <a:prstGeom prst="rect">
               <a:avLst/>
             </a:prstGeom>
+            <a:effectLst>
+              <a:outerShdw blurRad="50800" dist="38100" dir="8100000" algn="tr" rotWithShape="0">
+                <a:prstClr val="black">
+                  <a:alpha val="40000"/>
+                </a:prstClr>
+              </a:outerShdw>
+            </a:effectLst>
           </p:spPr>
           <p:style>
             <a:lnRef idx="2">
@@ -25469,14 +24870,24 @@
             </a:fontRef>
           </p:style>
           <p:txBody>
-            <a:bodyPr rtlCol="0" anchor="ctr"/>
+            <a:bodyPr vertOverflow="overflow" horzOverflow="overflow" vert="horz" wrap="square" numCol="1" spcCol="0" rtlCol="0" fromWordArt="0" anchor="ctr" anchorCtr="0" forceAA="0" compatLnSpc="1">
+              <a:noAutofit/>
+            </a:bodyPr>
             <a:p>
-              <a:pPr algn="ctr"/>
+              <a:pPr lvl="0" algn="ctr">
+                <a:buClrTx/>
+                <a:buSzTx/>
+                <a:buFontTx/>
+              </a:pPr>
               <a:r>
-                <a:rPr lang="en-US" sz="720"/>
+                <a:rPr lang="en-US" sz="720">
+                  <a:sym typeface="+mn-ea"/>
+                </a:rPr>
                 <a:t>Publish</a:t>
               </a:r>
-              <a:endParaRPr lang="en-US" sz="720"/>
+              <a:endParaRPr lang="en-US" sz="720">
+                <a:sym typeface="+mn-ea"/>
+              </a:endParaRPr>
             </a:p>
           </p:txBody>
         </p:sp>
@@ -25488,12 +24899,19 @@
           </p:nvSpPr>
           <p:spPr>
             <a:xfrm>
-              <a:off x="12092" y="9033"/>
+              <a:off x="9683" y="9432"/>
               <a:ext cx="1670" cy="203"/>
             </a:xfrm>
             <a:prstGeom prst="rect">
               <a:avLst/>
             </a:prstGeom>
+            <a:effectLst>
+              <a:outerShdw blurRad="50800" dist="38100" dir="8100000" algn="tr" rotWithShape="0">
+                <a:prstClr val="black">
+                  <a:alpha val="40000"/>
+                </a:prstClr>
+              </a:outerShdw>
+            </a:effectLst>
           </p:spPr>
           <p:style>
             <a:lnRef idx="2">
@@ -25512,14 +24930,24 @@
             </a:fontRef>
           </p:style>
           <p:txBody>
-            <a:bodyPr rtlCol="0" anchor="ctr"/>
+            <a:bodyPr vertOverflow="overflow" horzOverflow="overflow" vert="horz" wrap="square" numCol="1" spcCol="0" rtlCol="0" fromWordArt="0" anchor="ctr" anchorCtr="0" forceAA="0" compatLnSpc="1">
+              <a:noAutofit/>
+            </a:bodyPr>
             <a:p>
-              <a:pPr algn="ctr"/>
+              <a:pPr lvl="0" algn="ctr">
+                <a:buClrTx/>
+                <a:buSzTx/>
+                <a:buFontTx/>
+              </a:pPr>
               <a:r>
-                <a:rPr lang="en-US" sz="720"/>
+                <a:rPr lang="en-US" sz="720">
+                  <a:sym typeface="+mn-ea"/>
+                </a:rPr>
                 <a:t>Publish</a:t>
               </a:r>
-              <a:endParaRPr lang="en-US" sz="720"/>
+              <a:endParaRPr lang="en-US" sz="720">
+                <a:sym typeface="+mn-ea"/>
+              </a:endParaRPr>
             </a:p>
           </p:txBody>
         </p:sp>
@@ -25531,12 +24959,19 @@
           </p:nvSpPr>
           <p:spPr>
             <a:xfrm>
-              <a:off x="12092" y="9492"/>
+              <a:off x="9683" y="9901"/>
               <a:ext cx="1670" cy="203"/>
             </a:xfrm>
             <a:prstGeom prst="rect">
               <a:avLst/>
             </a:prstGeom>
+            <a:effectLst>
+              <a:outerShdw blurRad="50800" dist="38100" dir="8100000" algn="tr" rotWithShape="0">
+                <a:prstClr val="black">
+                  <a:alpha val="40000"/>
+                </a:prstClr>
+              </a:outerShdw>
+            </a:effectLst>
           </p:spPr>
           <p:style>
             <a:lnRef idx="2">
@@ -25555,14 +24990,24 @@
             </a:fontRef>
           </p:style>
           <p:txBody>
-            <a:bodyPr rtlCol="0" anchor="ctr"/>
+            <a:bodyPr vertOverflow="overflow" horzOverflow="overflow" vert="horz" wrap="square" numCol="1" spcCol="0" rtlCol="0" fromWordArt="0" anchor="ctr" anchorCtr="0" forceAA="0" compatLnSpc="1">
+              <a:noAutofit/>
+            </a:bodyPr>
             <a:p>
-              <a:pPr algn="ctr"/>
+              <a:pPr lvl="0" algn="ctr">
+                <a:buClrTx/>
+                <a:buSzTx/>
+                <a:buFontTx/>
+              </a:pPr>
               <a:r>
-                <a:rPr lang="en-US" sz="720"/>
+                <a:rPr lang="en-US" sz="720">
+                  <a:sym typeface="+mn-ea"/>
+                </a:rPr>
                 <a:t>Fetch</a:t>
               </a:r>
-              <a:endParaRPr lang="en-US" sz="720"/>
+              <a:endParaRPr lang="en-US" sz="720">
+                <a:sym typeface="+mn-ea"/>
+              </a:endParaRPr>
             </a:p>
           </p:txBody>
         </p:sp>
@@ -25574,12 +25019,19 @@
           </p:nvSpPr>
           <p:spPr>
             <a:xfrm>
-              <a:off x="12092" y="9262"/>
+              <a:off x="9683" y="9669"/>
               <a:ext cx="1670" cy="203"/>
             </a:xfrm>
             <a:prstGeom prst="rect">
               <a:avLst/>
             </a:prstGeom>
+            <a:effectLst>
+              <a:outerShdw blurRad="50800" dist="38100" dir="8100000" algn="tr" rotWithShape="0">
+                <a:prstClr val="black">
+                  <a:alpha val="40000"/>
+                </a:prstClr>
+              </a:outerShdw>
+            </a:effectLst>
           </p:spPr>
           <p:style>
             <a:lnRef idx="2">
@@ -25598,187 +25050,27 @@
             </a:fontRef>
           </p:style>
           <p:txBody>
-            <a:bodyPr rtlCol="0" anchor="ctr"/>
+            <a:bodyPr vertOverflow="overflow" horzOverflow="overflow" vert="horz" wrap="square" numCol="1" spcCol="0" rtlCol="0" fromWordArt="0" anchor="ctr" anchorCtr="0" forceAA="0" compatLnSpc="1">
+              <a:noAutofit/>
+            </a:bodyPr>
             <a:p>
-              <a:pPr algn="ctr"/>
+              <a:pPr lvl="0" algn="ctr">
+                <a:buClrTx/>
+                <a:buSzTx/>
+                <a:buFontTx/>
+              </a:pPr>
               <a:r>
-                <a:rPr lang="en-US" sz="720"/>
+                <a:rPr lang="en-US" sz="720">
+                  <a:sym typeface="+mn-ea"/>
+                </a:rPr>
                 <a:t>Published</a:t>
               </a:r>
-              <a:endParaRPr lang="en-US" sz="720"/>
-            </a:p>
-          </p:txBody>
-        </p:sp>
-        <p:sp>
-          <p:nvSpPr>
-            <p:cNvPr id="82" name="Flowchart: Terminator 81"/>
-            <p:cNvSpPr/>
-            <p:nvPr/>
-          </p:nvSpPr>
-          <p:spPr>
-            <a:xfrm>
-              <a:off x="13630" y="8692"/>
-              <a:ext cx="1070" cy="330"/>
-            </a:xfrm>
-            <a:prstGeom prst="flowChartTerminator">
-              <a:avLst/>
-            </a:prstGeom>
-            <a:solidFill>
-              <a:schemeClr val="accent6">
-                <a:lumMod val="40000"/>
-                <a:lumOff val="60000"/>
-              </a:schemeClr>
-            </a:solidFill>
-            <a:ln>
-              <a:solidFill>
-                <a:schemeClr val="accent6"/>
-              </a:solidFill>
-            </a:ln>
-          </p:spPr>
-          <p:style>
-            <a:lnRef idx="3">
-              <a:schemeClr val="lt1"/>
-            </a:lnRef>
-            <a:fillRef idx="1">
-              <a:schemeClr val="accent6"/>
-            </a:fillRef>
-            <a:effectRef idx="1">
-              <a:schemeClr val="accent6"/>
-            </a:effectRef>
-            <a:fontRef idx="minor">
-              <a:schemeClr val="lt1"/>
-            </a:fontRef>
-          </p:style>
-          <p:txBody>
-            <a:bodyPr rtlCol="0" anchor="ctr"/>
-            <a:p>
-              <a:pPr algn="ctr"/>
-              <a:r>
-                <a:rPr lang="en-US" sz="450" b="1">
-                  <a:solidFill>
-                    <a:schemeClr val="tx1">
-                      <a:lumMod val="75000"/>
-                      <a:lumOff val="25000"/>
-                    </a:schemeClr>
-                  </a:solidFill>
-                </a:rPr>
-                <a:t>api positions array</a:t>
-              </a:r>
-              <a:endParaRPr lang="en-US" sz="450" b="1">
-                <a:solidFill>
-                  <a:schemeClr val="tx1">
-                    <a:lumMod val="75000"/>
-                    <a:lumOff val="25000"/>
-                  </a:schemeClr>
-                </a:solidFill>
+              <a:endParaRPr lang="en-US" sz="720">
+                <a:sym typeface="+mn-ea"/>
               </a:endParaRPr>
             </a:p>
           </p:txBody>
         </p:sp>
-        <p:sp>
-          <p:nvSpPr>
-            <p:cNvPr id="18" name="Flowchart: Terminator 17"/>
-            <p:cNvSpPr/>
-            <p:nvPr/>
-          </p:nvSpPr>
-          <p:spPr>
-            <a:xfrm>
-              <a:off x="11390" y="9505"/>
-              <a:ext cx="872" cy="203"/>
-            </a:xfrm>
-            <a:prstGeom prst="flowChartTerminator">
-              <a:avLst/>
-            </a:prstGeom>
-            <a:solidFill>
-              <a:schemeClr val="accent6">
-                <a:lumMod val="40000"/>
-                <a:lumOff val="60000"/>
-              </a:schemeClr>
-            </a:solidFill>
-            <a:ln>
-              <a:solidFill>
-                <a:schemeClr val="accent6"/>
-              </a:solidFill>
-            </a:ln>
-          </p:spPr>
-          <p:style>
-            <a:lnRef idx="3">
-              <a:schemeClr val="lt1"/>
-            </a:lnRef>
-            <a:fillRef idx="1">
-              <a:schemeClr val="accent6"/>
-            </a:fillRef>
-            <a:effectRef idx="1">
-              <a:schemeClr val="accent6"/>
-            </a:effectRef>
-            <a:fontRef idx="minor">
-              <a:schemeClr val="lt1"/>
-            </a:fontRef>
-          </p:style>
-          <p:txBody>
-            <a:bodyPr rtlCol="0" anchor="ctr"/>
-            <a:p>
-              <a:pPr algn="ctr"/>
-              <a:r>
-                <a:rPr lang="en-US" sz="450" b="1">
-                  <a:solidFill>
-                    <a:schemeClr val="tx1">
-                      <a:lumMod val="75000"/>
-                      <a:lumOff val="25000"/>
-                    </a:schemeClr>
-                  </a:solidFill>
-                </a:rPr>
-                <a:t>open</a:t>
-              </a:r>
-              <a:endParaRPr lang="en-US" sz="450" b="1">
-                <a:solidFill>
-                  <a:schemeClr val="tx1">
-                    <a:lumMod val="75000"/>
-                    <a:lumOff val="25000"/>
-                  </a:schemeClr>
-                </a:solidFill>
-              </a:endParaRPr>
-            </a:p>
-          </p:txBody>
-        </p:sp>
-        <p:cxnSp>
-          <p:nvCxnSpPr>
-            <p:cNvPr id="27" name="Elbow Connector 26"/>
-            <p:cNvCxnSpPr>
-              <a:stCxn id="54" idx="3"/>
-              <a:endCxn id="33" idx="3"/>
-            </p:cNvCxnSpPr>
-            <p:nvPr/>
-          </p:nvCxnSpPr>
-          <p:spPr>
-            <a:xfrm>
-              <a:off x="13762" y="9135"/>
-              <a:ext cx="741" cy="243"/>
-            </a:xfrm>
-            <a:prstGeom prst="bentConnector3">
-              <a:avLst>
-                <a:gd name="adj1" fmla="val 150607"/>
-              </a:avLst>
-            </a:prstGeom>
-            <a:ln>
-              <a:tailEnd type="triangle"/>
-            </a:ln>
-          </p:spPr>
-          <p:style>
-            <a:lnRef idx="1">
-              <a:schemeClr val="accent1"/>
-            </a:lnRef>
-            <a:fillRef idx="0">
-              <a:schemeClr val="accent1"/>
-            </a:fillRef>
-            <a:effectRef idx="0">
-              <a:schemeClr val="accent1"/>
-            </a:effectRef>
-            <a:fontRef idx="minor">
-              <a:schemeClr val="tx1"/>
-            </a:fontRef>
-          </p:style>
-        </p:cxnSp>
         <p:sp>
           <p:nvSpPr>
             <p:cNvPr id="28" name="Rectangles 27"/>
@@ -25787,12 +25079,19 @@
           </p:nvSpPr>
           <p:spPr>
             <a:xfrm>
-              <a:off x="12092" y="9725"/>
+              <a:off x="9683" y="10142"/>
               <a:ext cx="1670" cy="203"/>
             </a:xfrm>
             <a:prstGeom prst="rect">
               <a:avLst/>
             </a:prstGeom>
+            <a:effectLst>
+              <a:outerShdw blurRad="50800" dist="38100" dir="8100000" algn="tr" rotWithShape="0">
+                <a:prstClr val="black">
+                  <a:alpha val="40000"/>
+                </a:prstClr>
+              </a:outerShdw>
+            </a:effectLst>
           </p:spPr>
           <p:style>
             <a:lnRef idx="2">
@@ -25811,14 +25110,24 @@
             </a:fontRef>
           </p:style>
           <p:txBody>
-            <a:bodyPr rtlCol="0" anchor="ctr"/>
+            <a:bodyPr vertOverflow="overflow" horzOverflow="overflow" vert="horz" wrap="square" numCol="1" spcCol="0" rtlCol="0" fromWordArt="0" anchor="ctr" anchorCtr="0" forceAA="0" compatLnSpc="1">
+              <a:noAutofit/>
+            </a:bodyPr>
             <a:p>
-              <a:pPr algn="ctr"/>
+              <a:pPr lvl="0" algn="ctr">
+                <a:buClrTx/>
+                <a:buSzTx/>
+                <a:buFontTx/>
+              </a:pPr>
               <a:r>
-                <a:rPr lang="en-US" sz="720"/>
+                <a:rPr lang="en-US" sz="720">
+                  <a:sym typeface="+mn-ea"/>
+                </a:rPr>
                 <a:t>Compare</a:t>
               </a:r>
-              <a:endParaRPr lang="en-US" sz="720"/>
+              <a:endParaRPr lang="en-US" sz="720">
+                <a:sym typeface="+mn-ea"/>
+              </a:endParaRPr>
             </a:p>
           </p:txBody>
         </p:sp>
@@ -25831,7 +25140,7 @@
         </p:nvSpPr>
         <p:spPr>
           <a:xfrm>
-            <a:off x="8284210" y="6148705"/>
+            <a:off x="7166610" y="6148705"/>
             <a:ext cx="553720" cy="128905"/>
           </a:xfrm>
           <a:prstGeom prst="flowChartTerminator">
@@ -25848,6 +25157,13 @@
               <a:schemeClr val="accent6"/>
             </a:solidFill>
           </a:ln>
+          <a:effectLst>
+            <a:outerShdw blurRad="50800" dist="38100" dir="8100000" algn="tr" rotWithShape="0">
+              <a:prstClr val="black">
+                <a:alpha val="40000"/>
+              </a:prstClr>
+            </a:outerShdw>
+          </a:effectLst>
         </p:spPr>
         <p:style>
           <a:lnRef idx="3">
@@ -25891,23 +25207,33 @@
       </p:sp>
       <p:cxnSp>
         <p:nvCxnSpPr>
-          <p:cNvPr id="39" name="Straight Arrow Connector 38"/>
+          <p:cNvPr id="39" name="Elbow Connector 38"/>
           <p:cNvCxnSpPr>
-            <a:endCxn id="312" idx="3"/>
+            <a:stCxn id="54" idx="1"/>
+            <a:endCxn id="319" idx="3"/>
           </p:cNvCxnSpPr>
           <p:nvPr/>
         </p:nvCxnSpPr>
         <p:spPr>
-          <a:xfrm flipH="1">
-            <a:off x="6861175" y="6059170"/>
-            <a:ext cx="502285" cy="1270"/>
-          </a:xfrm>
-          <a:prstGeom prst="straightConnector1">
-            <a:avLst/>
+          <a:xfrm rot="10800000">
+            <a:off x="5704205" y="5231130"/>
+            <a:ext cx="444500" cy="822960"/>
+          </a:xfrm>
+          <a:prstGeom prst="bentConnector3">
+            <a:avLst>
+              <a:gd name="adj1" fmla="val 50000"/>
+            </a:avLst>
           </a:prstGeom>
           <a:ln>
             <a:tailEnd type="triangle"/>
           </a:ln>
+          <a:effectLst>
+            <a:outerShdw blurRad="50800" dist="38100" dir="8100000" algn="tr" rotWithShape="0">
+              <a:prstClr val="black">
+                <a:alpha val="40000"/>
+              </a:prstClr>
+            </a:outerShdw>
+          </a:effectLst>
         </p:spPr>
         <p:style>
           <a:lnRef idx="1">
@@ -25924,251 +25250,6 @@
           </a:fontRef>
         </p:style>
       </p:cxnSp>
-      <p:grpSp>
-        <p:nvGrpSpPr>
-          <p:cNvPr id="204" name="Group 203"/>
-          <p:cNvGrpSpPr/>
-          <p:nvPr/>
-        </p:nvGrpSpPr>
-        <p:grpSpPr>
-          <a:xfrm>
-            <a:off x="3729164" y="7251501"/>
-            <a:ext cx="1060157" cy="428064"/>
-            <a:chOff x="12732" y="1607"/>
-            <a:chExt cx="1855" cy="749"/>
-          </a:xfrm>
-        </p:grpSpPr>
-        <p:sp>
-          <p:nvSpPr>
-            <p:cNvPr id="212" name="Rectangles 211"/>
-            <p:cNvSpPr/>
-            <p:nvPr/>
-          </p:nvSpPr>
-          <p:spPr>
-            <a:xfrm>
-              <a:off x="12732" y="2130"/>
-              <a:ext cx="1855" cy="226"/>
-            </a:xfrm>
-            <a:prstGeom prst="rect">
-              <a:avLst/>
-            </a:prstGeom>
-          </p:spPr>
-          <p:style>
-            <a:lnRef idx="2">
-              <a:schemeClr val="accent1">
-                <a:shade val="50000"/>
-              </a:schemeClr>
-            </a:lnRef>
-            <a:fillRef idx="1">
-              <a:schemeClr val="accent1"/>
-            </a:fillRef>
-            <a:effectRef idx="0">
-              <a:schemeClr val="accent1"/>
-            </a:effectRef>
-            <a:fontRef idx="minor">
-              <a:schemeClr val="lt1"/>
-            </a:fontRef>
-          </p:style>
-          <p:txBody>
-            <a:bodyPr rtlCol="0" anchor="ctr"/>
-            <a:p>
-              <a:pPr algn="ctr"/>
-              <a:r>
-                <a:rPr lang="en-US" sz="720"/>
-                <a:t>Reconcile</a:t>
-              </a:r>
-              <a:endParaRPr lang="en-US" sz="720"/>
-            </a:p>
-          </p:txBody>
-        </p:sp>
-        <p:sp>
-          <p:nvSpPr>
-            <p:cNvPr id="214" name="Rectangles 213"/>
-            <p:cNvSpPr/>
-            <p:nvPr/>
-          </p:nvSpPr>
-          <p:spPr>
-            <a:xfrm>
-              <a:off x="12732" y="1607"/>
-              <a:ext cx="1855" cy="226"/>
-            </a:xfrm>
-            <a:prstGeom prst="rect">
-              <a:avLst/>
-            </a:prstGeom>
-          </p:spPr>
-          <p:style>
-            <a:lnRef idx="2">
-              <a:schemeClr val="dk1">
-                <a:shade val="50000"/>
-              </a:schemeClr>
-            </a:lnRef>
-            <a:fillRef idx="1">
-              <a:schemeClr val="dk1"/>
-            </a:fillRef>
-            <a:effectRef idx="0">
-              <a:schemeClr val="dk1"/>
-            </a:effectRef>
-            <a:fontRef idx="minor">
-              <a:schemeClr val="lt1"/>
-            </a:fontRef>
-          </p:style>
-          <p:txBody>
-            <a:bodyPr rtlCol="0" anchor="ctr"/>
-            <a:p>
-              <a:pPr algn="ctr"/>
-              <a:r>
-                <a:rPr lang="en-US" sz="720"/>
-                <a:t>Process</a:t>
-              </a:r>
-              <a:endParaRPr lang="en-US" sz="720"/>
-            </a:p>
-          </p:txBody>
-        </p:sp>
-        <p:sp>
-          <p:nvSpPr>
-            <p:cNvPr id="216" name="Rectangles 215"/>
-            <p:cNvSpPr/>
-            <p:nvPr/>
-          </p:nvSpPr>
-          <p:spPr>
-            <a:xfrm>
-              <a:off x="12732" y="1867"/>
-              <a:ext cx="1855" cy="226"/>
-            </a:xfrm>
-            <a:prstGeom prst="rect">
-              <a:avLst/>
-            </a:prstGeom>
-          </p:spPr>
-          <p:style>
-            <a:lnRef idx="2">
-              <a:schemeClr val="accent1">
-                <a:shade val="50000"/>
-              </a:schemeClr>
-            </a:lnRef>
-            <a:fillRef idx="1">
-              <a:schemeClr val="accent1"/>
-            </a:fillRef>
-            <a:effectRef idx="0">
-              <a:schemeClr val="accent1"/>
-            </a:effectRef>
-            <a:fontRef idx="minor">
-              <a:schemeClr val="lt1"/>
-            </a:fontRef>
-          </p:style>
-          <p:txBody>
-            <a:bodyPr rtlCol="0" anchor="ctr"/>
-            <a:p>
-              <a:pPr algn="ctr"/>
-              <a:r>
-                <a:rPr lang="en-US" sz="720"/>
-                <a:t>Reconcile</a:t>
-              </a:r>
-              <a:endParaRPr lang="en-US" sz="720"/>
-            </a:p>
-          </p:txBody>
-        </p:sp>
-      </p:grpSp>
-      <p:grpSp>
-        <p:nvGrpSpPr>
-          <p:cNvPr id="222" name="Group 221"/>
-          <p:cNvGrpSpPr/>
-          <p:nvPr/>
-        </p:nvGrpSpPr>
-        <p:grpSpPr>
-          <a:xfrm>
-            <a:off x="4649046" y="7126670"/>
-            <a:ext cx="203459" cy="216032"/>
-            <a:chOff x="8092" y="1237"/>
-            <a:chExt cx="482" cy="524"/>
-          </a:xfrm>
-        </p:grpSpPr>
-        <p:sp>
-          <p:nvSpPr>
-            <p:cNvPr id="225" name="Oval 224"/>
-            <p:cNvSpPr/>
-            <p:nvPr/>
-          </p:nvSpPr>
-          <p:spPr>
-            <a:xfrm>
-              <a:off x="8092" y="1237"/>
-              <a:ext cx="482" cy="524"/>
-            </a:xfrm>
-            <a:prstGeom prst="ellipse">
-              <a:avLst/>
-            </a:prstGeom>
-            <a:solidFill>
-              <a:schemeClr val="bg2"/>
-            </a:solidFill>
-            <a:ln>
-              <a:solidFill>
-                <a:schemeClr val="tx1">
-                  <a:lumMod val="50000"/>
-                  <a:lumOff val="50000"/>
-                </a:schemeClr>
-              </a:solidFill>
-            </a:ln>
-          </p:spPr>
-          <p:style>
-            <a:lnRef idx="1">
-              <a:schemeClr val="accent1"/>
-            </a:lnRef>
-            <a:fillRef idx="3">
-              <a:schemeClr val="accent1"/>
-            </a:fillRef>
-            <a:effectRef idx="2">
-              <a:schemeClr val="accent1"/>
-            </a:effectRef>
-            <a:fontRef idx="minor">
-              <a:schemeClr val="lt1"/>
-            </a:fontRef>
-          </p:style>
-          <p:txBody>
-            <a:bodyPr rtlCol="0" anchor="ctr"/>
-            <a:p>
-              <a:pPr algn="ctr"/>
-              <a:endParaRPr lang="en-US" sz="1620"/>
-            </a:p>
-          </p:txBody>
-        </p:sp>
-        <p:pic>
-          <p:nvPicPr>
-            <p:cNvPr id="236" name="Picture 235"/>
-            <p:cNvPicPr>
-              <a:picLocks noChangeAspect="1"/>
-            </p:cNvPicPr>
-            <p:nvPr/>
-          </p:nvPicPr>
-          <p:blipFill>
-            <a:blip r:embed="rId7">
-              <a:clrChange>
-                <a:clrFrom>
-                  <a:srgbClr val="FFFFFF">
-                    <a:alpha val="100000"/>
-                  </a:srgbClr>
-                </a:clrFrom>
-                <a:clrTo>
-                  <a:srgbClr val="FFFFFF">
-                    <a:alpha val="100000"/>
-                    <a:alpha val="0"/>
-                  </a:srgbClr>
-                </a:clrTo>
-              </a:clrChange>
-            </a:blip>
-            <a:stretch>
-              <a:fillRect/>
-            </a:stretch>
-          </p:blipFill>
-          <p:spPr>
-            <a:xfrm>
-              <a:off x="8130" y="1345"/>
-              <a:ext cx="444" cy="408"/>
-            </a:xfrm>
-            <a:prstGeom prst="rect">
-              <a:avLst/>
-            </a:prstGeom>
-          </p:spPr>
-        </p:pic>
-      </p:grpSp>
       <p:cxnSp>
         <p:nvCxnSpPr>
           <p:cNvPr id="246" name="Elbow Connector 245"/>
@@ -26180,8 +25261,8 @@
         </p:nvCxnSpPr>
         <p:spPr>
           <a:xfrm rot="5400000">
-            <a:off x="7221855" y="6991985"/>
-            <a:ext cx="210820" cy="1023620"/>
+            <a:off x="6083300" y="7012940"/>
+            <a:ext cx="210820" cy="981710"/>
           </a:xfrm>
           <a:prstGeom prst="bentConnector2">
             <a:avLst/>
@@ -26189,6 +25270,13 @@
           <a:ln>
             <a:tailEnd type="triangle"/>
           </a:ln>
+          <a:effectLst>
+            <a:outerShdw blurRad="50800" dist="38100" dir="8100000" algn="tr" rotWithShape="0">
+              <a:prstClr val="black">
+                <a:alpha val="40000"/>
+              </a:prstClr>
+            </a:outerShdw>
+          </a:effectLst>
         </p:spPr>
         <p:style>
           <a:lnRef idx="1">
@@ -26213,7 +25301,7 @@
         </p:nvSpPr>
         <p:spPr>
           <a:xfrm>
-            <a:off x="6370955" y="7544435"/>
+            <a:off x="5253355" y="7544435"/>
             <a:ext cx="444500" cy="128905"/>
           </a:xfrm>
           <a:prstGeom prst="flowChartTerminator">
@@ -26230,6 +25318,13 @@
               <a:schemeClr val="accent6"/>
             </a:solidFill>
           </a:ln>
+          <a:effectLst>
+            <a:outerShdw blurRad="50800" dist="38100" dir="8100000" algn="tr" rotWithShape="0">
+              <a:prstClr val="black">
+                <a:alpha val="40000"/>
+              </a:prstClr>
+            </a:outerShdw>
+          </a:effectLst>
         </p:spPr>
         <p:style>
           <a:lnRef idx="3">
@@ -26279,12 +25374,19 @@
         </p:nvSpPr>
         <p:spPr>
           <a:xfrm>
-            <a:off x="7158883" y="7529030"/>
+            <a:off x="6041283" y="7529030"/>
             <a:ext cx="148022" cy="159452"/>
           </a:xfrm>
           <a:prstGeom prst="ellipse">
             <a:avLst/>
           </a:prstGeom>
+          <a:effectLst>
+            <a:outerShdw blurRad="50800" dist="38100" dir="8100000" algn="tr" rotWithShape="0">
+              <a:prstClr val="black">
+                <a:alpha val="40000"/>
+              </a:prstClr>
+            </a:outerShdw>
+          </a:effectLst>
         </p:spPr>
         <p:style>
           <a:lnRef idx="1">
@@ -26316,23 +25418,31 @@
         <p:nvCxnSpPr>
           <p:cNvPr id="267" name="Elbow Connector 266"/>
           <p:cNvCxnSpPr>
-            <a:stCxn id="237" idx="0"/>
+            <a:stCxn id="241" idx="0"/>
+            <a:endCxn id="238" idx="2"/>
           </p:cNvCxnSpPr>
           <p:nvPr/>
         </p:nvCxnSpPr>
         <p:spPr>
           <a:xfrm rot="16200000">
-            <a:off x="6318885" y="6098540"/>
-            <a:ext cx="494030" cy="1143635"/>
+            <a:off x="5178425" y="6070600"/>
+            <a:ext cx="489585" cy="1193800"/>
           </a:xfrm>
           <a:prstGeom prst="bentConnector3">
             <a:avLst>
-              <a:gd name="adj1" fmla="val 50064"/>
+              <a:gd name="adj1" fmla="val 50000"/>
             </a:avLst>
           </a:prstGeom>
           <a:ln>
             <a:tailEnd type="triangle"/>
           </a:ln>
+          <a:effectLst>
+            <a:outerShdw blurRad="50800" dist="38100" dir="8100000" algn="tr" rotWithShape="0">
+              <a:prstClr val="black">
+                <a:alpha val="40000"/>
+              </a:prstClr>
+            </a:outerShdw>
+          </a:effectLst>
         </p:spPr>
         <p:style>
           <a:lnRef idx="1">
@@ -26349,220 +25459,18 @@
           </a:fontRef>
         </p:style>
       </p:cxnSp>
-      <p:sp>
-        <p:nvSpPr>
-          <p:cNvPr id="277" name="Flowchart: Terminator 276"/>
-          <p:cNvSpPr/>
-          <p:nvPr/>
-        </p:nvSpPr>
-        <p:spPr>
-          <a:xfrm>
-            <a:off x="4694555" y="7399020"/>
-            <a:ext cx="485140" cy="133985"/>
-          </a:xfrm>
-          <a:prstGeom prst="flowChartTerminator">
-            <a:avLst/>
-          </a:prstGeom>
-          <a:solidFill>
-            <a:schemeClr val="accent6">
-              <a:lumMod val="40000"/>
-              <a:lumOff val="60000"/>
-            </a:schemeClr>
-          </a:solidFill>
-          <a:ln>
-            <a:solidFill>
-              <a:schemeClr val="accent6"/>
-            </a:solidFill>
-          </a:ln>
-        </p:spPr>
-        <p:style>
-          <a:lnRef idx="3">
-            <a:schemeClr val="lt1"/>
-          </a:lnRef>
-          <a:fillRef idx="1">
-            <a:schemeClr val="accent6"/>
-          </a:fillRef>
-          <a:effectRef idx="1">
-            <a:schemeClr val="accent6"/>
-          </a:effectRef>
-          <a:fontRef idx="minor">
-            <a:schemeClr val="lt1"/>
-          </a:fontRef>
-        </p:style>
-        <p:txBody>
-          <a:bodyPr rtlCol="0" anchor="ctr"/>
-          <a:p>
-            <a:pPr algn="ctr"/>
-            <a:r>
-              <a:rPr lang="en-US" sz="450" b="1">
-                <a:solidFill>
-                  <a:schemeClr val="tx1">
-                    <a:lumMod val="75000"/>
-                    <a:lumOff val="25000"/>
-                  </a:schemeClr>
-                </a:solidFill>
-              </a:rPr>
-              <a:t>open</a:t>
-            </a:r>
-            <a:endParaRPr lang="en-US" sz="450" b="1">
-              <a:solidFill>
-                <a:schemeClr val="tx1">
-                  <a:lumMod val="75000"/>
-                  <a:lumOff val="25000"/>
-                </a:schemeClr>
-              </a:solidFill>
-            </a:endParaRPr>
-          </a:p>
-        </p:txBody>
-      </p:sp>
-      <p:cxnSp>
-        <p:nvCxnSpPr>
-          <p:cNvPr id="284" name="Elbow Connector 283"/>
-          <p:cNvCxnSpPr>
-            <a:endCxn id="338" idx="2"/>
-          </p:cNvCxnSpPr>
-          <p:nvPr/>
-        </p:nvCxnSpPr>
-        <p:spPr>
-          <a:xfrm rot="10800000">
-            <a:off x="3359150" y="7239635"/>
-            <a:ext cx="370205" cy="225425"/>
-          </a:xfrm>
-          <a:prstGeom prst="bentConnector2">
-            <a:avLst/>
-          </a:prstGeom>
-          <a:ln>
-            <a:tailEnd type="triangle"/>
-          </a:ln>
-        </p:spPr>
-        <p:style>
-          <a:lnRef idx="1">
-            <a:schemeClr val="accent1"/>
-          </a:lnRef>
-          <a:fillRef idx="0">
-            <a:schemeClr val="accent1"/>
-          </a:fillRef>
-          <a:effectRef idx="0">
-            <a:schemeClr val="accent1"/>
-          </a:effectRef>
-          <a:fontRef idx="minor">
-            <a:schemeClr val="tx1"/>
-          </a:fontRef>
-        </p:style>
-      </p:cxnSp>
-      <p:cxnSp>
-        <p:nvCxnSpPr>
-          <p:cNvPr id="305" name="Elbow Connector 304"/>
-          <p:cNvCxnSpPr>
-            <a:endCxn id="340" idx="0"/>
-          </p:cNvCxnSpPr>
-          <p:nvPr/>
-        </p:nvCxnSpPr>
-        <p:spPr>
-          <a:xfrm rot="10800000" flipV="1">
-            <a:off x="3367405" y="7614920"/>
-            <a:ext cx="361950" cy="218440"/>
-          </a:xfrm>
-          <a:prstGeom prst="bentConnector2">
-            <a:avLst/>
-          </a:prstGeom>
-          <a:ln>
-            <a:tailEnd type="triangle"/>
-          </a:ln>
-        </p:spPr>
-        <p:style>
-          <a:lnRef idx="1">
-            <a:schemeClr val="accent1"/>
-          </a:lnRef>
-          <a:fillRef idx="0">
-            <a:schemeClr val="accent1"/>
-          </a:fillRef>
-          <a:effectRef idx="0">
-            <a:schemeClr val="accent1"/>
-          </a:effectRef>
-          <a:fontRef idx="minor">
-            <a:schemeClr val="tx1"/>
-          </a:fontRef>
-        </p:style>
-      </p:cxnSp>
-      <p:sp>
-        <p:nvSpPr>
-          <p:cNvPr id="308" name="Flowchart: Terminator 307"/>
-          <p:cNvSpPr/>
-          <p:nvPr/>
-        </p:nvSpPr>
-        <p:spPr>
-          <a:xfrm>
-            <a:off x="4699635" y="7561580"/>
-            <a:ext cx="485140" cy="133985"/>
-          </a:xfrm>
-          <a:prstGeom prst="flowChartTerminator">
-            <a:avLst/>
-          </a:prstGeom>
-          <a:solidFill>
-            <a:schemeClr val="accent6">
-              <a:lumMod val="40000"/>
-              <a:lumOff val="60000"/>
-            </a:schemeClr>
-          </a:solidFill>
-          <a:ln>
-            <a:solidFill>
-              <a:schemeClr val="accent6"/>
-            </a:solidFill>
-          </a:ln>
-        </p:spPr>
-        <p:style>
-          <a:lnRef idx="3">
-            <a:schemeClr val="lt1"/>
-          </a:lnRef>
-          <a:fillRef idx="1">
-            <a:schemeClr val="accent6"/>
-          </a:fillRef>
-          <a:effectRef idx="1">
-            <a:schemeClr val="accent6"/>
-          </a:effectRef>
-          <a:fontRef idx="minor">
-            <a:schemeClr val="lt1"/>
-          </a:fontRef>
-        </p:style>
-        <p:txBody>
-          <a:bodyPr rtlCol="0" anchor="ctr"/>
-          <a:p>
-            <a:pPr algn="ctr"/>
-            <a:r>
-              <a:rPr lang="en-US" sz="450" b="1">
-                <a:solidFill>
-                  <a:schemeClr val="tx1">
-                    <a:lumMod val="75000"/>
-                    <a:lumOff val="25000"/>
-                  </a:schemeClr>
-                </a:solidFill>
-              </a:rPr>
-              <a:t>closed</a:t>
-            </a:r>
-            <a:endParaRPr lang="en-US" sz="450" b="1">
-              <a:solidFill>
-                <a:schemeClr val="tx1">
-                  <a:lumMod val="75000"/>
-                  <a:lumOff val="25000"/>
-                </a:schemeClr>
-              </a:solidFill>
-            </a:endParaRPr>
-          </a:p>
-        </p:txBody>
-      </p:sp>
       <p:grpSp>
         <p:nvGrpSpPr>
-          <p:cNvPr id="309" name="Group 308"/>
+          <p:cNvPr id="231" name="Group 230"/>
           <p:cNvGrpSpPr/>
           <p:nvPr/>
         </p:nvGrpSpPr>
         <p:grpSpPr>
           <a:xfrm>
-            <a:off x="7266114" y="4611171"/>
-            <a:ext cx="1060157" cy="277756"/>
-            <a:chOff x="12732" y="1607"/>
-            <a:chExt cx="1855" cy="486"/>
+            <a:off x="6148705" y="4611370"/>
+            <a:ext cx="1060450" cy="276860"/>
+            <a:chOff x="9683" y="7262"/>
+            <a:chExt cx="1670" cy="436"/>
           </a:xfrm>
         </p:grpSpPr>
         <p:sp>
@@ -26573,12 +25481,19 @@
           </p:nvSpPr>
           <p:spPr>
             <a:xfrm>
-              <a:off x="12732" y="1607"/>
-              <a:ext cx="1855" cy="226"/>
+              <a:off x="9683" y="7262"/>
+              <a:ext cx="1670" cy="203"/>
             </a:xfrm>
             <a:prstGeom prst="rect">
               <a:avLst/>
             </a:prstGeom>
+            <a:effectLst>
+              <a:outerShdw blurRad="50800" dist="38100" dir="8100000" algn="tr" rotWithShape="0">
+                <a:prstClr val="black">
+                  <a:alpha val="40000"/>
+                </a:prstClr>
+              </a:outerShdw>
+            </a:effectLst>
           </p:spPr>
           <p:style>
             <a:lnRef idx="2">
@@ -26597,14 +25512,24 @@
             </a:fontRef>
           </p:style>
           <p:txBody>
-            <a:bodyPr rtlCol="0" anchor="ctr"/>
+            <a:bodyPr vertOverflow="overflow" horzOverflow="overflow" vert="horz" wrap="square" numCol="1" spcCol="0" rtlCol="0" fromWordArt="0" anchor="ctr" anchorCtr="0" forceAA="0" compatLnSpc="1">
+              <a:noAutofit/>
+            </a:bodyPr>
             <a:p>
-              <a:pPr algn="ctr"/>
+              <a:pPr lvl="0" algn="ctr">
+                <a:buClrTx/>
+                <a:buSzTx/>
+                <a:buFontTx/>
+              </a:pPr>
               <a:r>
-                <a:rPr lang="en-US" sz="720"/>
+                <a:rPr lang="en-US" sz="720">
+                  <a:sym typeface="+mn-ea"/>
+                </a:rPr>
                 <a:t>Publish</a:t>
               </a:r>
-              <a:endParaRPr lang="en-US" sz="720"/>
+              <a:endParaRPr lang="en-US" sz="720">
+                <a:sym typeface="+mn-ea"/>
+              </a:endParaRPr>
             </a:p>
           </p:txBody>
         </p:sp>
@@ -26616,12 +25541,19 @@
           </p:nvSpPr>
           <p:spPr>
             <a:xfrm>
-              <a:off x="12732" y="1867"/>
-              <a:ext cx="1855" cy="226"/>
+              <a:off x="9683" y="7496"/>
+              <a:ext cx="1670" cy="203"/>
             </a:xfrm>
             <a:prstGeom prst="rect">
               <a:avLst/>
             </a:prstGeom>
+            <a:effectLst>
+              <a:outerShdw blurRad="50800" dist="38100" dir="8100000" algn="tr" rotWithShape="0">
+                <a:prstClr val="black">
+                  <a:alpha val="40000"/>
+                </a:prstClr>
+              </a:outerShdw>
+            </a:effectLst>
           </p:spPr>
           <p:style>
             <a:lnRef idx="2">
@@ -26640,14 +25572,24 @@
             </a:fontRef>
           </p:style>
           <p:txBody>
-            <a:bodyPr rtlCol="0" anchor="ctr"/>
+            <a:bodyPr vertOverflow="overflow" horzOverflow="overflow" vert="horz" wrap="square" numCol="1" spcCol="0" rtlCol="0" fromWordArt="0" anchor="ctr" anchorCtr="0" forceAA="0" compatLnSpc="1">
+              <a:noAutofit/>
+            </a:bodyPr>
             <a:p>
-              <a:pPr algn="ctr"/>
+              <a:pPr lvl="0" algn="ctr">
+                <a:buClrTx/>
+                <a:buSzTx/>
+                <a:buFontTx/>
+              </a:pPr>
               <a:r>
-                <a:rPr lang="en-US" sz="720"/>
+                <a:rPr lang="en-US" sz="720">
+                  <a:sym typeface="+mn-ea"/>
+                </a:rPr>
                 <a:t>Publish</a:t>
               </a:r>
-              <a:endParaRPr lang="en-US" sz="720"/>
+              <a:endParaRPr lang="en-US" sz="720">
+                <a:sym typeface="+mn-ea"/>
+              </a:endParaRPr>
             </a:p>
           </p:txBody>
         </p:sp>
@@ -26662,7 +25604,7 @@
         </p:nvCxnSpPr>
         <p:spPr>
           <a:xfrm flipH="1" flipV="1">
-            <a:off x="8923020" y="4662805"/>
+            <a:off x="7805420" y="4662805"/>
             <a:ext cx="805180" cy="2540"/>
           </a:xfrm>
           <a:prstGeom prst="straightConnector1">
@@ -26671,6 +25613,58 @@
           <a:ln>
             <a:tailEnd type="triangle"/>
           </a:ln>
+          <a:effectLst>
+            <a:outerShdw blurRad="50800" dist="38100" dir="8100000" algn="tr" rotWithShape="0">
+              <a:prstClr val="black">
+                <a:alpha val="40000"/>
+              </a:prstClr>
+            </a:outerShdw>
+          </a:effectLst>
+        </p:spPr>
+        <p:style>
+          <a:lnRef idx="1">
+            <a:schemeClr val="accent1"/>
+          </a:lnRef>
+          <a:fillRef idx="0">
+            <a:schemeClr val="accent1"/>
+          </a:fillRef>
+          <a:effectRef idx="0">
+            <a:schemeClr val="accent1"/>
+          </a:effectRef>
+          <a:fontRef idx="minor">
+            <a:schemeClr val="tx1"/>
+          </a:fontRef>
+        </p:style>
+      </p:cxnSp>
+      <p:cxnSp>
+        <p:nvCxnSpPr>
+          <p:cNvPr id="324" name="Elbow Connector 323"/>
+          <p:cNvCxnSpPr>
+            <a:stCxn id="315" idx="1"/>
+            <a:endCxn id="319" idx="3"/>
+          </p:cNvCxnSpPr>
+          <p:nvPr/>
+        </p:nvCxnSpPr>
+        <p:spPr>
+          <a:xfrm rot="10800000" flipV="1">
+            <a:off x="5704205" y="4824730"/>
+            <a:ext cx="444500" cy="406400"/>
+          </a:xfrm>
+          <a:prstGeom prst="bentConnector3">
+            <a:avLst>
+              <a:gd name="adj1" fmla="val 50000"/>
+            </a:avLst>
+          </a:prstGeom>
+          <a:ln>
+            <a:tailEnd type="triangle"/>
+          </a:ln>
+          <a:effectLst>
+            <a:outerShdw blurRad="50800" dist="38100" dir="8100000" algn="tr" rotWithShape="0">
+              <a:prstClr val="black">
+                <a:alpha val="40000"/>
+              </a:prstClr>
+            </a:outerShdw>
+          </a:effectLst>
         </p:spPr>
         <p:style>
           <a:lnRef idx="1">
@@ -26689,14 +25683,14 @@
       </p:cxnSp>
       <p:sp>
         <p:nvSpPr>
-          <p:cNvPr id="319" name="Flowchart: Terminator 318"/>
+          <p:cNvPr id="329" name="Flowchart: Terminator 328"/>
           <p:cNvSpPr/>
           <p:nvPr/>
         </p:nvSpPr>
         <p:spPr>
           <a:xfrm>
-            <a:off x="6339840" y="4754880"/>
-            <a:ext cx="501015" cy="128905"/>
+            <a:off x="7089140" y="4551045"/>
+            <a:ext cx="716280" cy="223520"/>
           </a:xfrm>
           <a:prstGeom prst="flowChartTerminator">
             <a:avLst/>
@@ -26712,107 +25706,13 @@
               <a:schemeClr val="accent6"/>
             </a:solidFill>
           </a:ln>
-        </p:spPr>
-        <p:style>
-          <a:lnRef idx="3">
-            <a:schemeClr val="lt1"/>
-          </a:lnRef>
-          <a:fillRef idx="1">
-            <a:schemeClr val="accent6"/>
-          </a:fillRef>
-          <a:effectRef idx="1">
-            <a:schemeClr val="accent6"/>
-          </a:effectRef>
-          <a:fontRef idx="minor">
-            <a:schemeClr val="lt1"/>
-          </a:fontRef>
-        </p:style>
-        <p:txBody>
-          <a:bodyPr rtlCol="0" anchor="ctr"/>
-          <a:p>
-            <a:pPr algn="ctr"/>
-            <a:r>
-              <a:rPr lang="en-US" sz="450" b="1">
-                <a:solidFill>
-                  <a:schemeClr val="tx1">
-                    <a:lumMod val="75000"/>
-                    <a:lumOff val="25000"/>
-                  </a:schemeClr>
-                </a:solidFill>
-              </a:rPr>
-              <a:t>update</a:t>
-            </a:r>
-            <a:endParaRPr lang="en-US" sz="450" b="1">
-              <a:solidFill>
-                <a:schemeClr val="tx1">
-                  <a:lumMod val="75000"/>
-                  <a:lumOff val="25000"/>
-                </a:schemeClr>
-              </a:solidFill>
-            </a:endParaRPr>
-          </a:p>
-        </p:txBody>
-      </p:sp>
-      <p:cxnSp>
-        <p:nvCxnSpPr>
-          <p:cNvPr id="324" name="Straight Arrow Connector 323"/>
-          <p:cNvCxnSpPr>
-            <a:endCxn id="319" idx="3"/>
-          </p:cNvCxnSpPr>
-          <p:nvPr/>
-        </p:nvCxnSpPr>
-        <p:spPr>
-          <a:xfrm flipH="1" flipV="1">
-            <a:off x="6840855" y="4819650"/>
-            <a:ext cx="425450" cy="5080"/>
-          </a:xfrm>
-          <a:prstGeom prst="straightConnector1">
-            <a:avLst/>
-          </a:prstGeom>
-          <a:ln>
-            <a:tailEnd type="triangle"/>
-          </a:ln>
-        </p:spPr>
-        <p:style>
-          <a:lnRef idx="1">
-            <a:schemeClr val="accent1"/>
-          </a:lnRef>
-          <a:fillRef idx="0">
-            <a:schemeClr val="accent1"/>
-          </a:fillRef>
-          <a:effectRef idx="0">
-            <a:schemeClr val="accent1"/>
-          </a:effectRef>
-          <a:fontRef idx="minor">
-            <a:schemeClr val="tx1"/>
-          </a:fontRef>
-        </p:style>
-      </p:cxnSp>
-      <p:sp>
-        <p:nvSpPr>
-          <p:cNvPr id="329" name="Flowchart: Terminator 328"/>
-          <p:cNvSpPr/>
-          <p:nvPr/>
-        </p:nvSpPr>
-        <p:spPr>
-          <a:xfrm>
-            <a:off x="8206740" y="4551045"/>
-            <a:ext cx="716280" cy="223520"/>
-          </a:xfrm>
-          <a:prstGeom prst="flowChartTerminator">
-            <a:avLst/>
-          </a:prstGeom>
-          <a:solidFill>
-            <a:schemeClr val="accent6">
-              <a:lumMod val="40000"/>
-              <a:lumOff val="60000"/>
-            </a:schemeClr>
-          </a:solidFill>
-          <a:ln>
-            <a:solidFill>
-              <a:schemeClr val="accent6"/>
-            </a:solidFill>
-          </a:ln>
+          <a:effectLst>
+            <a:outerShdw blurRad="50800" dist="38100" dir="8100000" algn="tr" rotWithShape="0">
+              <a:prstClr val="black">
+                <a:alpha val="40000"/>
+              </a:prstClr>
+            </a:outerShdw>
+          </a:effectLst>
         </p:spPr>
         <p:style>
           <a:lnRef idx="3">
@@ -26862,7 +25762,7 @@
         </p:nvCxnSpPr>
         <p:spPr>
           <a:xfrm flipH="1" flipV="1">
-            <a:off x="8963025" y="5882640"/>
+            <a:off x="7845425" y="5882640"/>
             <a:ext cx="763905" cy="3810"/>
           </a:xfrm>
           <a:prstGeom prst="straightConnector1">
@@ -26871,6 +25771,13 @@
           <a:ln>
             <a:tailEnd type="triangle"/>
           </a:ln>
+          <a:effectLst>
+            <a:outerShdw blurRad="50800" dist="38100" dir="8100000" algn="tr" rotWithShape="0">
+              <a:prstClr val="black">
+                <a:alpha val="40000"/>
+              </a:prstClr>
+            </a:outerShdw>
+          </a:effectLst>
         </p:spPr>
         <p:style>
           <a:lnRef idx="1">
@@ -26887,294 +25794,144 @@
           </a:fontRef>
         </p:style>
       </p:cxnSp>
-      <p:sp>
-        <p:nvSpPr>
-          <p:cNvPr id="338" name="Flowchart: Off-page Connector 337"/>
-          <p:cNvSpPr/>
-          <p:nvPr/>
-        </p:nvSpPr>
-        <p:spPr>
-          <a:xfrm>
-            <a:off x="3187065" y="6911340"/>
-            <a:ext cx="344170" cy="328295"/>
-          </a:xfrm>
-          <a:prstGeom prst="flowChartOffpageConnector">
-            <a:avLst/>
-          </a:prstGeom>
-          <a:gradFill rotWithShape="0">
-            <a:gsLst>
-              <a:gs pos="0">
-                <a:schemeClr val="accent1"/>
-              </a:gs>
-              <a:gs pos="100000">
-                <a:schemeClr val="accent2"/>
-              </a:gs>
-            </a:gsLst>
-            <a:lin ang="5400000" scaled="1"/>
-          </a:gradFill>
-          <a:ln w="9525" cap="flat" cmpd="sng" algn="ctr">
-            <a:solidFill>
-              <a:schemeClr val="accent1"/>
-            </a:solidFill>
-            <a:prstDash val="solid"/>
-            <a:round/>
-            <a:headEnd type="none" w="med" len="med"/>
-            <a:tailEnd type="none" w="med" len="med"/>
+      <p:cxnSp>
+        <p:nvCxnSpPr>
+          <p:cNvPr id="132" name="Straight Arrow Connector 131"/>
+          <p:cNvCxnSpPr>
+            <a:stCxn id="83" idx="0"/>
+            <a:endCxn id="34" idx="2"/>
+          </p:cNvCxnSpPr>
+          <p:nvPr/>
+        </p:nvCxnSpPr>
+        <p:spPr>
+          <a:xfrm flipH="1" flipV="1">
+            <a:off x="9139555" y="5951220"/>
+            <a:ext cx="1270" cy="685165"/>
+          </a:xfrm>
+          <a:prstGeom prst="straightConnector1">
+            <a:avLst/>
+          </a:prstGeom>
+          <a:ln>
+            <a:prstDash val="sysDot"/>
+            <a:tailEnd type="triangle" w="med" len="med"/>
           </a:ln>
-        </p:spPr>
-        <p:txBody>
-          <a:bodyPr vert="horz" wrap="none" lIns="91440" tIns="45720" rIns="91440" bIns="45720" numCol="1" anchor="ctr" anchorCtr="0" compatLnSpc="1"/>
-          <a:p>
-            <a:pPr marL="0" marR="0" indent="0" algn="l" defTabSz="914400" rtl="0" eaLnBrk="1" fontAlgn="base" latinLnBrk="0" hangingPunct="1">
-              <a:lnSpc>
-                <a:spcPct val="100000"/>
-              </a:lnSpc>
-              <a:spcBef>
-                <a:spcPct val="0"/>
-              </a:spcBef>
-              <a:spcAft>
-                <a:spcPct val="0"/>
-              </a:spcAft>
-              <a:buClrTx/>
-              <a:buSzTx/>
-              <a:buFontTx/>
-              <a:buNone/>
-            </a:pPr>
-            <a:r>
-              <a:rPr lang="en-US" sz="1200">
-                <a:solidFill>
-                  <a:schemeClr val="accent1">
-                    <a:lumMod val="50000"/>
-                  </a:schemeClr>
-                </a:solidFill>
-                <a:effectLst>
-                  <a:outerShdw blurRad="38100" dist="25400" dir="5400000" algn="ctr" rotWithShape="0">
-                    <a:srgbClr val="6E747A">
-                      <a:alpha val="43000"/>
-                    </a:srgbClr>
-                  </a:outerShdw>
-                </a:effectLst>
-                <a:sym typeface="+mn-ea"/>
-              </a:rPr>
-              <a:t>S</a:t>
-            </a:r>
-            <a:r>
-              <a:rPr lang="en-US" sz="1200" baseline="-25000">
-                <a:solidFill>
-                  <a:schemeClr val="accent1">
-                    <a:lumMod val="50000"/>
-                  </a:schemeClr>
-                </a:solidFill>
-                <a:effectLst>
-                  <a:outerShdw blurRad="38100" dist="25400" dir="5400000" algn="ctr" rotWithShape="0">
-                    <a:srgbClr val="6E747A">
-                      <a:alpha val="43000"/>
-                    </a:srgbClr>
-                  </a:outerShdw>
-                </a:effectLst>
-                <a:sym typeface="+mn-ea"/>
-              </a:rPr>
-              <a:t>o</a:t>
-            </a:r>
-            <a:endParaRPr kumimoji="0" lang="en-US" altLang="en-US" sz="1200" b="0" i="0" u="none" strike="noStrike" cap="none" normalizeH="0" baseline="-25000" smtClean="0">
-              <a:ln>
-                <a:noFill/>
-              </a:ln>
-              <a:solidFill>
-                <a:schemeClr val="accent1">
-                  <a:lumMod val="50000"/>
-                </a:schemeClr>
-              </a:solidFill>
-              <a:effectLst>
-                <a:outerShdw blurRad="38100" dist="25400" dir="5400000" algn="ctr" rotWithShape="0">
-                  <a:srgbClr val="6E747A">
-                    <a:alpha val="43000"/>
-                  </a:srgbClr>
-                </a:outerShdw>
-              </a:effectLst>
-              <a:latin typeface="Arial" panose="02080604020202020204" pitchFamily="34" charset="0"/>
-              <a:ea typeface="SimSun" pitchFamily="2" charset="-122"/>
-              <a:sym typeface="+mn-ea"/>
-            </a:endParaRPr>
-          </a:p>
-        </p:txBody>
-      </p:sp>
-      <p:sp>
-        <p:nvSpPr>
-          <p:cNvPr id="340" name="Flowchart: Off-page Connector 339"/>
-          <p:cNvSpPr/>
-          <p:nvPr/>
-        </p:nvSpPr>
-        <p:spPr>
-          <a:xfrm>
-            <a:off x="3195320" y="7833360"/>
-            <a:ext cx="344170" cy="328295"/>
-          </a:xfrm>
-          <a:prstGeom prst="flowChartOffpageConnector">
-            <a:avLst/>
-          </a:prstGeom>
-          <a:gradFill rotWithShape="0">
-            <a:gsLst>
-              <a:gs pos="0">
-                <a:schemeClr val="accent1"/>
-              </a:gs>
-              <a:gs pos="100000">
-                <a:schemeClr val="accent2"/>
-              </a:gs>
-            </a:gsLst>
-            <a:lin ang="5400000" scaled="1"/>
-          </a:gradFill>
-          <a:ln w="9525" cap="flat" cmpd="sng" algn="ctr">
-            <a:solidFill>
-              <a:schemeClr val="accent1"/>
-            </a:solidFill>
-            <a:prstDash val="solid"/>
-            <a:round/>
-            <a:headEnd type="none" w="med" len="med"/>
-            <a:tailEnd type="none" w="med" len="med"/>
-          </a:ln>
-        </p:spPr>
-        <p:txBody>
-          <a:bodyPr vert="horz" wrap="none" lIns="91440" tIns="45720" rIns="91440" bIns="45720" numCol="1" anchor="ctr" anchorCtr="0" compatLnSpc="1"/>
-          <a:p>
-            <a:pPr marL="0" marR="0" indent="0" algn="l" defTabSz="914400" rtl="0" eaLnBrk="1" fontAlgn="base" latinLnBrk="0" hangingPunct="1">
-              <a:lnSpc>
-                <a:spcPct val="100000"/>
-              </a:lnSpc>
-              <a:spcBef>
-                <a:spcPct val="0"/>
-              </a:spcBef>
-              <a:spcAft>
-                <a:spcPct val="0"/>
-              </a:spcAft>
-              <a:buClrTx/>
-              <a:buSzTx/>
-              <a:buFontTx/>
-              <a:buNone/>
-            </a:pPr>
-            <a:r>
-              <a:rPr lang="en-US" sz="1200">
-                <a:solidFill>
-                  <a:schemeClr val="accent1">
-                    <a:lumMod val="50000"/>
-                  </a:schemeClr>
-                </a:solidFill>
-                <a:effectLst>
-                  <a:outerShdw blurRad="38100" dist="25400" dir="5400000" algn="ctr" rotWithShape="0">
-                    <a:srgbClr val="6E747A">
-                      <a:alpha val="43000"/>
-                    </a:srgbClr>
-                  </a:outerShdw>
-                </a:effectLst>
-                <a:sym typeface="+mn-ea"/>
-              </a:rPr>
-              <a:t>S</a:t>
-            </a:r>
-            <a:r>
-              <a:rPr lang="en-US" sz="1200" baseline="-25000">
-                <a:solidFill>
-                  <a:schemeClr val="accent1">
-                    <a:lumMod val="50000"/>
-                  </a:schemeClr>
-                </a:solidFill>
-                <a:effectLst>
-                  <a:outerShdw blurRad="38100" dist="25400" dir="5400000" algn="ctr" rotWithShape="0">
-                    <a:srgbClr val="6E747A">
-                      <a:alpha val="43000"/>
-                    </a:srgbClr>
-                  </a:outerShdw>
-                </a:effectLst>
-                <a:sym typeface="+mn-ea"/>
-              </a:rPr>
-              <a:t>c</a:t>
-            </a:r>
-            <a:endParaRPr kumimoji="0" lang="en-US" altLang="en-US" sz="1200" b="0" i="0" u="none" strike="noStrike" cap="none" normalizeH="0" baseline="-25000" smtClean="0">
-              <a:ln>
-                <a:noFill/>
-              </a:ln>
-              <a:solidFill>
-                <a:schemeClr val="accent1">
-                  <a:lumMod val="50000"/>
-                </a:schemeClr>
-              </a:solidFill>
-              <a:effectLst>
-                <a:outerShdw blurRad="38100" dist="25400" dir="5400000" algn="ctr" rotWithShape="0">
-                  <a:srgbClr val="6E747A">
-                    <a:alpha val="43000"/>
-                  </a:srgbClr>
-                </a:outerShdw>
-              </a:effectLst>
-              <a:latin typeface="Arial" panose="02080604020202020204" pitchFamily="34" charset="0"/>
-              <a:ea typeface="SimSun" pitchFamily="2" charset="-122"/>
-              <a:sym typeface="+mn-ea"/>
-            </a:endParaRPr>
-          </a:p>
-        </p:txBody>
-      </p:sp>
-      <p:sp>
-        <p:nvSpPr>
-          <p:cNvPr id="17" name="Flowchart: Off-page Connector 16"/>
-          <p:cNvSpPr/>
-          <p:nvPr/>
-        </p:nvSpPr>
-        <p:spPr>
-          <a:xfrm>
-            <a:off x="10038715" y="3950970"/>
-            <a:ext cx="438912" cy="219456"/>
-          </a:xfrm>
-          <a:prstGeom prst="flowChartOffpageConnector">
-            <a:avLst/>
-          </a:prstGeom>
-          <a:solidFill>
-            <a:schemeClr val="accent5">
-              <a:lumMod val="75000"/>
-            </a:schemeClr>
-          </a:solidFill>
-          <a:ln w="9525" cmpd="sng">
-            <a:solidFill>
-              <a:schemeClr val="accent1">
-                <a:shade val="50000"/>
-              </a:schemeClr>
-            </a:solidFill>
-            <a:prstDash val="solid"/>
-            <a:headEnd type="none" w="med" len="med"/>
-            <a:tailEnd type="none" w="med" len="med"/>
-          </a:ln>
-        </p:spPr>
-        <p:style>
-          <a:lnRef idx="1">
-            <a:schemeClr val="accent6"/>
-          </a:lnRef>
-          <a:fillRef idx="2">
-            <a:schemeClr val="accent6"/>
-          </a:fillRef>
-          <a:effectRef idx="1">
-            <a:schemeClr val="accent6"/>
-          </a:effectRef>
-          <a:fontRef idx="minor">
-            <a:schemeClr val="dk1"/>
-          </a:fontRef>
-        </p:style>
-        <p:txBody>
-          <a:bodyPr vert="horz" wrap="none" lIns="91440" tIns="45720" rIns="91440" bIns="45720" numCol="1" anchor="ctr" anchorCtr="0" compatLnSpc="1"/>
-          <a:p>
-            <a:pPr marL="0" marR="0" indent="0" algn="ctr" defTabSz="914400" rtl="0" eaLnBrk="1" fontAlgn="base" latinLnBrk="0" hangingPunct="1">
-              <a:lnSpc>
-                <a:spcPct val="100000"/>
-              </a:lnSpc>
-              <a:spcBef>
-                <a:spcPct val="0"/>
-              </a:spcBef>
-              <a:spcAft>
-                <a:spcPct val="0"/>
-              </a:spcAft>
-              <a:buClrTx/>
-              <a:buSzTx/>
-              <a:buFontTx/>
-              <a:buNone/>
-            </a:pPr>
-            <a:r>
-              <a:rPr kumimoji="0" lang="en-US" altLang="en-US" sz="800" b="1" i="0" u="none" strike="noStrike" cap="none" normalizeH="0" baseline="-25000" smtClean="0">
+          <a:effectLst>
+            <a:outerShdw blurRad="50800" dist="38100" dir="8100000" algn="tr" rotWithShape="0">
+              <a:prstClr val="black">
+                <a:alpha val="40000"/>
+              </a:prstClr>
+            </a:outerShdw>
+          </a:effectLst>
+        </p:spPr>
+        <p:style>
+          <a:lnRef idx="3">
+            <a:schemeClr val="accent4"/>
+          </a:lnRef>
+          <a:fillRef idx="0">
+            <a:schemeClr val="accent4"/>
+          </a:fillRef>
+          <a:effectRef idx="2">
+            <a:schemeClr val="accent4"/>
+          </a:effectRef>
+          <a:fontRef idx="minor">
+            <a:schemeClr val="tx1"/>
+          </a:fontRef>
+        </p:style>
+      </p:cxnSp>
+      <p:grpSp>
+        <p:nvGrpSpPr>
+          <p:cNvPr id="234" name="Group 233"/>
+          <p:cNvGrpSpPr/>
+          <p:nvPr/>
+        </p:nvGrpSpPr>
+        <p:grpSpPr>
+          <a:xfrm>
+            <a:off x="8921115" y="6485890"/>
+            <a:ext cx="554355" cy="368935"/>
+            <a:chOff x="14049" y="10214"/>
+            <a:chExt cx="873" cy="581"/>
+          </a:xfrm>
+        </p:grpSpPr>
+        <p:sp>
+          <p:nvSpPr>
+            <p:cNvPr id="83" name="Flowchart: Off-page Connector 82"/>
+            <p:cNvSpPr/>
+            <p:nvPr/>
+          </p:nvSpPr>
+          <p:spPr>
+            <a:xfrm>
+              <a:off x="14049" y="10451"/>
+              <a:ext cx="691" cy="345"/>
+            </a:xfrm>
+            <a:prstGeom prst="flowChartOffpageConnector">
+              <a:avLst/>
+            </a:prstGeom>
+            <a:ln>
+              <a:headEnd type="none" w="med" len="med"/>
+              <a:tailEnd type="none" w="med" len="med"/>
+            </a:ln>
+            <a:effectLst>
+              <a:outerShdw blurRad="50800" dist="38100" dir="8100000" algn="tr" rotWithShape="0">
+                <a:prstClr val="black">
+                  <a:alpha val="40000"/>
+                </a:prstClr>
+              </a:outerShdw>
+            </a:effectLst>
+          </p:spPr>
+          <p:style>
+            <a:lnRef idx="0">
+              <a:schemeClr val="accent4"/>
+            </a:lnRef>
+            <a:fillRef idx="3">
+              <a:schemeClr val="accent4"/>
+            </a:fillRef>
+            <a:effectRef idx="3">
+              <a:schemeClr val="accent4"/>
+            </a:effectRef>
+            <a:fontRef idx="minor">
+              <a:schemeClr val="lt1"/>
+            </a:fontRef>
+          </p:style>
+          <p:txBody>
+            <a:bodyPr vert="horz" wrap="none" lIns="91440" tIns="45720" rIns="91440" bIns="45720" numCol="1" anchor="ctr" anchorCtr="0" compatLnSpc="1"/>
+            <a:p>
+              <a:pPr marL="0" marR="0" indent="0" algn="ctr" defTabSz="914400" rtl="0" eaLnBrk="1" fontAlgn="base" latinLnBrk="0" hangingPunct="1">
+                <a:lnSpc>
+                  <a:spcPct val="100000"/>
+                </a:lnSpc>
+                <a:spcBef>
+                  <a:spcPct val="0"/>
+                </a:spcBef>
+                <a:spcAft>
+                  <a:spcPct val="0"/>
+                </a:spcAft>
+                <a:buClrTx/>
+                <a:buSzTx/>
+                <a:buFontTx/>
+                <a:buNone/>
+              </a:pPr>
+              <a:r>
+                <a:rPr kumimoji="0" lang="en-US" altLang="en-US" sz="800" b="1" i="0" u="none" strike="noStrike" cap="none" normalizeH="0" baseline="-25000" smtClean="0">
+                  <a:ln>
+                    <a:noFill/>
+                  </a:ln>
+                  <a:solidFill>
+                    <a:schemeClr val="bg1"/>
+                  </a:solidFill>
+                  <a:effectLst>
+                    <a:outerShdw blurRad="38100" dist="25400" dir="5400000" algn="ctr" rotWithShape="0">
+                      <a:srgbClr val="6E747A">
+                        <a:alpha val="43000"/>
+                      </a:srgbClr>
+                    </a:outerShdw>
+                  </a:effectLst>
+                  <a:latin typeface="Arial" panose="02080604020202020204" pitchFamily="34" charset="0"/>
+                  <a:ea typeface="SimSun" pitchFamily="2" charset="-122"/>
+                  <a:sym typeface="+mn-ea"/>
+                </a:rPr>
+                <a:t>position</a:t>
+              </a:r>
+              <a:endParaRPr kumimoji="0" lang="en-US" altLang="en-US" sz="800" b="1" i="0" u="none" strike="noStrike" cap="none" normalizeH="0" baseline="-25000" smtClean="0">
                 <a:ln>
                   <a:noFill/>
                 </a:ln>
@@ -27191,66 +25948,473 @@
                 <a:latin typeface="Arial" panose="02080604020202020204" pitchFamily="34" charset="0"/>
                 <a:ea typeface="SimSun" pitchFamily="2" charset="-122"/>
                 <a:sym typeface="+mn-ea"/>
+              </a:endParaRPr>
+            </a:p>
+          </p:txBody>
+        </p:sp>
+        <p:grpSp>
+          <p:nvGrpSpPr>
+            <p:cNvPr id="102" name="Group 101"/>
+            <p:cNvGrpSpPr/>
+            <p:nvPr/>
+          </p:nvGrpSpPr>
+          <p:grpSpPr>
+            <a:xfrm>
+              <a:off x="14602" y="10214"/>
+              <a:ext cx="320" cy="340"/>
+              <a:chOff x="8092" y="1237"/>
+              <a:chExt cx="482" cy="524"/>
+            </a:xfrm>
+          </p:grpSpPr>
+          <p:sp>
+            <p:nvSpPr>
+              <p:cNvPr id="101" name="Oval 100"/>
+              <p:cNvSpPr/>
+              <p:nvPr/>
+            </p:nvSpPr>
+            <p:spPr>
+              <a:xfrm>
+                <a:off x="8092" y="1237"/>
+                <a:ext cx="482" cy="524"/>
+              </a:xfrm>
+              <a:prstGeom prst="ellipse">
+                <a:avLst/>
+              </a:prstGeom>
+              <a:solidFill>
+                <a:schemeClr val="bg2"/>
+              </a:solidFill>
+              <a:ln>
+                <a:solidFill>
+                  <a:schemeClr val="tx1">
+                    <a:lumMod val="50000"/>
+                    <a:lumOff val="50000"/>
+                  </a:schemeClr>
+                </a:solidFill>
+              </a:ln>
+            </p:spPr>
+            <p:style>
+              <a:lnRef idx="1">
+                <a:schemeClr val="accent1"/>
+              </a:lnRef>
+              <a:fillRef idx="3">
+                <a:schemeClr val="accent1"/>
+              </a:fillRef>
+              <a:effectRef idx="2">
+                <a:schemeClr val="accent1"/>
+              </a:effectRef>
+              <a:fontRef idx="minor">
+                <a:schemeClr val="lt1"/>
+              </a:fontRef>
+            </p:style>
+            <p:txBody>
+              <a:bodyPr rtlCol="0" anchor="ctr"/>
+              <a:p>
+                <a:pPr algn="ctr"/>
+                <a:endParaRPr lang="en-US" sz="1620"/>
+              </a:p>
+            </p:txBody>
+          </p:sp>
+          <p:pic>
+            <p:nvPicPr>
+              <p:cNvPr id="99" name="Picture 98"/>
+              <p:cNvPicPr>
+                <a:picLocks noChangeAspect="1"/>
+              </p:cNvPicPr>
+              <p:nvPr/>
+            </p:nvPicPr>
+            <p:blipFill>
+              <a:blip r:embed="rId8">
+                <a:clrChange>
+                  <a:clrFrom>
+                    <a:srgbClr val="FFFFFF">
+                      <a:alpha val="100000"/>
+                    </a:srgbClr>
+                  </a:clrFrom>
+                  <a:clrTo>
+                    <a:srgbClr val="FFFFFF">
+                      <a:alpha val="100000"/>
+                      <a:alpha val="0"/>
+                    </a:srgbClr>
+                  </a:clrTo>
+                </a:clrChange>
+              </a:blip>
+              <a:stretch>
+                <a:fillRect/>
+              </a:stretch>
+            </p:blipFill>
+            <p:spPr>
+              <a:xfrm>
+                <a:off x="8130" y="1345"/>
+                <a:ext cx="444" cy="408"/>
+              </a:xfrm>
+              <a:prstGeom prst="rect">
+                <a:avLst/>
+              </a:prstGeom>
+            </p:spPr>
+          </p:pic>
+        </p:grpSp>
+      </p:grpSp>
+      <p:sp>
+        <p:nvSpPr>
+          <p:cNvPr id="7" name="Flowchart: Terminator 6"/>
+          <p:cNvSpPr/>
+          <p:nvPr/>
+        </p:nvSpPr>
+        <p:spPr>
+          <a:xfrm>
+            <a:off x="9542780" y="5822315"/>
+            <a:ext cx="553720" cy="128905"/>
+          </a:xfrm>
+          <a:prstGeom prst="flowChartTerminator">
+            <a:avLst/>
+          </a:prstGeom>
+          <a:solidFill>
+            <a:schemeClr val="accent6">
+              <a:lumMod val="40000"/>
+              <a:lumOff val="60000"/>
+            </a:schemeClr>
+          </a:solidFill>
+          <a:ln>
+            <a:solidFill>
+              <a:schemeClr val="accent6"/>
+            </a:solidFill>
+          </a:ln>
+          <a:effectLst>
+            <a:outerShdw blurRad="50800" dist="38100" dir="8100000" algn="tr" rotWithShape="0">
+              <a:prstClr val="black">
+                <a:alpha val="40000"/>
+              </a:prstClr>
+            </a:outerShdw>
+          </a:effectLst>
+        </p:spPr>
+        <p:style>
+          <a:lnRef idx="3">
+            <a:schemeClr val="lt1"/>
+          </a:lnRef>
+          <a:fillRef idx="1">
+            <a:schemeClr val="accent6"/>
+          </a:fillRef>
+          <a:effectRef idx="1">
+            <a:schemeClr val="accent6"/>
+          </a:effectRef>
+          <a:fontRef idx="minor">
+            <a:schemeClr val="lt1"/>
+          </a:fontRef>
+        </p:style>
+        <p:txBody>
+          <a:bodyPr rtlCol="0" anchor="ctr"/>
+          <a:p>
+            <a:pPr algn="ctr"/>
+            <a:r>
+              <a:rPr lang="en-US" sz="450" b="1">
+                <a:solidFill>
+                  <a:schemeClr val="tx1">
+                    <a:lumMod val="75000"/>
+                    <a:lumOff val="25000"/>
+                  </a:schemeClr>
+                </a:solidFill>
               </a:rPr>
-              <a:t>positions</a:t>
+              <a:t>active</a:t>
             </a:r>
-            <a:endParaRPr kumimoji="0" lang="en-US" altLang="en-US" sz="800" b="1" i="0" u="none" strike="noStrike" cap="none" normalizeH="0" baseline="-25000" smtClean="0">
-              <a:ln>
-                <a:noFill/>
-              </a:ln>
+            <a:endParaRPr lang="en-US" sz="450" b="1">
               <a:solidFill>
-                <a:schemeClr val="bg1"/>
+                <a:schemeClr val="tx1">
+                  <a:lumMod val="75000"/>
+                  <a:lumOff val="25000"/>
+                </a:schemeClr>
               </a:solidFill>
-              <a:effectLst>
-                <a:outerShdw blurRad="38100" dist="25400" dir="5400000" algn="ctr" rotWithShape="0">
-                  <a:srgbClr val="6E747A">
-                    <a:alpha val="43000"/>
-                  </a:srgbClr>
-                </a:outerShdw>
-              </a:effectLst>
-              <a:latin typeface="Arial" panose="02080604020202020204" pitchFamily="34" charset="0"/>
-              <a:ea typeface="SimSun" pitchFamily="2" charset="-122"/>
-              <a:sym typeface="+mn-ea"/>
             </a:endParaRPr>
           </a:p>
         </p:txBody>
       </p:sp>
-      <p:cxnSp>
-        <p:nvCxnSpPr>
-          <p:cNvPr id="4" name="Straight Arrow Connector 3"/>
-          <p:cNvCxnSpPr>
-            <a:stCxn id="17" idx="2"/>
-            <a:endCxn id="8" idx="0"/>
-          </p:cNvCxnSpPr>
-          <p:nvPr/>
-        </p:nvCxnSpPr>
-        <p:spPr>
-          <a:xfrm>
-            <a:off x="10258425" y="4170680"/>
-            <a:ext cx="0" cy="281305"/>
-          </a:xfrm>
-          <a:prstGeom prst="straightConnector1">
-            <a:avLst/>
-          </a:prstGeom>
+      <p:sp>
+        <p:nvSpPr>
+          <p:cNvPr id="238" name="Flowchart: Terminator 237"/>
+          <p:cNvSpPr/>
+          <p:nvPr/>
+        </p:nvSpPr>
+        <p:spPr>
+          <a:xfrm>
+            <a:off x="5743575" y="6294120"/>
+            <a:ext cx="553720" cy="128905"/>
+          </a:xfrm>
+          <a:prstGeom prst="flowChartTerminator">
+            <a:avLst/>
+          </a:prstGeom>
+          <a:solidFill>
+            <a:schemeClr val="accent6">
+              <a:lumMod val="40000"/>
+              <a:lumOff val="60000"/>
+            </a:schemeClr>
+          </a:solidFill>
           <a:ln>
-            <a:tailEnd type="triangle"/>
+            <a:solidFill>
+              <a:schemeClr val="accent6"/>
+            </a:solidFill>
           </a:ln>
         </p:spPr>
         <p:style>
-          <a:lnRef idx="1">
-            <a:schemeClr val="accent1"/>
-          </a:lnRef>
-          <a:fillRef idx="0">
-            <a:schemeClr val="accent1"/>
-          </a:fillRef>
-          <a:effectRef idx="0">
-            <a:schemeClr val="accent1"/>
-          </a:effectRef>
-          <a:fontRef idx="minor">
-            <a:schemeClr val="tx1"/>
-          </a:fontRef>
-        </p:style>
-      </p:cxnSp>
+          <a:lnRef idx="3">
+            <a:schemeClr val="lt1"/>
+          </a:lnRef>
+          <a:fillRef idx="1">
+            <a:schemeClr val="accent6"/>
+          </a:fillRef>
+          <a:effectRef idx="1">
+            <a:schemeClr val="accent6"/>
+          </a:effectRef>
+          <a:fontRef idx="minor">
+            <a:schemeClr val="lt1"/>
+          </a:fontRef>
+        </p:style>
+        <p:txBody>
+          <a:bodyPr rtlCol="0" anchor="ctr"/>
+          <a:p>
+            <a:pPr algn="ctr"/>
+            <a:r>
+              <a:rPr lang="en-US" sz="450" b="1">
+                <a:solidFill>
+                  <a:schemeClr val="tx1">
+                    <a:lumMod val="75000"/>
+                    <a:lumOff val="25000"/>
+                  </a:schemeClr>
+                </a:solidFill>
+              </a:rPr>
+              <a:t>open</a:t>
+            </a:r>
+            <a:endParaRPr lang="en-US" sz="450" b="1">
+              <a:solidFill>
+                <a:schemeClr val="tx1">
+                  <a:lumMod val="75000"/>
+                  <a:lumOff val="25000"/>
+                </a:schemeClr>
+              </a:solidFill>
+            </a:endParaRPr>
+          </a:p>
+        </p:txBody>
+      </p:sp>
+      <p:grpSp>
+        <p:nvGrpSpPr>
+          <p:cNvPr id="240" name="Group 239"/>
+          <p:cNvGrpSpPr/>
+          <p:nvPr/>
+        </p:nvGrpSpPr>
+        <p:grpSpPr>
+          <a:xfrm>
+            <a:off x="4281170" y="3948430"/>
+            <a:ext cx="1099820" cy="2291080"/>
+            <a:chOff x="6742" y="6218"/>
+            <a:chExt cx="1732" cy="3608"/>
+          </a:xfrm>
+        </p:grpSpPr>
+        <p:grpSp>
+          <p:nvGrpSpPr>
+            <p:cNvPr id="268" name="Group 267"/>
+            <p:cNvGrpSpPr/>
+            <p:nvPr/>
+          </p:nvGrpSpPr>
+          <p:grpSpPr>
+            <a:xfrm rot="0">
+              <a:off x="6742" y="6218"/>
+              <a:ext cx="673" cy="526"/>
+              <a:chOff x="16290" y="4518"/>
+              <a:chExt cx="748" cy="584"/>
+            </a:xfrm>
+          </p:grpSpPr>
+          <p:pic>
+            <p:nvPicPr>
+              <p:cNvPr id="269" name="Picture 268"/>
+              <p:cNvPicPr>
+                <a:picLocks noChangeAspect="1"/>
+              </p:cNvPicPr>
+              <p:nvPr/>
+            </p:nvPicPr>
+            <p:blipFill>
+              <a:blip r:embed="rId2"/>
+              <a:stretch>
+                <a:fillRect/>
+              </a:stretch>
+            </p:blipFill>
+            <p:spPr>
+              <a:xfrm>
+                <a:off x="16290" y="4760"/>
+                <a:ext cx="301" cy="342"/>
+              </a:xfrm>
+              <a:prstGeom prst="rect">
+                <a:avLst/>
+              </a:prstGeom>
+            </p:spPr>
+          </p:pic>
+          <p:sp>
+            <p:nvSpPr>
+              <p:cNvPr id="270" name="Oval 269"/>
+              <p:cNvSpPr/>
+              <p:nvPr/>
+            </p:nvSpPr>
+            <p:spPr>
+              <a:xfrm>
+                <a:off x="16568" y="4588"/>
+                <a:ext cx="389" cy="383"/>
+              </a:xfrm>
+              <a:prstGeom prst="ellipse">
+                <a:avLst/>
+              </a:prstGeom>
+              <a:solidFill>
+                <a:schemeClr val="bg1"/>
+              </a:solidFill>
+              <a:ln>
+                <a:solidFill>
+                  <a:srgbClr val="E7971C"/>
+                </a:solidFill>
+              </a:ln>
+            </p:spPr>
+            <p:style>
+              <a:lnRef idx="2">
+                <a:schemeClr val="accent1">
+                  <a:shade val="50000"/>
+                </a:schemeClr>
+              </a:lnRef>
+              <a:fillRef idx="1">
+                <a:schemeClr val="accent1"/>
+              </a:fillRef>
+              <a:effectRef idx="0">
+                <a:schemeClr val="accent1"/>
+              </a:effectRef>
+              <a:fontRef idx="minor">
+                <a:schemeClr val="lt1"/>
+              </a:fontRef>
+            </p:style>
+            <p:txBody>
+              <a:bodyPr rtlCol="0" anchor="ctr"/>
+              <a:p>
+                <a:pPr algn="ctr"/>
+                <a:endParaRPr lang="en-US" sz="1620"/>
+              </a:p>
+            </p:txBody>
+          </p:sp>
+          <p:pic>
+            <p:nvPicPr>
+              <p:cNvPr id="271" name="Picture 270"/>
+              <p:cNvPicPr>
+                <a:picLocks noChangeAspect="1"/>
+              </p:cNvPicPr>
+              <p:nvPr/>
+            </p:nvPicPr>
+            <p:blipFill>
+              <a:blip r:embed="rId3"/>
+              <a:stretch>
+                <a:fillRect/>
+              </a:stretch>
+            </p:blipFill>
+            <p:spPr>
+              <a:xfrm>
+                <a:off x="16474" y="4518"/>
+                <a:ext cx="565" cy="519"/>
+              </a:xfrm>
+              <a:prstGeom prst="rect">
+                <a:avLst/>
+              </a:prstGeom>
+            </p:spPr>
+          </p:pic>
+        </p:grpSp>
+        <p:pic>
+          <p:nvPicPr>
+            <p:cNvPr id="239" name="Picture 238"/>
+            <p:cNvPicPr>
+              <a:picLocks noChangeAspect="1"/>
+            </p:cNvPicPr>
+            <p:nvPr/>
+          </p:nvPicPr>
+          <p:blipFill>
+            <a:blip r:embed="rId9"/>
+            <a:stretch>
+              <a:fillRect/>
+            </a:stretch>
+          </p:blipFill>
+          <p:spPr>
+            <a:xfrm>
+              <a:off x="6908" y="6640"/>
+              <a:ext cx="1566" cy="3186"/>
+            </a:xfrm>
+            <a:prstGeom prst="rect">
+              <a:avLst/>
+            </a:prstGeom>
+          </p:spPr>
+        </p:pic>
+      </p:grpSp>
+      <p:sp>
+        <p:nvSpPr>
+          <p:cNvPr id="319" name="Flowchart: Terminator 318"/>
+          <p:cNvSpPr/>
+          <p:nvPr/>
+        </p:nvSpPr>
+        <p:spPr>
+          <a:xfrm>
+            <a:off x="5203190" y="5166360"/>
+            <a:ext cx="501015" cy="128905"/>
+          </a:xfrm>
+          <a:prstGeom prst="flowChartTerminator">
+            <a:avLst/>
+          </a:prstGeom>
+          <a:solidFill>
+            <a:schemeClr val="accent6">
+              <a:lumMod val="40000"/>
+              <a:lumOff val="60000"/>
+            </a:schemeClr>
+          </a:solidFill>
+          <a:ln>
+            <a:solidFill>
+              <a:schemeClr val="accent6"/>
+            </a:solidFill>
+          </a:ln>
+          <a:effectLst>
+            <a:outerShdw blurRad="50800" dist="38100" dir="8100000" algn="tr" rotWithShape="0">
+              <a:prstClr val="black">
+                <a:alpha val="40000"/>
+              </a:prstClr>
+            </a:outerShdw>
+          </a:effectLst>
+        </p:spPr>
+        <p:style>
+          <a:lnRef idx="3">
+            <a:schemeClr val="lt1"/>
+          </a:lnRef>
+          <a:fillRef idx="1">
+            <a:schemeClr val="accent6"/>
+          </a:fillRef>
+          <a:effectRef idx="1">
+            <a:schemeClr val="accent6"/>
+          </a:effectRef>
+          <a:fontRef idx="minor">
+            <a:schemeClr val="lt1"/>
+          </a:fontRef>
+        </p:style>
+        <p:txBody>
+          <a:bodyPr rtlCol="0" anchor="ctr"/>
+          <a:p>
+            <a:pPr algn="ctr"/>
+            <a:r>
+              <a:rPr lang="en-US" sz="450" b="1">
+                <a:solidFill>
+                  <a:schemeClr val="tx1">
+                    <a:lumMod val="75000"/>
+                    <a:lumOff val="25000"/>
+                  </a:schemeClr>
+                </a:solidFill>
+              </a:rPr>
+              <a:t>update</a:t>
+            </a:r>
+            <a:endParaRPr lang="en-US" sz="450" b="1">
+              <a:solidFill>
+                <a:schemeClr val="tx1">
+                  <a:lumMod val="75000"/>
+                  <a:lumOff val="25000"/>
+                </a:schemeClr>
+              </a:solidFill>
+            </a:endParaRPr>
+          </a:p>
+        </p:txBody>
+      </p:sp>
     </p:spTree>
   </p:cSld>
   <p:clrMapOvr>

</xml_diff>

<commit_message>
Savepoint; Working release; enhancements to request.submit to provide for keyless entry;
</commit_message>
<xml_diff>
--- a/~Documents/AppArchitecture.pptx
+++ b/~Documents/AppArchitecture.pptx
@@ -23482,30 +23482,6 @@
         <p:nvPr/>
       </p:nvGrpSpPr>
       <p:grpSpPr/>
-      <p:pic>
-        <p:nvPicPr>
-          <p:cNvPr id="241" name="Picture 240"/>
-          <p:cNvPicPr>
-            <a:picLocks noChangeAspect="1"/>
-          </p:cNvPicPr>
-          <p:nvPr/>
-        </p:nvPicPr>
-        <p:blipFill>
-          <a:blip r:embed="rId1"/>
-          <a:stretch>
-            <a:fillRect/>
-          </a:stretch>
-        </p:blipFill>
-        <p:spPr>
-          <a:xfrm>
-            <a:off x="4326255" y="6912610"/>
-            <a:ext cx="1000125" cy="1175385"/>
-          </a:xfrm>
-          <a:prstGeom prst="rect">
-            <a:avLst/>
-          </a:prstGeom>
-        </p:spPr>
-      </p:pic>
       <p:sp>
         <p:nvSpPr>
           <p:cNvPr id="6" name="Rectangles 5"/>
@@ -23575,113 +23551,159 @@
       </p:sp>
       <p:grpSp>
         <p:nvGrpSpPr>
-          <p:cNvPr id="272" name="Group 271"/>
+          <p:cNvPr id="10" name="Group 9"/>
           <p:cNvGrpSpPr/>
           <p:nvPr/>
         </p:nvGrpSpPr>
         <p:grpSpPr>
-          <a:xfrm rot="0">
+          <a:xfrm>
             <a:off x="4239895" y="6641465"/>
-            <a:ext cx="427355" cy="334010"/>
-            <a:chOff x="16290" y="4518"/>
-            <a:chExt cx="748" cy="584"/>
+            <a:ext cx="1085850" cy="1445895"/>
+            <a:chOff x="6677" y="10459"/>
+            <a:chExt cx="1710" cy="2277"/>
           </a:xfrm>
         </p:grpSpPr>
         <p:pic>
           <p:nvPicPr>
-            <p:cNvPr id="273" name="Picture 272"/>
+            <p:cNvPr id="241" name="Picture 240"/>
             <p:cNvPicPr>
               <a:picLocks noChangeAspect="1"/>
             </p:cNvPicPr>
             <p:nvPr/>
           </p:nvPicPr>
           <p:blipFill>
-            <a:blip r:embed="rId2"/>
+            <a:blip r:embed="rId1"/>
             <a:stretch>
               <a:fillRect/>
             </a:stretch>
           </p:blipFill>
           <p:spPr>
             <a:xfrm>
-              <a:off x="16290" y="4760"/>
-              <a:ext cx="301" cy="342"/>
+              <a:off x="6813" y="10886"/>
+              <a:ext cx="1575" cy="1851"/>
             </a:xfrm>
             <a:prstGeom prst="rect">
               <a:avLst/>
             </a:prstGeom>
+            <a:effectLst>
+              <a:outerShdw blurRad="50800" dist="38100" dir="8100000" algn="tr" rotWithShape="0">
+                <a:prstClr val="black">
+                  <a:alpha val="40000"/>
+                </a:prstClr>
+              </a:outerShdw>
+            </a:effectLst>
           </p:spPr>
         </p:pic>
-        <p:sp>
-          <p:nvSpPr>
-            <p:cNvPr id="274" name="Oval 273"/>
-            <p:cNvSpPr/>
+        <p:grpSp>
+          <p:nvGrpSpPr>
+            <p:cNvPr id="272" name="Group 271"/>
+            <p:cNvGrpSpPr/>
             <p:nvPr/>
-          </p:nvSpPr>
-          <p:spPr>
-            <a:xfrm>
-              <a:off x="16568" y="4588"/>
-              <a:ext cx="389" cy="383"/>
+          </p:nvGrpSpPr>
+          <p:grpSpPr>
+            <a:xfrm rot="0">
+              <a:off x="6677" y="10459"/>
+              <a:ext cx="673" cy="526"/>
+              <a:chOff x="16290" y="4518"/>
+              <a:chExt cx="748" cy="584"/>
             </a:xfrm>
-            <a:prstGeom prst="ellipse">
-              <a:avLst/>
-            </a:prstGeom>
-            <a:solidFill>
-              <a:schemeClr val="bg1"/>
-            </a:solidFill>
-            <a:ln>
+          </p:grpSpPr>
+          <p:pic>
+            <p:nvPicPr>
+              <p:cNvPr id="273" name="Picture 272"/>
+              <p:cNvPicPr>
+                <a:picLocks noChangeAspect="1"/>
+              </p:cNvPicPr>
+              <p:nvPr/>
+            </p:nvPicPr>
+            <p:blipFill>
+              <a:blip r:embed="rId2"/>
+              <a:stretch>
+                <a:fillRect/>
+              </a:stretch>
+            </p:blipFill>
+            <p:spPr>
+              <a:xfrm>
+                <a:off x="16290" y="4760"/>
+                <a:ext cx="301" cy="342"/>
+              </a:xfrm>
+              <a:prstGeom prst="rect">
+                <a:avLst/>
+              </a:prstGeom>
+            </p:spPr>
+          </p:pic>
+          <p:sp>
+            <p:nvSpPr>
+              <p:cNvPr id="274" name="Oval 273"/>
+              <p:cNvSpPr/>
+              <p:nvPr/>
+            </p:nvSpPr>
+            <p:spPr>
+              <a:xfrm>
+                <a:off x="16568" y="4588"/>
+                <a:ext cx="389" cy="383"/>
+              </a:xfrm>
+              <a:prstGeom prst="ellipse">
+                <a:avLst/>
+              </a:prstGeom>
               <a:solidFill>
-                <a:srgbClr val="E7971C"/>
+                <a:schemeClr val="bg1"/>
               </a:solidFill>
-            </a:ln>
-          </p:spPr>
-          <p:style>
-            <a:lnRef idx="2">
-              <a:schemeClr val="accent1">
-                <a:shade val="50000"/>
-              </a:schemeClr>
-            </a:lnRef>
-            <a:fillRef idx="1">
-              <a:schemeClr val="accent1"/>
-            </a:fillRef>
-            <a:effectRef idx="0">
-              <a:schemeClr val="accent1"/>
-            </a:effectRef>
-            <a:fontRef idx="minor">
-              <a:schemeClr val="lt1"/>
-            </a:fontRef>
-          </p:style>
-          <p:txBody>
-            <a:bodyPr rtlCol="0" anchor="ctr"/>
-            <a:p>
-              <a:pPr algn="ctr"/>
-              <a:endParaRPr lang="en-US" sz="1620"/>
-            </a:p>
-          </p:txBody>
-        </p:sp>
-        <p:pic>
-          <p:nvPicPr>
-            <p:cNvPr id="275" name="Picture 274"/>
-            <p:cNvPicPr>
-              <a:picLocks noChangeAspect="1"/>
-            </p:cNvPicPr>
-            <p:nvPr/>
-          </p:nvPicPr>
-          <p:blipFill>
-            <a:blip r:embed="rId3"/>
-            <a:stretch>
-              <a:fillRect/>
-            </a:stretch>
-          </p:blipFill>
-          <p:spPr>
-            <a:xfrm>
-              <a:off x="16474" y="4518"/>
-              <a:ext cx="565" cy="519"/>
-            </a:xfrm>
-            <a:prstGeom prst="rect">
-              <a:avLst/>
-            </a:prstGeom>
-          </p:spPr>
-        </p:pic>
+              <a:ln>
+                <a:solidFill>
+                  <a:srgbClr val="E7971C"/>
+                </a:solidFill>
+              </a:ln>
+            </p:spPr>
+            <p:style>
+              <a:lnRef idx="2">
+                <a:schemeClr val="accent1">
+                  <a:shade val="50000"/>
+                </a:schemeClr>
+              </a:lnRef>
+              <a:fillRef idx="1">
+                <a:schemeClr val="accent1"/>
+              </a:fillRef>
+              <a:effectRef idx="0">
+                <a:schemeClr val="accent1"/>
+              </a:effectRef>
+              <a:fontRef idx="minor">
+                <a:schemeClr val="lt1"/>
+              </a:fontRef>
+            </p:style>
+            <p:txBody>
+              <a:bodyPr rtlCol="0" anchor="ctr"/>
+              <a:p>
+                <a:pPr algn="ctr"/>
+                <a:endParaRPr lang="en-US" sz="1620"/>
+              </a:p>
+            </p:txBody>
+          </p:sp>
+          <p:pic>
+            <p:nvPicPr>
+              <p:cNvPr id="275" name="Picture 274"/>
+              <p:cNvPicPr>
+                <a:picLocks noChangeAspect="1"/>
+              </p:cNvPicPr>
+              <p:nvPr/>
+            </p:nvPicPr>
+            <p:blipFill>
+              <a:blip r:embed="rId3"/>
+              <a:stretch>
+                <a:fillRect/>
+              </a:stretch>
+            </p:blipFill>
+            <p:spPr>
+              <a:xfrm>
+                <a:off x="16474" y="4518"/>
+                <a:ext cx="565" cy="519"/>
+              </a:xfrm>
+              <a:prstGeom prst="rect">
+                <a:avLst/>
+              </a:prstGeom>
+            </p:spPr>
+          </p:pic>
+        </p:grpSp>
       </p:grpSp>
       <p:sp>
         <p:nvSpPr>
@@ -26195,7 +26217,7 @@
       </p:sp>
       <p:grpSp>
         <p:nvGrpSpPr>
-          <p:cNvPr id="240" name="Group 239"/>
+          <p:cNvPr id="4" name="Group 3"/>
           <p:cNvGrpSpPr/>
           <p:nvPr/>
         </p:nvGrpSpPr>
@@ -26339,6 +26361,13 @@
             <a:prstGeom prst="rect">
               <a:avLst/>
             </a:prstGeom>
+            <a:effectLst>
+              <a:outerShdw blurRad="50800" dist="38100" dir="8100000" algn="tr" rotWithShape="0">
+                <a:prstClr val="black">
+                  <a:alpha val="40000"/>
+                </a:prstClr>
+              </a:outerShdw>
+            </a:effectLst>
           </p:spPr>
         </p:pic>
       </p:grpSp>

</xml_diff>

<commit_message>
Major Savepoint; DST bug identified and fixed; required significant DDL changes to candles and candle processing; Instrument Position underwent an overhaul; ipos now limited to account-specific symbols; issues with leverage forced migration of leverage property to ipos; redesign complete; next up: FCRT-2.1/2.2 (again, hence the reasons why testing is essential);
</commit_message>
<xml_diff>
--- a/~Documents/AppArchitecture.pptx
+++ b/~Documents/AppArchitecture.pptx
@@ -8,7 +8,7 @@
     <p:notesMasterId r:id="rId4"/>
   </p:notesMasterIdLst>
   <p:handoutMasterIdLst>
-    <p:handoutMasterId r:id="rId14"/>
+    <p:handoutMasterId r:id="rId15"/>
   </p:handoutMasterIdLst>
   <p:sldIdLst>
     <p:sldId id="257" r:id="rId3"/>
@@ -21,6 +21,7 @@
     <p:sldId id="270" r:id="rId11"/>
     <p:sldId id="272" r:id="rId12"/>
     <p:sldId id="274" r:id="rId13"/>
+    <p:sldId id="287" r:id="rId14"/>
   </p:sldIdLst>
   <p:sldSz cx="14630400" cy="10972800"/>
   <p:notesSz cx="10234295" cy="7103745"/>
@@ -8757,6 +8758,105 @@
           <a:xfrm>
             <a:off x="1151890" y="2202180"/>
             <a:ext cx="1011555" cy="4923790"/>
+          </a:xfrm>
+          <a:prstGeom prst="rect">
+            <a:avLst/>
+          </a:prstGeom>
+        </p:spPr>
+      </p:pic>
+    </p:spTree>
+  </p:cSld>
+  <p:clrMapOvr>
+    <a:masterClrMapping/>
+  </p:clrMapOvr>
+</p:sld>
+</file>
+
+<file path=ppt/slides/slide11.xml><?xml version="1.0" encoding="utf-8"?>
+<p:sld xmlns:a="http://schemas.openxmlformats.org/drawingml/2006/main" xmlns:r="http://schemas.openxmlformats.org/officeDocument/2006/relationships" xmlns:p="http://schemas.openxmlformats.org/presentationml/2006/main">
+  <p:cSld>
+    <p:bg>
+      <p:bgPr>
+        <a:blipFill>
+          <a:blip r:embed="rId1"/>
+          <a:stretch>
+            <a:fillRect/>
+          </a:stretch>
+        </a:blipFill>
+        <a:effectLst/>
+      </p:bgPr>
+    </p:bg>
+    <p:spTree>
+      <p:nvGrpSpPr>
+        <p:cNvPr id="1" name=""/>
+        <p:cNvGrpSpPr/>
+        <p:nvPr/>
+      </p:nvGrpSpPr>
+      <p:grpSpPr/>
+      <p:sp>
+        <p:nvSpPr>
+          <p:cNvPr id="2" name="Title 1"/>
+          <p:cNvSpPr>
+            <a:spLocks noGrp="1"/>
+          </p:cNvSpPr>
+          <p:nvPr>
+            <p:ph type="title"/>
+          </p:nvPr>
+        </p:nvSpPr>
+        <p:spPr/>
+        <p:txBody>
+          <a:bodyPr/>
+          <a:p>
+            <a:endParaRPr lang="en-US"/>
+          </a:p>
+        </p:txBody>
+      </p:sp>
+      <p:pic>
+        <p:nvPicPr>
+          <p:cNvPr id="99" name="Picture 8" descr="IMG_256"/>
+          <p:cNvPicPr>
+            <a:picLocks noChangeAspect="1"/>
+          </p:cNvPicPr>
+          <p:nvPr/>
+        </p:nvPicPr>
+        <p:blipFill>
+          <a:blip r:embed="rId1"/>
+          <a:stretch>
+            <a:fillRect/>
+          </a:stretch>
+        </p:blipFill>
+        <p:spPr>
+          <a:xfrm>
+            <a:off x="7153910" y="5325110"/>
+            <a:ext cx="322580" cy="322580"/>
+          </a:xfrm>
+          <a:prstGeom prst="rect">
+            <a:avLst/>
+          </a:prstGeom>
+          <a:noFill/>
+          <a:ln w="9525">
+            <a:noFill/>
+          </a:ln>
+        </p:spPr>
+      </p:pic>
+      <p:pic>
+        <p:nvPicPr>
+          <p:cNvPr id="6" name="Picture 5" descr="diff"/>
+          <p:cNvPicPr>
+            <a:picLocks noChangeAspect="1"/>
+          </p:cNvPicPr>
+          <p:nvPr/>
+        </p:nvPicPr>
+        <p:blipFill>
+          <a:blip r:embed="rId2"/>
+          <a:stretch>
+            <a:fillRect/>
+          </a:stretch>
+        </p:blipFill>
+        <p:spPr>
+          <a:xfrm>
+            <a:off x="7608570" y="5345430"/>
+            <a:ext cx="412115" cy="412115"/>
           </a:xfrm>
           <a:prstGeom prst="rect">
             <a:avLst/>

</xml_diff>

<commit_message>
Savepoint; FCRT 2.1.1 passed; minor updates; advancing to FCRT 2.1.2;
</commit_message>
<xml_diff>
--- a/~Documents/AppArchitecture.pptx
+++ b/~Documents/AppArchitecture.pptx
@@ -6469,7 +6469,7 @@
         </p:nvCxnSpPr>
         <p:spPr>
           <a:xfrm>
-            <a:off x="3308350" y="5518785"/>
+            <a:off x="1542415" y="5487670"/>
             <a:ext cx="3175" cy="304800"/>
           </a:xfrm>
           <a:prstGeom prst="straightConnector1">
@@ -6987,7 +6987,7 @@
         </p:nvSpPr>
         <p:spPr>
           <a:xfrm>
-            <a:off x="3092577" y="3814445"/>
+            <a:off x="1326642" y="3783330"/>
             <a:ext cx="438785" cy="219456"/>
           </a:xfrm>
           <a:prstGeom prst="flowChartOffpageConnector">
@@ -7080,7 +7080,7 @@
         </p:nvSpPr>
         <p:spPr>
           <a:xfrm>
-            <a:off x="3087497" y="4194366"/>
+            <a:off x="1321562" y="4163251"/>
             <a:ext cx="438785" cy="219075"/>
           </a:xfrm>
           <a:prstGeom prst="flowChartOffpageConnector">
@@ -7173,7 +7173,7 @@
         </p:nvSpPr>
         <p:spPr>
           <a:xfrm>
-            <a:off x="2788920" y="3086735"/>
+            <a:off x="1022985" y="3055620"/>
             <a:ext cx="1060450" cy="129540"/>
           </a:xfrm>
           <a:prstGeom prst="rect">
@@ -7223,7 +7223,7 @@
         </p:nvSpPr>
         <p:spPr>
           <a:xfrm>
-            <a:off x="2788920" y="2939415"/>
+            <a:off x="1022985" y="2908300"/>
             <a:ext cx="1060450" cy="129540"/>
           </a:xfrm>
           <a:prstGeom prst="rect">
@@ -7360,7 +7360,7 @@
         </p:nvGrpSpPr>
         <p:grpSpPr>
           <a:xfrm rot="0">
-            <a:off x="3717925" y="2823845"/>
+            <a:off x="1951990" y="2792730"/>
             <a:ext cx="203200" cy="215900"/>
             <a:chOff x="4768" y="5570"/>
             <a:chExt cx="320" cy="340"/>
@@ -7461,7 +7461,7 @@
         </p:nvSpPr>
         <p:spPr>
           <a:xfrm>
-            <a:off x="2773680" y="4808855"/>
+            <a:off x="1007745" y="4777740"/>
             <a:ext cx="1060450" cy="129540"/>
           </a:xfrm>
           <a:prstGeom prst="rect">
@@ -7511,7 +7511,7 @@
         </p:nvSpPr>
         <p:spPr>
           <a:xfrm>
-            <a:off x="2773680" y="4956175"/>
+            <a:off x="1007745" y="4925060"/>
             <a:ext cx="1060450" cy="129540"/>
           </a:xfrm>
           <a:prstGeom prst="rect">
@@ -7546,8 +7546,10 @@
           <a:p>
             <a:pPr algn="ctr"/>
             <a:r>
-              <a:rPr lang="en-US" sz="720"/>
-              <a:t>Canceled</a:t>
+              <a:rPr lang="en-US" sz="720">
+                <a:sym typeface="+mn-ea"/>
+              </a:rPr>
+              <a:t>Pending</a:t>
             </a:r>
             <a:endParaRPr lang="en-US" sz="720"/>
           </a:p>
@@ -7564,7 +7566,7 @@
         </p:nvCxnSpPr>
         <p:spPr>
           <a:xfrm rot="10800000" flipV="1">
-            <a:off x="2773680" y="5020945"/>
+            <a:off x="1007745" y="4989830"/>
             <a:ext cx="3175" cy="147320"/>
           </a:xfrm>
           <a:prstGeom prst="bentConnector3">
@@ -7599,7 +7601,7 @@
         </p:nvSpPr>
         <p:spPr>
           <a:xfrm>
-            <a:off x="2773680" y="5103495"/>
+            <a:off x="1007745" y="5072380"/>
             <a:ext cx="1060450" cy="129540"/>
           </a:xfrm>
           <a:prstGeom prst="rect">
@@ -7634,8 +7636,10 @@
           <a:p>
             <a:pPr algn="ctr"/>
             <a:r>
-              <a:rPr lang="en-US" sz="720"/>
-              <a:t>Pending</a:t>
+              <a:rPr lang="en-US" sz="720">
+                <a:sym typeface="+mn-ea"/>
+              </a:rPr>
+              <a:t>Canceled</a:t>
             </a:r>
             <a:endParaRPr lang="en-US" sz="720"/>
           </a:p>
@@ -7649,7 +7653,7 @@
         </p:nvSpPr>
         <p:spPr>
           <a:xfrm>
-            <a:off x="2773680" y="5250815"/>
+            <a:off x="1007745" y="5219700"/>
             <a:ext cx="1060450" cy="129540"/>
           </a:xfrm>
           <a:prstGeom prst="rect">
@@ -7699,7 +7703,7 @@
         </p:nvSpPr>
         <p:spPr>
           <a:xfrm>
-            <a:off x="2773680" y="5398135"/>
+            <a:off x="1007745" y="5367020"/>
             <a:ext cx="1060450" cy="129540"/>
           </a:xfrm>
           <a:prstGeom prst="rect">
@@ -7752,7 +7756,7 @@
         </p:nvCxnSpPr>
         <p:spPr>
           <a:xfrm>
-            <a:off x="3834130" y="4873625"/>
+            <a:off x="2068195" y="4842510"/>
             <a:ext cx="3175" cy="147320"/>
           </a:xfrm>
           <a:prstGeom prst="bentConnector3">
@@ -7789,7 +7793,7 @@
         </p:nvCxnSpPr>
         <p:spPr>
           <a:xfrm rot="5400000">
-            <a:off x="2628265" y="5309870"/>
+            <a:off x="862330" y="5278755"/>
             <a:ext cx="298450" cy="7620"/>
           </a:xfrm>
           <a:prstGeom prst="bentConnector4">
@@ -7828,7 +7832,7 @@
         </p:nvCxnSpPr>
         <p:spPr>
           <a:xfrm>
-            <a:off x="3834130" y="5168265"/>
+            <a:off x="2068195" y="5137150"/>
             <a:ext cx="3175" cy="147320"/>
           </a:xfrm>
           <a:prstGeom prst="bentConnector3">
@@ -7866,7 +7870,7 @@
         </p:nvCxnSpPr>
         <p:spPr>
           <a:xfrm flipH="1">
-            <a:off x="3317240" y="3216275"/>
+            <a:off x="1551305" y="3185160"/>
             <a:ext cx="1905" cy="214630"/>
           </a:xfrm>
           <a:prstGeom prst="straightConnector1">
@@ -7902,7 +7906,7 @@
         </p:nvCxnSpPr>
         <p:spPr>
           <a:xfrm flipH="1">
-            <a:off x="3306445" y="4413250"/>
+            <a:off x="1540510" y="4382135"/>
             <a:ext cx="635" cy="240030"/>
           </a:xfrm>
           <a:prstGeom prst="straightConnector1">
@@ -7935,7 +7939,7 @@
         </p:nvSpPr>
         <p:spPr>
           <a:xfrm>
-            <a:off x="2776220" y="4653280"/>
+            <a:off x="1010285" y="4622165"/>
             <a:ext cx="1060450" cy="129540"/>
           </a:xfrm>
           <a:prstGeom prst="rect">
@@ -7985,7 +7989,7 @@
         </p:nvCxnSpPr>
         <p:spPr>
           <a:xfrm>
-            <a:off x="3313430" y="6750050"/>
+            <a:off x="1547495" y="6718935"/>
             <a:ext cx="6350" cy="289560"/>
           </a:xfrm>
           <a:prstGeom prst="straightConnector1">
@@ -8018,7 +8022,7 @@
         </p:nvSpPr>
         <p:spPr>
           <a:xfrm>
-            <a:off x="2778760" y="5979160"/>
+            <a:off x="1012825" y="5948045"/>
             <a:ext cx="1060450" cy="129540"/>
           </a:xfrm>
           <a:prstGeom prst="rect">
@@ -8068,7 +8072,7 @@
         </p:nvSpPr>
         <p:spPr>
           <a:xfrm>
-            <a:off x="2778760" y="6126480"/>
+            <a:off x="1012825" y="6095365"/>
             <a:ext cx="1060450" cy="129540"/>
           </a:xfrm>
           <a:prstGeom prst="rect">
@@ -8104,7 +8108,7 @@
             <a:pPr algn="ctr"/>
             <a:r>
               <a:rPr lang="en-US" sz="720"/>
-              <a:t>Canceled</a:t>
+              <a:t>Pending</a:t>
             </a:r>
             <a:endParaRPr lang="en-US" sz="720"/>
           </a:p>
@@ -8121,7 +8125,7 @@
         </p:nvCxnSpPr>
         <p:spPr>
           <a:xfrm rot="10800000" flipV="1">
-            <a:off x="2778760" y="6191250"/>
+            <a:off x="1012825" y="6160135"/>
             <a:ext cx="3175" cy="147320"/>
           </a:xfrm>
           <a:prstGeom prst="bentConnector3">
@@ -8156,7 +8160,7 @@
         </p:nvSpPr>
         <p:spPr>
           <a:xfrm>
-            <a:off x="2778760" y="6273800"/>
+            <a:off x="1012825" y="6242685"/>
             <a:ext cx="1060450" cy="129540"/>
           </a:xfrm>
           <a:prstGeom prst="rect">
@@ -8191,8 +8195,10 @@
           <a:p>
             <a:pPr algn="ctr"/>
             <a:r>
-              <a:rPr lang="en-US" sz="720"/>
-              <a:t>Pending</a:t>
+              <a:rPr lang="en-US" sz="720">
+                <a:sym typeface="+mn-ea"/>
+              </a:rPr>
+              <a:t>Canceled</a:t>
             </a:r>
             <a:endParaRPr lang="en-US" sz="720"/>
           </a:p>
@@ -8206,7 +8212,7 @@
         </p:nvSpPr>
         <p:spPr>
           <a:xfrm>
-            <a:off x="2778760" y="6421120"/>
+            <a:off x="1012825" y="6390005"/>
             <a:ext cx="1060450" cy="129540"/>
           </a:xfrm>
           <a:prstGeom prst="rect">
@@ -8256,7 +8262,7 @@
         </p:nvSpPr>
         <p:spPr>
           <a:xfrm>
-            <a:off x="2778760" y="6568440"/>
+            <a:off x="1012825" y="6537325"/>
             <a:ext cx="1060450" cy="129540"/>
           </a:xfrm>
           <a:prstGeom prst="rect">
@@ -8309,7 +8315,7 @@
         </p:nvCxnSpPr>
         <p:spPr>
           <a:xfrm>
-            <a:off x="3839210" y="6043930"/>
+            <a:off x="2073275" y="6012815"/>
             <a:ext cx="3175" cy="147320"/>
           </a:xfrm>
           <a:prstGeom prst="bentConnector3">
@@ -8346,7 +8352,7 @@
         </p:nvCxnSpPr>
         <p:spPr>
           <a:xfrm rot="5400000">
-            <a:off x="2633345" y="6480175"/>
+            <a:off x="867410" y="6449060"/>
             <a:ext cx="298450" cy="7620"/>
           </a:xfrm>
           <a:prstGeom prst="bentConnector4">
@@ -8385,7 +8391,7 @@
         </p:nvCxnSpPr>
         <p:spPr>
           <a:xfrm>
-            <a:off x="3839210" y="6338570"/>
+            <a:off x="2073275" y="6307455"/>
             <a:ext cx="3175" cy="147320"/>
           </a:xfrm>
           <a:prstGeom prst="bentConnector3">
@@ -8420,7 +8426,7 @@
         </p:nvSpPr>
         <p:spPr>
           <a:xfrm>
-            <a:off x="2781300" y="5823585"/>
+            <a:off x="1015365" y="5792470"/>
             <a:ext cx="1060450" cy="129540"/>
           </a:xfrm>
           <a:prstGeom prst="rect">
@@ -8473,7 +8479,7 @@
         </p:nvCxnSpPr>
         <p:spPr>
           <a:xfrm flipH="1">
-            <a:off x="3307080" y="4034155"/>
+            <a:off x="1541145" y="4003040"/>
             <a:ext cx="5080" cy="160020"/>
           </a:xfrm>
           <a:prstGeom prst="straightConnector1">
@@ -8506,7 +8512,7 @@
         </p:nvSpPr>
         <p:spPr>
           <a:xfrm>
-            <a:off x="3097530" y="3431096"/>
+            <a:off x="1331595" y="3399981"/>
             <a:ext cx="438912" cy="219075"/>
           </a:xfrm>
           <a:prstGeom prst="flowChartOffpageConnector">
@@ -8605,7 +8611,7 @@
         </p:nvCxnSpPr>
         <p:spPr>
           <a:xfrm flipH="1">
-            <a:off x="3312160" y="3649980"/>
+            <a:off x="1546225" y="3618865"/>
             <a:ext cx="5080" cy="164465"/>
           </a:xfrm>
           <a:prstGeom prst="straightConnector1">
@@ -8638,7 +8644,7 @@
         </p:nvGrpSpPr>
         <p:grpSpPr>
           <a:xfrm rot="0">
-            <a:off x="1090930" y="1934210"/>
+            <a:off x="9363075" y="1640840"/>
             <a:ext cx="427355" cy="334010"/>
             <a:chOff x="16290" y="4518"/>
             <a:chExt cx="748" cy="584"/>
@@ -8756,7 +8762,7 @@
         </p:blipFill>
         <p:spPr>
           <a:xfrm>
-            <a:off x="1151890" y="2202180"/>
+            <a:off x="9424035" y="1908810"/>
             <a:ext cx="1011555" cy="4923790"/>
           </a:xfrm>
           <a:prstGeom prst="rect">
@@ -8764,6 +8770,535 @@
           </a:prstGeom>
         </p:spPr>
       </p:pic>
+      <p:sp>
+        <p:nvSpPr>
+          <p:cNvPr id="4" name="Flowchart: Document 3"/>
+          <p:cNvSpPr/>
+          <p:nvPr/>
+        </p:nvSpPr>
+        <p:spPr>
+          <a:xfrm>
+            <a:off x="2237105" y="3396615"/>
+            <a:ext cx="393065" cy="222250"/>
+          </a:xfrm>
+          <a:prstGeom prst="flowChartDocument">
+            <a:avLst/>
+          </a:prstGeom>
+          <a:ln>
+            <a:headEnd type="none" w="med" len="med"/>
+            <a:tailEnd type="none" w="med" len="med"/>
+          </a:ln>
+        </p:spPr>
+        <p:style>
+          <a:lnRef idx="2">
+            <a:schemeClr val="accent6">
+              <a:shade val="50000"/>
+            </a:schemeClr>
+          </a:lnRef>
+          <a:fillRef idx="1">
+            <a:schemeClr val="accent6"/>
+          </a:fillRef>
+          <a:effectRef idx="0">
+            <a:schemeClr val="accent6"/>
+          </a:effectRef>
+          <a:fontRef idx="minor">
+            <a:schemeClr val="lt1"/>
+          </a:fontRef>
+        </p:style>
+        <p:txBody>
+          <a:bodyPr vert="horz" wrap="none" lIns="91440" tIns="45720" rIns="91440" bIns="45720" numCol="1" anchor="ctr" anchorCtr="0" compatLnSpc="1"/>
+          <a:p>
+            <a:pPr marL="0" marR="0" indent="0" algn="l" defTabSz="914400" rtl="0" eaLnBrk="1" fontAlgn="base" latinLnBrk="0" hangingPunct="1">
+              <a:lnSpc>
+                <a:spcPct val="100000"/>
+              </a:lnSpc>
+              <a:spcBef>
+                <a:spcPct val="0"/>
+              </a:spcBef>
+              <a:spcAft>
+                <a:spcPct val="0"/>
+              </a:spcAft>
+              <a:buClrTx/>
+              <a:buSzTx/>
+              <a:buFontTx/>
+              <a:buNone/>
+            </a:pPr>
+            <a:endParaRPr kumimoji="0" lang="zh-CN" altLang="en-US" sz="1800" b="0" i="0" u="none" strike="noStrike" cap="none" normalizeH="0" baseline="0" smtClean="0">
+              <a:ln>
+                <a:noFill/>
+              </a:ln>
+              <a:solidFill>
+                <a:schemeClr val="tx1"/>
+              </a:solidFill>
+              <a:effectLst/>
+              <a:latin typeface="Arial" panose="02080604020202020204" pitchFamily="34" charset="0"/>
+              <a:ea typeface="SimSun" pitchFamily="2" charset="-122"/>
+            </a:endParaRPr>
+          </a:p>
+        </p:txBody>
+      </p:sp>
+      <p:sp>
+        <p:nvSpPr>
+          <p:cNvPr id="5" name="Flowchart: Document 4"/>
+          <p:cNvSpPr/>
+          <p:nvPr/>
+        </p:nvSpPr>
+        <p:spPr>
+          <a:xfrm>
+            <a:off x="2237105" y="3780790"/>
+            <a:ext cx="393065" cy="222250"/>
+          </a:xfrm>
+          <a:prstGeom prst="flowChartDocument">
+            <a:avLst/>
+          </a:prstGeom>
+          <a:ln>
+            <a:headEnd type="none" w="med" len="med"/>
+            <a:tailEnd type="none" w="med" len="med"/>
+          </a:ln>
+        </p:spPr>
+        <p:style>
+          <a:lnRef idx="2">
+            <a:schemeClr val="accent6">
+              <a:shade val="50000"/>
+            </a:schemeClr>
+          </a:lnRef>
+          <a:fillRef idx="1">
+            <a:schemeClr val="accent6"/>
+          </a:fillRef>
+          <a:effectRef idx="0">
+            <a:schemeClr val="accent6"/>
+          </a:effectRef>
+          <a:fontRef idx="minor">
+            <a:schemeClr val="lt1"/>
+          </a:fontRef>
+        </p:style>
+        <p:txBody>
+          <a:bodyPr vert="horz" wrap="none" lIns="91440" tIns="45720" rIns="91440" bIns="45720" numCol="1" anchor="ctr" anchorCtr="0" compatLnSpc="1"/>
+          <a:p>
+            <a:pPr marL="0" marR="0" indent="0" algn="l" defTabSz="914400" rtl="0" eaLnBrk="1" fontAlgn="base" latinLnBrk="0" hangingPunct="1">
+              <a:lnSpc>
+                <a:spcPct val="100000"/>
+              </a:lnSpc>
+              <a:spcBef>
+                <a:spcPct val="0"/>
+              </a:spcBef>
+              <a:spcAft>
+                <a:spcPct val="0"/>
+              </a:spcAft>
+              <a:buClrTx/>
+              <a:buSzTx/>
+              <a:buFontTx/>
+              <a:buNone/>
+            </a:pPr>
+            <a:endParaRPr kumimoji="0" lang="zh-CN" altLang="en-US" sz="1800" b="0" i="0" u="none" strike="noStrike" cap="none" normalizeH="0" baseline="0" smtClean="0">
+              <a:ln>
+                <a:noFill/>
+              </a:ln>
+              <a:solidFill>
+                <a:schemeClr val="tx1"/>
+              </a:solidFill>
+              <a:effectLst/>
+              <a:latin typeface="Arial" panose="02080604020202020204" pitchFamily="34" charset="0"/>
+              <a:ea typeface="SimSun" pitchFamily="2" charset="-122"/>
+            </a:endParaRPr>
+          </a:p>
+        </p:txBody>
+      </p:sp>
+      <p:sp>
+        <p:nvSpPr>
+          <p:cNvPr id="16" name="Flowchart: Document 15"/>
+          <p:cNvSpPr/>
+          <p:nvPr/>
+        </p:nvSpPr>
+        <p:spPr>
+          <a:xfrm>
+            <a:off x="2237105" y="4166235"/>
+            <a:ext cx="393065" cy="222250"/>
+          </a:xfrm>
+          <a:prstGeom prst="flowChartDocument">
+            <a:avLst/>
+          </a:prstGeom>
+          <a:ln>
+            <a:headEnd type="none" w="med" len="med"/>
+            <a:tailEnd type="none" w="med" len="med"/>
+          </a:ln>
+        </p:spPr>
+        <p:style>
+          <a:lnRef idx="2">
+            <a:schemeClr val="accent6">
+              <a:shade val="50000"/>
+            </a:schemeClr>
+          </a:lnRef>
+          <a:fillRef idx="1">
+            <a:schemeClr val="accent6"/>
+          </a:fillRef>
+          <a:effectRef idx="0">
+            <a:schemeClr val="accent6"/>
+          </a:effectRef>
+          <a:fontRef idx="minor">
+            <a:schemeClr val="lt1"/>
+          </a:fontRef>
+        </p:style>
+        <p:txBody>
+          <a:bodyPr vert="horz" wrap="none" lIns="91440" tIns="45720" rIns="91440" bIns="45720" numCol="1" anchor="ctr" anchorCtr="0" compatLnSpc="1"/>
+          <a:p>
+            <a:pPr marL="0" marR="0" indent="0" algn="l" defTabSz="914400" rtl="0" eaLnBrk="1" fontAlgn="base" latinLnBrk="0" hangingPunct="1">
+              <a:lnSpc>
+                <a:spcPct val="100000"/>
+              </a:lnSpc>
+              <a:spcBef>
+                <a:spcPct val="0"/>
+              </a:spcBef>
+              <a:spcAft>
+                <a:spcPct val="0"/>
+              </a:spcAft>
+              <a:buClrTx/>
+              <a:buSzTx/>
+              <a:buFontTx/>
+              <a:buNone/>
+            </a:pPr>
+            <a:endParaRPr kumimoji="0" lang="zh-CN" altLang="en-US" sz="1800" b="0" i="0" u="none" strike="noStrike" cap="none" normalizeH="0" baseline="0" smtClean="0">
+              <a:ln>
+                <a:noFill/>
+              </a:ln>
+              <a:solidFill>
+                <a:schemeClr val="tx1"/>
+              </a:solidFill>
+              <a:effectLst/>
+              <a:latin typeface="Arial" panose="02080604020202020204" pitchFamily="34" charset="0"/>
+              <a:ea typeface="SimSun" pitchFamily="2" charset="-122"/>
+            </a:endParaRPr>
+          </a:p>
+        </p:txBody>
+      </p:sp>
+      <p:cxnSp>
+        <p:nvCxnSpPr>
+          <p:cNvPr id="18" name="Straight Arrow Connector 17"/>
+          <p:cNvCxnSpPr>
+            <a:stCxn id="85" idx="3"/>
+            <a:endCxn id="4" idx="1"/>
+          </p:cNvCxnSpPr>
+          <p:nvPr/>
+        </p:nvCxnSpPr>
+        <p:spPr>
+          <a:xfrm flipV="1">
+            <a:off x="1770380" y="3507740"/>
+            <a:ext cx="466725" cy="1905"/>
+          </a:xfrm>
+          <a:prstGeom prst="straightConnector1">
+            <a:avLst/>
+          </a:prstGeom>
+          <a:ln>
+            <a:tailEnd type="triangle"/>
+          </a:ln>
+        </p:spPr>
+        <p:style>
+          <a:lnRef idx="1">
+            <a:schemeClr val="accent1"/>
+          </a:lnRef>
+          <a:fillRef idx="0">
+            <a:schemeClr val="accent1"/>
+          </a:fillRef>
+          <a:effectRef idx="0">
+            <a:schemeClr val="accent1"/>
+          </a:effectRef>
+          <a:fontRef idx="minor">
+            <a:schemeClr val="tx1"/>
+          </a:fontRef>
+        </p:style>
+      </p:cxnSp>
+      <p:cxnSp>
+        <p:nvCxnSpPr>
+          <p:cNvPr id="19" name="Straight Arrow Connector 18"/>
+          <p:cNvCxnSpPr>
+            <a:stCxn id="17" idx="3"/>
+            <a:endCxn id="5" idx="1"/>
+          </p:cNvCxnSpPr>
+          <p:nvPr/>
+        </p:nvCxnSpPr>
+        <p:spPr>
+          <a:xfrm flipV="1">
+            <a:off x="1765300" y="3891915"/>
+            <a:ext cx="471805" cy="1270"/>
+          </a:xfrm>
+          <a:prstGeom prst="straightConnector1">
+            <a:avLst/>
+          </a:prstGeom>
+          <a:ln>
+            <a:tailEnd type="triangle"/>
+          </a:ln>
+        </p:spPr>
+        <p:style>
+          <a:lnRef idx="1">
+            <a:schemeClr val="accent1"/>
+          </a:lnRef>
+          <a:fillRef idx="0">
+            <a:schemeClr val="accent1"/>
+          </a:fillRef>
+          <a:effectRef idx="0">
+            <a:schemeClr val="accent1"/>
+          </a:effectRef>
+          <a:fontRef idx="minor">
+            <a:schemeClr val="tx1"/>
+          </a:fontRef>
+        </p:style>
+      </p:cxnSp>
+      <p:cxnSp>
+        <p:nvCxnSpPr>
+          <p:cNvPr id="20" name="Straight Arrow Connector 19"/>
+          <p:cNvCxnSpPr>
+            <a:stCxn id="22" idx="3"/>
+            <a:endCxn id="16" idx="1"/>
+          </p:cNvCxnSpPr>
+          <p:nvPr/>
+        </p:nvCxnSpPr>
+        <p:spPr>
+          <a:xfrm>
+            <a:off x="1760220" y="4272915"/>
+            <a:ext cx="476885" cy="4445"/>
+          </a:xfrm>
+          <a:prstGeom prst="straightConnector1">
+            <a:avLst/>
+          </a:prstGeom>
+          <a:ln>
+            <a:tailEnd type="triangle"/>
+          </a:ln>
+        </p:spPr>
+        <p:style>
+          <a:lnRef idx="1">
+            <a:schemeClr val="accent1"/>
+          </a:lnRef>
+          <a:fillRef idx="0">
+            <a:schemeClr val="accent1"/>
+          </a:fillRef>
+          <a:effectRef idx="0">
+            <a:schemeClr val="accent1"/>
+          </a:effectRef>
+          <a:fontRef idx="minor">
+            <a:schemeClr val="tx1"/>
+          </a:fontRef>
+        </p:style>
+      </p:cxnSp>
+      <p:grpSp>
+        <p:nvGrpSpPr>
+          <p:cNvPr id="21" name="Group 20"/>
+          <p:cNvGrpSpPr/>
+          <p:nvPr/>
+        </p:nvGrpSpPr>
+        <p:grpSpPr>
+          <a:xfrm rot="0">
+            <a:off x="829945" y="4430395"/>
+            <a:ext cx="427355" cy="334010"/>
+            <a:chOff x="16290" y="4518"/>
+            <a:chExt cx="748" cy="584"/>
+          </a:xfrm>
+        </p:grpSpPr>
+        <p:pic>
+          <p:nvPicPr>
+            <p:cNvPr id="25" name="Picture 24"/>
+            <p:cNvPicPr>
+              <a:picLocks noChangeAspect="1"/>
+            </p:cNvPicPr>
+            <p:nvPr/>
+          </p:nvPicPr>
+          <p:blipFill>
+            <a:blip r:embed="rId1"/>
+            <a:stretch>
+              <a:fillRect/>
+            </a:stretch>
+          </p:blipFill>
+          <p:spPr>
+            <a:xfrm>
+              <a:off x="16290" y="4760"/>
+              <a:ext cx="301" cy="342"/>
+            </a:xfrm>
+            <a:prstGeom prst="rect">
+              <a:avLst/>
+            </a:prstGeom>
+          </p:spPr>
+        </p:pic>
+        <p:sp>
+          <p:nvSpPr>
+            <p:cNvPr id="31" name="Oval 30"/>
+            <p:cNvSpPr/>
+            <p:nvPr/>
+          </p:nvSpPr>
+          <p:spPr>
+            <a:xfrm>
+              <a:off x="16568" y="4588"/>
+              <a:ext cx="389" cy="383"/>
+            </a:xfrm>
+            <a:prstGeom prst="ellipse">
+              <a:avLst/>
+            </a:prstGeom>
+            <a:solidFill>
+              <a:schemeClr val="bg1"/>
+            </a:solidFill>
+            <a:ln>
+              <a:solidFill>
+                <a:srgbClr val="E7971C"/>
+              </a:solidFill>
+            </a:ln>
+          </p:spPr>
+          <p:style>
+            <a:lnRef idx="2">
+              <a:schemeClr val="accent1">
+                <a:shade val="50000"/>
+              </a:schemeClr>
+            </a:lnRef>
+            <a:fillRef idx="1">
+              <a:schemeClr val="accent1"/>
+            </a:fillRef>
+            <a:effectRef idx="0">
+              <a:schemeClr val="accent1"/>
+            </a:effectRef>
+            <a:fontRef idx="minor">
+              <a:schemeClr val="lt1"/>
+            </a:fontRef>
+          </p:style>
+          <p:txBody>
+            <a:bodyPr rtlCol="0" anchor="ctr"/>
+            <a:p>
+              <a:pPr algn="ctr"/>
+              <a:endParaRPr lang="en-US" sz="1620"/>
+            </a:p>
+          </p:txBody>
+        </p:sp>
+        <p:pic>
+          <p:nvPicPr>
+            <p:cNvPr id="33" name="Picture 32"/>
+            <p:cNvPicPr>
+              <a:picLocks noChangeAspect="1"/>
+            </p:cNvPicPr>
+            <p:nvPr/>
+          </p:nvPicPr>
+          <p:blipFill>
+            <a:blip r:embed="rId2"/>
+            <a:stretch>
+              <a:fillRect/>
+            </a:stretch>
+          </p:blipFill>
+          <p:spPr>
+            <a:xfrm>
+              <a:off x="16474" y="4518"/>
+              <a:ext cx="565" cy="519"/>
+            </a:xfrm>
+            <a:prstGeom prst="rect">
+              <a:avLst/>
+            </a:prstGeom>
+          </p:spPr>
+        </p:pic>
+      </p:grpSp>
+      <p:grpSp>
+        <p:nvGrpSpPr>
+          <p:cNvPr id="42" name="Group 41"/>
+          <p:cNvGrpSpPr/>
+          <p:nvPr/>
+        </p:nvGrpSpPr>
+        <p:grpSpPr>
+          <a:xfrm rot="0">
+            <a:off x="833120" y="5588000"/>
+            <a:ext cx="427355" cy="334010"/>
+            <a:chOff x="16290" y="4518"/>
+            <a:chExt cx="748" cy="584"/>
+          </a:xfrm>
+        </p:grpSpPr>
+        <p:pic>
+          <p:nvPicPr>
+            <p:cNvPr id="43" name="Picture 42"/>
+            <p:cNvPicPr>
+              <a:picLocks noChangeAspect="1"/>
+            </p:cNvPicPr>
+            <p:nvPr/>
+          </p:nvPicPr>
+          <p:blipFill>
+            <a:blip r:embed="rId1"/>
+            <a:stretch>
+              <a:fillRect/>
+            </a:stretch>
+          </p:blipFill>
+          <p:spPr>
+            <a:xfrm>
+              <a:off x="16290" y="4760"/>
+              <a:ext cx="301" cy="342"/>
+            </a:xfrm>
+            <a:prstGeom prst="rect">
+              <a:avLst/>
+            </a:prstGeom>
+          </p:spPr>
+        </p:pic>
+        <p:sp>
+          <p:nvSpPr>
+            <p:cNvPr id="45" name="Oval 44"/>
+            <p:cNvSpPr/>
+            <p:nvPr/>
+          </p:nvSpPr>
+          <p:spPr>
+            <a:xfrm>
+              <a:off x="16568" y="4588"/>
+              <a:ext cx="389" cy="383"/>
+            </a:xfrm>
+            <a:prstGeom prst="ellipse">
+              <a:avLst/>
+            </a:prstGeom>
+            <a:solidFill>
+              <a:schemeClr val="bg1"/>
+            </a:solidFill>
+            <a:ln>
+              <a:solidFill>
+                <a:srgbClr val="E7971C"/>
+              </a:solidFill>
+            </a:ln>
+          </p:spPr>
+          <p:style>
+            <a:lnRef idx="2">
+              <a:schemeClr val="accent1">
+                <a:shade val="50000"/>
+              </a:schemeClr>
+            </a:lnRef>
+            <a:fillRef idx="1">
+              <a:schemeClr val="accent1"/>
+            </a:fillRef>
+            <a:effectRef idx="0">
+              <a:schemeClr val="accent1"/>
+            </a:effectRef>
+            <a:fontRef idx="minor">
+              <a:schemeClr val="lt1"/>
+            </a:fontRef>
+          </p:style>
+          <p:txBody>
+            <a:bodyPr rtlCol="0" anchor="ctr"/>
+            <a:p>
+              <a:pPr algn="ctr"/>
+              <a:endParaRPr lang="en-US" sz="1620"/>
+            </a:p>
+          </p:txBody>
+        </p:sp>
+        <p:pic>
+          <p:nvPicPr>
+            <p:cNvPr id="46" name="Picture 45"/>
+            <p:cNvPicPr>
+              <a:picLocks noChangeAspect="1"/>
+            </p:cNvPicPr>
+            <p:nvPr/>
+          </p:nvPicPr>
+          <p:blipFill>
+            <a:blip r:embed="rId2"/>
+            <a:stretch>
+              <a:fillRect/>
+            </a:stretch>
+          </p:blipFill>
+          <p:spPr>
+            <a:xfrm>
+              <a:off x="16474" y="4518"/>
+              <a:ext cx="565" cy="519"/>
+            </a:xfrm>
+            <a:prstGeom prst="rect">
+              <a:avLst/>
+            </a:prstGeom>
+          </p:spPr>
+        </p:pic>
+      </p:grpSp>
     </p:spTree>
   </p:cSld>
   <p:clrMapOvr>

</xml_diff>

<commit_message>
Savepoint; FCRT 2.1.1-2 are complete and 100%; required nominal corrections including a 'state' nomen collision on TResponse; modified api post response route thru Request.Publish (~new) and not Request.Submit; determination made that Submit s/b restricted for internal app requests only while exposing the Publish function to the API was in fact cleaner; next up, FCRT 2.1.3-4 (3.Updates, 4.Leverages) ...
</commit_message>
<xml_diff>
--- a/~Documents/AppArchitecture.pptx
+++ b/~Documents/AppArchitecture.pptx
@@ -19167,7 +19167,7 @@
               <a:pPr algn="ctr"/>
               <a:r>
                 <a:rPr lang="en-US" sz="720"/>
-                <a:t>Place Order</a:t>
+                <a:t>Submit</a:t>
               </a:r>
               <a:endParaRPr lang="en-US" sz="720"/>
             </a:p>
@@ -19210,7 +19210,7 @@
               <a:pPr algn="ctr"/>
               <a:r>
                 <a:rPr lang="en-US" sz="720"/>
-                <a:t>Set State</a:t>
+                <a:t>Publish</a:t>
               </a:r>
               <a:endParaRPr lang="en-US" sz="720"/>
             </a:p>
@@ -19356,7 +19356,7 @@
               <a:pPr algn="ctr"/>
               <a:r>
                 <a:rPr lang="en-US" sz="720"/>
-                <a:t>Cancel Order</a:t>
+                <a:t>Submit</a:t>
               </a:r>
               <a:endParaRPr lang="en-US" sz="720"/>
             </a:p>
@@ -19399,7 +19399,7 @@
               <a:pPr algn="ctr"/>
               <a:r>
                 <a:rPr lang="en-US" sz="720"/>
-                <a:t>Set State</a:t>
+                <a:t>Publish</a:t>
               </a:r>
               <a:endParaRPr lang="en-US" sz="720"/>
             </a:p>
@@ -21599,7 +21599,6 @@
               <a:pPr algn="ctr"/>
               <a:r>
                 <a:rPr lang="en-US" sz="550">
-                  <a:ln/>
                   <a:solidFill>
                     <a:schemeClr val="tx1"/>
                   </a:solidFill>
@@ -21614,7 +21613,6 @@
                 <a:t>Pending?</a:t>
               </a:r>
               <a:endParaRPr lang="en-US" sz="550">
-                <a:ln/>
                 <a:solidFill>
                   <a:schemeClr val="tx1"/>
                 </a:solidFill>
@@ -25561,7 +25559,6 @@
               <a:pPr algn="ctr"/>
               <a:r>
                 <a:rPr lang="en-US" sz="550">
-                  <a:ln/>
                   <a:solidFill>
                     <a:schemeClr val="tx1"/>
                   </a:solidFill>
@@ -25576,7 +25573,6 @@
                 <a:t>Found?</a:t>
               </a:r>
               <a:endParaRPr lang="en-US" sz="550">
-                <a:ln/>
                 <a:solidFill>
                   <a:schemeClr val="tx1"/>
                 </a:solidFill>
@@ -25695,7 +25691,6 @@
               <a:pPr algn="ctr"/>
               <a:r>
                 <a:rPr lang="en-US" sz="550">
-                  <a:ln/>
                   <a:solidFill>
                     <a:schemeClr val="tx1"/>
                   </a:solidFill>
@@ -25710,7 +25705,6 @@
                 <a:t>Newer?</a:t>
               </a:r>
               <a:endParaRPr lang="en-US" sz="550">
-                <a:ln/>
                 <a:solidFill>
                   <a:schemeClr val="tx1"/>
                 </a:solidFill>
@@ -26089,7 +26083,6 @@
             <a:pPr algn="ctr"/>
             <a:r>
               <a:rPr lang="en-US" sz="630" b="1">
-                <a:ln/>
                 <a:solidFill>
                   <a:schemeClr val="tx1"/>
                 </a:solidFill>
@@ -26104,7 +26097,6 @@
               <a:t>1</a:t>
             </a:r>
             <a:endParaRPr lang="en-US" sz="630" b="1">
-              <a:ln/>
               <a:solidFill>
                 <a:schemeClr val="tx1"/>
               </a:solidFill>
@@ -26176,7 +26168,6 @@
             <a:pPr algn="ctr"/>
             <a:r>
               <a:rPr lang="en-US" sz="630" b="1">
-                <a:ln/>
                 <a:solidFill>
                   <a:schemeClr val="tx1"/>
                 </a:solidFill>
@@ -26191,7 +26182,6 @@
               <a:t>2</a:t>
             </a:r>
             <a:endParaRPr lang="en-US" sz="630" b="1">
-              <a:ln/>
               <a:solidFill>
                 <a:schemeClr val="tx1"/>
               </a:solidFill>

</xml_diff>